<commit_message>
updated Stuart Gross bio text... added elevator pitch, page description and user story to project presentation
</commit_message>
<xml_diff>
--- a/assets/reference/Project Presentation Template.pptx
+++ b/assets/reference/Project Presentation Template.pptx
@@ -1,25 +1,25 @@
 
 <file path=ppt/presentation.xml><?xml version="1.0" encoding="utf-8"?>
-<p:presentation xmlns:a="http://schemas.openxmlformats.org/drawingml/2006/main" xmlns:r="http://schemas.openxmlformats.org/officeDocument/2006/relationships" xmlns:mc="http://schemas.openxmlformats.org/markup-compatibility/2006" xmlns:mv="urn:schemas-microsoft-com:mac:vml" xmlns:p="http://schemas.openxmlformats.org/presentationml/2006/main" xmlns:c="http://schemas.openxmlformats.org/drawingml/2006/chart" xmlns:dgm="http://schemas.openxmlformats.org/drawingml/2006/diagram" xmlns:o="urn:schemas-microsoft-com:office:office" xmlns:v="urn:schemas-microsoft-com:vml" xmlns:pvml="urn:schemas-microsoft-com:office:powerpoint" xmlns:com="http://schemas.openxmlformats.org/drawingml/2006/compatibility" xmlns:p14="http://schemas.microsoft.com/office/powerpoint/2010/main" xmlns:p15="http://schemas.microsoft.com/office/powerpoint/2012/main" xmlns:ahyp="http://schemas.microsoft.com/office/drawing/2018/hyperlinkcolor" autoCompressPictures="0" strictFirstAndLastChars="0" saveSubsetFonts="1">
+<p:presentation xmlns:a="http://schemas.openxmlformats.org/drawingml/2006/main" xmlns:r="http://schemas.openxmlformats.org/officeDocument/2006/relationships" xmlns:p="http://schemas.openxmlformats.org/presentationml/2006/main" strictFirstAndLastChars="0" saveSubsetFonts="1" autoCompressPictures="0">
   <p:sldMasterIdLst>
-    <p:sldMasterId id="2147483659" r:id="rId3"/>
+    <p:sldMasterId id="2147483659" r:id="rId1"/>
   </p:sldMasterIdLst>
   <p:notesMasterIdLst>
-    <p:notesMasterId r:id="rId4"/>
+    <p:notesMasterId r:id="rId9"/>
   </p:notesMasterIdLst>
   <p:sldIdLst>
-    <p:sldId id="256" r:id="rId5"/>
-    <p:sldId id="257" r:id="rId6"/>
-    <p:sldId id="258" r:id="rId7"/>
-    <p:sldId id="259" r:id="rId8"/>
-    <p:sldId id="260" r:id="rId9"/>
-    <p:sldId id="261" r:id="rId10"/>
-    <p:sldId id="262" r:id="rId11"/>
+    <p:sldId id="256" r:id="rId2"/>
+    <p:sldId id="257" r:id="rId3"/>
+    <p:sldId id="258" r:id="rId4"/>
+    <p:sldId id="259" r:id="rId5"/>
+    <p:sldId id="260" r:id="rId6"/>
+    <p:sldId id="261" r:id="rId7"/>
+    <p:sldId id="262" r:id="rId8"/>
   </p:sldIdLst>
-  <p:sldSz cy="5143500" cx="9144000"/>
+  <p:sldSz cx="9144000" cy="5143500" type="screen16x9"/>
   <p:notesSz cx="6858000" cy="9144000"/>
   <p:defaultTextStyle>
-    <a:defPPr lvl="0" marR="0" rtl="0" algn="l">
+    <a:defPPr marR="0" lvl="0" algn="l" rtl="0">
       <a:lnSpc>
         <a:spcPct val="100000"/>
       </a:lnSpc>
@@ -30,7 +30,7 @@
         <a:spcPts val="0"/>
       </a:spcAft>
     </a:defPPr>
-    <a:lvl1pPr lvl="0" marR="0" rtl="0" algn="l">
+    <a:lvl1pPr marR="0" lvl="0" algn="l" rtl="0">
       <a:lnSpc>
         <a:spcPct val="100000"/>
       </a:lnSpc>
@@ -44,7 +44,7 @@
         <a:srgbClr val="000000"/>
       </a:buClr>
       <a:buFont typeface="Arial"/>
-      <a:defRPr b="0" i="0" sz="1400" u="none" cap="none" strike="noStrike">
+      <a:defRPr sz="1400" b="0" i="0" u="none" strike="noStrike" cap="none">
         <a:solidFill>
           <a:srgbClr val="000000"/>
         </a:solidFill>
@@ -54,7 +54,7 @@
         <a:sym typeface="Arial"/>
       </a:defRPr>
     </a:lvl1pPr>
-    <a:lvl2pPr lvl="1" marR="0" rtl="0" algn="l">
+    <a:lvl2pPr marR="0" lvl="1" algn="l" rtl="0">
       <a:lnSpc>
         <a:spcPct val="100000"/>
       </a:lnSpc>
@@ -68,7 +68,7 @@
         <a:srgbClr val="000000"/>
       </a:buClr>
       <a:buFont typeface="Arial"/>
-      <a:defRPr b="0" i="0" sz="1400" u="none" cap="none" strike="noStrike">
+      <a:defRPr sz="1400" b="0" i="0" u="none" strike="noStrike" cap="none">
         <a:solidFill>
           <a:srgbClr val="000000"/>
         </a:solidFill>
@@ -78,7 +78,7 @@
         <a:sym typeface="Arial"/>
       </a:defRPr>
     </a:lvl2pPr>
-    <a:lvl3pPr lvl="2" marR="0" rtl="0" algn="l">
+    <a:lvl3pPr marR="0" lvl="2" algn="l" rtl="0">
       <a:lnSpc>
         <a:spcPct val="100000"/>
       </a:lnSpc>
@@ -92,7 +92,7 @@
         <a:srgbClr val="000000"/>
       </a:buClr>
       <a:buFont typeface="Arial"/>
-      <a:defRPr b="0" i="0" sz="1400" u="none" cap="none" strike="noStrike">
+      <a:defRPr sz="1400" b="0" i="0" u="none" strike="noStrike" cap="none">
         <a:solidFill>
           <a:srgbClr val="000000"/>
         </a:solidFill>
@@ -102,7 +102,7 @@
         <a:sym typeface="Arial"/>
       </a:defRPr>
     </a:lvl3pPr>
-    <a:lvl4pPr lvl="3" marR="0" rtl="0" algn="l">
+    <a:lvl4pPr marR="0" lvl="3" algn="l" rtl="0">
       <a:lnSpc>
         <a:spcPct val="100000"/>
       </a:lnSpc>
@@ -116,7 +116,7 @@
         <a:srgbClr val="000000"/>
       </a:buClr>
       <a:buFont typeface="Arial"/>
-      <a:defRPr b="0" i="0" sz="1400" u="none" cap="none" strike="noStrike">
+      <a:defRPr sz="1400" b="0" i="0" u="none" strike="noStrike" cap="none">
         <a:solidFill>
           <a:srgbClr val="000000"/>
         </a:solidFill>
@@ -126,7 +126,7 @@
         <a:sym typeface="Arial"/>
       </a:defRPr>
     </a:lvl4pPr>
-    <a:lvl5pPr lvl="4" marR="0" rtl="0" algn="l">
+    <a:lvl5pPr marR="0" lvl="4" algn="l" rtl="0">
       <a:lnSpc>
         <a:spcPct val="100000"/>
       </a:lnSpc>
@@ -140,7 +140,7 @@
         <a:srgbClr val="000000"/>
       </a:buClr>
       <a:buFont typeface="Arial"/>
-      <a:defRPr b="0" i="0" sz="1400" u="none" cap="none" strike="noStrike">
+      <a:defRPr sz="1400" b="0" i="0" u="none" strike="noStrike" cap="none">
         <a:solidFill>
           <a:srgbClr val="000000"/>
         </a:solidFill>
@@ -150,7 +150,7 @@
         <a:sym typeface="Arial"/>
       </a:defRPr>
     </a:lvl5pPr>
-    <a:lvl6pPr lvl="5" marR="0" rtl="0" algn="l">
+    <a:lvl6pPr marR="0" lvl="5" algn="l" rtl="0">
       <a:lnSpc>
         <a:spcPct val="100000"/>
       </a:lnSpc>
@@ -164,7 +164,7 @@
         <a:srgbClr val="000000"/>
       </a:buClr>
       <a:buFont typeface="Arial"/>
-      <a:defRPr b="0" i="0" sz="1400" u="none" cap="none" strike="noStrike">
+      <a:defRPr sz="1400" b="0" i="0" u="none" strike="noStrike" cap="none">
         <a:solidFill>
           <a:srgbClr val="000000"/>
         </a:solidFill>
@@ -174,7 +174,7 @@
         <a:sym typeface="Arial"/>
       </a:defRPr>
     </a:lvl6pPr>
-    <a:lvl7pPr lvl="6" marR="0" rtl="0" algn="l">
+    <a:lvl7pPr marR="0" lvl="6" algn="l" rtl="0">
       <a:lnSpc>
         <a:spcPct val="100000"/>
       </a:lnSpc>
@@ -188,7 +188,7 @@
         <a:srgbClr val="000000"/>
       </a:buClr>
       <a:buFont typeface="Arial"/>
-      <a:defRPr b="0" i="0" sz="1400" u="none" cap="none" strike="noStrike">
+      <a:defRPr sz="1400" b="0" i="0" u="none" strike="noStrike" cap="none">
         <a:solidFill>
           <a:srgbClr val="000000"/>
         </a:solidFill>
@@ -198,7 +198,7 @@
         <a:sym typeface="Arial"/>
       </a:defRPr>
     </a:lvl7pPr>
-    <a:lvl8pPr lvl="7" marR="0" rtl="0" algn="l">
+    <a:lvl8pPr marR="0" lvl="7" algn="l" rtl="0">
       <a:lnSpc>
         <a:spcPct val="100000"/>
       </a:lnSpc>
@@ -212,7 +212,7 @@
         <a:srgbClr val="000000"/>
       </a:buClr>
       <a:buFont typeface="Arial"/>
-      <a:defRPr b="0" i="0" sz="1400" u="none" cap="none" strike="noStrike">
+      <a:defRPr sz="1400" b="0" i="0" u="none" strike="noStrike" cap="none">
         <a:solidFill>
           <a:srgbClr val="000000"/>
         </a:solidFill>
@@ -222,7 +222,7 @@
         <a:sym typeface="Arial"/>
       </a:defRPr>
     </a:lvl8pPr>
-    <a:lvl9pPr lvl="8" marR="0" rtl="0" algn="l">
+    <a:lvl9pPr marR="0" lvl="8" algn="l" rtl="0">
       <a:lnSpc>
         <a:spcPct val="100000"/>
       </a:lnSpc>
@@ -236,7 +236,7 @@
         <a:srgbClr val="000000"/>
       </a:buClr>
       <a:buFont typeface="Arial"/>
-      <a:defRPr b="0" i="0" sz="1400" u="none" cap="none" strike="noStrike">
+      <a:defRPr sz="1400" b="0" i="0" u="none" strike="noStrike" cap="none">
         <a:solidFill>
           <a:srgbClr val="000000"/>
         </a:solidFill>
@@ -251,11 +251,16 @@
 </file>
 
 <file path=ppt/notesMasters/notesMaster1.xml><?xml version="1.0" encoding="utf-8"?>
-<p:notesMaster xmlns:a="http://schemas.openxmlformats.org/drawingml/2006/main" xmlns:r="http://schemas.openxmlformats.org/officeDocument/2006/relationships" xmlns:mc="http://schemas.openxmlformats.org/markup-compatibility/2006" xmlns:mv="urn:schemas-microsoft-com:mac:vml" xmlns:p="http://schemas.openxmlformats.org/presentationml/2006/main" xmlns:c="http://schemas.openxmlformats.org/drawingml/2006/chart" xmlns:dgm="http://schemas.openxmlformats.org/drawingml/2006/diagram" xmlns:o="urn:schemas-microsoft-com:office:office" xmlns:v="urn:schemas-microsoft-com:vml" xmlns:pvml="urn:schemas-microsoft-com:office:powerpoint" xmlns:com="http://schemas.openxmlformats.org/drawingml/2006/compatibility" xmlns:p14="http://schemas.microsoft.com/office/powerpoint/2010/main" xmlns:p15="http://schemas.microsoft.com/office/powerpoint/2012/main" xmlns:ahyp="http://schemas.microsoft.com/office/drawing/2018/hyperlinkcolor">
+<p:notesMaster xmlns:a="http://schemas.openxmlformats.org/drawingml/2006/main" xmlns:r="http://schemas.openxmlformats.org/officeDocument/2006/relationships" xmlns:p="http://schemas.openxmlformats.org/presentationml/2006/main">
   <p:cSld>
+    <p:bg>
+      <p:bgRef idx="1001">
+        <a:schemeClr val="bg1"/>
+      </p:bgRef>
+    </p:bg>
     <p:spTree>
       <p:nvGrpSpPr>
-        <p:cNvPr id="2" name="Shape 2"/>
+        <p:cNvPr id="1" name="Shape 2"/>
         <p:cNvGrpSpPr/>
         <p:nvPr/>
       </p:nvGrpSpPr>
@@ -270,9 +275,11 @@
       <p:sp>
         <p:nvSpPr>
           <p:cNvPr id="3" name="Google Shape;3;n"/>
-          <p:cNvSpPr/>
+          <p:cNvSpPr>
+            <a:spLocks noGrp="1" noRot="1" noChangeAspect="1"/>
+          </p:cNvSpPr>
           <p:nvPr>
-            <p:ph idx="2" type="sldImg"/>
+            <p:ph type="sldImg" idx="2"/>
           </p:nvPr>
         </p:nvSpPr>
         <p:spPr>
@@ -281,9 +288,13 @@
             <a:ext cx="6096075" cy="3429000"/>
           </a:xfrm>
           <a:custGeom>
-            <a:rect b="b" l="l" r="r" t="t"/>
+            <a:avLst/>
+            <a:gdLst/>
+            <a:ahLst/>
+            <a:cxnLst/>
+            <a:rect l="l" t="t" r="r" b="b"/>
             <a:pathLst>
-              <a:path extrusionOk="0" h="120000" w="120000">
+              <a:path w="120000" h="120000" extrusionOk="0">
                 <a:moveTo>
                   <a:pt x="0" y="0"/>
                 </a:moveTo>
@@ -301,23 +312,25 @@
             </a:pathLst>
           </a:custGeom>
           <a:noFill/>
-          <a:ln cap="flat" cmpd="sng" w="9525">
+          <a:ln w="9525" cap="flat" cmpd="sng">
             <a:solidFill>
               <a:srgbClr val="000000"/>
             </a:solidFill>
             <a:prstDash val="solid"/>
             <a:round/>
-            <a:headEnd len="sm" w="sm" type="none"/>
-            <a:tailEnd len="sm" w="sm" type="none"/>
+            <a:headEnd type="none" w="sm" len="sm"/>
+            <a:tailEnd type="none" w="sm" len="sm"/>
           </a:ln>
         </p:spPr>
       </p:sp>
       <p:sp>
         <p:nvSpPr>
           <p:cNvPr id="4" name="Google Shape;4;n"/>
-          <p:cNvSpPr txBox="1"/>
+          <p:cNvSpPr txBox="1">
+            <a:spLocks noGrp="1"/>
+          </p:cNvSpPr>
           <p:nvPr>
-            <p:ph idx="1" type="body"/>
+            <p:ph type="body" idx="1"/>
           </p:nvPr>
         </p:nvSpPr>
         <p:spPr>
@@ -334,11 +347,11 @@
           </a:ln>
         </p:spPr>
         <p:txBody>
-          <a:bodyPr anchorCtr="0" anchor="t" bIns="91425" lIns="91425" spcFirstLastPara="1" rIns="91425" wrap="square" tIns="91425">
+          <a:bodyPr spcFirstLastPara="1" wrap="square" lIns="91425" tIns="91425" rIns="91425" bIns="91425" anchor="t" anchorCtr="0">
             <a:noAutofit/>
           </a:bodyPr>
           <a:lstStyle>
-            <a:lvl1pPr indent="-298450" lvl="0" marL="457200">
+            <a:lvl1pPr marL="457200" lvl="0" indent="-298450">
               <a:spcBef>
                 <a:spcPts val="0"/>
               </a:spcBef>
@@ -349,7 +362,7 @@
               <a:buChar char="●"/>
               <a:defRPr sz="1100"/>
             </a:lvl1pPr>
-            <a:lvl2pPr indent="-298450" lvl="1" marL="914400">
+            <a:lvl2pPr marL="914400" lvl="1" indent="-298450">
               <a:spcBef>
                 <a:spcPts val="0"/>
               </a:spcBef>
@@ -360,7 +373,7 @@
               <a:buChar char="○"/>
               <a:defRPr sz="1100"/>
             </a:lvl2pPr>
-            <a:lvl3pPr indent="-298450" lvl="2" marL="1371600">
+            <a:lvl3pPr marL="1371600" lvl="2" indent="-298450">
               <a:spcBef>
                 <a:spcPts val="0"/>
               </a:spcBef>
@@ -371,7 +384,7 @@
               <a:buChar char="■"/>
               <a:defRPr sz="1100"/>
             </a:lvl3pPr>
-            <a:lvl4pPr indent="-298450" lvl="3" marL="1828800">
+            <a:lvl4pPr marL="1828800" lvl="3" indent="-298450">
               <a:spcBef>
                 <a:spcPts val="0"/>
               </a:spcBef>
@@ -382,7 +395,7 @@
               <a:buChar char="●"/>
               <a:defRPr sz="1100"/>
             </a:lvl4pPr>
-            <a:lvl5pPr indent="-298450" lvl="4" marL="2286000">
+            <a:lvl5pPr marL="2286000" lvl="4" indent="-298450">
               <a:spcBef>
                 <a:spcPts val="0"/>
               </a:spcBef>
@@ -393,7 +406,7 @@
               <a:buChar char="○"/>
               <a:defRPr sz="1100"/>
             </a:lvl5pPr>
-            <a:lvl6pPr indent="-298450" lvl="5" marL="2743200">
+            <a:lvl6pPr marL="2743200" lvl="5" indent="-298450">
               <a:spcBef>
                 <a:spcPts val="0"/>
               </a:spcBef>
@@ -404,7 +417,7 @@
               <a:buChar char="■"/>
               <a:defRPr sz="1100"/>
             </a:lvl6pPr>
-            <a:lvl7pPr indent="-298450" lvl="6" marL="3200400">
+            <a:lvl7pPr marL="3200400" lvl="6" indent="-298450">
               <a:spcBef>
                 <a:spcPts val="0"/>
               </a:spcBef>
@@ -415,7 +428,7 @@
               <a:buChar char="●"/>
               <a:defRPr sz="1100"/>
             </a:lvl7pPr>
-            <a:lvl8pPr indent="-298450" lvl="7" marL="3657600">
+            <a:lvl8pPr marL="3657600" lvl="7" indent="-298450">
               <a:spcBef>
                 <a:spcPts val="0"/>
               </a:spcBef>
@@ -426,7 +439,7 @@
               <a:buChar char="○"/>
               <a:defRPr sz="1100"/>
             </a:lvl8pPr>
-            <a:lvl9pPr indent="-298450" lvl="8" marL="4114800">
+            <a:lvl9pPr marL="4114800" lvl="8" indent="-298450">
               <a:spcBef>
                 <a:spcPts val="0"/>
               </a:spcBef>
@@ -438,14 +451,16 @@
               <a:defRPr sz="1100"/>
             </a:lvl9pPr>
           </a:lstStyle>
-          <a:p/>
+          <a:p>
+            <a:endParaRPr/>
+          </a:p>
         </p:txBody>
       </p:sp>
     </p:spTree>
   </p:cSld>
-  <p:clrMap accent1="accent1" accent2="accent2" accent3="accent3" accent4="accent4" accent5="accent5" accent6="accent6" bg1="lt1" bg2="dk2" tx1="dk1" tx2="lt2" folHlink="folHlink" hlink="hlink"/>
+  <p:clrMap bg1="lt1" tx1="dk1" bg2="dk2" tx2="lt2" accent1="accent1" accent2="accent2" accent3="accent3" accent4="accent4" accent5="accent5" accent6="accent6" hlink="hlink" folHlink="folHlink"/>
   <p:notesStyle>
-    <a:defPPr lvl="0" marR="0" rtl="0" algn="l">
+    <a:defPPr marR="0" lvl="0" algn="l" rtl="0">
       <a:lnSpc>
         <a:spcPct val="100000"/>
       </a:lnSpc>
@@ -456,7 +471,7 @@
         <a:spcPts val="0"/>
       </a:spcAft>
     </a:defPPr>
-    <a:lvl1pPr lvl="0" marR="0" rtl="0" algn="l">
+    <a:lvl1pPr marR="0" lvl="0" algn="l" rtl="0">
       <a:lnSpc>
         <a:spcPct val="100000"/>
       </a:lnSpc>
@@ -470,7 +485,7 @@
         <a:srgbClr val="000000"/>
       </a:buClr>
       <a:buFont typeface="Arial"/>
-      <a:defRPr b="0" i="0" sz="1400" u="none" cap="none" strike="noStrike">
+      <a:defRPr sz="1400" b="0" i="0" u="none" strike="noStrike" cap="none">
         <a:solidFill>
           <a:srgbClr val="000000"/>
         </a:solidFill>
@@ -480,7 +495,7 @@
         <a:sym typeface="Arial"/>
       </a:defRPr>
     </a:lvl1pPr>
-    <a:lvl2pPr lvl="1" marR="0" rtl="0" algn="l">
+    <a:lvl2pPr marR="0" lvl="1" algn="l" rtl="0">
       <a:lnSpc>
         <a:spcPct val="100000"/>
       </a:lnSpc>
@@ -494,7 +509,7 @@
         <a:srgbClr val="000000"/>
       </a:buClr>
       <a:buFont typeface="Arial"/>
-      <a:defRPr b="0" i="0" sz="1400" u="none" cap="none" strike="noStrike">
+      <a:defRPr sz="1400" b="0" i="0" u="none" strike="noStrike" cap="none">
         <a:solidFill>
           <a:srgbClr val="000000"/>
         </a:solidFill>
@@ -504,7 +519,7 @@
         <a:sym typeface="Arial"/>
       </a:defRPr>
     </a:lvl2pPr>
-    <a:lvl3pPr lvl="2" marR="0" rtl="0" algn="l">
+    <a:lvl3pPr marR="0" lvl="2" algn="l" rtl="0">
       <a:lnSpc>
         <a:spcPct val="100000"/>
       </a:lnSpc>
@@ -518,7 +533,7 @@
         <a:srgbClr val="000000"/>
       </a:buClr>
       <a:buFont typeface="Arial"/>
-      <a:defRPr b="0" i="0" sz="1400" u="none" cap="none" strike="noStrike">
+      <a:defRPr sz="1400" b="0" i="0" u="none" strike="noStrike" cap="none">
         <a:solidFill>
           <a:srgbClr val="000000"/>
         </a:solidFill>
@@ -528,7 +543,7 @@
         <a:sym typeface="Arial"/>
       </a:defRPr>
     </a:lvl3pPr>
-    <a:lvl4pPr lvl="3" marR="0" rtl="0" algn="l">
+    <a:lvl4pPr marR="0" lvl="3" algn="l" rtl="0">
       <a:lnSpc>
         <a:spcPct val="100000"/>
       </a:lnSpc>
@@ -542,7 +557,7 @@
         <a:srgbClr val="000000"/>
       </a:buClr>
       <a:buFont typeface="Arial"/>
-      <a:defRPr b="0" i="0" sz="1400" u="none" cap="none" strike="noStrike">
+      <a:defRPr sz="1400" b="0" i="0" u="none" strike="noStrike" cap="none">
         <a:solidFill>
           <a:srgbClr val="000000"/>
         </a:solidFill>
@@ -552,7 +567,7 @@
         <a:sym typeface="Arial"/>
       </a:defRPr>
     </a:lvl4pPr>
-    <a:lvl5pPr lvl="4" marR="0" rtl="0" algn="l">
+    <a:lvl5pPr marR="0" lvl="4" algn="l" rtl="0">
       <a:lnSpc>
         <a:spcPct val="100000"/>
       </a:lnSpc>
@@ -566,7 +581,7 @@
         <a:srgbClr val="000000"/>
       </a:buClr>
       <a:buFont typeface="Arial"/>
-      <a:defRPr b="0" i="0" sz="1400" u="none" cap="none" strike="noStrike">
+      <a:defRPr sz="1400" b="0" i="0" u="none" strike="noStrike" cap="none">
         <a:solidFill>
           <a:srgbClr val="000000"/>
         </a:solidFill>
@@ -576,7 +591,7 @@
         <a:sym typeface="Arial"/>
       </a:defRPr>
     </a:lvl5pPr>
-    <a:lvl6pPr lvl="5" marR="0" rtl="0" algn="l">
+    <a:lvl6pPr marR="0" lvl="5" algn="l" rtl="0">
       <a:lnSpc>
         <a:spcPct val="100000"/>
       </a:lnSpc>
@@ -590,7 +605,7 @@
         <a:srgbClr val="000000"/>
       </a:buClr>
       <a:buFont typeface="Arial"/>
-      <a:defRPr b="0" i="0" sz="1400" u="none" cap="none" strike="noStrike">
+      <a:defRPr sz="1400" b="0" i="0" u="none" strike="noStrike" cap="none">
         <a:solidFill>
           <a:srgbClr val="000000"/>
         </a:solidFill>
@@ -600,7 +615,7 @@
         <a:sym typeface="Arial"/>
       </a:defRPr>
     </a:lvl6pPr>
-    <a:lvl7pPr lvl="6" marR="0" rtl="0" algn="l">
+    <a:lvl7pPr marR="0" lvl="6" algn="l" rtl="0">
       <a:lnSpc>
         <a:spcPct val="100000"/>
       </a:lnSpc>
@@ -614,7 +629,7 @@
         <a:srgbClr val="000000"/>
       </a:buClr>
       <a:buFont typeface="Arial"/>
-      <a:defRPr b="0" i="0" sz="1400" u="none" cap="none" strike="noStrike">
+      <a:defRPr sz="1400" b="0" i="0" u="none" strike="noStrike" cap="none">
         <a:solidFill>
           <a:srgbClr val="000000"/>
         </a:solidFill>
@@ -624,7 +639,7 @@
         <a:sym typeface="Arial"/>
       </a:defRPr>
     </a:lvl7pPr>
-    <a:lvl8pPr lvl="7" marR="0" rtl="0" algn="l">
+    <a:lvl8pPr marR="0" lvl="7" algn="l" rtl="0">
       <a:lnSpc>
         <a:spcPct val="100000"/>
       </a:lnSpc>
@@ -638,7 +653,7 @@
         <a:srgbClr val="000000"/>
       </a:buClr>
       <a:buFont typeface="Arial"/>
-      <a:defRPr b="0" i="0" sz="1400" u="none" cap="none" strike="noStrike">
+      <a:defRPr sz="1400" b="0" i="0" u="none" strike="noStrike" cap="none">
         <a:solidFill>
           <a:srgbClr val="000000"/>
         </a:solidFill>
@@ -648,7 +663,7 @@
         <a:sym typeface="Arial"/>
       </a:defRPr>
     </a:lvl8pPr>
-    <a:lvl9pPr lvl="8" marR="0" rtl="0" algn="l">
+    <a:lvl9pPr marR="0" lvl="8" algn="l" rtl="0">
       <a:lnSpc>
         <a:spcPct val="100000"/>
       </a:lnSpc>
@@ -662,7 +677,7 @@
         <a:srgbClr val="000000"/>
       </a:buClr>
       <a:buFont typeface="Arial"/>
-      <a:defRPr b="0" i="0" sz="1400" u="none" cap="none" strike="noStrike">
+      <a:defRPr sz="1400" b="0" i="0" u="none" strike="noStrike" cap="none">
         <a:solidFill>
           <a:srgbClr val="000000"/>
         </a:solidFill>
@@ -677,11 +692,11 @@
 </file>
 
 <file path=ppt/notesSlides/notesSlide1.xml><?xml version="1.0" encoding="utf-8"?>
-<p:notes xmlns:a="http://schemas.openxmlformats.org/drawingml/2006/main" xmlns:r="http://schemas.openxmlformats.org/officeDocument/2006/relationships" xmlns:mc="http://schemas.openxmlformats.org/markup-compatibility/2006" xmlns:mv="urn:schemas-microsoft-com:mac:vml" xmlns:p="http://schemas.openxmlformats.org/presentationml/2006/main" xmlns:c="http://schemas.openxmlformats.org/drawingml/2006/chart" xmlns:dgm="http://schemas.openxmlformats.org/drawingml/2006/diagram" xmlns:o="urn:schemas-microsoft-com:office:office" xmlns:v="urn:schemas-microsoft-com:vml" xmlns:pvml="urn:schemas-microsoft-com:office:powerpoint" xmlns:com="http://schemas.openxmlformats.org/drawingml/2006/compatibility" xmlns:p14="http://schemas.microsoft.com/office/powerpoint/2010/main" xmlns:p15="http://schemas.microsoft.com/office/powerpoint/2012/main" xmlns:ahyp="http://schemas.microsoft.com/office/drawing/2018/hyperlinkcolor" showMasterPhAnim="0" showMasterSp="0">
+<p:notes xmlns:a="http://schemas.openxmlformats.org/drawingml/2006/main" xmlns:r="http://schemas.openxmlformats.org/officeDocument/2006/relationships" xmlns:p="http://schemas.openxmlformats.org/presentationml/2006/main" showMasterSp="0" showMasterPhAnim="0">
   <p:cSld>
     <p:spTree>
       <p:nvGrpSpPr>
-        <p:cNvPr id="50" name="Shape 50"/>
+        <p:cNvPr id="1" name="Shape 50"/>
         <p:cNvGrpSpPr/>
         <p:nvPr/>
       </p:nvGrpSpPr>
@@ -696,20 +711,26 @@
       <p:sp>
         <p:nvSpPr>
           <p:cNvPr id="51" name="Google Shape;51;p:notes"/>
-          <p:cNvSpPr/>
+          <p:cNvSpPr>
+            <a:spLocks noGrp="1" noRot="1" noChangeAspect="1"/>
+          </p:cNvSpPr>
           <p:nvPr>
-            <p:ph idx="2" type="sldImg"/>
+            <p:ph type="sldImg" idx="2"/>
           </p:nvPr>
         </p:nvSpPr>
         <p:spPr>
           <a:xfrm>
-            <a:off x="381300" y="685800"/>
-            <a:ext cx="6096075" cy="3429000"/>
+            <a:off x="381000" y="685800"/>
+            <a:ext cx="6096000" cy="3429000"/>
           </a:xfrm>
           <a:custGeom>
-            <a:rect b="b" l="l" r="r" t="t"/>
+            <a:avLst/>
+            <a:gdLst/>
+            <a:ahLst/>
+            <a:cxnLst/>
+            <a:rect l="l" t="t" r="r" b="b"/>
             <a:pathLst>
-              <a:path extrusionOk="0" h="120000" w="120000">
+              <a:path w="120000" h="120000" extrusionOk="0">
                 <a:moveTo>
                   <a:pt x="0" y="0"/>
                 </a:moveTo>
@@ -731,9 +752,11 @@
       <p:sp>
         <p:nvSpPr>
           <p:cNvPr id="52" name="Google Shape;52;p:notes"/>
-          <p:cNvSpPr txBox="1"/>
+          <p:cNvSpPr txBox="1">
+            <a:spLocks noGrp="1"/>
+          </p:cNvSpPr>
           <p:nvPr>
-            <p:ph idx="1" type="body"/>
+            <p:ph type="body" idx="1"/>
           </p:nvPr>
         </p:nvSpPr>
         <p:spPr>
@@ -746,12 +769,12 @@
           </a:prstGeom>
         </p:spPr>
         <p:txBody>
-          <a:bodyPr anchorCtr="0" anchor="t" bIns="91425" lIns="91425" spcFirstLastPara="1" rIns="91425" wrap="square" tIns="91425">
+          <a:bodyPr spcFirstLastPara="1" wrap="square" lIns="91425" tIns="91425" rIns="91425" bIns="91425" anchor="t" anchorCtr="0">
             <a:noAutofit/>
           </a:bodyPr>
           <a:lstStyle/>
           <a:p>
-            <a:pPr indent="0" lvl="0" marL="0" rtl="0" algn="l">
+            <a:pPr marL="0" lvl="0" indent="0" algn="l" rtl="0">
               <a:spcBef>
                 <a:spcPts val="0"/>
               </a:spcBef>
@@ -760,9 +783,6 @@
               </a:spcAft>
               <a:buNone/>
             </a:pPr>
-            <a:r>
-              <a:t/>
-            </a:r>
             <a:endParaRPr/>
           </a:p>
         </p:txBody>
@@ -776,11 +796,11 @@
 </file>
 
 <file path=ppt/notesSlides/notesSlide2.xml><?xml version="1.0" encoding="utf-8"?>
-<p:notes xmlns:a="http://schemas.openxmlformats.org/drawingml/2006/main" xmlns:r="http://schemas.openxmlformats.org/officeDocument/2006/relationships" xmlns:mc="http://schemas.openxmlformats.org/markup-compatibility/2006" xmlns:mv="urn:schemas-microsoft-com:mac:vml" xmlns:p="http://schemas.openxmlformats.org/presentationml/2006/main" xmlns:c="http://schemas.openxmlformats.org/drawingml/2006/chart" xmlns:dgm="http://schemas.openxmlformats.org/drawingml/2006/diagram" xmlns:o="urn:schemas-microsoft-com:office:office" xmlns:v="urn:schemas-microsoft-com:vml" xmlns:pvml="urn:schemas-microsoft-com:office:powerpoint" xmlns:com="http://schemas.openxmlformats.org/drawingml/2006/compatibility" xmlns:p14="http://schemas.microsoft.com/office/powerpoint/2010/main" xmlns:p15="http://schemas.microsoft.com/office/powerpoint/2012/main" xmlns:ahyp="http://schemas.microsoft.com/office/drawing/2018/hyperlinkcolor" showMasterPhAnim="0" showMasterSp="0">
+<p:notes xmlns:a="http://schemas.openxmlformats.org/drawingml/2006/main" xmlns:r="http://schemas.openxmlformats.org/officeDocument/2006/relationships" xmlns:p="http://schemas.openxmlformats.org/presentationml/2006/main" showMasterSp="0" showMasterPhAnim="0">
   <p:cSld>
     <p:spTree>
       <p:nvGrpSpPr>
-        <p:cNvPr id="56" name="Shape 56"/>
+        <p:cNvPr id="1" name="Shape 56"/>
         <p:cNvGrpSpPr/>
         <p:nvPr/>
       </p:nvGrpSpPr>
@@ -795,20 +815,26 @@
       <p:sp>
         <p:nvSpPr>
           <p:cNvPr id="57" name="Google Shape;57;g320332ed93_1_0:notes"/>
-          <p:cNvSpPr/>
+          <p:cNvSpPr>
+            <a:spLocks noGrp="1" noRot="1" noChangeAspect="1"/>
+          </p:cNvSpPr>
           <p:nvPr>
-            <p:ph idx="2" type="sldImg"/>
+            <p:ph type="sldImg" idx="2"/>
           </p:nvPr>
         </p:nvSpPr>
         <p:spPr>
           <a:xfrm>
-            <a:off x="381300" y="685800"/>
+            <a:off x="381000" y="685800"/>
             <a:ext cx="6096000" cy="3429000"/>
           </a:xfrm>
           <a:custGeom>
-            <a:rect b="b" l="l" r="r" t="t"/>
+            <a:avLst/>
+            <a:gdLst/>
+            <a:ahLst/>
+            <a:cxnLst/>
+            <a:rect l="l" t="t" r="r" b="b"/>
             <a:pathLst>
-              <a:path extrusionOk="0" h="120000" w="120000">
+              <a:path w="120000" h="120000" extrusionOk="0">
                 <a:moveTo>
                   <a:pt x="0" y="0"/>
                 </a:moveTo>
@@ -830,9 +856,11 @@
       <p:sp>
         <p:nvSpPr>
           <p:cNvPr id="58" name="Google Shape;58;g320332ed93_1_0:notes"/>
-          <p:cNvSpPr txBox="1"/>
+          <p:cNvSpPr txBox="1">
+            <a:spLocks noGrp="1"/>
+          </p:cNvSpPr>
           <p:nvPr>
-            <p:ph idx="1" type="body"/>
+            <p:ph type="body" idx="1"/>
           </p:nvPr>
         </p:nvSpPr>
         <p:spPr>
@@ -845,12 +873,12 @@
           </a:prstGeom>
         </p:spPr>
         <p:txBody>
-          <a:bodyPr anchorCtr="0" anchor="t" bIns="91425" lIns="91425" spcFirstLastPara="1" rIns="91425" wrap="square" tIns="91425">
+          <a:bodyPr spcFirstLastPara="1" wrap="square" lIns="91425" tIns="91425" rIns="91425" bIns="91425" anchor="t" anchorCtr="0">
             <a:noAutofit/>
           </a:bodyPr>
           <a:lstStyle/>
           <a:p>
-            <a:pPr indent="0" lvl="0" marL="0" rtl="0" algn="l">
+            <a:pPr marL="0" lvl="0" indent="0" algn="l" rtl="0">
               <a:spcBef>
                 <a:spcPts val="0"/>
               </a:spcBef>
@@ -859,9 +887,6 @@
               </a:spcAft>
               <a:buNone/>
             </a:pPr>
-            <a:r>
-              <a:t/>
-            </a:r>
             <a:endParaRPr/>
           </a:p>
         </p:txBody>
@@ -875,11 +900,11 @@
 </file>
 
 <file path=ppt/notesSlides/notesSlide3.xml><?xml version="1.0" encoding="utf-8"?>
-<p:notes xmlns:a="http://schemas.openxmlformats.org/drawingml/2006/main" xmlns:r="http://schemas.openxmlformats.org/officeDocument/2006/relationships" xmlns:mc="http://schemas.openxmlformats.org/markup-compatibility/2006" xmlns:mv="urn:schemas-microsoft-com:mac:vml" xmlns:p="http://schemas.openxmlformats.org/presentationml/2006/main" xmlns:c="http://schemas.openxmlformats.org/drawingml/2006/chart" xmlns:dgm="http://schemas.openxmlformats.org/drawingml/2006/diagram" xmlns:o="urn:schemas-microsoft-com:office:office" xmlns:v="urn:schemas-microsoft-com:vml" xmlns:pvml="urn:schemas-microsoft-com:office:powerpoint" xmlns:com="http://schemas.openxmlformats.org/drawingml/2006/compatibility" xmlns:p14="http://schemas.microsoft.com/office/powerpoint/2010/main" xmlns:p15="http://schemas.microsoft.com/office/powerpoint/2012/main" xmlns:ahyp="http://schemas.microsoft.com/office/drawing/2018/hyperlinkcolor" showMasterPhAnim="0" showMasterSp="0">
+<p:notes xmlns:a="http://schemas.openxmlformats.org/drawingml/2006/main" xmlns:r="http://schemas.openxmlformats.org/officeDocument/2006/relationships" xmlns:p="http://schemas.openxmlformats.org/presentationml/2006/main" showMasterSp="0" showMasterPhAnim="0">
   <p:cSld>
     <p:spTree>
       <p:nvGrpSpPr>
-        <p:cNvPr id="61" name="Shape 61"/>
+        <p:cNvPr id="1" name="Shape 61"/>
         <p:cNvGrpSpPr/>
         <p:nvPr/>
       </p:nvGrpSpPr>
@@ -894,20 +919,26 @@
       <p:sp>
         <p:nvSpPr>
           <p:cNvPr id="62" name="Google Shape;62;g29f43f0a72_0_0:notes"/>
-          <p:cNvSpPr/>
+          <p:cNvSpPr>
+            <a:spLocks noGrp="1" noRot="1" noChangeAspect="1"/>
+          </p:cNvSpPr>
           <p:nvPr>
-            <p:ph idx="2" type="sldImg"/>
+            <p:ph type="sldImg" idx="2"/>
           </p:nvPr>
         </p:nvSpPr>
         <p:spPr>
           <a:xfrm>
-            <a:off x="381300" y="685800"/>
+            <a:off x="381000" y="685800"/>
             <a:ext cx="6096000" cy="3429000"/>
           </a:xfrm>
           <a:custGeom>
-            <a:rect b="b" l="l" r="r" t="t"/>
+            <a:avLst/>
+            <a:gdLst/>
+            <a:ahLst/>
+            <a:cxnLst/>
+            <a:rect l="l" t="t" r="r" b="b"/>
             <a:pathLst>
-              <a:path extrusionOk="0" h="120000" w="120000">
+              <a:path w="120000" h="120000" extrusionOk="0">
                 <a:moveTo>
                   <a:pt x="0" y="0"/>
                 </a:moveTo>
@@ -929,9 +960,11 @@
       <p:sp>
         <p:nvSpPr>
           <p:cNvPr id="63" name="Google Shape;63;g29f43f0a72_0_0:notes"/>
-          <p:cNvSpPr txBox="1"/>
+          <p:cNvSpPr txBox="1">
+            <a:spLocks noGrp="1"/>
+          </p:cNvSpPr>
           <p:nvPr>
-            <p:ph idx="1" type="body"/>
+            <p:ph type="body" idx="1"/>
           </p:nvPr>
         </p:nvSpPr>
         <p:spPr>
@@ -944,12 +977,12 @@
           </a:prstGeom>
         </p:spPr>
         <p:txBody>
-          <a:bodyPr anchorCtr="0" anchor="t" bIns="91425" lIns="91425" spcFirstLastPara="1" rIns="91425" wrap="square" tIns="91425">
+          <a:bodyPr spcFirstLastPara="1" wrap="square" lIns="91425" tIns="91425" rIns="91425" bIns="91425" anchor="t" anchorCtr="0">
             <a:noAutofit/>
           </a:bodyPr>
           <a:lstStyle/>
           <a:p>
-            <a:pPr indent="0" lvl="0" marL="0" rtl="0" algn="l">
+            <a:pPr marL="0" lvl="0" indent="0" algn="l" rtl="0">
               <a:spcBef>
                 <a:spcPts val="0"/>
               </a:spcBef>
@@ -958,9 +991,6 @@
               </a:spcAft>
               <a:buNone/>
             </a:pPr>
-            <a:r>
-              <a:t/>
-            </a:r>
             <a:endParaRPr/>
           </a:p>
         </p:txBody>
@@ -974,11 +1004,11 @@
 </file>
 
 <file path=ppt/notesSlides/notesSlide4.xml><?xml version="1.0" encoding="utf-8"?>
-<p:notes xmlns:a="http://schemas.openxmlformats.org/drawingml/2006/main" xmlns:r="http://schemas.openxmlformats.org/officeDocument/2006/relationships" xmlns:mc="http://schemas.openxmlformats.org/markup-compatibility/2006" xmlns:mv="urn:schemas-microsoft-com:mac:vml" xmlns:p="http://schemas.openxmlformats.org/presentationml/2006/main" xmlns:c="http://schemas.openxmlformats.org/drawingml/2006/chart" xmlns:dgm="http://schemas.openxmlformats.org/drawingml/2006/diagram" xmlns:o="urn:schemas-microsoft-com:office:office" xmlns:v="urn:schemas-microsoft-com:vml" xmlns:pvml="urn:schemas-microsoft-com:office:powerpoint" xmlns:com="http://schemas.openxmlformats.org/drawingml/2006/compatibility" xmlns:p14="http://schemas.microsoft.com/office/powerpoint/2010/main" xmlns:p15="http://schemas.microsoft.com/office/powerpoint/2012/main" xmlns:ahyp="http://schemas.microsoft.com/office/drawing/2018/hyperlinkcolor" showMasterPhAnim="0" showMasterSp="0">
+<p:notes xmlns:a="http://schemas.openxmlformats.org/drawingml/2006/main" xmlns:r="http://schemas.openxmlformats.org/officeDocument/2006/relationships" xmlns:p="http://schemas.openxmlformats.org/presentationml/2006/main" showMasterSp="0" showMasterPhAnim="0">
   <p:cSld>
     <p:spTree>
       <p:nvGrpSpPr>
-        <p:cNvPr id="67" name="Shape 67"/>
+        <p:cNvPr id="1" name="Shape 67"/>
         <p:cNvGrpSpPr/>
         <p:nvPr/>
       </p:nvGrpSpPr>
@@ -993,9 +1023,11 @@
       <p:sp>
         <p:nvSpPr>
           <p:cNvPr id="68" name="Google Shape;68;g29f43f0a72_0_5:notes"/>
-          <p:cNvSpPr/>
+          <p:cNvSpPr>
+            <a:spLocks noGrp="1" noRot="1" noChangeAspect="1"/>
+          </p:cNvSpPr>
           <p:nvPr>
-            <p:ph idx="2" type="sldImg"/>
+            <p:ph type="sldImg" idx="2"/>
           </p:nvPr>
         </p:nvSpPr>
         <p:spPr>
@@ -1004,9 +1036,13 @@
             <a:ext cx="6096000" cy="3429000"/>
           </a:xfrm>
           <a:custGeom>
-            <a:rect b="b" l="l" r="r" t="t"/>
+            <a:avLst/>
+            <a:gdLst/>
+            <a:ahLst/>
+            <a:cxnLst/>
+            <a:rect l="l" t="t" r="r" b="b"/>
             <a:pathLst>
-              <a:path extrusionOk="0" h="120000" w="120000">
+              <a:path w="120000" h="120000" extrusionOk="0">
                 <a:moveTo>
                   <a:pt x="0" y="0"/>
                 </a:moveTo>
@@ -1028,9 +1064,11 @@
       <p:sp>
         <p:nvSpPr>
           <p:cNvPr id="69" name="Google Shape;69;g29f43f0a72_0_5:notes"/>
-          <p:cNvSpPr txBox="1"/>
+          <p:cNvSpPr txBox="1">
+            <a:spLocks noGrp="1"/>
+          </p:cNvSpPr>
           <p:nvPr>
-            <p:ph idx="1" type="body"/>
+            <p:ph type="body" idx="1"/>
           </p:nvPr>
         </p:nvSpPr>
         <p:spPr>
@@ -1043,12 +1081,12 @@
           </a:prstGeom>
         </p:spPr>
         <p:txBody>
-          <a:bodyPr anchorCtr="0" anchor="t" bIns="91425" lIns="91425" spcFirstLastPara="1" rIns="91425" wrap="square" tIns="91425">
+          <a:bodyPr spcFirstLastPara="1" wrap="square" lIns="91425" tIns="91425" rIns="91425" bIns="91425" anchor="t" anchorCtr="0">
             <a:noAutofit/>
           </a:bodyPr>
           <a:lstStyle/>
           <a:p>
-            <a:pPr indent="0" lvl="0" marL="0" rtl="0" algn="l">
+            <a:pPr marL="0" lvl="0" indent="0" algn="l" rtl="0">
               <a:spcBef>
                 <a:spcPts val="0"/>
               </a:spcBef>
@@ -1057,9 +1095,6 @@
               </a:spcAft>
               <a:buNone/>
             </a:pPr>
-            <a:r>
-              <a:t/>
-            </a:r>
             <a:endParaRPr/>
           </a:p>
         </p:txBody>
@@ -1073,11 +1108,11 @@
 </file>
 
 <file path=ppt/notesSlides/notesSlide5.xml><?xml version="1.0" encoding="utf-8"?>
-<p:notes xmlns:a="http://schemas.openxmlformats.org/drawingml/2006/main" xmlns:r="http://schemas.openxmlformats.org/officeDocument/2006/relationships" xmlns:mc="http://schemas.openxmlformats.org/markup-compatibility/2006" xmlns:mv="urn:schemas-microsoft-com:mac:vml" xmlns:p="http://schemas.openxmlformats.org/presentationml/2006/main" xmlns:c="http://schemas.openxmlformats.org/drawingml/2006/chart" xmlns:dgm="http://schemas.openxmlformats.org/drawingml/2006/diagram" xmlns:o="urn:schemas-microsoft-com:office:office" xmlns:v="urn:schemas-microsoft-com:vml" xmlns:pvml="urn:schemas-microsoft-com:office:powerpoint" xmlns:com="http://schemas.openxmlformats.org/drawingml/2006/compatibility" xmlns:p14="http://schemas.microsoft.com/office/powerpoint/2010/main" xmlns:p15="http://schemas.microsoft.com/office/powerpoint/2012/main" xmlns:ahyp="http://schemas.microsoft.com/office/drawing/2018/hyperlinkcolor" showMasterPhAnim="0" showMasterSp="0">
+<p:notes xmlns:a="http://schemas.openxmlformats.org/drawingml/2006/main" xmlns:r="http://schemas.openxmlformats.org/officeDocument/2006/relationships" xmlns:p="http://schemas.openxmlformats.org/presentationml/2006/main" showMasterSp="0" showMasterPhAnim="0">
   <p:cSld>
     <p:spTree>
       <p:nvGrpSpPr>
-        <p:cNvPr id="73" name="Shape 73"/>
+        <p:cNvPr id="1" name="Shape 73"/>
         <p:cNvGrpSpPr/>
         <p:nvPr/>
       </p:nvGrpSpPr>
@@ -1092,9 +1127,11 @@
       <p:sp>
         <p:nvSpPr>
           <p:cNvPr id="74" name="Google Shape;74;g29f43f0a72_0_15:notes"/>
-          <p:cNvSpPr/>
+          <p:cNvSpPr>
+            <a:spLocks noGrp="1" noRot="1" noChangeAspect="1"/>
+          </p:cNvSpPr>
           <p:nvPr>
-            <p:ph idx="2" type="sldImg"/>
+            <p:ph type="sldImg" idx="2"/>
           </p:nvPr>
         </p:nvSpPr>
         <p:spPr>
@@ -1103,9 +1140,13 @@
             <a:ext cx="6096000" cy="3429000"/>
           </a:xfrm>
           <a:custGeom>
-            <a:rect b="b" l="l" r="r" t="t"/>
+            <a:avLst/>
+            <a:gdLst/>
+            <a:ahLst/>
+            <a:cxnLst/>
+            <a:rect l="l" t="t" r="r" b="b"/>
             <a:pathLst>
-              <a:path extrusionOk="0" h="120000" w="120000">
+              <a:path w="120000" h="120000" extrusionOk="0">
                 <a:moveTo>
                   <a:pt x="0" y="0"/>
                 </a:moveTo>
@@ -1127,9 +1168,11 @@
       <p:sp>
         <p:nvSpPr>
           <p:cNvPr id="75" name="Google Shape;75;g29f43f0a72_0_15:notes"/>
-          <p:cNvSpPr txBox="1"/>
+          <p:cNvSpPr txBox="1">
+            <a:spLocks noGrp="1"/>
+          </p:cNvSpPr>
           <p:nvPr>
-            <p:ph idx="1" type="body"/>
+            <p:ph type="body" idx="1"/>
           </p:nvPr>
         </p:nvSpPr>
         <p:spPr>
@@ -1142,12 +1185,12 @@
           </a:prstGeom>
         </p:spPr>
         <p:txBody>
-          <a:bodyPr anchorCtr="0" anchor="t" bIns="91425" lIns="91425" spcFirstLastPara="1" rIns="91425" wrap="square" tIns="91425">
+          <a:bodyPr spcFirstLastPara="1" wrap="square" lIns="91425" tIns="91425" rIns="91425" bIns="91425" anchor="t" anchorCtr="0">
             <a:noAutofit/>
           </a:bodyPr>
           <a:lstStyle/>
           <a:p>
-            <a:pPr indent="0" lvl="0" marL="0" rtl="0" algn="l">
+            <a:pPr marL="0" lvl="0" indent="0" algn="l" rtl="0">
               <a:spcBef>
                 <a:spcPts val="0"/>
               </a:spcBef>
@@ -1156,9 +1199,6 @@
               </a:spcAft>
               <a:buNone/>
             </a:pPr>
-            <a:r>
-              <a:t/>
-            </a:r>
             <a:endParaRPr/>
           </a:p>
         </p:txBody>
@@ -1172,11 +1212,11 @@
 </file>
 
 <file path=ppt/notesSlides/notesSlide6.xml><?xml version="1.0" encoding="utf-8"?>
-<p:notes xmlns:a="http://schemas.openxmlformats.org/drawingml/2006/main" xmlns:r="http://schemas.openxmlformats.org/officeDocument/2006/relationships" xmlns:mc="http://schemas.openxmlformats.org/markup-compatibility/2006" xmlns:mv="urn:schemas-microsoft-com:mac:vml" xmlns:p="http://schemas.openxmlformats.org/presentationml/2006/main" xmlns:c="http://schemas.openxmlformats.org/drawingml/2006/chart" xmlns:dgm="http://schemas.openxmlformats.org/drawingml/2006/diagram" xmlns:o="urn:schemas-microsoft-com:office:office" xmlns:v="urn:schemas-microsoft-com:vml" xmlns:pvml="urn:schemas-microsoft-com:office:powerpoint" xmlns:com="http://schemas.openxmlformats.org/drawingml/2006/compatibility" xmlns:p14="http://schemas.microsoft.com/office/powerpoint/2010/main" xmlns:p15="http://schemas.microsoft.com/office/powerpoint/2012/main" xmlns:ahyp="http://schemas.microsoft.com/office/drawing/2018/hyperlinkcolor" showMasterPhAnim="0" showMasterSp="0">
+<p:notes xmlns:a="http://schemas.openxmlformats.org/drawingml/2006/main" xmlns:r="http://schemas.openxmlformats.org/officeDocument/2006/relationships" xmlns:p="http://schemas.openxmlformats.org/presentationml/2006/main" showMasterSp="0" showMasterPhAnim="0">
   <p:cSld>
     <p:spTree>
       <p:nvGrpSpPr>
-        <p:cNvPr id="78" name="Shape 78"/>
+        <p:cNvPr id="1" name="Shape 78"/>
         <p:cNvGrpSpPr/>
         <p:nvPr/>
       </p:nvGrpSpPr>
@@ -1191,9 +1231,11 @@
       <p:sp>
         <p:nvSpPr>
           <p:cNvPr id="79" name="Google Shape;79;g29f43f0a72_0_10:notes"/>
-          <p:cNvSpPr/>
+          <p:cNvSpPr>
+            <a:spLocks noGrp="1" noRot="1" noChangeAspect="1"/>
+          </p:cNvSpPr>
           <p:nvPr>
-            <p:ph idx="2" type="sldImg"/>
+            <p:ph type="sldImg" idx="2"/>
           </p:nvPr>
         </p:nvSpPr>
         <p:spPr>
@@ -1202,9 +1244,13 @@
             <a:ext cx="6096000" cy="3429000"/>
           </a:xfrm>
           <a:custGeom>
-            <a:rect b="b" l="l" r="r" t="t"/>
+            <a:avLst/>
+            <a:gdLst/>
+            <a:ahLst/>
+            <a:cxnLst/>
+            <a:rect l="l" t="t" r="r" b="b"/>
             <a:pathLst>
-              <a:path extrusionOk="0" h="120000" w="120000">
+              <a:path w="120000" h="120000" extrusionOk="0">
                 <a:moveTo>
                   <a:pt x="0" y="0"/>
                 </a:moveTo>
@@ -1226,9 +1272,11 @@
       <p:sp>
         <p:nvSpPr>
           <p:cNvPr id="80" name="Google Shape;80;g29f43f0a72_0_10:notes"/>
-          <p:cNvSpPr txBox="1"/>
+          <p:cNvSpPr txBox="1">
+            <a:spLocks noGrp="1"/>
+          </p:cNvSpPr>
           <p:nvPr>
-            <p:ph idx="1" type="body"/>
+            <p:ph type="body" idx="1"/>
           </p:nvPr>
         </p:nvSpPr>
         <p:spPr>
@@ -1241,12 +1289,12 @@
           </a:prstGeom>
         </p:spPr>
         <p:txBody>
-          <a:bodyPr anchorCtr="0" anchor="t" bIns="91425" lIns="91425" spcFirstLastPara="1" rIns="91425" wrap="square" tIns="91425">
+          <a:bodyPr spcFirstLastPara="1" wrap="square" lIns="91425" tIns="91425" rIns="91425" bIns="91425" anchor="t" anchorCtr="0">
             <a:noAutofit/>
           </a:bodyPr>
           <a:lstStyle/>
           <a:p>
-            <a:pPr indent="0" lvl="0" marL="0" rtl="0" algn="l">
+            <a:pPr marL="0" lvl="0" indent="0" algn="l" rtl="0">
               <a:spcBef>
                 <a:spcPts val="0"/>
               </a:spcBef>
@@ -1255,9 +1303,6 @@
               </a:spcAft>
               <a:buNone/>
             </a:pPr>
-            <a:r>
-              <a:t/>
-            </a:r>
             <a:endParaRPr/>
           </a:p>
         </p:txBody>
@@ -1271,11 +1316,11 @@
 </file>
 
 <file path=ppt/notesSlides/notesSlide7.xml><?xml version="1.0" encoding="utf-8"?>
-<p:notes xmlns:a="http://schemas.openxmlformats.org/drawingml/2006/main" xmlns:r="http://schemas.openxmlformats.org/officeDocument/2006/relationships" xmlns:mc="http://schemas.openxmlformats.org/markup-compatibility/2006" xmlns:mv="urn:schemas-microsoft-com:mac:vml" xmlns:p="http://schemas.openxmlformats.org/presentationml/2006/main" xmlns:c="http://schemas.openxmlformats.org/drawingml/2006/chart" xmlns:dgm="http://schemas.openxmlformats.org/drawingml/2006/diagram" xmlns:o="urn:schemas-microsoft-com:office:office" xmlns:v="urn:schemas-microsoft-com:vml" xmlns:pvml="urn:schemas-microsoft-com:office:powerpoint" xmlns:com="http://schemas.openxmlformats.org/drawingml/2006/compatibility" xmlns:p14="http://schemas.microsoft.com/office/powerpoint/2010/main" xmlns:p15="http://schemas.microsoft.com/office/powerpoint/2012/main" xmlns:ahyp="http://schemas.microsoft.com/office/drawing/2018/hyperlinkcolor" showMasterPhAnim="0" showMasterSp="0">
+<p:notes xmlns:a="http://schemas.openxmlformats.org/drawingml/2006/main" xmlns:r="http://schemas.openxmlformats.org/officeDocument/2006/relationships" xmlns:p="http://schemas.openxmlformats.org/presentationml/2006/main" showMasterSp="0" showMasterPhAnim="0">
   <p:cSld>
     <p:spTree>
       <p:nvGrpSpPr>
-        <p:cNvPr id="83" name="Shape 83"/>
+        <p:cNvPr id="1" name="Shape 83"/>
         <p:cNvGrpSpPr/>
         <p:nvPr/>
       </p:nvGrpSpPr>
@@ -1290,9 +1335,11 @@
       <p:sp>
         <p:nvSpPr>
           <p:cNvPr id="84" name="Google Shape;84;g29f43f0a72_0_24:notes"/>
-          <p:cNvSpPr/>
+          <p:cNvSpPr>
+            <a:spLocks noGrp="1" noRot="1" noChangeAspect="1"/>
+          </p:cNvSpPr>
           <p:nvPr>
-            <p:ph idx="2" type="sldImg"/>
+            <p:ph type="sldImg" idx="2"/>
           </p:nvPr>
         </p:nvSpPr>
         <p:spPr>
@@ -1301,9 +1348,13 @@
             <a:ext cx="6096000" cy="3429000"/>
           </a:xfrm>
           <a:custGeom>
-            <a:rect b="b" l="l" r="r" t="t"/>
+            <a:avLst/>
+            <a:gdLst/>
+            <a:ahLst/>
+            <a:cxnLst/>
+            <a:rect l="l" t="t" r="r" b="b"/>
             <a:pathLst>
-              <a:path extrusionOk="0" h="120000" w="120000">
+              <a:path w="120000" h="120000" extrusionOk="0">
                 <a:moveTo>
                   <a:pt x="0" y="0"/>
                 </a:moveTo>
@@ -1325,9 +1376,11 @@
       <p:sp>
         <p:nvSpPr>
           <p:cNvPr id="85" name="Google Shape;85;g29f43f0a72_0_24:notes"/>
-          <p:cNvSpPr txBox="1"/>
+          <p:cNvSpPr txBox="1">
+            <a:spLocks noGrp="1"/>
+          </p:cNvSpPr>
           <p:nvPr>
-            <p:ph idx="1" type="body"/>
+            <p:ph type="body" idx="1"/>
           </p:nvPr>
         </p:nvSpPr>
         <p:spPr>
@@ -1340,12 +1393,12 @@
           </a:prstGeom>
         </p:spPr>
         <p:txBody>
-          <a:bodyPr anchorCtr="0" anchor="t" bIns="91425" lIns="91425" spcFirstLastPara="1" rIns="91425" wrap="square" tIns="91425">
+          <a:bodyPr spcFirstLastPara="1" wrap="square" lIns="91425" tIns="91425" rIns="91425" bIns="91425" anchor="t" anchorCtr="0">
             <a:noAutofit/>
           </a:bodyPr>
           <a:lstStyle/>
           <a:p>
-            <a:pPr indent="0" lvl="0" marL="0" rtl="0" algn="l">
+            <a:pPr marL="0" lvl="0" indent="0" algn="l" rtl="0">
               <a:spcBef>
                 <a:spcPts val="0"/>
               </a:spcBef>
@@ -1354,9 +1407,6 @@
               </a:spcAft>
               <a:buNone/>
             </a:pPr>
-            <a:r>
-              <a:t/>
-            </a:r>
             <a:endParaRPr/>
           </a:p>
         </p:txBody>
@@ -1370,11 +1420,11 @@
 </file>
 
 <file path=ppt/slideLayouts/slideLayout1.xml><?xml version="1.0" encoding="utf-8"?>
-<p:sldLayout xmlns:a="http://schemas.openxmlformats.org/drawingml/2006/main" xmlns:r="http://schemas.openxmlformats.org/officeDocument/2006/relationships" xmlns:mc="http://schemas.openxmlformats.org/markup-compatibility/2006" xmlns:mv="urn:schemas-microsoft-com:mac:vml" xmlns:p="http://schemas.openxmlformats.org/presentationml/2006/main" xmlns:c="http://schemas.openxmlformats.org/drawingml/2006/chart" xmlns:dgm="http://schemas.openxmlformats.org/drawingml/2006/diagram" xmlns:o="urn:schemas-microsoft-com:office:office" xmlns:v="urn:schemas-microsoft-com:vml" xmlns:pvml="urn:schemas-microsoft-com:office:powerpoint" xmlns:com="http://schemas.openxmlformats.org/drawingml/2006/compatibility" xmlns:p14="http://schemas.microsoft.com/office/powerpoint/2010/main" xmlns:p15="http://schemas.microsoft.com/office/powerpoint/2012/main" xmlns:ahyp="http://schemas.microsoft.com/office/drawing/2018/hyperlinkcolor" matchingName="Title slide" type="title">
+<p:sldLayout xmlns:a="http://schemas.openxmlformats.org/drawingml/2006/main" xmlns:r="http://schemas.openxmlformats.org/officeDocument/2006/relationships" xmlns:p="http://schemas.openxmlformats.org/presentationml/2006/main" matchingName="Title slide" type="title">
   <p:cSld name="TITLE">
     <p:spTree>
       <p:nvGrpSpPr>
-        <p:cNvPr id="9" name="Shape 9"/>
+        <p:cNvPr id="1" name="Shape 9"/>
         <p:cNvGrpSpPr/>
         <p:nvPr/>
       </p:nvGrpSpPr>
@@ -1389,7 +1439,9 @@
       <p:sp>
         <p:nvSpPr>
           <p:cNvPr id="10" name="Google Shape;10;p2"/>
-          <p:cNvSpPr txBox="1"/>
+          <p:cNvSpPr txBox="1">
+            <a:spLocks noGrp="1"/>
+          </p:cNvSpPr>
           <p:nvPr>
             <p:ph type="ctrTitle"/>
           </p:nvPr>
@@ -1404,7 +1456,7 @@
           </a:prstGeom>
         </p:spPr>
         <p:txBody>
-          <a:bodyPr anchorCtr="0" anchor="b" bIns="91425" lIns="91425" spcFirstLastPara="1" rIns="91425" wrap="square" tIns="91425">
+          <a:bodyPr spcFirstLastPara="1" wrap="square" lIns="91425" tIns="91425" rIns="91425" bIns="91425" anchor="b" anchorCtr="0">
             <a:noAutofit/>
           </a:bodyPr>
           <a:lstStyle>
@@ -1508,15 +1560,19 @@
               <a:defRPr sz="5200"/>
             </a:lvl9pPr>
           </a:lstStyle>
-          <a:p/>
+          <a:p>
+            <a:endParaRPr/>
+          </a:p>
         </p:txBody>
       </p:sp>
       <p:sp>
         <p:nvSpPr>
           <p:cNvPr id="11" name="Google Shape;11;p2"/>
-          <p:cNvSpPr txBox="1"/>
+          <p:cNvSpPr txBox="1">
+            <a:spLocks noGrp="1"/>
+          </p:cNvSpPr>
           <p:nvPr>
-            <p:ph idx="1" type="subTitle"/>
+            <p:ph type="subTitle" idx="1"/>
           </p:nvPr>
         </p:nvSpPr>
         <p:spPr>
@@ -1529,7 +1585,7 @@
           </a:prstGeom>
         </p:spPr>
         <p:txBody>
-          <a:bodyPr anchorCtr="0" anchor="t" bIns="91425" lIns="91425" spcFirstLastPara="1" rIns="91425" wrap="square" tIns="91425">
+          <a:bodyPr spcFirstLastPara="1" wrap="square" lIns="91425" tIns="91425" rIns="91425" bIns="91425" anchor="t" anchorCtr="0">
             <a:noAutofit/>
           </a:bodyPr>
           <a:lstStyle>
@@ -1660,15 +1716,19 @@
               <a:defRPr sz="2800"/>
             </a:lvl9pPr>
           </a:lstStyle>
-          <a:p/>
+          <a:p>
+            <a:endParaRPr/>
+          </a:p>
         </p:txBody>
       </p:sp>
       <p:sp>
         <p:nvSpPr>
           <p:cNvPr id="12" name="Google Shape;12;p2"/>
-          <p:cNvSpPr txBox="1"/>
+          <p:cNvSpPr txBox="1">
+            <a:spLocks noGrp="1"/>
+          </p:cNvSpPr>
           <p:nvPr>
-            <p:ph idx="12" type="sldNum"/>
+            <p:ph type="sldNum" idx="12"/>
           </p:nvPr>
         </p:nvSpPr>
         <p:spPr>
@@ -1681,7 +1741,7 @@
           </a:prstGeom>
         </p:spPr>
         <p:txBody>
-          <a:bodyPr anchorCtr="0" anchor="ctr" bIns="91425" lIns="91425" spcFirstLastPara="1" rIns="91425" wrap="square" tIns="91425">
+          <a:bodyPr spcFirstLastPara="1" wrap="square" lIns="91425" tIns="91425" rIns="91425" bIns="91425" anchor="ctr" anchorCtr="0">
             <a:noAutofit/>
           </a:bodyPr>
           <a:lstStyle>
@@ -1723,7 +1783,7 @@
             </a:lvl9pPr>
           </a:lstStyle>
           <a:p>
-            <a:pPr indent="0" lvl="0" marL="0" rtl="0" algn="r">
+            <a:pPr marL="0" lvl="0" indent="0" algn="r" rtl="0">
               <a:spcBef>
                 <a:spcPts val="0"/>
               </a:spcBef>
@@ -1749,11 +1809,11 @@
 </file>
 
 <file path=ppt/slideLayouts/slideLayout10.xml><?xml version="1.0" encoding="utf-8"?>
-<p:sldLayout xmlns:a="http://schemas.openxmlformats.org/drawingml/2006/main" xmlns:r="http://schemas.openxmlformats.org/officeDocument/2006/relationships" xmlns:mc="http://schemas.openxmlformats.org/markup-compatibility/2006" xmlns:mv="urn:schemas-microsoft-com:mac:vml" xmlns:p="http://schemas.openxmlformats.org/presentationml/2006/main" xmlns:c="http://schemas.openxmlformats.org/drawingml/2006/chart" xmlns:dgm="http://schemas.openxmlformats.org/drawingml/2006/diagram" xmlns:o="urn:schemas-microsoft-com:office:office" xmlns:v="urn:schemas-microsoft-com:vml" xmlns:pvml="urn:schemas-microsoft-com:office:powerpoint" xmlns:com="http://schemas.openxmlformats.org/drawingml/2006/compatibility" xmlns:p14="http://schemas.microsoft.com/office/powerpoint/2010/main" xmlns:p15="http://schemas.microsoft.com/office/powerpoint/2012/main" xmlns:ahyp="http://schemas.microsoft.com/office/drawing/2018/hyperlinkcolor" matchingName="Big number">
+<p:sldLayout xmlns:a="http://schemas.openxmlformats.org/drawingml/2006/main" xmlns:r="http://schemas.openxmlformats.org/officeDocument/2006/relationships" xmlns:p="http://schemas.openxmlformats.org/presentationml/2006/main" matchingName="Big number">
   <p:cSld name="BIG_NUMBER">
     <p:spTree>
       <p:nvGrpSpPr>
-        <p:cNvPr id="44" name="Shape 44"/>
+        <p:cNvPr id="1" name="Shape 44"/>
         <p:cNvGrpSpPr/>
         <p:nvPr/>
       </p:nvGrpSpPr>
@@ -1768,9 +1828,11 @@
       <p:sp>
         <p:nvSpPr>
           <p:cNvPr id="45" name="Google Shape;45;p11"/>
-          <p:cNvSpPr txBox="1"/>
+          <p:cNvSpPr txBox="1">
+            <a:spLocks noGrp="1"/>
+          </p:cNvSpPr>
           <p:nvPr>
-            <p:ph hasCustomPrompt="1" type="title"/>
+            <p:ph type="title" hasCustomPrompt="1"/>
           </p:nvPr>
         </p:nvSpPr>
         <p:spPr>
@@ -1783,7 +1845,7 @@
           </a:prstGeom>
         </p:spPr>
         <p:txBody>
-          <a:bodyPr anchorCtr="0" anchor="b" bIns="91425" lIns="91425" spcFirstLastPara="1" rIns="91425" wrap="square" tIns="91425">
+          <a:bodyPr spcFirstLastPara="1" wrap="square" lIns="91425" tIns="91425" rIns="91425" bIns="91425" anchor="b" anchorCtr="0">
             <a:noAutofit/>
           </a:bodyPr>
           <a:lstStyle>
@@ -1897,9 +1959,11 @@
       <p:sp>
         <p:nvSpPr>
           <p:cNvPr id="46" name="Google Shape;46;p11"/>
-          <p:cNvSpPr txBox="1"/>
+          <p:cNvSpPr txBox="1">
+            <a:spLocks noGrp="1"/>
+          </p:cNvSpPr>
           <p:nvPr>
-            <p:ph idx="1" type="body"/>
+            <p:ph type="body" idx="1"/>
           </p:nvPr>
         </p:nvSpPr>
         <p:spPr>
@@ -1912,11 +1976,11 @@
           </a:prstGeom>
         </p:spPr>
         <p:txBody>
-          <a:bodyPr anchorCtr="0" anchor="t" bIns="91425" lIns="91425" spcFirstLastPara="1" rIns="91425" wrap="square" tIns="91425">
+          <a:bodyPr spcFirstLastPara="1" wrap="square" lIns="91425" tIns="91425" rIns="91425" bIns="91425" anchor="t" anchorCtr="0">
             <a:noAutofit/>
           </a:bodyPr>
           <a:lstStyle>
-            <a:lvl1pPr indent="-342900" lvl="0" marL="457200" algn="ctr">
+            <a:lvl1pPr marL="457200" lvl="0" indent="-342900" algn="ctr">
               <a:spcBef>
                 <a:spcPts val="0"/>
               </a:spcBef>
@@ -1927,7 +1991,7 @@
               <a:buChar char="●"/>
               <a:defRPr/>
             </a:lvl1pPr>
-            <a:lvl2pPr indent="-317500" lvl="1" marL="914400" algn="ctr">
+            <a:lvl2pPr marL="914400" lvl="1" indent="-317500" algn="ctr">
               <a:spcBef>
                 <a:spcPts val="1600"/>
               </a:spcBef>
@@ -1938,7 +2002,7 @@
               <a:buChar char="○"/>
               <a:defRPr/>
             </a:lvl2pPr>
-            <a:lvl3pPr indent="-317500" lvl="2" marL="1371600" algn="ctr">
+            <a:lvl3pPr marL="1371600" lvl="2" indent="-317500" algn="ctr">
               <a:spcBef>
                 <a:spcPts val="1600"/>
               </a:spcBef>
@@ -1949,7 +2013,7 @@
               <a:buChar char="■"/>
               <a:defRPr/>
             </a:lvl3pPr>
-            <a:lvl4pPr indent="-317500" lvl="3" marL="1828800" algn="ctr">
+            <a:lvl4pPr marL="1828800" lvl="3" indent="-317500" algn="ctr">
               <a:spcBef>
                 <a:spcPts val="1600"/>
               </a:spcBef>
@@ -1960,7 +2024,7 @@
               <a:buChar char="●"/>
               <a:defRPr/>
             </a:lvl4pPr>
-            <a:lvl5pPr indent="-317500" lvl="4" marL="2286000" algn="ctr">
+            <a:lvl5pPr marL="2286000" lvl="4" indent="-317500" algn="ctr">
               <a:spcBef>
                 <a:spcPts val="1600"/>
               </a:spcBef>
@@ -1971,7 +2035,7 @@
               <a:buChar char="○"/>
               <a:defRPr/>
             </a:lvl5pPr>
-            <a:lvl6pPr indent="-317500" lvl="5" marL="2743200" algn="ctr">
+            <a:lvl6pPr marL="2743200" lvl="5" indent="-317500" algn="ctr">
               <a:spcBef>
                 <a:spcPts val="1600"/>
               </a:spcBef>
@@ -1982,7 +2046,7 @@
               <a:buChar char="■"/>
               <a:defRPr/>
             </a:lvl6pPr>
-            <a:lvl7pPr indent="-317500" lvl="6" marL="3200400" algn="ctr">
+            <a:lvl7pPr marL="3200400" lvl="6" indent="-317500" algn="ctr">
               <a:spcBef>
                 <a:spcPts val="1600"/>
               </a:spcBef>
@@ -1993,7 +2057,7 @@
               <a:buChar char="●"/>
               <a:defRPr/>
             </a:lvl7pPr>
-            <a:lvl8pPr indent="-317500" lvl="7" marL="3657600" algn="ctr">
+            <a:lvl8pPr marL="3657600" lvl="7" indent="-317500" algn="ctr">
               <a:spcBef>
                 <a:spcPts val="1600"/>
               </a:spcBef>
@@ -2004,7 +2068,7 @@
               <a:buChar char="○"/>
               <a:defRPr/>
             </a:lvl8pPr>
-            <a:lvl9pPr indent="-317500" lvl="8" marL="4114800" algn="ctr">
+            <a:lvl9pPr marL="4114800" lvl="8" indent="-317500" algn="ctr">
               <a:spcBef>
                 <a:spcPts val="1600"/>
               </a:spcBef>
@@ -2016,15 +2080,19 @@
               <a:defRPr/>
             </a:lvl9pPr>
           </a:lstStyle>
-          <a:p/>
+          <a:p>
+            <a:endParaRPr/>
+          </a:p>
         </p:txBody>
       </p:sp>
       <p:sp>
         <p:nvSpPr>
           <p:cNvPr id="47" name="Google Shape;47;p11"/>
-          <p:cNvSpPr txBox="1"/>
+          <p:cNvSpPr txBox="1">
+            <a:spLocks noGrp="1"/>
+          </p:cNvSpPr>
           <p:nvPr>
-            <p:ph idx="12" type="sldNum"/>
+            <p:ph type="sldNum" idx="12"/>
           </p:nvPr>
         </p:nvSpPr>
         <p:spPr>
@@ -2037,7 +2105,7 @@
           </a:prstGeom>
         </p:spPr>
         <p:txBody>
-          <a:bodyPr anchorCtr="0" anchor="ctr" bIns="91425" lIns="91425" spcFirstLastPara="1" rIns="91425" wrap="square" tIns="91425">
+          <a:bodyPr spcFirstLastPara="1" wrap="square" lIns="91425" tIns="91425" rIns="91425" bIns="91425" anchor="ctr" anchorCtr="0">
             <a:noAutofit/>
           </a:bodyPr>
           <a:lstStyle>
@@ -2079,7 +2147,7 @@
             </a:lvl9pPr>
           </a:lstStyle>
           <a:p>
-            <a:pPr indent="0" lvl="0" marL="0" rtl="0" algn="r">
+            <a:pPr marL="0" lvl="0" indent="0" algn="r" rtl="0">
               <a:spcBef>
                 <a:spcPts val="0"/>
               </a:spcBef>
@@ -2105,11 +2173,11 @@
 </file>
 
 <file path=ppt/slideLayouts/slideLayout11.xml><?xml version="1.0" encoding="utf-8"?>
-<p:sldLayout xmlns:a="http://schemas.openxmlformats.org/drawingml/2006/main" xmlns:r="http://schemas.openxmlformats.org/officeDocument/2006/relationships" xmlns:mc="http://schemas.openxmlformats.org/markup-compatibility/2006" xmlns:mv="urn:schemas-microsoft-com:mac:vml" xmlns:p="http://schemas.openxmlformats.org/presentationml/2006/main" xmlns:c="http://schemas.openxmlformats.org/drawingml/2006/chart" xmlns:dgm="http://schemas.openxmlformats.org/drawingml/2006/diagram" xmlns:o="urn:schemas-microsoft-com:office:office" xmlns:v="urn:schemas-microsoft-com:vml" xmlns:pvml="urn:schemas-microsoft-com:office:powerpoint" xmlns:com="http://schemas.openxmlformats.org/drawingml/2006/compatibility" xmlns:p14="http://schemas.microsoft.com/office/powerpoint/2010/main" xmlns:p15="http://schemas.microsoft.com/office/powerpoint/2012/main" xmlns:ahyp="http://schemas.microsoft.com/office/drawing/2018/hyperlinkcolor" matchingName="Blank" type="blank">
+<p:sldLayout xmlns:a="http://schemas.openxmlformats.org/drawingml/2006/main" xmlns:r="http://schemas.openxmlformats.org/officeDocument/2006/relationships" xmlns:p="http://schemas.openxmlformats.org/presentationml/2006/main" matchingName="Blank" type="blank">
   <p:cSld name="BLANK">
     <p:spTree>
       <p:nvGrpSpPr>
-        <p:cNvPr id="48" name="Shape 48"/>
+        <p:cNvPr id="1" name="Shape 48"/>
         <p:cNvGrpSpPr/>
         <p:nvPr/>
       </p:nvGrpSpPr>
@@ -2124,9 +2192,11 @@
       <p:sp>
         <p:nvSpPr>
           <p:cNvPr id="49" name="Google Shape;49;p12"/>
-          <p:cNvSpPr txBox="1"/>
+          <p:cNvSpPr txBox="1">
+            <a:spLocks noGrp="1"/>
+          </p:cNvSpPr>
           <p:nvPr>
-            <p:ph idx="12" type="sldNum"/>
+            <p:ph type="sldNum" idx="12"/>
           </p:nvPr>
         </p:nvSpPr>
         <p:spPr>
@@ -2139,7 +2209,7 @@
           </a:prstGeom>
         </p:spPr>
         <p:txBody>
-          <a:bodyPr anchorCtr="0" anchor="ctr" bIns="91425" lIns="91425" spcFirstLastPara="1" rIns="91425" wrap="square" tIns="91425">
+          <a:bodyPr spcFirstLastPara="1" wrap="square" lIns="91425" tIns="91425" rIns="91425" bIns="91425" anchor="ctr" anchorCtr="0">
             <a:noAutofit/>
           </a:bodyPr>
           <a:lstStyle>
@@ -2181,7 +2251,7 @@
             </a:lvl9pPr>
           </a:lstStyle>
           <a:p>
-            <a:pPr indent="0" lvl="0" marL="0" rtl="0" algn="r">
+            <a:pPr marL="0" lvl="0" indent="0" algn="r" rtl="0">
               <a:spcBef>
                 <a:spcPts val="0"/>
               </a:spcBef>
@@ -2207,11 +2277,11 @@
 </file>
 
 <file path=ppt/slideLayouts/slideLayout2.xml><?xml version="1.0" encoding="utf-8"?>
-<p:sldLayout xmlns:a="http://schemas.openxmlformats.org/drawingml/2006/main" xmlns:r="http://schemas.openxmlformats.org/officeDocument/2006/relationships" xmlns:mc="http://schemas.openxmlformats.org/markup-compatibility/2006" xmlns:mv="urn:schemas-microsoft-com:mac:vml" xmlns:p="http://schemas.openxmlformats.org/presentationml/2006/main" xmlns:c="http://schemas.openxmlformats.org/drawingml/2006/chart" xmlns:dgm="http://schemas.openxmlformats.org/drawingml/2006/diagram" xmlns:o="urn:schemas-microsoft-com:office:office" xmlns:v="urn:schemas-microsoft-com:vml" xmlns:pvml="urn:schemas-microsoft-com:office:powerpoint" xmlns:com="http://schemas.openxmlformats.org/drawingml/2006/compatibility" xmlns:p14="http://schemas.microsoft.com/office/powerpoint/2010/main" xmlns:p15="http://schemas.microsoft.com/office/powerpoint/2012/main" xmlns:ahyp="http://schemas.microsoft.com/office/drawing/2018/hyperlinkcolor" matchingName="Section header" type="secHead">
+<p:sldLayout xmlns:a="http://schemas.openxmlformats.org/drawingml/2006/main" xmlns:r="http://schemas.openxmlformats.org/officeDocument/2006/relationships" xmlns:p="http://schemas.openxmlformats.org/presentationml/2006/main" matchingName="Section header" type="secHead">
   <p:cSld name="SECTION_HEADER">
     <p:spTree>
       <p:nvGrpSpPr>
-        <p:cNvPr id="13" name="Shape 13"/>
+        <p:cNvPr id="1" name="Shape 13"/>
         <p:cNvGrpSpPr/>
         <p:nvPr/>
       </p:nvGrpSpPr>
@@ -2226,7 +2296,9 @@
       <p:sp>
         <p:nvSpPr>
           <p:cNvPr id="14" name="Google Shape;14;p3"/>
-          <p:cNvSpPr txBox="1"/>
+          <p:cNvSpPr txBox="1">
+            <a:spLocks noGrp="1"/>
+          </p:cNvSpPr>
           <p:nvPr>
             <p:ph type="title"/>
           </p:nvPr>
@@ -2241,7 +2313,7 @@
           </a:prstGeom>
         </p:spPr>
         <p:txBody>
-          <a:bodyPr anchorCtr="0" anchor="ctr" bIns="91425" lIns="91425" spcFirstLastPara="1" rIns="91425" wrap="square" tIns="91425">
+          <a:bodyPr spcFirstLastPara="1" wrap="square" lIns="91425" tIns="91425" rIns="91425" bIns="91425" anchor="ctr" anchorCtr="0">
             <a:noAutofit/>
           </a:bodyPr>
           <a:lstStyle>
@@ -2345,15 +2417,19 @@
               <a:defRPr sz="3600"/>
             </a:lvl9pPr>
           </a:lstStyle>
-          <a:p/>
+          <a:p>
+            <a:endParaRPr/>
+          </a:p>
         </p:txBody>
       </p:sp>
       <p:sp>
         <p:nvSpPr>
           <p:cNvPr id="15" name="Google Shape;15;p3"/>
-          <p:cNvSpPr txBox="1"/>
+          <p:cNvSpPr txBox="1">
+            <a:spLocks noGrp="1"/>
+          </p:cNvSpPr>
           <p:nvPr>
-            <p:ph idx="12" type="sldNum"/>
+            <p:ph type="sldNum" idx="12"/>
           </p:nvPr>
         </p:nvSpPr>
         <p:spPr>
@@ -2366,7 +2442,7 @@
           </a:prstGeom>
         </p:spPr>
         <p:txBody>
-          <a:bodyPr anchorCtr="0" anchor="ctr" bIns="91425" lIns="91425" spcFirstLastPara="1" rIns="91425" wrap="square" tIns="91425">
+          <a:bodyPr spcFirstLastPara="1" wrap="square" lIns="91425" tIns="91425" rIns="91425" bIns="91425" anchor="ctr" anchorCtr="0">
             <a:noAutofit/>
           </a:bodyPr>
           <a:lstStyle>
@@ -2408,7 +2484,7 @@
             </a:lvl9pPr>
           </a:lstStyle>
           <a:p>
-            <a:pPr indent="0" lvl="0" marL="0" rtl="0" algn="r">
+            <a:pPr marL="0" lvl="0" indent="0" algn="r" rtl="0">
               <a:spcBef>
                 <a:spcPts val="0"/>
               </a:spcBef>
@@ -2434,11 +2510,11 @@
 </file>
 
 <file path=ppt/slideLayouts/slideLayout3.xml><?xml version="1.0" encoding="utf-8"?>
-<p:sldLayout xmlns:a="http://schemas.openxmlformats.org/drawingml/2006/main" xmlns:r="http://schemas.openxmlformats.org/officeDocument/2006/relationships" xmlns:mc="http://schemas.openxmlformats.org/markup-compatibility/2006" xmlns:mv="urn:schemas-microsoft-com:mac:vml" xmlns:p="http://schemas.openxmlformats.org/presentationml/2006/main" xmlns:c="http://schemas.openxmlformats.org/drawingml/2006/chart" xmlns:dgm="http://schemas.openxmlformats.org/drawingml/2006/diagram" xmlns:o="urn:schemas-microsoft-com:office:office" xmlns:v="urn:schemas-microsoft-com:vml" xmlns:pvml="urn:schemas-microsoft-com:office:powerpoint" xmlns:com="http://schemas.openxmlformats.org/drawingml/2006/compatibility" xmlns:p14="http://schemas.microsoft.com/office/powerpoint/2010/main" xmlns:p15="http://schemas.microsoft.com/office/powerpoint/2012/main" xmlns:ahyp="http://schemas.microsoft.com/office/drawing/2018/hyperlinkcolor" matchingName="Title and body" type="tx">
+<p:sldLayout xmlns:a="http://schemas.openxmlformats.org/drawingml/2006/main" xmlns:r="http://schemas.openxmlformats.org/officeDocument/2006/relationships" xmlns:p="http://schemas.openxmlformats.org/presentationml/2006/main" matchingName="Title and body" type="tx">
   <p:cSld name="TITLE_AND_BODY">
     <p:spTree>
       <p:nvGrpSpPr>
-        <p:cNvPr id="16" name="Shape 16"/>
+        <p:cNvPr id="1" name="Shape 16"/>
         <p:cNvGrpSpPr/>
         <p:nvPr/>
       </p:nvGrpSpPr>
@@ -2453,7 +2529,9 @@
       <p:sp>
         <p:nvSpPr>
           <p:cNvPr id="17" name="Google Shape;17;p4"/>
-          <p:cNvSpPr txBox="1"/>
+          <p:cNvSpPr txBox="1">
+            <a:spLocks noGrp="1"/>
+          </p:cNvSpPr>
           <p:nvPr>
             <p:ph type="title"/>
           </p:nvPr>
@@ -2468,7 +2546,7 @@
           </a:prstGeom>
         </p:spPr>
         <p:txBody>
-          <a:bodyPr anchorCtr="0" anchor="t" bIns="91425" lIns="91425" spcFirstLastPara="1" rIns="91425" wrap="square" tIns="91425">
+          <a:bodyPr spcFirstLastPara="1" wrap="square" lIns="91425" tIns="91425" rIns="91425" bIns="91425" anchor="t" anchorCtr="0">
             <a:noAutofit/>
           </a:bodyPr>
           <a:lstStyle>
@@ -2572,15 +2650,19 @@
               <a:defRPr/>
             </a:lvl9pPr>
           </a:lstStyle>
-          <a:p/>
+          <a:p>
+            <a:endParaRPr/>
+          </a:p>
         </p:txBody>
       </p:sp>
       <p:sp>
         <p:nvSpPr>
           <p:cNvPr id="18" name="Google Shape;18;p4"/>
-          <p:cNvSpPr txBox="1"/>
+          <p:cNvSpPr txBox="1">
+            <a:spLocks noGrp="1"/>
+          </p:cNvSpPr>
           <p:nvPr>
-            <p:ph idx="1" type="body"/>
+            <p:ph type="body" idx="1"/>
           </p:nvPr>
         </p:nvSpPr>
         <p:spPr>
@@ -2593,11 +2675,11 @@
           </a:prstGeom>
         </p:spPr>
         <p:txBody>
-          <a:bodyPr anchorCtr="0" anchor="t" bIns="91425" lIns="91425" spcFirstLastPara="1" rIns="91425" wrap="square" tIns="91425">
+          <a:bodyPr spcFirstLastPara="1" wrap="square" lIns="91425" tIns="91425" rIns="91425" bIns="91425" anchor="t" anchorCtr="0">
             <a:noAutofit/>
           </a:bodyPr>
           <a:lstStyle>
-            <a:lvl1pPr indent="-342900" lvl="0" marL="457200">
+            <a:lvl1pPr marL="457200" lvl="0" indent="-342900">
               <a:spcBef>
                 <a:spcPts val="0"/>
               </a:spcBef>
@@ -2608,7 +2690,7 @@
               <a:buChar char="●"/>
               <a:defRPr/>
             </a:lvl1pPr>
-            <a:lvl2pPr indent="-317500" lvl="1" marL="914400">
+            <a:lvl2pPr marL="914400" lvl="1" indent="-317500">
               <a:spcBef>
                 <a:spcPts val="1600"/>
               </a:spcBef>
@@ -2619,7 +2701,7 @@
               <a:buChar char="○"/>
               <a:defRPr/>
             </a:lvl2pPr>
-            <a:lvl3pPr indent="-317500" lvl="2" marL="1371600">
+            <a:lvl3pPr marL="1371600" lvl="2" indent="-317500">
               <a:spcBef>
                 <a:spcPts val="1600"/>
               </a:spcBef>
@@ -2630,7 +2712,7 @@
               <a:buChar char="■"/>
               <a:defRPr/>
             </a:lvl3pPr>
-            <a:lvl4pPr indent="-317500" lvl="3" marL="1828800">
+            <a:lvl4pPr marL="1828800" lvl="3" indent="-317500">
               <a:spcBef>
                 <a:spcPts val="1600"/>
               </a:spcBef>
@@ -2641,7 +2723,7 @@
               <a:buChar char="●"/>
               <a:defRPr/>
             </a:lvl4pPr>
-            <a:lvl5pPr indent="-317500" lvl="4" marL="2286000">
+            <a:lvl5pPr marL="2286000" lvl="4" indent="-317500">
               <a:spcBef>
                 <a:spcPts val="1600"/>
               </a:spcBef>
@@ -2652,7 +2734,7 @@
               <a:buChar char="○"/>
               <a:defRPr/>
             </a:lvl5pPr>
-            <a:lvl6pPr indent="-317500" lvl="5" marL="2743200">
+            <a:lvl6pPr marL="2743200" lvl="5" indent="-317500">
               <a:spcBef>
                 <a:spcPts val="1600"/>
               </a:spcBef>
@@ -2663,7 +2745,7 @@
               <a:buChar char="■"/>
               <a:defRPr/>
             </a:lvl6pPr>
-            <a:lvl7pPr indent="-317500" lvl="6" marL="3200400">
+            <a:lvl7pPr marL="3200400" lvl="6" indent="-317500">
               <a:spcBef>
                 <a:spcPts val="1600"/>
               </a:spcBef>
@@ -2674,7 +2756,7 @@
               <a:buChar char="●"/>
               <a:defRPr/>
             </a:lvl7pPr>
-            <a:lvl8pPr indent="-317500" lvl="7" marL="3657600">
+            <a:lvl8pPr marL="3657600" lvl="7" indent="-317500">
               <a:spcBef>
                 <a:spcPts val="1600"/>
               </a:spcBef>
@@ -2685,7 +2767,7 @@
               <a:buChar char="○"/>
               <a:defRPr/>
             </a:lvl8pPr>
-            <a:lvl9pPr indent="-317500" lvl="8" marL="4114800">
+            <a:lvl9pPr marL="4114800" lvl="8" indent="-317500">
               <a:spcBef>
                 <a:spcPts val="1600"/>
               </a:spcBef>
@@ -2697,15 +2779,19 @@
               <a:defRPr/>
             </a:lvl9pPr>
           </a:lstStyle>
-          <a:p/>
+          <a:p>
+            <a:endParaRPr/>
+          </a:p>
         </p:txBody>
       </p:sp>
       <p:sp>
         <p:nvSpPr>
           <p:cNvPr id="19" name="Google Shape;19;p4"/>
-          <p:cNvSpPr txBox="1"/>
+          <p:cNvSpPr txBox="1">
+            <a:spLocks noGrp="1"/>
+          </p:cNvSpPr>
           <p:nvPr>
-            <p:ph idx="12" type="sldNum"/>
+            <p:ph type="sldNum" idx="12"/>
           </p:nvPr>
         </p:nvSpPr>
         <p:spPr>
@@ -2718,7 +2804,7 @@
           </a:prstGeom>
         </p:spPr>
         <p:txBody>
-          <a:bodyPr anchorCtr="0" anchor="ctr" bIns="91425" lIns="91425" spcFirstLastPara="1" rIns="91425" wrap="square" tIns="91425">
+          <a:bodyPr spcFirstLastPara="1" wrap="square" lIns="91425" tIns="91425" rIns="91425" bIns="91425" anchor="ctr" anchorCtr="0">
             <a:noAutofit/>
           </a:bodyPr>
           <a:lstStyle>
@@ -2760,7 +2846,7 @@
             </a:lvl9pPr>
           </a:lstStyle>
           <a:p>
-            <a:pPr indent="0" lvl="0" marL="0" rtl="0" algn="r">
+            <a:pPr marL="0" lvl="0" indent="0" algn="r" rtl="0">
               <a:spcBef>
                 <a:spcPts val="0"/>
               </a:spcBef>
@@ -2786,11 +2872,11 @@
 </file>
 
 <file path=ppt/slideLayouts/slideLayout4.xml><?xml version="1.0" encoding="utf-8"?>
-<p:sldLayout xmlns:a="http://schemas.openxmlformats.org/drawingml/2006/main" xmlns:r="http://schemas.openxmlformats.org/officeDocument/2006/relationships" xmlns:mc="http://schemas.openxmlformats.org/markup-compatibility/2006" xmlns:mv="urn:schemas-microsoft-com:mac:vml" xmlns:p="http://schemas.openxmlformats.org/presentationml/2006/main" xmlns:c="http://schemas.openxmlformats.org/drawingml/2006/chart" xmlns:dgm="http://schemas.openxmlformats.org/drawingml/2006/diagram" xmlns:o="urn:schemas-microsoft-com:office:office" xmlns:v="urn:schemas-microsoft-com:vml" xmlns:pvml="urn:schemas-microsoft-com:office:powerpoint" xmlns:com="http://schemas.openxmlformats.org/drawingml/2006/compatibility" xmlns:p14="http://schemas.microsoft.com/office/powerpoint/2010/main" xmlns:p15="http://schemas.microsoft.com/office/powerpoint/2012/main" xmlns:ahyp="http://schemas.microsoft.com/office/drawing/2018/hyperlinkcolor" matchingName="Title and two columns" type="twoColTx">
+<p:sldLayout xmlns:a="http://schemas.openxmlformats.org/drawingml/2006/main" xmlns:r="http://schemas.openxmlformats.org/officeDocument/2006/relationships" xmlns:p="http://schemas.openxmlformats.org/presentationml/2006/main" matchingName="Title and two columns" type="twoColTx">
   <p:cSld name="TITLE_AND_TWO_COLUMNS">
     <p:spTree>
       <p:nvGrpSpPr>
-        <p:cNvPr id="20" name="Shape 20"/>
+        <p:cNvPr id="1" name="Shape 20"/>
         <p:cNvGrpSpPr/>
         <p:nvPr/>
       </p:nvGrpSpPr>
@@ -2805,7 +2891,9 @@
       <p:sp>
         <p:nvSpPr>
           <p:cNvPr id="21" name="Google Shape;21;p5"/>
-          <p:cNvSpPr txBox="1"/>
+          <p:cNvSpPr txBox="1">
+            <a:spLocks noGrp="1"/>
+          </p:cNvSpPr>
           <p:nvPr>
             <p:ph type="title"/>
           </p:nvPr>
@@ -2820,7 +2908,7 @@
           </a:prstGeom>
         </p:spPr>
         <p:txBody>
-          <a:bodyPr anchorCtr="0" anchor="t" bIns="91425" lIns="91425" spcFirstLastPara="1" rIns="91425" wrap="square" tIns="91425">
+          <a:bodyPr spcFirstLastPara="1" wrap="square" lIns="91425" tIns="91425" rIns="91425" bIns="91425" anchor="t" anchorCtr="0">
             <a:noAutofit/>
           </a:bodyPr>
           <a:lstStyle>
@@ -2924,15 +3012,19 @@
               <a:defRPr/>
             </a:lvl9pPr>
           </a:lstStyle>
-          <a:p/>
+          <a:p>
+            <a:endParaRPr/>
+          </a:p>
         </p:txBody>
       </p:sp>
       <p:sp>
         <p:nvSpPr>
           <p:cNvPr id="22" name="Google Shape;22;p5"/>
-          <p:cNvSpPr txBox="1"/>
+          <p:cNvSpPr txBox="1">
+            <a:spLocks noGrp="1"/>
+          </p:cNvSpPr>
           <p:nvPr>
-            <p:ph idx="1" type="body"/>
+            <p:ph type="body" idx="1"/>
           </p:nvPr>
         </p:nvSpPr>
         <p:spPr>
@@ -2945,11 +3037,11 @@
           </a:prstGeom>
         </p:spPr>
         <p:txBody>
-          <a:bodyPr anchorCtr="0" anchor="t" bIns="91425" lIns="91425" spcFirstLastPara="1" rIns="91425" wrap="square" tIns="91425">
+          <a:bodyPr spcFirstLastPara="1" wrap="square" lIns="91425" tIns="91425" rIns="91425" bIns="91425" anchor="t" anchorCtr="0">
             <a:noAutofit/>
           </a:bodyPr>
           <a:lstStyle>
-            <a:lvl1pPr indent="-317500" lvl="0" marL="457200">
+            <a:lvl1pPr marL="457200" lvl="0" indent="-317500">
               <a:spcBef>
                 <a:spcPts val="0"/>
               </a:spcBef>
@@ -2960,7 +3052,7 @@
               <a:buChar char="●"/>
               <a:defRPr sz="1400"/>
             </a:lvl1pPr>
-            <a:lvl2pPr indent="-304800" lvl="1" marL="914400">
+            <a:lvl2pPr marL="914400" lvl="1" indent="-304800">
               <a:spcBef>
                 <a:spcPts val="1600"/>
               </a:spcBef>
@@ -2971,7 +3063,7 @@
               <a:buChar char="○"/>
               <a:defRPr sz="1200"/>
             </a:lvl2pPr>
-            <a:lvl3pPr indent="-304800" lvl="2" marL="1371600">
+            <a:lvl3pPr marL="1371600" lvl="2" indent="-304800">
               <a:spcBef>
                 <a:spcPts val="1600"/>
               </a:spcBef>
@@ -2982,7 +3074,7 @@
               <a:buChar char="■"/>
               <a:defRPr sz="1200"/>
             </a:lvl3pPr>
-            <a:lvl4pPr indent="-304800" lvl="3" marL="1828800">
+            <a:lvl4pPr marL="1828800" lvl="3" indent="-304800">
               <a:spcBef>
                 <a:spcPts val="1600"/>
               </a:spcBef>
@@ -2993,7 +3085,7 @@
               <a:buChar char="●"/>
               <a:defRPr sz="1200"/>
             </a:lvl4pPr>
-            <a:lvl5pPr indent="-304800" lvl="4" marL="2286000">
+            <a:lvl5pPr marL="2286000" lvl="4" indent="-304800">
               <a:spcBef>
                 <a:spcPts val="1600"/>
               </a:spcBef>
@@ -3004,7 +3096,7 @@
               <a:buChar char="○"/>
               <a:defRPr sz="1200"/>
             </a:lvl5pPr>
-            <a:lvl6pPr indent="-304800" lvl="5" marL="2743200">
+            <a:lvl6pPr marL="2743200" lvl="5" indent="-304800">
               <a:spcBef>
                 <a:spcPts val="1600"/>
               </a:spcBef>
@@ -3015,7 +3107,7 @@
               <a:buChar char="■"/>
               <a:defRPr sz="1200"/>
             </a:lvl6pPr>
-            <a:lvl7pPr indent="-304800" lvl="6" marL="3200400">
+            <a:lvl7pPr marL="3200400" lvl="6" indent="-304800">
               <a:spcBef>
                 <a:spcPts val="1600"/>
               </a:spcBef>
@@ -3026,7 +3118,7 @@
               <a:buChar char="●"/>
               <a:defRPr sz="1200"/>
             </a:lvl7pPr>
-            <a:lvl8pPr indent="-304800" lvl="7" marL="3657600">
+            <a:lvl8pPr marL="3657600" lvl="7" indent="-304800">
               <a:spcBef>
                 <a:spcPts val="1600"/>
               </a:spcBef>
@@ -3037,7 +3129,7 @@
               <a:buChar char="○"/>
               <a:defRPr sz="1200"/>
             </a:lvl8pPr>
-            <a:lvl9pPr indent="-304800" lvl="8" marL="4114800">
+            <a:lvl9pPr marL="4114800" lvl="8" indent="-304800">
               <a:spcBef>
                 <a:spcPts val="1600"/>
               </a:spcBef>
@@ -3049,15 +3141,19 @@
               <a:defRPr sz="1200"/>
             </a:lvl9pPr>
           </a:lstStyle>
-          <a:p/>
+          <a:p>
+            <a:endParaRPr/>
+          </a:p>
         </p:txBody>
       </p:sp>
       <p:sp>
         <p:nvSpPr>
           <p:cNvPr id="23" name="Google Shape;23;p5"/>
-          <p:cNvSpPr txBox="1"/>
+          <p:cNvSpPr txBox="1">
+            <a:spLocks noGrp="1"/>
+          </p:cNvSpPr>
           <p:nvPr>
-            <p:ph idx="2" type="body"/>
+            <p:ph type="body" idx="2"/>
           </p:nvPr>
         </p:nvSpPr>
         <p:spPr>
@@ -3070,11 +3166,11 @@
           </a:prstGeom>
         </p:spPr>
         <p:txBody>
-          <a:bodyPr anchorCtr="0" anchor="t" bIns="91425" lIns="91425" spcFirstLastPara="1" rIns="91425" wrap="square" tIns="91425">
+          <a:bodyPr spcFirstLastPara="1" wrap="square" lIns="91425" tIns="91425" rIns="91425" bIns="91425" anchor="t" anchorCtr="0">
             <a:noAutofit/>
           </a:bodyPr>
           <a:lstStyle>
-            <a:lvl1pPr indent="-317500" lvl="0" marL="457200">
+            <a:lvl1pPr marL="457200" lvl="0" indent="-317500">
               <a:spcBef>
                 <a:spcPts val="0"/>
               </a:spcBef>
@@ -3085,7 +3181,7 @@
               <a:buChar char="●"/>
               <a:defRPr sz="1400"/>
             </a:lvl1pPr>
-            <a:lvl2pPr indent="-304800" lvl="1" marL="914400">
+            <a:lvl2pPr marL="914400" lvl="1" indent="-304800">
               <a:spcBef>
                 <a:spcPts val="1600"/>
               </a:spcBef>
@@ -3096,7 +3192,7 @@
               <a:buChar char="○"/>
               <a:defRPr sz="1200"/>
             </a:lvl2pPr>
-            <a:lvl3pPr indent="-304800" lvl="2" marL="1371600">
+            <a:lvl3pPr marL="1371600" lvl="2" indent="-304800">
               <a:spcBef>
                 <a:spcPts val="1600"/>
               </a:spcBef>
@@ -3107,7 +3203,7 @@
               <a:buChar char="■"/>
               <a:defRPr sz="1200"/>
             </a:lvl3pPr>
-            <a:lvl4pPr indent="-304800" lvl="3" marL="1828800">
+            <a:lvl4pPr marL="1828800" lvl="3" indent="-304800">
               <a:spcBef>
                 <a:spcPts val="1600"/>
               </a:spcBef>
@@ -3118,7 +3214,7 @@
               <a:buChar char="●"/>
               <a:defRPr sz="1200"/>
             </a:lvl4pPr>
-            <a:lvl5pPr indent="-304800" lvl="4" marL="2286000">
+            <a:lvl5pPr marL="2286000" lvl="4" indent="-304800">
               <a:spcBef>
                 <a:spcPts val="1600"/>
               </a:spcBef>
@@ -3129,7 +3225,7 @@
               <a:buChar char="○"/>
               <a:defRPr sz="1200"/>
             </a:lvl5pPr>
-            <a:lvl6pPr indent="-304800" lvl="5" marL="2743200">
+            <a:lvl6pPr marL="2743200" lvl="5" indent="-304800">
               <a:spcBef>
                 <a:spcPts val="1600"/>
               </a:spcBef>
@@ -3140,7 +3236,7 @@
               <a:buChar char="■"/>
               <a:defRPr sz="1200"/>
             </a:lvl6pPr>
-            <a:lvl7pPr indent="-304800" lvl="6" marL="3200400">
+            <a:lvl7pPr marL="3200400" lvl="6" indent="-304800">
               <a:spcBef>
                 <a:spcPts val="1600"/>
               </a:spcBef>
@@ -3151,7 +3247,7 @@
               <a:buChar char="●"/>
               <a:defRPr sz="1200"/>
             </a:lvl7pPr>
-            <a:lvl8pPr indent="-304800" lvl="7" marL="3657600">
+            <a:lvl8pPr marL="3657600" lvl="7" indent="-304800">
               <a:spcBef>
                 <a:spcPts val="1600"/>
               </a:spcBef>
@@ -3162,7 +3258,7 @@
               <a:buChar char="○"/>
               <a:defRPr sz="1200"/>
             </a:lvl8pPr>
-            <a:lvl9pPr indent="-304800" lvl="8" marL="4114800">
+            <a:lvl9pPr marL="4114800" lvl="8" indent="-304800">
               <a:spcBef>
                 <a:spcPts val="1600"/>
               </a:spcBef>
@@ -3174,15 +3270,19 @@
               <a:defRPr sz="1200"/>
             </a:lvl9pPr>
           </a:lstStyle>
-          <a:p/>
+          <a:p>
+            <a:endParaRPr/>
+          </a:p>
         </p:txBody>
       </p:sp>
       <p:sp>
         <p:nvSpPr>
           <p:cNvPr id="24" name="Google Shape;24;p5"/>
-          <p:cNvSpPr txBox="1"/>
+          <p:cNvSpPr txBox="1">
+            <a:spLocks noGrp="1"/>
+          </p:cNvSpPr>
           <p:nvPr>
-            <p:ph idx="12" type="sldNum"/>
+            <p:ph type="sldNum" idx="12"/>
           </p:nvPr>
         </p:nvSpPr>
         <p:spPr>
@@ -3195,7 +3295,7 @@
           </a:prstGeom>
         </p:spPr>
         <p:txBody>
-          <a:bodyPr anchorCtr="0" anchor="ctr" bIns="91425" lIns="91425" spcFirstLastPara="1" rIns="91425" wrap="square" tIns="91425">
+          <a:bodyPr spcFirstLastPara="1" wrap="square" lIns="91425" tIns="91425" rIns="91425" bIns="91425" anchor="ctr" anchorCtr="0">
             <a:noAutofit/>
           </a:bodyPr>
           <a:lstStyle>
@@ -3237,7 +3337,7 @@
             </a:lvl9pPr>
           </a:lstStyle>
           <a:p>
-            <a:pPr indent="0" lvl="0" marL="0" rtl="0" algn="r">
+            <a:pPr marL="0" lvl="0" indent="0" algn="r" rtl="0">
               <a:spcBef>
                 <a:spcPts val="0"/>
               </a:spcBef>
@@ -3263,11 +3363,11 @@
 </file>
 
 <file path=ppt/slideLayouts/slideLayout5.xml><?xml version="1.0" encoding="utf-8"?>
-<p:sldLayout xmlns:a="http://schemas.openxmlformats.org/drawingml/2006/main" xmlns:r="http://schemas.openxmlformats.org/officeDocument/2006/relationships" xmlns:mc="http://schemas.openxmlformats.org/markup-compatibility/2006" xmlns:mv="urn:schemas-microsoft-com:mac:vml" xmlns:p="http://schemas.openxmlformats.org/presentationml/2006/main" xmlns:c="http://schemas.openxmlformats.org/drawingml/2006/chart" xmlns:dgm="http://schemas.openxmlformats.org/drawingml/2006/diagram" xmlns:o="urn:schemas-microsoft-com:office:office" xmlns:v="urn:schemas-microsoft-com:vml" xmlns:pvml="urn:schemas-microsoft-com:office:powerpoint" xmlns:com="http://schemas.openxmlformats.org/drawingml/2006/compatibility" xmlns:p14="http://schemas.microsoft.com/office/powerpoint/2010/main" xmlns:p15="http://schemas.microsoft.com/office/powerpoint/2012/main" xmlns:ahyp="http://schemas.microsoft.com/office/drawing/2018/hyperlinkcolor" matchingName="Title only" type="titleOnly">
+<p:sldLayout xmlns:a="http://schemas.openxmlformats.org/drawingml/2006/main" xmlns:r="http://schemas.openxmlformats.org/officeDocument/2006/relationships" xmlns:p="http://schemas.openxmlformats.org/presentationml/2006/main" matchingName="Title only" type="titleOnly">
   <p:cSld name="TITLE_ONLY">
     <p:spTree>
       <p:nvGrpSpPr>
-        <p:cNvPr id="25" name="Shape 25"/>
+        <p:cNvPr id="1" name="Shape 25"/>
         <p:cNvGrpSpPr/>
         <p:nvPr/>
       </p:nvGrpSpPr>
@@ -3282,7 +3382,9 @@
       <p:sp>
         <p:nvSpPr>
           <p:cNvPr id="26" name="Google Shape;26;p6"/>
-          <p:cNvSpPr txBox="1"/>
+          <p:cNvSpPr txBox="1">
+            <a:spLocks noGrp="1"/>
+          </p:cNvSpPr>
           <p:nvPr>
             <p:ph type="title"/>
           </p:nvPr>
@@ -3297,7 +3399,7 @@
           </a:prstGeom>
         </p:spPr>
         <p:txBody>
-          <a:bodyPr anchorCtr="0" anchor="t" bIns="91425" lIns="91425" spcFirstLastPara="1" rIns="91425" wrap="square" tIns="91425">
+          <a:bodyPr spcFirstLastPara="1" wrap="square" lIns="91425" tIns="91425" rIns="91425" bIns="91425" anchor="t" anchorCtr="0">
             <a:noAutofit/>
           </a:bodyPr>
           <a:lstStyle>
@@ -3401,15 +3503,19 @@
               <a:defRPr/>
             </a:lvl9pPr>
           </a:lstStyle>
-          <a:p/>
+          <a:p>
+            <a:endParaRPr/>
+          </a:p>
         </p:txBody>
       </p:sp>
       <p:sp>
         <p:nvSpPr>
           <p:cNvPr id="27" name="Google Shape;27;p6"/>
-          <p:cNvSpPr txBox="1"/>
+          <p:cNvSpPr txBox="1">
+            <a:spLocks noGrp="1"/>
+          </p:cNvSpPr>
           <p:nvPr>
-            <p:ph idx="12" type="sldNum"/>
+            <p:ph type="sldNum" idx="12"/>
           </p:nvPr>
         </p:nvSpPr>
         <p:spPr>
@@ -3422,7 +3528,7 @@
           </a:prstGeom>
         </p:spPr>
         <p:txBody>
-          <a:bodyPr anchorCtr="0" anchor="ctr" bIns="91425" lIns="91425" spcFirstLastPara="1" rIns="91425" wrap="square" tIns="91425">
+          <a:bodyPr spcFirstLastPara="1" wrap="square" lIns="91425" tIns="91425" rIns="91425" bIns="91425" anchor="ctr" anchorCtr="0">
             <a:noAutofit/>
           </a:bodyPr>
           <a:lstStyle>
@@ -3464,7 +3570,7 @@
             </a:lvl9pPr>
           </a:lstStyle>
           <a:p>
-            <a:pPr indent="0" lvl="0" marL="0" rtl="0" algn="r">
+            <a:pPr marL="0" lvl="0" indent="0" algn="r" rtl="0">
               <a:spcBef>
                 <a:spcPts val="0"/>
               </a:spcBef>
@@ -3490,11 +3596,11 @@
 </file>
 
 <file path=ppt/slideLayouts/slideLayout6.xml><?xml version="1.0" encoding="utf-8"?>
-<p:sldLayout xmlns:a="http://schemas.openxmlformats.org/drawingml/2006/main" xmlns:r="http://schemas.openxmlformats.org/officeDocument/2006/relationships" xmlns:mc="http://schemas.openxmlformats.org/markup-compatibility/2006" xmlns:mv="urn:schemas-microsoft-com:mac:vml" xmlns:p="http://schemas.openxmlformats.org/presentationml/2006/main" xmlns:c="http://schemas.openxmlformats.org/drawingml/2006/chart" xmlns:dgm="http://schemas.openxmlformats.org/drawingml/2006/diagram" xmlns:o="urn:schemas-microsoft-com:office:office" xmlns:v="urn:schemas-microsoft-com:vml" xmlns:pvml="urn:schemas-microsoft-com:office:powerpoint" xmlns:com="http://schemas.openxmlformats.org/drawingml/2006/compatibility" xmlns:p14="http://schemas.microsoft.com/office/powerpoint/2010/main" xmlns:p15="http://schemas.microsoft.com/office/powerpoint/2012/main" xmlns:ahyp="http://schemas.microsoft.com/office/drawing/2018/hyperlinkcolor" matchingName="One column text">
+<p:sldLayout xmlns:a="http://schemas.openxmlformats.org/drawingml/2006/main" xmlns:r="http://schemas.openxmlformats.org/officeDocument/2006/relationships" xmlns:p="http://schemas.openxmlformats.org/presentationml/2006/main" matchingName="One column text">
   <p:cSld name="ONE_COLUMN_TEXT">
     <p:spTree>
       <p:nvGrpSpPr>
-        <p:cNvPr id="28" name="Shape 28"/>
+        <p:cNvPr id="1" name="Shape 28"/>
         <p:cNvGrpSpPr/>
         <p:nvPr/>
       </p:nvGrpSpPr>
@@ -3509,7 +3615,9 @@
       <p:sp>
         <p:nvSpPr>
           <p:cNvPr id="29" name="Google Shape;29;p7"/>
-          <p:cNvSpPr txBox="1"/>
+          <p:cNvSpPr txBox="1">
+            <a:spLocks noGrp="1"/>
+          </p:cNvSpPr>
           <p:nvPr>
             <p:ph type="title"/>
           </p:nvPr>
@@ -3524,7 +3632,7 @@
           </a:prstGeom>
         </p:spPr>
         <p:txBody>
-          <a:bodyPr anchorCtr="0" anchor="b" bIns="91425" lIns="91425" spcFirstLastPara="1" rIns="91425" wrap="square" tIns="91425">
+          <a:bodyPr spcFirstLastPara="1" wrap="square" lIns="91425" tIns="91425" rIns="91425" bIns="91425" anchor="b" anchorCtr="0">
             <a:noAutofit/>
           </a:bodyPr>
           <a:lstStyle>
@@ -3628,15 +3736,19 @@
               <a:defRPr sz="2400"/>
             </a:lvl9pPr>
           </a:lstStyle>
-          <a:p/>
+          <a:p>
+            <a:endParaRPr/>
+          </a:p>
         </p:txBody>
       </p:sp>
       <p:sp>
         <p:nvSpPr>
           <p:cNvPr id="30" name="Google Shape;30;p7"/>
-          <p:cNvSpPr txBox="1"/>
+          <p:cNvSpPr txBox="1">
+            <a:spLocks noGrp="1"/>
+          </p:cNvSpPr>
           <p:nvPr>
-            <p:ph idx="1" type="body"/>
+            <p:ph type="body" idx="1"/>
           </p:nvPr>
         </p:nvSpPr>
         <p:spPr>
@@ -3649,11 +3761,11 @@
           </a:prstGeom>
         </p:spPr>
         <p:txBody>
-          <a:bodyPr anchorCtr="0" anchor="t" bIns="91425" lIns="91425" spcFirstLastPara="1" rIns="91425" wrap="square" tIns="91425">
+          <a:bodyPr spcFirstLastPara="1" wrap="square" lIns="91425" tIns="91425" rIns="91425" bIns="91425" anchor="t" anchorCtr="0">
             <a:noAutofit/>
           </a:bodyPr>
           <a:lstStyle>
-            <a:lvl1pPr indent="-304800" lvl="0" marL="457200">
+            <a:lvl1pPr marL="457200" lvl="0" indent="-304800">
               <a:spcBef>
                 <a:spcPts val="0"/>
               </a:spcBef>
@@ -3664,7 +3776,7 @@
               <a:buChar char="●"/>
               <a:defRPr sz="1200"/>
             </a:lvl1pPr>
-            <a:lvl2pPr indent="-304800" lvl="1" marL="914400">
+            <a:lvl2pPr marL="914400" lvl="1" indent="-304800">
               <a:spcBef>
                 <a:spcPts val="1600"/>
               </a:spcBef>
@@ -3675,7 +3787,7 @@
               <a:buChar char="○"/>
               <a:defRPr sz="1200"/>
             </a:lvl2pPr>
-            <a:lvl3pPr indent="-304800" lvl="2" marL="1371600">
+            <a:lvl3pPr marL="1371600" lvl="2" indent="-304800">
               <a:spcBef>
                 <a:spcPts val="1600"/>
               </a:spcBef>
@@ -3686,7 +3798,7 @@
               <a:buChar char="■"/>
               <a:defRPr sz="1200"/>
             </a:lvl3pPr>
-            <a:lvl4pPr indent="-304800" lvl="3" marL="1828800">
+            <a:lvl4pPr marL="1828800" lvl="3" indent="-304800">
               <a:spcBef>
                 <a:spcPts val="1600"/>
               </a:spcBef>
@@ -3697,7 +3809,7 @@
               <a:buChar char="●"/>
               <a:defRPr sz="1200"/>
             </a:lvl4pPr>
-            <a:lvl5pPr indent="-304800" lvl="4" marL="2286000">
+            <a:lvl5pPr marL="2286000" lvl="4" indent="-304800">
               <a:spcBef>
                 <a:spcPts val="1600"/>
               </a:spcBef>
@@ -3708,7 +3820,7 @@
               <a:buChar char="○"/>
               <a:defRPr sz="1200"/>
             </a:lvl5pPr>
-            <a:lvl6pPr indent="-304800" lvl="5" marL="2743200">
+            <a:lvl6pPr marL="2743200" lvl="5" indent="-304800">
               <a:spcBef>
                 <a:spcPts val="1600"/>
               </a:spcBef>
@@ -3719,7 +3831,7 @@
               <a:buChar char="■"/>
               <a:defRPr sz="1200"/>
             </a:lvl6pPr>
-            <a:lvl7pPr indent="-304800" lvl="6" marL="3200400">
+            <a:lvl7pPr marL="3200400" lvl="6" indent="-304800">
               <a:spcBef>
                 <a:spcPts val="1600"/>
               </a:spcBef>
@@ -3730,7 +3842,7 @@
               <a:buChar char="●"/>
               <a:defRPr sz="1200"/>
             </a:lvl7pPr>
-            <a:lvl8pPr indent="-304800" lvl="7" marL="3657600">
+            <a:lvl8pPr marL="3657600" lvl="7" indent="-304800">
               <a:spcBef>
                 <a:spcPts val="1600"/>
               </a:spcBef>
@@ -3741,7 +3853,7 @@
               <a:buChar char="○"/>
               <a:defRPr sz="1200"/>
             </a:lvl8pPr>
-            <a:lvl9pPr indent="-304800" lvl="8" marL="4114800">
+            <a:lvl9pPr marL="4114800" lvl="8" indent="-304800">
               <a:spcBef>
                 <a:spcPts val="1600"/>
               </a:spcBef>
@@ -3753,15 +3865,19 @@
               <a:defRPr sz="1200"/>
             </a:lvl9pPr>
           </a:lstStyle>
-          <a:p/>
+          <a:p>
+            <a:endParaRPr/>
+          </a:p>
         </p:txBody>
       </p:sp>
       <p:sp>
         <p:nvSpPr>
           <p:cNvPr id="31" name="Google Shape;31;p7"/>
-          <p:cNvSpPr txBox="1"/>
+          <p:cNvSpPr txBox="1">
+            <a:spLocks noGrp="1"/>
+          </p:cNvSpPr>
           <p:nvPr>
-            <p:ph idx="12" type="sldNum"/>
+            <p:ph type="sldNum" idx="12"/>
           </p:nvPr>
         </p:nvSpPr>
         <p:spPr>
@@ -3774,7 +3890,7 @@
           </a:prstGeom>
         </p:spPr>
         <p:txBody>
-          <a:bodyPr anchorCtr="0" anchor="ctr" bIns="91425" lIns="91425" spcFirstLastPara="1" rIns="91425" wrap="square" tIns="91425">
+          <a:bodyPr spcFirstLastPara="1" wrap="square" lIns="91425" tIns="91425" rIns="91425" bIns="91425" anchor="ctr" anchorCtr="0">
             <a:noAutofit/>
           </a:bodyPr>
           <a:lstStyle>
@@ -3816,7 +3932,7 @@
             </a:lvl9pPr>
           </a:lstStyle>
           <a:p>
-            <a:pPr indent="0" lvl="0" marL="0" rtl="0" algn="r">
+            <a:pPr marL="0" lvl="0" indent="0" algn="r" rtl="0">
               <a:spcBef>
                 <a:spcPts val="0"/>
               </a:spcBef>
@@ -3842,11 +3958,11 @@
 </file>
 
 <file path=ppt/slideLayouts/slideLayout7.xml><?xml version="1.0" encoding="utf-8"?>
-<p:sldLayout xmlns:a="http://schemas.openxmlformats.org/drawingml/2006/main" xmlns:r="http://schemas.openxmlformats.org/officeDocument/2006/relationships" xmlns:mc="http://schemas.openxmlformats.org/markup-compatibility/2006" xmlns:mv="urn:schemas-microsoft-com:mac:vml" xmlns:p="http://schemas.openxmlformats.org/presentationml/2006/main" xmlns:c="http://schemas.openxmlformats.org/drawingml/2006/chart" xmlns:dgm="http://schemas.openxmlformats.org/drawingml/2006/diagram" xmlns:o="urn:schemas-microsoft-com:office:office" xmlns:v="urn:schemas-microsoft-com:vml" xmlns:pvml="urn:schemas-microsoft-com:office:powerpoint" xmlns:com="http://schemas.openxmlformats.org/drawingml/2006/compatibility" xmlns:p14="http://schemas.microsoft.com/office/powerpoint/2010/main" xmlns:p15="http://schemas.microsoft.com/office/powerpoint/2012/main" xmlns:ahyp="http://schemas.microsoft.com/office/drawing/2018/hyperlinkcolor" matchingName="Main point">
+<p:sldLayout xmlns:a="http://schemas.openxmlformats.org/drawingml/2006/main" xmlns:r="http://schemas.openxmlformats.org/officeDocument/2006/relationships" xmlns:p="http://schemas.openxmlformats.org/presentationml/2006/main" matchingName="Main point">
   <p:cSld name="MAIN_POINT">
     <p:spTree>
       <p:nvGrpSpPr>
-        <p:cNvPr id="32" name="Shape 32"/>
+        <p:cNvPr id="1" name="Shape 32"/>
         <p:cNvGrpSpPr/>
         <p:nvPr/>
       </p:nvGrpSpPr>
@@ -3861,7 +3977,9 @@
       <p:sp>
         <p:nvSpPr>
           <p:cNvPr id="33" name="Google Shape;33;p8"/>
-          <p:cNvSpPr txBox="1"/>
+          <p:cNvSpPr txBox="1">
+            <a:spLocks noGrp="1"/>
+          </p:cNvSpPr>
           <p:nvPr>
             <p:ph type="title"/>
           </p:nvPr>
@@ -3876,7 +3994,7 @@
           </a:prstGeom>
         </p:spPr>
         <p:txBody>
-          <a:bodyPr anchorCtr="0" anchor="ctr" bIns="91425" lIns="91425" spcFirstLastPara="1" rIns="91425" wrap="square" tIns="91425">
+          <a:bodyPr spcFirstLastPara="1" wrap="square" lIns="91425" tIns="91425" rIns="91425" bIns="91425" anchor="ctr" anchorCtr="0">
             <a:noAutofit/>
           </a:bodyPr>
           <a:lstStyle>
@@ -3980,15 +4098,19 @@
               <a:defRPr sz="4800"/>
             </a:lvl9pPr>
           </a:lstStyle>
-          <a:p/>
+          <a:p>
+            <a:endParaRPr/>
+          </a:p>
         </p:txBody>
       </p:sp>
       <p:sp>
         <p:nvSpPr>
           <p:cNvPr id="34" name="Google Shape;34;p8"/>
-          <p:cNvSpPr txBox="1"/>
+          <p:cNvSpPr txBox="1">
+            <a:spLocks noGrp="1"/>
+          </p:cNvSpPr>
           <p:nvPr>
-            <p:ph idx="12" type="sldNum"/>
+            <p:ph type="sldNum" idx="12"/>
           </p:nvPr>
         </p:nvSpPr>
         <p:spPr>
@@ -4001,7 +4123,7 @@
           </a:prstGeom>
         </p:spPr>
         <p:txBody>
-          <a:bodyPr anchorCtr="0" anchor="ctr" bIns="91425" lIns="91425" spcFirstLastPara="1" rIns="91425" wrap="square" tIns="91425">
+          <a:bodyPr spcFirstLastPara="1" wrap="square" lIns="91425" tIns="91425" rIns="91425" bIns="91425" anchor="ctr" anchorCtr="0">
             <a:noAutofit/>
           </a:bodyPr>
           <a:lstStyle>
@@ -4043,7 +4165,7 @@
             </a:lvl9pPr>
           </a:lstStyle>
           <a:p>
-            <a:pPr indent="0" lvl="0" marL="0" rtl="0" algn="r">
+            <a:pPr marL="0" lvl="0" indent="0" algn="r" rtl="0">
               <a:spcBef>
                 <a:spcPts val="0"/>
               </a:spcBef>
@@ -4069,11 +4191,11 @@
 </file>
 
 <file path=ppt/slideLayouts/slideLayout8.xml><?xml version="1.0" encoding="utf-8"?>
-<p:sldLayout xmlns:a="http://schemas.openxmlformats.org/drawingml/2006/main" xmlns:r="http://schemas.openxmlformats.org/officeDocument/2006/relationships" xmlns:mc="http://schemas.openxmlformats.org/markup-compatibility/2006" xmlns:mv="urn:schemas-microsoft-com:mac:vml" xmlns:p="http://schemas.openxmlformats.org/presentationml/2006/main" xmlns:c="http://schemas.openxmlformats.org/drawingml/2006/chart" xmlns:dgm="http://schemas.openxmlformats.org/drawingml/2006/diagram" xmlns:o="urn:schemas-microsoft-com:office:office" xmlns:v="urn:schemas-microsoft-com:vml" xmlns:pvml="urn:schemas-microsoft-com:office:powerpoint" xmlns:com="http://schemas.openxmlformats.org/drawingml/2006/compatibility" xmlns:p14="http://schemas.microsoft.com/office/powerpoint/2010/main" xmlns:p15="http://schemas.microsoft.com/office/powerpoint/2012/main" xmlns:ahyp="http://schemas.microsoft.com/office/drawing/2018/hyperlinkcolor" matchingName="Section title and description">
+<p:sldLayout xmlns:a="http://schemas.openxmlformats.org/drawingml/2006/main" xmlns:r="http://schemas.openxmlformats.org/officeDocument/2006/relationships" xmlns:p="http://schemas.openxmlformats.org/presentationml/2006/main" matchingName="Section title and description">
   <p:cSld name="SECTION_TITLE_AND_DESCRIPTION">
     <p:spTree>
       <p:nvGrpSpPr>
-        <p:cNvPr id="35" name="Shape 35"/>
+        <p:cNvPr id="1" name="Shape 35"/>
         <p:cNvGrpSpPr/>
         <p:nvPr/>
       </p:nvGrpSpPr>
@@ -4107,12 +4229,12 @@
           </a:ln>
         </p:spPr>
         <p:txBody>
-          <a:bodyPr anchorCtr="0" anchor="ctr" bIns="91425" lIns="91425" spcFirstLastPara="1" rIns="91425" wrap="square" tIns="91425">
+          <a:bodyPr spcFirstLastPara="1" wrap="square" lIns="91425" tIns="91425" rIns="91425" bIns="91425" anchor="ctr" anchorCtr="0">
             <a:noAutofit/>
           </a:bodyPr>
           <a:lstStyle/>
           <a:p>
-            <a:pPr indent="0" lvl="0" marL="0" rtl="0" algn="l">
+            <a:pPr marL="0" lvl="0" indent="0" algn="l" rtl="0">
               <a:spcBef>
                 <a:spcPts val="0"/>
               </a:spcBef>
@@ -4121,9 +4243,6 @@
               </a:spcAft>
               <a:buNone/>
             </a:pPr>
-            <a:r>
-              <a:t/>
-            </a:r>
             <a:endParaRPr/>
           </a:p>
         </p:txBody>
@@ -4131,7 +4250,9 @@
       <p:sp>
         <p:nvSpPr>
           <p:cNvPr id="37" name="Google Shape;37;p9"/>
-          <p:cNvSpPr txBox="1"/>
+          <p:cNvSpPr txBox="1">
+            <a:spLocks noGrp="1"/>
+          </p:cNvSpPr>
           <p:nvPr>
             <p:ph type="title"/>
           </p:nvPr>
@@ -4146,7 +4267,7 @@
           </a:prstGeom>
         </p:spPr>
         <p:txBody>
-          <a:bodyPr anchorCtr="0" anchor="b" bIns="91425" lIns="91425" spcFirstLastPara="1" rIns="91425" wrap="square" tIns="91425">
+          <a:bodyPr spcFirstLastPara="1" wrap="square" lIns="91425" tIns="91425" rIns="91425" bIns="91425" anchor="b" anchorCtr="0">
             <a:noAutofit/>
           </a:bodyPr>
           <a:lstStyle>
@@ -4250,15 +4371,19 @@
               <a:defRPr sz="4200"/>
             </a:lvl9pPr>
           </a:lstStyle>
-          <a:p/>
+          <a:p>
+            <a:endParaRPr/>
+          </a:p>
         </p:txBody>
       </p:sp>
       <p:sp>
         <p:nvSpPr>
           <p:cNvPr id="38" name="Google Shape;38;p9"/>
-          <p:cNvSpPr txBox="1"/>
+          <p:cNvSpPr txBox="1">
+            <a:spLocks noGrp="1"/>
+          </p:cNvSpPr>
           <p:nvPr>
-            <p:ph idx="1" type="subTitle"/>
+            <p:ph type="subTitle" idx="1"/>
           </p:nvPr>
         </p:nvSpPr>
         <p:spPr>
@@ -4271,7 +4396,7 @@
           </a:prstGeom>
         </p:spPr>
         <p:txBody>
-          <a:bodyPr anchorCtr="0" anchor="t" bIns="91425" lIns="91425" spcFirstLastPara="1" rIns="91425" wrap="square" tIns="91425">
+          <a:bodyPr spcFirstLastPara="1" wrap="square" lIns="91425" tIns="91425" rIns="91425" bIns="91425" anchor="t" anchorCtr="0">
             <a:noAutofit/>
           </a:bodyPr>
           <a:lstStyle>
@@ -4402,15 +4527,19 @@
               <a:defRPr sz="2100"/>
             </a:lvl9pPr>
           </a:lstStyle>
-          <a:p/>
+          <a:p>
+            <a:endParaRPr/>
+          </a:p>
         </p:txBody>
       </p:sp>
       <p:sp>
         <p:nvSpPr>
           <p:cNvPr id="39" name="Google Shape;39;p9"/>
-          <p:cNvSpPr txBox="1"/>
+          <p:cNvSpPr txBox="1">
+            <a:spLocks noGrp="1"/>
+          </p:cNvSpPr>
           <p:nvPr>
-            <p:ph idx="2" type="body"/>
+            <p:ph type="body" idx="2"/>
           </p:nvPr>
         </p:nvSpPr>
         <p:spPr>
@@ -4423,11 +4552,11 @@
           </a:prstGeom>
         </p:spPr>
         <p:txBody>
-          <a:bodyPr anchorCtr="0" anchor="ctr" bIns="91425" lIns="91425" spcFirstLastPara="1" rIns="91425" wrap="square" tIns="91425">
+          <a:bodyPr spcFirstLastPara="1" wrap="square" lIns="91425" tIns="91425" rIns="91425" bIns="91425" anchor="ctr" anchorCtr="0">
             <a:noAutofit/>
           </a:bodyPr>
           <a:lstStyle>
-            <a:lvl1pPr indent="-342900" lvl="0" marL="457200">
+            <a:lvl1pPr marL="457200" lvl="0" indent="-342900">
               <a:spcBef>
                 <a:spcPts val="0"/>
               </a:spcBef>
@@ -4438,7 +4567,7 @@
               <a:buChar char="●"/>
               <a:defRPr/>
             </a:lvl1pPr>
-            <a:lvl2pPr indent="-317500" lvl="1" marL="914400">
+            <a:lvl2pPr marL="914400" lvl="1" indent="-317500">
               <a:spcBef>
                 <a:spcPts val="1600"/>
               </a:spcBef>
@@ -4449,7 +4578,7 @@
               <a:buChar char="○"/>
               <a:defRPr/>
             </a:lvl2pPr>
-            <a:lvl3pPr indent="-317500" lvl="2" marL="1371600">
+            <a:lvl3pPr marL="1371600" lvl="2" indent="-317500">
               <a:spcBef>
                 <a:spcPts val="1600"/>
               </a:spcBef>
@@ -4460,7 +4589,7 @@
               <a:buChar char="■"/>
               <a:defRPr/>
             </a:lvl3pPr>
-            <a:lvl4pPr indent="-317500" lvl="3" marL="1828800">
+            <a:lvl4pPr marL="1828800" lvl="3" indent="-317500">
               <a:spcBef>
                 <a:spcPts val="1600"/>
               </a:spcBef>
@@ -4471,7 +4600,7 @@
               <a:buChar char="●"/>
               <a:defRPr/>
             </a:lvl4pPr>
-            <a:lvl5pPr indent="-317500" lvl="4" marL="2286000">
+            <a:lvl5pPr marL="2286000" lvl="4" indent="-317500">
               <a:spcBef>
                 <a:spcPts val="1600"/>
               </a:spcBef>
@@ -4482,7 +4611,7 @@
               <a:buChar char="○"/>
               <a:defRPr/>
             </a:lvl5pPr>
-            <a:lvl6pPr indent="-317500" lvl="5" marL="2743200">
+            <a:lvl6pPr marL="2743200" lvl="5" indent="-317500">
               <a:spcBef>
                 <a:spcPts val="1600"/>
               </a:spcBef>
@@ -4493,7 +4622,7 @@
               <a:buChar char="■"/>
               <a:defRPr/>
             </a:lvl6pPr>
-            <a:lvl7pPr indent="-317500" lvl="6" marL="3200400">
+            <a:lvl7pPr marL="3200400" lvl="6" indent="-317500">
               <a:spcBef>
                 <a:spcPts val="1600"/>
               </a:spcBef>
@@ -4504,7 +4633,7 @@
               <a:buChar char="●"/>
               <a:defRPr/>
             </a:lvl7pPr>
-            <a:lvl8pPr indent="-317500" lvl="7" marL="3657600">
+            <a:lvl8pPr marL="3657600" lvl="7" indent="-317500">
               <a:spcBef>
                 <a:spcPts val="1600"/>
               </a:spcBef>
@@ -4515,7 +4644,7 @@
               <a:buChar char="○"/>
               <a:defRPr/>
             </a:lvl8pPr>
-            <a:lvl9pPr indent="-317500" lvl="8" marL="4114800">
+            <a:lvl9pPr marL="4114800" lvl="8" indent="-317500">
               <a:spcBef>
                 <a:spcPts val="1600"/>
               </a:spcBef>
@@ -4527,15 +4656,19 @@
               <a:defRPr/>
             </a:lvl9pPr>
           </a:lstStyle>
-          <a:p/>
+          <a:p>
+            <a:endParaRPr/>
+          </a:p>
         </p:txBody>
       </p:sp>
       <p:sp>
         <p:nvSpPr>
           <p:cNvPr id="40" name="Google Shape;40;p9"/>
-          <p:cNvSpPr txBox="1"/>
+          <p:cNvSpPr txBox="1">
+            <a:spLocks noGrp="1"/>
+          </p:cNvSpPr>
           <p:nvPr>
-            <p:ph idx="12" type="sldNum"/>
+            <p:ph type="sldNum" idx="12"/>
           </p:nvPr>
         </p:nvSpPr>
         <p:spPr>
@@ -4548,7 +4681,7 @@
           </a:prstGeom>
         </p:spPr>
         <p:txBody>
-          <a:bodyPr anchorCtr="0" anchor="ctr" bIns="91425" lIns="91425" spcFirstLastPara="1" rIns="91425" wrap="square" tIns="91425">
+          <a:bodyPr spcFirstLastPara="1" wrap="square" lIns="91425" tIns="91425" rIns="91425" bIns="91425" anchor="ctr" anchorCtr="0">
             <a:noAutofit/>
           </a:bodyPr>
           <a:lstStyle>
@@ -4590,7 +4723,7 @@
             </a:lvl9pPr>
           </a:lstStyle>
           <a:p>
-            <a:pPr indent="0" lvl="0" marL="0" rtl="0" algn="r">
+            <a:pPr marL="0" lvl="0" indent="0" algn="r" rtl="0">
               <a:spcBef>
                 <a:spcPts val="0"/>
               </a:spcBef>
@@ -4616,11 +4749,11 @@
 </file>
 
 <file path=ppt/slideLayouts/slideLayout9.xml><?xml version="1.0" encoding="utf-8"?>
-<p:sldLayout xmlns:a="http://schemas.openxmlformats.org/drawingml/2006/main" xmlns:r="http://schemas.openxmlformats.org/officeDocument/2006/relationships" xmlns:mc="http://schemas.openxmlformats.org/markup-compatibility/2006" xmlns:mv="urn:schemas-microsoft-com:mac:vml" xmlns:p="http://schemas.openxmlformats.org/presentationml/2006/main" xmlns:c="http://schemas.openxmlformats.org/drawingml/2006/chart" xmlns:dgm="http://schemas.openxmlformats.org/drawingml/2006/diagram" xmlns:o="urn:schemas-microsoft-com:office:office" xmlns:v="urn:schemas-microsoft-com:vml" xmlns:pvml="urn:schemas-microsoft-com:office:powerpoint" xmlns:com="http://schemas.openxmlformats.org/drawingml/2006/compatibility" xmlns:p14="http://schemas.microsoft.com/office/powerpoint/2010/main" xmlns:p15="http://schemas.microsoft.com/office/powerpoint/2012/main" xmlns:ahyp="http://schemas.microsoft.com/office/drawing/2018/hyperlinkcolor" matchingName="Caption">
+<p:sldLayout xmlns:a="http://schemas.openxmlformats.org/drawingml/2006/main" xmlns:r="http://schemas.openxmlformats.org/officeDocument/2006/relationships" xmlns:p="http://schemas.openxmlformats.org/presentationml/2006/main" matchingName="Caption">
   <p:cSld name="CAPTION_ONLY">
     <p:spTree>
       <p:nvGrpSpPr>
-        <p:cNvPr id="41" name="Shape 41"/>
+        <p:cNvPr id="1" name="Shape 41"/>
         <p:cNvGrpSpPr/>
         <p:nvPr/>
       </p:nvGrpSpPr>
@@ -4635,9 +4768,11 @@
       <p:sp>
         <p:nvSpPr>
           <p:cNvPr id="42" name="Google Shape;42;p10"/>
-          <p:cNvSpPr txBox="1"/>
+          <p:cNvSpPr txBox="1">
+            <a:spLocks noGrp="1"/>
+          </p:cNvSpPr>
           <p:nvPr>
-            <p:ph idx="1" type="body"/>
+            <p:ph type="body" idx="1"/>
           </p:nvPr>
         </p:nvSpPr>
         <p:spPr>
@@ -4650,11 +4785,11 @@
           </a:prstGeom>
         </p:spPr>
         <p:txBody>
-          <a:bodyPr anchorCtr="0" anchor="ctr" bIns="91425" lIns="91425" spcFirstLastPara="1" rIns="91425" wrap="square" tIns="91425">
+          <a:bodyPr spcFirstLastPara="1" wrap="square" lIns="91425" tIns="91425" rIns="91425" bIns="91425" anchor="ctr" anchorCtr="0">
             <a:noAutofit/>
           </a:bodyPr>
           <a:lstStyle>
-            <a:lvl1pPr indent="-228600" lvl="0" marL="457200">
+            <a:lvl1pPr marL="457200" lvl="0" indent="-228600">
               <a:lnSpc>
                 <a:spcPct val="100000"/>
               </a:lnSpc>
@@ -4669,15 +4804,19 @@
               <a:defRPr/>
             </a:lvl1pPr>
           </a:lstStyle>
-          <a:p/>
+          <a:p>
+            <a:endParaRPr/>
+          </a:p>
         </p:txBody>
       </p:sp>
       <p:sp>
         <p:nvSpPr>
           <p:cNvPr id="43" name="Google Shape;43;p10"/>
-          <p:cNvSpPr txBox="1"/>
+          <p:cNvSpPr txBox="1">
+            <a:spLocks noGrp="1"/>
+          </p:cNvSpPr>
           <p:nvPr>
-            <p:ph idx="12" type="sldNum"/>
+            <p:ph type="sldNum" idx="12"/>
           </p:nvPr>
         </p:nvSpPr>
         <p:spPr>
@@ -4690,7 +4829,7 @@
           </a:prstGeom>
         </p:spPr>
         <p:txBody>
-          <a:bodyPr anchorCtr="0" anchor="ctr" bIns="91425" lIns="91425" spcFirstLastPara="1" rIns="91425" wrap="square" tIns="91425">
+          <a:bodyPr spcFirstLastPara="1" wrap="square" lIns="91425" tIns="91425" rIns="91425" bIns="91425" anchor="ctr" anchorCtr="0">
             <a:noAutofit/>
           </a:bodyPr>
           <a:lstStyle>
@@ -4732,7 +4871,7 @@
             </a:lvl9pPr>
           </a:lstStyle>
           <a:p>
-            <a:pPr indent="0" lvl="0" marL="0" rtl="0" algn="r">
+            <a:pPr marL="0" lvl="0" indent="0" algn="r" rtl="0">
               <a:spcBef>
                 <a:spcPts val="0"/>
               </a:spcBef>
@@ -4758,18 +4897,19 @@
 </file>
 
 <file path=ppt/slideMasters/slideMaster1.xml><?xml version="1.0" encoding="utf-8"?>
-<p:sldMaster xmlns:a="http://schemas.openxmlformats.org/drawingml/2006/main" xmlns:r="http://schemas.openxmlformats.org/officeDocument/2006/relationships" xmlns:mc="http://schemas.openxmlformats.org/markup-compatibility/2006" xmlns:mv="urn:schemas-microsoft-com:mac:vml" xmlns:p="http://schemas.openxmlformats.org/presentationml/2006/main" xmlns:c="http://schemas.openxmlformats.org/drawingml/2006/chart" xmlns:dgm="http://schemas.openxmlformats.org/drawingml/2006/diagram" xmlns:o="urn:schemas-microsoft-com:office:office" xmlns:v="urn:schemas-microsoft-com:vml" xmlns:pvml="urn:schemas-microsoft-com:office:powerpoint" xmlns:com="http://schemas.openxmlformats.org/drawingml/2006/compatibility" xmlns:p14="http://schemas.microsoft.com/office/powerpoint/2010/main" xmlns:p15="http://schemas.microsoft.com/office/powerpoint/2012/main" xmlns:ahyp="http://schemas.microsoft.com/office/drawing/2018/hyperlinkcolor">
+<p:sldMaster xmlns:a="http://schemas.openxmlformats.org/drawingml/2006/main" xmlns:r="http://schemas.openxmlformats.org/officeDocument/2006/relationships" xmlns:p="http://schemas.openxmlformats.org/presentationml/2006/main">
   <p:cSld name="simple-light-2">
     <p:bg>
       <p:bgPr>
         <a:solidFill>
           <a:schemeClr val="lt1"/>
         </a:solidFill>
+        <a:effectLst/>
       </p:bgPr>
     </p:bg>
     <p:spTree>
       <p:nvGrpSpPr>
-        <p:cNvPr id="5" name="Shape 5"/>
+        <p:cNvPr id="1" name="Shape 5"/>
         <p:cNvGrpSpPr/>
         <p:nvPr/>
       </p:nvGrpSpPr>
@@ -4784,7 +4924,9 @@
       <p:sp>
         <p:nvSpPr>
           <p:cNvPr id="6" name="Google Shape;6;p1"/>
-          <p:cNvSpPr txBox="1"/>
+          <p:cNvSpPr txBox="1">
+            <a:spLocks noGrp="1"/>
+          </p:cNvSpPr>
           <p:nvPr>
             <p:ph type="title"/>
           </p:nvPr>
@@ -4803,7 +4945,7 @@
           </a:ln>
         </p:spPr>
         <p:txBody>
-          <a:bodyPr anchorCtr="0" anchor="t" bIns="91425" lIns="91425" spcFirstLastPara="1" rIns="91425" wrap="square" tIns="91425">
+          <a:bodyPr spcFirstLastPara="1" wrap="square" lIns="91425" tIns="91425" rIns="91425" bIns="91425" anchor="t" anchorCtr="0">
             <a:noAutofit/>
           </a:bodyPr>
           <a:lstStyle>
@@ -4970,15 +5112,19 @@
               </a:defRPr>
             </a:lvl9pPr>
           </a:lstStyle>
-          <a:p/>
+          <a:p>
+            <a:endParaRPr/>
+          </a:p>
         </p:txBody>
       </p:sp>
       <p:sp>
         <p:nvSpPr>
           <p:cNvPr id="7" name="Google Shape;7;p1"/>
-          <p:cNvSpPr txBox="1"/>
+          <p:cNvSpPr txBox="1">
+            <a:spLocks noGrp="1"/>
+          </p:cNvSpPr>
           <p:nvPr>
-            <p:ph idx="1" type="body"/>
+            <p:ph type="body" idx="1"/>
           </p:nvPr>
         </p:nvSpPr>
         <p:spPr>
@@ -4995,11 +5141,11 @@
           </a:ln>
         </p:spPr>
         <p:txBody>
-          <a:bodyPr anchorCtr="0" anchor="t" bIns="91425" lIns="91425" spcFirstLastPara="1" rIns="91425" wrap="square" tIns="91425">
+          <a:bodyPr spcFirstLastPara="1" wrap="square" lIns="91425" tIns="91425" rIns="91425" bIns="91425" anchor="t" anchorCtr="0">
             <a:noAutofit/>
           </a:bodyPr>
           <a:lstStyle>
-            <a:lvl1pPr indent="-342900" lvl="0" marL="457200">
+            <a:lvl1pPr marL="457200" lvl="0" indent="-342900">
               <a:lnSpc>
                 <a:spcPct val="115000"/>
               </a:lnSpc>
@@ -5020,7 +5166,7 @@
                 </a:solidFill>
               </a:defRPr>
             </a:lvl1pPr>
-            <a:lvl2pPr indent="-317500" lvl="1" marL="914400">
+            <a:lvl2pPr marL="914400" lvl="1" indent="-317500">
               <a:lnSpc>
                 <a:spcPct val="115000"/>
               </a:lnSpc>
@@ -5041,7 +5187,7 @@
                 </a:solidFill>
               </a:defRPr>
             </a:lvl2pPr>
-            <a:lvl3pPr indent="-317500" lvl="2" marL="1371600">
+            <a:lvl3pPr marL="1371600" lvl="2" indent="-317500">
               <a:lnSpc>
                 <a:spcPct val="115000"/>
               </a:lnSpc>
@@ -5062,7 +5208,7 @@
                 </a:solidFill>
               </a:defRPr>
             </a:lvl3pPr>
-            <a:lvl4pPr indent="-317500" lvl="3" marL="1828800">
+            <a:lvl4pPr marL="1828800" lvl="3" indent="-317500">
               <a:lnSpc>
                 <a:spcPct val="115000"/>
               </a:lnSpc>
@@ -5083,7 +5229,7 @@
                 </a:solidFill>
               </a:defRPr>
             </a:lvl4pPr>
-            <a:lvl5pPr indent="-317500" lvl="4" marL="2286000">
+            <a:lvl5pPr marL="2286000" lvl="4" indent="-317500">
               <a:lnSpc>
                 <a:spcPct val="115000"/>
               </a:lnSpc>
@@ -5104,7 +5250,7 @@
                 </a:solidFill>
               </a:defRPr>
             </a:lvl5pPr>
-            <a:lvl6pPr indent="-317500" lvl="5" marL="2743200">
+            <a:lvl6pPr marL="2743200" lvl="5" indent="-317500">
               <a:lnSpc>
                 <a:spcPct val="115000"/>
               </a:lnSpc>
@@ -5125,7 +5271,7 @@
                 </a:solidFill>
               </a:defRPr>
             </a:lvl6pPr>
-            <a:lvl7pPr indent="-317500" lvl="6" marL="3200400">
+            <a:lvl7pPr marL="3200400" lvl="6" indent="-317500">
               <a:lnSpc>
                 <a:spcPct val="115000"/>
               </a:lnSpc>
@@ -5146,7 +5292,7 @@
                 </a:solidFill>
               </a:defRPr>
             </a:lvl7pPr>
-            <a:lvl8pPr indent="-317500" lvl="7" marL="3657600">
+            <a:lvl8pPr marL="3657600" lvl="7" indent="-317500">
               <a:lnSpc>
                 <a:spcPct val="115000"/>
               </a:lnSpc>
@@ -5167,7 +5313,7 @@
                 </a:solidFill>
               </a:defRPr>
             </a:lvl8pPr>
-            <a:lvl9pPr indent="-317500" lvl="8" marL="4114800">
+            <a:lvl9pPr marL="4114800" lvl="8" indent="-317500">
               <a:lnSpc>
                 <a:spcPct val="115000"/>
               </a:lnSpc>
@@ -5189,15 +5335,19 @@
               </a:defRPr>
             </a:lvl9pPr>
           </a:lstStyle>
-          <a:p/>
+          <a:p>
+            <a:endParaRPr/>
+          </a:p>
         </p:txBody>
       </p:sp>
       <p:sp>
         <p:nvSpPr>
           <p:cNvPr id="8" name="Google Shape;8;p1"/>
-          <p:cNvSpPr txBox="1"/>
+          <p:cNvSpPr txBox="1">
+            <a:spLocks noGrp="1"/>
+          </p:cNvSpPr>
           <p:nvPr>
-            <p:ph idx="12" type="sldNum"/>
+            <p:ph type="sldNum" idx="12"/>
           </p:nvPr>
         </p:nvSpPr>
         <p:spPr>
@@ -5214,7 +5364,7 @@
           </a:ln>
         </p:spPr>
         <p:txBody>
-          <a:bodyPr anchorCtr="0" anchor="ctr" bIns="91425" lIns="91425" spcFirstLastPara="1" rIns="91425" wrap="square" tIns="91425">
+          <a:bodyPr spcFirstLastPara="1" wrap="square" lIns="91425" tIns="91425" rIns="91425" bIns="91425" anchor="ctr" anchorCtr="0">
             <a:noAutofit/>
           </a:bodyPr>
           <a:lstStyle>
@@ -5292,7 +5442,7 @@
             </a:lvl9pPr>
           </a:lstStyle>
           <a:p>
-            <a:pPr indent="0" lvl="0" marL="0" rtl="0" algn="r">
+            <a:pPr marL="0" lvl="0" indent="0" algn="r" rtl="0">
               <a:spcBef>
                 <a:spcPts val="0"/>
               </a:spcBef>
@@ -5311,7 +5461,7 @@
       </p:sp>
     </p:spTree>
   </p:cSld>
-  <p:clrMap accent1="accent1" accent2="accent2" accent3="accent3" accent4="accent4" accent5="accent5" accent6="accent6" bg1="lt1" bg2="dk2" tx1="dk1" tx2="lt2" folHlink="folHlink" hlink="hlink"/>
+  <p:clrMap bg1="lt1" tx1="dk1" bg2="dk2" tx2="lt2" accent1="accent1" accent2="accent2" accent3="accent3" accent4="accent4" accent5="accent5" accent6="accent6" hlink="hlink" folHlink="folHlink"/>
   <p:sldLayoutIdLst>
     <p:sldLayoutId id="2147483648" r:id="rId1"/>
     <p:sldLayoutId id="2147483649" r:id="rId2"/>
@@ -5325,10 +5475,10 @@
     <p:sldLayoutId id="2147483657" r:id="rId10"/>
     <p:sldLayoutId id="2147483658" r:id="rId11"/>
   </p:sldLayoutIdLst>
-  <p:hf dt="0" ftr="0" hdr="0" sldNum="0"/>
+  <p:hf sldNum="0" hdr="0" ftr="0" dt="0"/>
   <p:txStyles>
     <p:titleStyle>
-      <a:defPPr lvl="0" marR="0" rtl="0" algn="l">
+      <a:defPPr marR="0" lvl="0" algn="l" rtl="0">
         <a:lnSpc>
           <a:spcPct val="100000"/>
         </a:lnSpc>
@@ -5339,7 +5489,7 @@
           <a:spcPts val="0"/>
         </a:spcAft>
       </a:defPPr>
-      <a:lvl1pPr lvl="0" marR="0" rtl="0" algn="l">
+      <a:lvl1pPr marR="0" lvl="0" algn="l" rtl="0">
         <a:lnSpc>
           <a:spcPct val="100000"/>
         </a:lnSpc>
@@ -5353,7 +5503,7 @@
           <a:srgbClr val="000000"/>
         </a:buClr>
         <a:buFont typeface="Arial"/>
-        <a:defRPr b="0" i="0" sz="1400" u="none" cap="none" strike="noStrike">
+        <a:defRPr sz="1400" b="0" i="0" u="none" strike="noStrike" cap="none">
           <a:solidFill>
             <a:srgbClr val="000000"/>
           </a:solidFill>
@@ -5363,7 +5513,7 @@
           <a:sym typeface="Arial"/>
         </a:defRPr>
       </a:lvl1pPr>
-      <a:lvl2pPr lvl="1" marR="0" rtl="0" algn="l">
+      <a:lvl2pPr marR="0" lvl="1" algn="l" rtl="0">
         <a:lnSpc>
           <a:spcPct val="100000"/>
         </a:lnSpc>
@@ -5377,7 +5527,7 @@
           <a:srgbClr val="000000"/>
         </a:buClr>
         <a:buFont typeface="Arial"/>
-        <a:defRPr b="0" i="0" sz="1400" u="none" cap="none" strike="noStrike">
+        <a:defRPr sz="1400" b="0" i="0" u="none" strike="noStrike" cap="none">
           <a:solidFill>
             <a:srgbClr val="000000"/>
           </a:solidFill>
@@ -5387,7 +5537,7 @@
           <a:sym typeface="Arial"/>
         </a:defRPr>
       </a:lvl2pPr>
-      <a:lvl3pPr lvl="2" marR="0" rtl="0" algn="l">
+      <a:lvl3pPr marR="0" lvl="2" algn="l" rtl="0">
         <a:lnSpc>
           <a:spcPct val="100000"/>
         </a:lnSpc>
@@ -5401,7 +5551,7 @@
           <a:srgbClr val="000000"/>
         </a:buClr>
         <a:buFont typeface="Arial"/>
-        <a:defRPr b="0" i="0" sz="1400" u="none" cap="none" strike="noStrike">
+        <a:defRPr sz="1400" b="0" i="0" u="none" strike="noStrike" cap="none">
           <a:solidFill>
             <a:srgbClr val="000000"/>
           </a:solidFill>
@@ -5411,7 +5561,7 @@
           <a:sym typeface="Arial"/>
         </a:defRPr>
       </a:lvl3pPr>
-      <a:lvl4pPr lvl="3" marR="0" rtl="0" algn="l">
+      <a:lvl4pPr marR="0" lvl="3" algn="l" rtl="0">
         <a:lnSpc>
           <a:spcPct val="100000"/>
         </a:lnSpc>
@@ -5425,7 +5575,7 @@
           <a:srgbClr val="000000"/>
         </a:buClr>
         <a:buFont typeface="Arial"/>
-        <a:defRPr b="0" i="0" sz="1400" u="none" cap="none" strike="noStrike">
+        <a:defRPr sz="1400" b="0" i="0" u="none" strike="noStrike" cap="none">
           <a:solidFill>
             <a:srgbClr val="000000"/>
           </a:solidFill>
@@ -5435,7 +5585,7 @@
           <a:sym typeface="Arial"/>
         </a:defRPr>
       </a:lvl4pPr>
-      <a:lvl5pPr lvl="4" marR="0" rtl="0" algn="l">
+      <a:lvl5pPr marR="0" lvl="4" algn="l" rtl="0">
         <a:lnSpc>
           <a:spcPct val="100000"/>
         </a:lnSpc>
@@ -5449,7 +5599,7 @@
           <a:srgbClr val="000000"/>
         </a:buClr>
         <a:buFont typeface="Arial"/>
-        <a:defRPr b="0" i="0" sz="1400" u="none" cap="none" strike="noStrike">
+        <a:defRPr sz="1400" b="0" i="0" u="none" strike="noStrike" cap="none">
           <a:solidFill>
             <a:srgbClr val="000000"/>
           </a:solidFill>
@@ -5459,7 +5609,7 @@
           <a:sym typeface="Arial"/>
         </a:defRPr>
       </a:lvl5pPr>
-      <a:lvl6pPr lvl="5" marR="0" rtl="0" algn="l">
+      <a:lvl6pPr marR="0" lvl="5" algn="l" rtl="0">
         <a:lnSpc>
           <a:spcPct val="100000"/>
         </a:lnSpc>
@@ -5473,7 +5623,7 @@
           <a:srgbClr val="000000"/>
         </a:buClr>
         <a:buFont typeface="Arial"/>
-        <a:defRPr b="0" i="0" sz="1400" u="none" cap="none" strike="noStrike">
+        <a:defRPr sz="1400" b="0" i="0" u="none" strike="noStrike" cap="none">
           <a:solidFill>
             <a:srgbClr val="000000"/>
           </a:solidFill>
@@ -5483,7 +5633,7 @@
           <a:sym typeface="Arial"/>
         </a:defRPr>
       </a:lvl6pPr>
-      <a:lvl7pPr lvl="6" marR="0" rtl="0" algn="l">
+      <a:lvl7pPr marR="0" lvl="6" algn="l" rtl="0">
         <a:lnSpc>
           <a:spcPct val="100000"/>
         </a:lnSpc>
@@ -5497,7 +5647,7 @@
           <a:srgbClr val="000000"/>
         </a:buClr>
         <a:buFont typeface="Arial"/>
-        <a:defRPr b="0" i="0" sz="1400" u="none" cap="none" strike="noStrike">
+        <a:defRPr sz="1400" b="0" i="0" u="none" strike="noStrike" cap="none">
           <a:solidFill>
             <a:srgbClr val="000000"/>
           </a:solidFill>
@@ -5507,7 +5657,7 @@
           <a:sym typeface="Arial"/>
         </a:defRPr>
       </a:lvl7pPr>
-      <a:lvl8pPr lvl="7" marR="0" rtl="0" algn="l">
+      <a:lvl8pPr marR="0" lvl="7" algn="l" rtl="0">
         <a:lnSpc>
           <a:spcPct val="100000"/>
         </a:lnSpc>
@@ -5521,7 +5671,7 @@
           <a:srgbClr val="000000"/>
         </a:buClr>
         <a:buFont typeface="Arial"/>
-        <a:defRPr b="0" i="0" sz="1400" u="none" cap="none" strike="noStrike">
+        <a:defRPr sz="1400" b="0" i="0" u="none" strike="noStrike" cap="none">
           <a:solidFill>
             <a:srgbClr val="000000"/>
           </a:solidFill>
@@ -5531,7 +5681,7 @@
           <a:sym typeface="Arial"/>
         </a:defRPr>
       </a:lvl8pPr>
-      <a:lvl9pPr lvl="8" marR="0" rtl="0" algn="l">
+      <a:lvl9pPr marR="0" lvl="8" algn="l" rtl="0">
         <a:lnSpc>
           <a:spcPct val="100000"/>
         </a:lnSpc>
@@ -5545,7 +5695,7 @@
           <a:srgbClr val="000000"/>
         </a:buClr>
         <a:buFont typeface="Arial"/>
-        <a:defRPr b="0" i="0" sz="1400" u="none" cap="none" strike="noStrike">
+        <a:defRPr sz="1400" b="0" i="0" u="none" strike="noStrike" cap="none">
           <a:solidFill>
             <a:srgbClr val="000000"/>
           </a:solidFill>
@@ -5557,7 +5707,7 @@
       </a:lvl9pPr>
     </p:titleStyle>
     <p:bodyStyle>
-      <a:defPPr lvl="0" marR="0" rtl="0" algn="l">
+      <a:defPPr marR="0" lvl="0" algn="l" rtl="0">
         <a:lnSpc>
           <a:spcPct val="100000"/>
         </a:lnSpc>
@@ -5568,7 +5718,7 @@
           <a:spcPts val="0"/>
         </a:spcAft>
       </a:defPPr>
-      <a:lvl1pPr lvl="0" marR="0" rtl="0" algn="l">
+      <a:lvl1pPr marR="0" lvl="0" algn="l" rtl="0">
         <a:lnSpc>
           <a:spcPct val="100000"/>
         </a:lnSpc>
@@ -5582,7 +5732,7 @@
           <a:srgbClr val="000000"/>
         </a:buClr>
         <a:buFont typeface="Arial"/>
-        <a:defRPr b="0" i="0" sz="1400" u="none" cap="none" strike="noStrike">
+        <a:defRPr sz="1400" b="0" i="0" u="none" strike="noStrike" cap="none">
           <a:solidFill>
             <a:srgbClr val="000000"/>
           </a:solidFill>
@@ -5592,7 +5742,7 @@
           <a:sym typeface="Arial"/>
         </a:defRPr>
       </a:lvl1pPr>
-      <a:lvl2pPr lvl="1" marR="0" rtl="0" algn="l">
+      <a:lvl2pPr marR="0" lvl="1" algn="l" rtl="0">
         <a:lnSpc>
           <a:spcPct val="100000"/>
         </a:lnSpc>
@@ -5606,7 +5756,7 @@
           <a:srgbClr val="000000"/>
         </a:buClr>
         <a:buFont typeface="Arial"/>
-        <a:defRPr b="0" i="0" sz="1400" u="none" cap="none" strike="noStrike">
+        <a:defRPr sz="1400" b="0" i="0" u="none" strike="noStrike" cap="none">
           <a:solidFill>
             <a:srgbClr val="000000"/>
           </a:solidFill>
@@ -5616,7 +5766,7 @@
           <a:sym typeface="Arial"/>
         </a:defRPr>
       </a:lvl2pPr>
-      <a:lvl3pPr lvl="2" marR="0" rtl="0" algn="l">
+      <a:lvl3pPr marR="0" lvl="2" algn="l" rtl="0">
         <a:lnSpc>
           <a:spcPct val="100000"/>
         </a:lnSpc>
@@ -5630,7 +5780,7 @@
           <a:srgbClr val="000000"/>
         </a:buClr>
         <a:buFont typeface="Arial"/>
-        <a:defRPr b="0" i="0" sz="1400" u="none" cap="none" strike="noStrike">
+        <a:defRPr sz="1400" b="0" i="0" u="none" strike="noStrike" cap="none">
           <a:solidFill>
             <a:srgbClr val="000000"/>
           </a:solidFill>
@@ -5640,7 +5790,7 @@
           <a:sym typeface="Arial"/>
         </a:defRPr>
       </a:lvl3pPr>
-      <a:lvl4pPr lvl="3" marR="0" rtl="0" algn="l">
+      <a:lvl4pPr marR="0" lvl="3" algn="l" rtl="0">
         <a:lnSpc>
           <a:spcPct val="100000"/>
         </a:lnSpc>
@@ -5654,7 +5804,7 @@
           <a:srgbClr val="000000"/>
         </a:buClr>
         <a:buFont typeface="Arial"/>
-        <a:defRPr b="0" i="0" sz="1400" u="none" cap="none" strike="noStrike">
+        <a:defRPr sz="1400" b="0" i="0" u="none" strike="noStrike" cap="none">
           <a:solidFill>
             <a:srgbClr val="000000"/>
           </a:solidFill>
@@ -5664,7 +5814,7 @@
           <a:sym typeface="Arial"/>
         </a:defRPr>
       </a:lvl4pPr>
-      <a:lvl5pPr lvl="4" marR="0" rtl="0" algn="l">
+      <a:lvl5pPr marR="0" lvl="4" algn="l" rtl="0">
         <a:lnSpc>
           <a:spcPct val="100000"/>
         </a:lnSpc>
@@ -5678,7 +5828,7 @@
           <a:srgbClr val="000000"/>
         </a:buClr>
         <a:buFont typeface="Arial"/>
-        <a:defRPr b="0" i="0" sz="1400" u="none" cap="none" strike="noStrike">
+        <a:defRPr sz="1400" b="0" i="0" u="none" strike="noStrike" cap="none">
           <a:solidFill>
             <a:srgbClr val="000000"/>
           </a:solidFill>
@@ -5688,7 +5838,7 @@
           <a:sym typeface="Arial"/>
         </a:defRPr>
       </a:lvl5pPr>
-      <a:lvl6pPr lvl="5" marR="0" rtl="0" algn="l">
+      <a:lvl6pPr marR="0" lvl="5" algn="l" rtl="0">
         <a:lnSpc>
           <a:spcPct val="100000"/>
         </a:lnSpc>
@@ -5702,7 +5852,7 @@
           <a:srgbClr val="000000"/>
         </a:buClr>
         <a:buFont typeface="Arial"/>
-        <a:defRPr b="0" i="0" sz="1400" u="none" cap="none" strike="noStrike">
+        <a:defRPr sz="1400" b="0" i="0" u="none" strike="noStrike" cap="none">
           <a:solidFill>
             <a:srgbClr val="000000"/>
           </a:solidFill>
@@ -5712,7 +5862,7 @@
           <a:sym typeface="Arial"/>
         </a:defRPr>
       </a:lvl6pPr>
-      <a:lvl7pPr lvl="6" marR="0" rtl="0" algn="l">
+      <a:lvl7pPr marR="0" lvl="6" algn="l" rtl="0">
         <a:lnSpc>
           <a:spcPct val="100000"/>
         </a:lnSpc>
@@ -5726,7 +5876,7 @@
           <a:srgbClr val="000000"/>
         </a:buClr>
         <a:buFont typeface="Arial"/>
-        <a:defRPr b="0" i="0" sz="1400" u="none" cap="none" strike="noStrike">
+        <a:defRPr sz="1400" b="0" i="0" u="none" strike="noStrike" cap="none">
           <a:solidFill>
             <a:srgbClr val="000000"/>
           </a:solidFill>
@@ -5736,7 +5886,7 @@
           <a:sym typeface="Arial"/>
         </a:defRPr>
       </a:lvl7pPr>
-      <a:lvl8pPr lvl="7" marR="0" rtl="0" algn="l">
+      <a:lvl8pPr marR="0" lvl="7" algn="l" rtl="0">
         <a:lnSpc>
           <a:spcPct val="100000"/>
         </a:lnSpc>
@@ -5750,7 +5900,7 @@
           <a:srgbClr val="000000"/>
         </a:buClr>
         <a:buFont typeface="Arial"/>
-        <a:defRPr b="0" i="0" sz="1400" u="none" cap="none" strike="noStrike">
+        <a:defRPr sz="1400" b="0" i="0" u="none" strike="noStrike" cap="none">
           <a:solidFill>
             <a:srgbClr val="000000"/>
           </a:solidFill>
@@ -5760,7 +5910,7 @@
           <a:sym typeface="Arial"/>
         </a:defRPr>
       </a:lvl8pPr>
-      <a:lvl9pPr lvl="8" marR="0" rtl="0" algn="l">
+      <a:lvl9pPr marR="0" lvl="8" algn="l" rtl="0">
         <a:lnSpc>
           <a:spcPct val="100000"/>
         </a:lnSpc>
@@ -5774,7 +5924,7 @@
           <a:srgbClr val="000000"/>
         </a:buClr>
         <a:buFont typeface="Arial"/>
-        <a:defRPr b="0" i="0" sz="1400" u="none" cap="none" strike="noStrike">
+        <a:defRPr sz="1400" b="0" i="0" u="none" strike="noStrike" cap="none">
           <a:solidFill>
             <a:srgbClr val="000000"/>
           </a:solidFill>
@@ -5786,7 +5936,7 @@
       </a:lvl9pPr>
     </p:bodyStyle>
     <p:otherStyle>
-      <a:defPPr lvl="0" marR="0" rtl="0" algn="l">
+      <a:defPPr marR="0" lvl="0" algn="l" rtl="0">
         <a:lnSpc>
           <a:spcPct val="100000"/>
         </a:lnSpc>
@@ -5797,7 +5947,7 @@
           <a:spcPts val="0"/>
         </a:spcAft>
       </a:defPPr>
-      <a:lvl1pPr lvl="0" marR="0" rtl="0" algn="l">
+      <a:lvl1pPr marR="0" lvl="0" algn="l" rtl="0">
         <a:lnSpc>
           <a:spcPct val="100000"/>
         </a:lnSpc>
@@ -5811,7 +5961,7 @@
           <a:srgbClr val="000000"/>
         </a:buClr>
         <a:buFont typeface="Arial"/>
-        <a:defRPr b="0" i="0" sz="1400" u="none" cap="none" strike="noStrike">
+        <a:defRPr sz="1400" b="0" i="0" u="none" strike="noStrike" cap="none">
           <a:solidFill>
             <a:srgbClr val="000000"/>
           </a:solidFill>
@@ -5821,7 +5971,7 @@
           <a:sym typeface="Arial"/>
         </a:defRPr>
       </a:lvl1pPr>
-      <a:lvl2pPr lvl="1" marR="0" rtl="0" algn="l">
+      <a:lvl2pPr marR="0" lvl="1" algn="l" rtl="0">
         <a:lnSpc>
           <a:spcPct val="100000"/>
         </a:lnSpc>
@@ -5835,7 +5985,7 @@
           <a:srgbClr val="000000"/>
         </a:buClr>
         <a:buFont typeface="Arial"/>
-        <a:defRPr b="0" i="0" sz="1400" u="none" cap="none" strike="noStrike">
+        <a:defRPr sz="1400" b="0" i="0" u="none" strike="noStrike" cap="none">
           <a:solidFill>
             <a:srgbClr val="000000"/>
           </a:solidFill>
@@ -5845,7 +5995,7 @@
           <a:sym typeface="Arial"/>
         </a:defRPr>
       </a:lvl2pPr>
-      <a:lvl3pPr lvl="2" marR="0" rtl="0" algn="l">
+      <a:lvl3pPr marR="0" lvl="2" algn="l" rtl="0">
         <a:lnSpc>
           <a:spcPct val="100000"/>
         </a:lnSpc>
@@ -5859,7 +6009,7 @@
           <a:srgbClr val="000000"/>
         </a:buClr>
         <a:buFont typeface="Arial"/>
-        <a:defRPr b="0" i="0" sz="1400" u="none" cap="none" strike="noStrike">
+        <a:defRPr sz="1400" b="0" i="0" u="none" strike="noStrike" cap="none">
           <a:solidFill>
             <a:srgbClr val="000000"/>
           </a:solidFill>
@@ -5869,7 +6019,7 @@
           <a:sym typeface="Arial"/>
         </a:defRPr>
       </a:lvl3pPr>
-      <a:lvl4pPr lvl="3" marR="0" rtl="0" algn="l">
+      <a:lvl4pPr marR="0" lvl="3" algn="l" rtl="0">
         <a:lnSpc>
           <a:spcPct val="100000"/>
         </a:lnSpc>
@@ -5883,7 +6033,7 @@
           <a:srgbClr val="000000"/>
         </a:buClr>
         <a:buFont typeface="Arial"/>
-        <a:defRPr b="0" i="0" sz="1400" u="none" cap="none" strike="noStrike">
+        <a:defRPr sz="1400" b="0" i="0" u="none" strike="noStrike" cap="none">
           <a:solidFill>
             <a:srgbClr val="000000"/>
           </a:solidFill>
@@ -5893,7 +6043,7 @@
           <a:sym typeface="Arial"/>
         </a:defRPr>
       </a:lvl4pPr>
-      <a:lvl5pPr lvl="4" marR="0" rtl="0" algn="l">
+      <a:lvl5pPr marR="0" lvl="4" algn="l" rtl="0">
         <a:lnSpc>
           <a:spcPct val="100000"/>
         </a:lnSpc>
@@ -5907,7 +6057,7 @@
           <a:srgbClr val="000000"/>
         </a:buClr>
         <a:buFont typeface="Arial"/>
-        <a:defRPr b="0" i="0" sz="1400" u="none" cap="none" strike="noStrike">
+        <a:defRPr sz="1400" b="0" i="0" u="none" strike="noStrike" cap="none">
           <a:solidFill>
             <a:srgbClr val="000000"/>
           </a:solidFill>
@@ -5917,7 +6067,7 @@
           <a:sym typeface="Arial"/>
         </a:defRPr>
       </a:lvl5pPr>
-      <a:lvl6pPr lvl="5" marR="0" rtl="0" algn="l">
+      <a:lvl6pPr marR="0" lvl="5" algn="l" rtl="0">
         <a:lnSpc>
           <a:spcPct val="100000"/>
         </a:lnSpc>
@@ -5931,7 +6081,7 @@
           <a:srgbClr val="000000"/>
         </a:buClr>
         <a:buFont typeface="Arial"/>
-        <a:defRPr b="0" i="0" sz="1400" u="none" cap="none" strike="noStrike">
+        <a:defRPr sz="1400" b="0" i="0" u="none" strike="noStrike" cap="none">
           <a:solidFill>
             <a:srgbClr val="000000"/>
           </a:solidFill>
@@ -5941,7 +6091,7 @@
           <a:sym typeface="Arial"/>
         </a:defRPr>
       </a:lvl6pPr>
-      <a:lvl7pPr lvl="6" marR="0" rtl="0" algn="l">
+      <a:lvl7pPr marR="0" lvl="6" algn="l" rtl="0">
         <a:lnSpc>
           <a:spcPct val="100000"/>
         </a:lnSpc>
@@ -5955,7 +6105,7 @@
           <a:srgbClr val="000000"/>
         </a:buClr>
         <a:buFont typeface="Arial"/>
-        <a:defRPr b="0" i="0" sz="1400" u="none" cap="none" strike="noStrike">
+        <a:defRPr sz="1400" b="0" i="0" u="none" strike="noStrike" cap="none">
           <a:solidFill>
             <a:srgbClr val="000000"/>
           </a:solidFill>
@@ -5965,7 +6115,7 @@
           <a:sym typeface="Arial"/>
         </a:defRPr>
       </a:lvl7pPr>
-      <a:lvl8pPr lvl="7" marR="0" rtl="0" algn="l">
+      <a:lvl8pPr marR="0" lvl="7" algn="l" rtl="0">
         <a:lnSpc>
           <a:spcPct val="100000"/>
         </a:lnSpc>
@@ -5979,7 +6129,7 @@
           <a:srgbClr val="000000"/>
         </a:buClr>
         <a:buFont typeface="Arial"/>
-        <a:defRPr b="0" i="0" sz="1400" u="none" cap="none" strike="noStrike">
+        <a:defRPr sz="1400" b="0" i="0" u="none" strike="noStrike" cap="none">
           <a:solidFill>
             <a:srgbClr val="000000"/>
           </a:solidFill>
@@ -5989,7 +6139,7 @@
           <a:sym typeface="Arial"/>
         </a:defRPr>
       </a:lvl8pPr>
-      <a:lvl9pPr lvl="8" marR="0" rtl="0" algn="l">
+      <a:lvl9pPr marR="0" lvl="8" algn="l" rtl="0">
         <a:lnSpc>
           <a:spcPct val="100000"/>
         </a:lnSpc>
@@ -6003,7 +6153,7 @@
           <a:srgbClr val="000000"/>
         </a:buClr>
         <a:buFont typeface="Arial"/>
-        <a:defRPr b="0" i="0" sz="1400" u="none" cap="none" strike="noStrike">
+        <a:defRPr sz="1400" b="0" i="0" u="none" strike="noStrike" cap="none">
           <a:solidFill>
             <a:srgbClr val="000000"/>
           </a:solidFill>
@@ -6019,11 +6169,11 @@
 </file>
 
 <file path=ppt/slides/slide1.xml><?xml version="1.0" encoding="utf-8"?>
-<p:sld xmlns:a="http://schemas.openxmlformats.org/drawingml/2006/main" xmlns:r="http://schemas.openxmlformats.org/officeDocument/2006/relationships" xmlns:mc="http://schemas.openxmlformats.org/markup-compatibility/2006" xmlns:mv="urn:schemas-microsoft-com:mac:vml" xmlns:p="http://schemas.openxmlformats.org/presentationml/2006/main" xmlns:c="http://schemas.openxmlformats.org/drawingml/2006/chart" xmlns:dgm="http://schemas.openxmlformats.org/drawingml/2006/diagram" xmlns:o="urn:schemas-microsoft-com:office:office" xmlns:v="urn:schemas-microsoft-com:vml" xmlns:pvml="urn:schemas-microsoft-com:office:powerpoint" xmlns:com="http://schemas.openxmlformats.org/drawingml/2006/compatibility" xmlns:p14="http://schemas.microsoft.com/office/powerpoint/2010/main" xmlns:p15="http://schemas.microsoft.com/office/powerpoint/2012/main" xmlns:ahyp="http://schemas.microsoft.com/office/drawing/2018/hyperlinkcolor">
+<p:sld xmlns:a="http://schemas.openxmlformats.org/drawingml/2006/main" xmlns:r="http://schemas.openxmlformats.org/officeDocument/2006/relationships" xmlns:p="http://schemas.openxmlformats.org/presentationml/2006/main">
   <p:cSld>
     <p:spTree>
       <p:nvGrpSpPr>
-        <p:cNvPr id="53" name="Shape 53"/>
+        <p:cNvPr id="1" name="Shape 53"/>
         <p:cNvGrpSpPr/>
         <p:nvPr/>
       </p:nvGrpSpPr>
@@ -6038,7 +6188,9 @@
       <p:sp>
         <p:nvSpPr>
           <p:cNvPr id="54" name="Google Shape;54;p13"/>
-          <p:cNvSpPr txBox="1"/>
+          <p:cNvSpPr txBox="1">
+            <a:spLocks noGrp="1"/>
+          </p:cNvSpPr>
           <p:nvPr>
             <p:ph type="ctrTitle"/>
           </p:nvPr>
@@ -6053,12 +6205,12 @@
           </a:prstGeom>
         </p:spPr>
         <p:txBody>
-          <a:bodyPr anchorCtr="0" anchor="b" bIns="91425" lIns="91425" spcFirstLastPara="1" rIns="91425" wrap="square" tIns="91425">
+          <a:bodyPr spcFirstLastPara="1" wrap="square" lIns="91425" tIns="91425" rIns="91425" bIns="91425" anchor="b" anchorCtr="0">
             <a:noAutofit/>
           </a:bodyPr>
           <a:lstStyle/>
           <a:p>
-            <a:pPr indent="0" lvl="0" marL="0" rtl="0" algn="ctr">
+            <a:pPr marL="0" lvl="0" indent="0" algn="ctr" rtl="0">
               <a:spcBef>
                 <a:spcPts val="0"/>
               </a:spcBef>
@@ -6068,69 +6220,9 @@
               <a:buNone/>
             </a:pPr>
             <a:r>
-              <a:rPr lang="en"/>
-              <a:t>Project Title</a:t>
+              <a:rPr lang="en-US" dirty="0"/>
+              <a:t>P1T2-Array-of-Sunshine</a:t>
             </a:r>
-            <a:endParaRPr/>
-          </a:p>
-        </p:txBody>
-      </p:sp>
-      <p:sp>
-        <p:nvSpPr>
-          <p:cNvPr id="55" name="Google Shape;55;p13"/>
-          <p:cNvSpPr txBox="1"/>
-          <p:nvPr>
-            <p:ph idx="1" type="subTitle"/>
-          </p:nvPr>
-        </p:nvSpPr>
-        <p:spPr>
-          <a:xfrm>
-            <a:off x="311700" y="2834125"/>
-            <a:ext cx="8520600" cy="792600"/>
-          </a:xfrm>
-          <a:prstGeom prst="rect">
-            <a:avLst/>
-          </a:prstGeom>
-        </p:spPr>
-        <p:txBody>
-          <a:bodyPr anchorCtr="0" anchor="t" bIns="91425" lIns="91425" spcFirstLastPara="1" rIns="91425" wrap="square" tIns="91425">
-            <a:noAutofit/>
-          </a:bodyPr>
-          <a:lstStyle/>
-          <a:p>
-            <a:pPr indent="0" lvl="0" marL="0" rtl="0" algn="ctr">
-              <a:spcBef>
-                <a:spcPts val="0"/>
-              </a:spcBef>
-              <a:spcAft>
-                <a:spcPts val="0"/>
-              </a:spcAft>
-              <a:buNone/>
-            </a:pPr>
-            <a:r>
-              <a:rPr lang="en">
-                <a:solidFill>
-                  <a:srgbClr val="FFFFFF"/>
-                </a:solidFill>
-                <a:highlight>
-                  <a:srgbClr val="FF0000"/>
-                </a:highlight>
-              </a:rPr>
-              <a:t>MAKE A COPY!</a:t>
-            </a:r>
-            <a:r>
-              <a:rPr lang="en">
-                <a:highlight>
-                  <a:srgbClr val="FFFF00"/>
-                </a:highlight>
-              </a:rPr>
-              <a:t> DO NOT REQUEST EDIT ACCESS</a:t>
-            </a:r>
-            <a:endParaRPr>
-              <a:highlight>
-                <a:srgbClr val="FFFF00"/>
-              </a:highlight>
-            </a:endParaRPr>
           </a:p>
         </p:txBody>
       </p:sp>
@@ -6143,11 +6235,11 @@
 </file>
 
 <file path=ppt/slides/slide2.xml><?xml version="1.0" encoding="utf-8"?>
-<p:sld xmlns:a="http://schemas.openxmlformats.org/drawingml/2006/main" xmlns:r="http://schemas.openxmlformats.org/officeDocument/2006/relationships" xmlns:mc="http://schemas.openxmlformats.org/markup-compatibility/2006" xmlns:mv="urn:schemas-microsoft-com:mac:vml" xmlns:p="http://schemas.openxmlformats.org/presentationml/2006/main" xmlns:c="http://schemas.openxmlformats.org/drawingml/2006/chart" xmlns:dgm="http://schemas.openxmlformats.org/drawingml/2006/diagram" xmlns:o="urn:schemas-microsoft-com:office:office" xmlns:v="urn:schemas-microsoft-com:vml" xmlns:pvml="urn:schemas-microsoft-com:office:powerpoint" xmlns:com="http://schemas.openxmlformats.org/drawingml/2006/compatibility" xmlns:p14="http://schemas.microsoft.com/office/powerpoint/2010/main" xmlns:p15="http://schemas.microsoft.com/office/powerpoint/2012/main" xmlns:ahyp="http://schemas.microsoft.com/office/drawing/2018/hyperlinkcolor">
+<p:sld xmlns:a="http://schemas.openxmlformats.org/drawingml/2006/main" xmlns:r="http://schemas.openxmlformats.org/officeDocument/2006/relationships" xmlns:p="http://schemas.openxmlformats.org/presentationml/2006/main">
   <p:cSld>
     <p:spTree>
       <p:nvGrpSpPr>
-        <p:cNvPr id="59" name="Shape 59"/>
+        <p:cNvPr id="1" name="Shape 59"/>
         <p:cNvGrpSpPr/>
         <p:nvPr/>
       </p:nvGrpSpPr>
@@ -6162,27 +6254,29 @@
       <p:sp>
         <p:nvSpPr>
           <p:cNvPr id="60" name="Google Shape;60;p14"/>
-          <p:cNvSpPr txBox="1"/>
+          <p:cNvSpPr txBox="1">
+            <a:spLocks noGrp="1"/>
+          </p:cNvSpPr>
           <p:nvPr>
             <p:ph type="title"/>
           </p:nvPr>
         </p:nvSpPr>
         <p:spPr>
           <a:xfrm>
-            <a:off x="311700" y="2150850"/>
-            <a:ext cx="8520600" cy="841800"/>
+            <a:off x="311700" y="245327"/>
+            <a:ext cx="8520600" cy="4549697"/>
           </a:xfrm>
           <a:prstGeom prst="rect">
             <a:avLst/>
           </a:prstGeom>
         </p:spPr>
         <p:txBody>
-          <a:bodyPr anchorCtr="0" anchor="ctr" bIns="91425" lIns="91425" spcFirstLastPara="1" rIns="91425" wrap="square" tIns="91425">
+          <a:bodyPr spcFirstLastPara="1" wrap="square" lIns="91425" tIns="91425" rIns="91425" bIns="91425" anchor="ctr" anchorCtr="0">
             <a:noAutofit/>
           </a:bodyPr>
           <a:lstStyle/>
           <a:p>
-            <a:pPr indent="0" lvl="0" marL="0" rtl="0" algn="ctr">
+            <a:pPr marL="0" lvl="0" indent="0" algn="l" rtl="0">
               <a:spcBef>
                 <a:spcPts val="0"/>
               </a:spcBef>
@@ -6192,10 +6286,14 @@
               <a:buNone/>
             </a:pPr>
             <a:r>
-              <a:rPr lang="en"/>
-              <a:t>Elevator pitch</a:t>
+              <a:rPr lang="en-US" sz="1800" dirty="0"/>
+              <a:t>"Level up your logic skills with our Connect 4-inspired game, built from the ground up using HTML, CSS, and JavaScript! Designed as a coding bootcamp project, this interactive web game delivers a fun and engaging experience while showcasing dynamic UI updates, responsive design, and core JavaScript functionality. Play against a friend, test your strategic thinking, and see how simple web technologies come together to create an immersive gameplay experience!"</a:t>
             </a:r>
-            <a:endParaRPr/>
+            <a:r>
+              <a:rPr lang="en" sz="1800" dirty="0"/>
+              <a:t> pitch</a:t>
+            </a:r>
+            <a:endParaRPr sz="1800" dirty="0"/>
           </a:p>
         </p:txBody>
       </p:sp>
@@ -6208,11 +6306,11 @@
 </file>
 
 <file path=ppt/slides/slide3.xml><?xml version="1.0" encoding="utf-8"?>
-<p:sld xmlns:a="http://schemas.openxmlformats.org/drawingml/2006/main" xmlns:r="http://schemas.openxmlformats.org/officeDocument/2006/relationships" xmlns:mc="http://schemas.openxmlformats.org/markup-compatibility/2006" xmlns:mv="urn:schemas-microsoft-com:mac:vml" xmlns:p="http://schemas.openxmlformats.org/presentationml/2006/main" xmlns:c="http://schemas.openxmlformats.org/drawingml/2006/chart" xmlns:dgm="http://schemas.openxmlformats.org/drawingml/2006/diagram" xmlns:o="urn:schemas-microsoft-com:office:office" xmlns:v="urn:schemas-microsoft-com:vml" xmlns:pvml="urn:schemas-microsoft-com:office:powerpoint" xmlns:com="http://schemas.openxmlformats.org/drawingml/2006/compatibility" xmlns:p14="http://schemas.microsoft.com/office/powerpoint/2010/main" xmlns:p15="http://schemas.microsoft.com/office/powerpoint/2012/main" xmlns:ahyp="http://schemas.microsoft.com/office/drawing/2018/hyperlinkcolor">
+<p:sld xmlns:a="http://schemas.openxmlformats.org/drawingml/2006/main" xmlns:r="http://schemas.openxmlformats.org/officeDocument/2006/relationships" xmlns:p="http://schemas.openxmlformats.org/presentationml/2006/main">
   <p:cSld>
     <p:spTree>
       <p:nvGrpSpPr>
-        <p:cNvPr id="64" name="Shape 64"/>
+        <p:cNvPr id="1" name="Shape 64"/>
         <p:cNvGrpSpPr/>
         <p:nvPr/>
       </p:nvGrpSpPr>
@@ -6227,7 +6325,185 @@
       <p:sp>
         <p:nvSpPr>
           <p:cNvPr id="65" name="Google Shape;65;p15"/>
-          <p:cNvSpPr txBox="1"/>
+          <p:cNvSpPr txBox="1">
+            <a:spLocks noGrp="1"/>
+          </p:cNvSpPr>
+          <p:nvPr>
+            <p:ph type="title"/>
+          </p:nvPr>
+        </p:nvSpPr>
+        <p:spPr>
+          <a:xfrm>
+            <a:off x="311700" y="1925"/>
+            <a:ext cx="8520600" cy="572700"/>
+          </a:xfrm>
+          <a:prstGeom prst="rect">
+            <a:avLst/>
+          </a:prstGeom>
+        </p:spPr>
+        <p:txBody>
+          <a:bodyPr spcFirstLastPara="1" wrap="square" lIns="91425" tIns="91425" rIns="91425" bIns="91425" anchor="t" anchorCtr="0">
+            <a:noAutofit/>
+          </a:bodyPr>
+          <a:lstStyle/>
+          <a:p>
+            <a:pPr marL="0" lvl="0" indent="0" algn="l" rtl="0">
+              <a:spcBef>
+                <a:spcPts val="0"/>
+              </a:spcBef>
+              <a:spcAft>
+                <a:spcPts val="0"/>
+              </a:spcAft>
+              <a:buNone/>
+            </a:pPr>
+            <a:r>
+              <a:rPr lang="en" b="1" dirty="0">
+                <a:solidFill>
+                  <a:schemeClr val="dk2"/>
+                </a:solidFill>
+              </a:rPr>
+              <a:t>Concept</a:t>
+            </a:r>
+            <a:endParaRPr b="1" dirty="0">
+              <a:solidFill>
+                <a:schemeClr val="dk2"/>
+              </a:solidFill>
+            </a:endParaRPr>
+          </a:p>
+        </p:txBody>
+      </p:sp>
+      <p:sp>
+        <p:nvSpPr>
+          <p:cNvPr id="66" name="Google Shape;66;p15"/>
+          <p:cNvSpPr txBox="1">
+            <a:spLocks noGrp="1"/>
+          </p:cNvSpPr>
+          <p:nvPr>
+            <p:ph type="body" idx="1"/>
+          </p:nvPr>
+        </p:nvSpPr>
+        <p:spPr>
+          <a:xfrm>
+            <a:off x="311700" y="574625"/>
+            <a:ext cx="8520600" cy="3416400"/>
+          </a:xfrm>
+          <a:prstGeom prst="rect">
+            <a:avLst/>
+          </a:prstGeom>
+        </p:spPr>
+        <p:txBody>
+          <a:bodyPr spcFirstLastPara="1" wrap="square" lIns="91425" tIns="91425" rIns="91425" bIns="91425" anchor="t" anchorCtr="0">
+            <a:noAutofit/>
+          </a:bodyPr>
+          <a:lstStyle/>
+          <a:p>
+            <a:pPr marL="114300" lvl="0" indent="0" algn="l" rtl="0">
+              <a:spcBef>
+                <a:spcPts val="0"/>
+              </a:spcBef>
+              <a:spcAft>
+                <a:spcPts val="0"/>
+              </a:spcAft>
+              <a:buSzPts val="1800"/>
+              <a:buNone/>
+            </a:pPr>
+            <a:r>
+              <a:rPr lang="en" sz="1600" b="1" dirty="0"/>
+              <a:t>Description</a:t>
+            </a:r>
+            <a:endParaRPr lang="en-US" sz="1600" b="1" dirty="0"/>
+          </a:p>
+          <a:p>
+            <a:pPr marL="114300" indent="0">
+              <a:buNone/>
+            </a:pPr>
+            <a:r>
+              <a:rPr lang="en-US" sz="1200" dirty="0"/>
+              <a:t>Array of Sunshine is a web-based twist on the classic game, built with HTML, CSS, and JavaScript for an interactive and personalized experience. Players can choose custom token colors and create a username that persists via local storage. Smooth animations bring the game to life as tokens drop into place, while an intuitive message UI guides players with turn-based prompts and victory messages. With its dynamic visuals and engaging mechanics, Array of Sunshine offers a fresh, fun way to enjoy this timeless strategy game.</a:t>
+            </a:r>
+          </a:p>
+          <a:p>
+            <a:pPr marL="114300" indent="0">
+              <a:buNone/>
+            </a:pPr>
+            <a:endParaRPr lang="en-US" sz="1200" dirty="0"/>
+          </a:p>
+          <a:p>
+            <a:pPr marL="114300" indent="0">
+              <a:buNone/>
+            </a:pPr>
+            <a:r>
+              <a:rPr lang="en-US" sz="1600" b="1" dirty="0"/>
+              <a:t>Motivation for development?</a:t>
+            </a:r>
+          </a:p>
+          <a:p>
+            <a:pPr marL="114300" indent="0">
+              <a:buNone/>
+            </a:pPr>
+            <a:r>
+              <a:rPr lang="en-US" sz="1200" dirty="0"/>
+              <a:t>Stuff</a:t>
+            </a:r>
+          </a:p>
+          <a:p>
+            <a:pPr marL="114300" indent="0">
+              <a:buNone/>
+            </a:pPr>
+            <a:endParaRPr lang="en-US" sz="1200" dirty="0"/>
+          </a:p>
+          <a:p>
+            <a:pPr marL="114300" indent="0">
+              <a:buNone/>
+            </a:pPr>
+            <a:r>
+              <a:rPr lang="en" sz="1600" b="1" dirty="0"/>
+              <a:t>User story</a:t>
+            </a:r>
+            <a:endParaRPr lang="en-US" sz="1200" dirty="0"/>
+          </a:p>
+          <a:p>
+            <a:pPr marL="114300" indent="0">
+              <a:buNone/>
+            </a:pPr>
+            <a:r>
+              <a:rPr lang="en-US" sz="1200" dirty="0"/>
+              <a:t>As a player, I want to customize my game experience by selecting my own token color and creating a unique username that saves for future sessions, so I can feel more connected to the game. I want smooth, animated gameplay where tokens drop seamlessly into place, making each move visually satisfying. Throughout the game, I expect clear and engaging messages that prompt my actions, indicate turns, and celebrate wins, so I always know what’s happening. Ultimately, I want an interactive, customizable and visually appealing way to enjoy the classic Connect 4 experience right in my browser.</a:t>
+            </a:r>
+          </a:p>
+        </p:txBody>
+      </p:sp>
+    </p:spTree>
+  </p:cSld>
+  <p:clrMapOvr>
+    <a:masterClrMapping/>
+  </p:clrMapOvr>
+</p:sld>
+</file>
+
+<file path=ppt/slides/slide4.xml><?xml version="1.0" encoding="utf-8"?>
+<p:sld xmlns:a="http://schemas.openxmlformats.org/drawingml/2006/main" xmlns:r="http://schemas.openxmlformats.org/officeDocument/2006/relationships" xmlns:p="http://schemas.openxmlformats.org/presentationml/2006/main">
+  <p:cSld>
+    <p:spTree>
+      <p:nvGrpSpPr>
+        <p:cNvPr id="1" name="Shape 70"/>
+        <p:cNvGrpSpPr/>
+        <p:nvPr/>
+      </p:nvGrpSpPr>
+      <p:grpSpPr>
+        <a:xfrm>
+          <a:off x="0" y="0"/>
+          <a:ext cx="0" cy="0"/>
+          <a:chOff x="0" y="0"/>
+          <a:chExt cx="0" cy="0"/>
+        </a:xfrm>
+      </p:grpSpPr>
+      <p:sp>
+        <p:nvSpPr>
+          <p:cNvPr id="71" name="Google Shape;71;p16"/>
+          <p:cNvSpPr txBox="1">
+            <a:spLocks noGrp="1"/>
+          </p:cNvSpPr>
           <p:nvPr>
             <p:ph type="title"/>
           </p:nvPr>
@@ -6242,12 +6518,12 @@
           </a:prstGeom>
         </p:spPr>
         <p:txBody>
-          <a:bodyPr anchorCtr="0" anchor="t" bIns="91425" lIns="91425" spcFirstLastPara="1" rIns="91425" wrap="square" tIns="91425">
+          <a:bodyPr spcFirstLastPara="1" wrap="square" lIns="91425" tIns="91425" rIns="91425" bIns="91425" anchor="t" anchorCtr="0">
             <a:noAutofit/>
           </a:bodyPr>
           <a:lstStyle/>
           <a:p>
-            <a:pPr indent="0" lvl="0" marL="0" rtl="0" algn="l">
+            <a:pPr marL="0" lvl="0" indent="0" algn="l" rtl="0">
               <a:spcBef>
                 <a:spcPts val="0"/>
               </a:spcBef>
@@ -6258,7 +6534,7 @@
             </a:pPr>
             <a:r>
               <a:rPr lang="en"/>
-              <a:t>Concept</a:t>
+              <a:t>Process</a:t>
             </a:r>
             <a:endParaRPr/>
           </a:p>
@@ -6266,10 +6542,12 @@
       </p:sp>
       <p:sp>
         <p:nvSpPr>
-          <p:cNvPr id="66" name="Google Shape;66;p15"/>
-          <p:cNvSpPr txBox="1"/>
+          <p:cNvPr id="72" name="Google Shape;72;p16"/>
+          <p:cNvSpPr txBox="1">
+            <a:spLocks noGrp="1"/>
+          </p:cNvSpPr>
           <p:nvPr>
-            <p:ph idx="1" type="body"/>
+            <p:ph type="body" idx="1"/>
           </p:nvPr>
         </p:nvSpPr>
         <p:spPr>
@@ -6282,152 +6560,12 @@
           </a:prstGeom>
         </p:spPr>
         <p:txBody>
-          <a:bodyPr anchorCtr="0" anchor="t" bIns="91425" lIns="91425" spcFirstLastPara="1" rIns="91425" wrap="square" tIns="91425">
+          <a:bodyPr spcFirstLastPara="1" wrap="square" lIns="91425" tIns="91425" rIns="91425" bIns="91425" anchor="t" anchorCtr="0">
             <a:noAutofit/>
           </a:bodyPr>
           <a:lstStyle/>
           <a:p>
-            <a:pPr indent="-342900" lvl="0" marL="457200" rtl="0" algn="l">
-              <a:spcBef>
-                <a:spcPts val="0"/>
-              </a:spcBef>
-              <a:spcAft>
-                <a:spcPts val="0"/>
-              </a:spcAft>
-              <a:buSzPts val="1800"/>
-              <a:buChar char="●"/>
-            </a:pPr>
-            <a:r>
-              <a:rPr lang="en"/>
-              <a:t>Description</a:t>
-            </a:r>
-            <a:endParaRPr/>
-          </a:p>
-          <a:p>
-            <a:pPr indent="-342900" lvl="0" marL="457200" rtl="0" algn="l">
-              <a:spcBef>
-                <a:spcPts val="0"/>
-              </a:spcBef>
-              <a:spcAft>
-                <a:spcPts val="0"/>
-              </a:spcAft>
-              <a:buSzPts val="1800"/>
-              <a:buChar char="●"/>
-            </a:pPr>
-            <a:r>
-              <a:rPr lang="en"/>
-              <a:t>Motivation for development?</a:t>
-            </a:r>
-            <a:endParaRPr/>
-          </a:p>
-          <a:p>
-            <a:pPr indent="-342900" lvl="0" marL="457200" rtl="0" algn="l">
-              <a:spcBef>
-                <a:spcPts val="0"/>
-              </a:spcBef>
-              <a:spcAft>
-                <a:spcPts val="0"/>
-              </a:spcAft>
-              <a:buSzPts val="1800"/>
-              <a:buChar char="●"/>
-            </a:pPr>
-            <a:r>
-              <a:rPr lang="en"/>
-              <a:t>User story</a:t>
-            </a:r>
-            <a:endParaRPr/>
-          </a:p>
-        </p:txBody>
-      </p:sp>
-    </p:spTree>
-  </p:cSld>
-  <p:clrMapOvr>
-    <a:masterClrMapping/>
-  </p:clrMapOvr>
-</p:sld>
-</file>
-
-<file path=ppt/slides/slide4.xml><?xml version="1.0" encoding="utf-8"?>
-<p:sld xmlns:a="http://schemas.openxmlformats.org/drawingml/2006/main" xmlns:r="http://schemas.openxmlformats.org/officeDocument/2006/relationships" xmlns:mc="http://schemas.openxmlformats.org/markup-compatibility/2006" xmlns:mv="urn:schemas-microsoft-com:mac:vml" xmlns:p="http://schemas.openxmlformats.org/presentationml/2006/main" xmlns:c="http://schemas.openxmlformats.org/drawingml/2006/chart" xmlns:dgm="http://schemas.openxmlformats.org/drawingml/2006/diagram" xmlns:o="urn:schemas-microsoft-com:office:office" xmlns:v="urn:schemas-microsoft-com:vml" xmlns:pvml="urn:schemas-microsoft-com:office:powerpoint" xmlns:com="http://schemas.openxmlformats.org/drawingml/2006/compatibility" xmlns:p14="http://schemas.microsoft.com/office/powerpoint/2010/main" xmlns:p15="http://schemas.microsoft.com/office/powerpoint/2012/main" xmlns:ahyp="http://schemas.microsoft.com/office/drawing/2018/hyperlinkcolor">
-  <p:cSld>
-    <p:spTree>
-      <p:nvGrpSpPr>
-        <p:cNvPr id="70" name="Shape 70"/>
-        <p:cNvGrpSpPr/>
-        <p:nvPr/>
-      </p:nvGrpSpPr>
-      <p:grpSpPr>
-        <a:xfrm>
-          <a:off x="0" y="0"/>
-          <a:ext cx="0" cy="0"/>
-          <a:chOff x="0" y="0"/>
-          <a:chExt cx="0" cy="0"/>
-        </a:xfrm>
-      </p:grpSpPr>
-      <p:sp>
-        <p:nvSpPr>
-          <p:cNvPr id="71" name="Google Shape;71;p16"/>
-          <p:cNvSpPr txBox="1"/>
-          <p:nvPr>
-            <p:ph type="title"/>
-          </p:nvPr>
-        </p:nvSpPr>
-        <p:spPr>
-          <a:xfrm>
-            <a:off x="311700" y="445025"/>
-            <a:ext cx="8520600" cy="572700"/>
-          </a:xfrm>
-          <a:prstGeom prst="rect">
-            <a:avLst/>
-          </a:prstGeom>
-        </p:spPr>
-        <p:txBody>
-          <a:bodyPr anchorCtr="0" anchor="t" bIns="91425" lIns="91425" spcFirstLastPara="1" rIns="91425" wrap="square" tIns="91425">
-            <a:noAutofit/>
-          </a:bodyPr>
-          <a:lstStyle/>
-          <a:p>
-            <a:pPr indent="0" lvl="0" marL="0" rtl="0" algn="l">
-              <a:spcBef>
-                <a:spcPts val="0"/>
-              </a:spcBef>
-              <a:spcAft>
-                <a:spcPts val="0"/>
-              </a:spcAft>
-              <a:buNone/>
-            </a:pPr>
-            <a:r>
-              <a:rPr lang="en"/>
-              <a:t>Process</a:t>
-            </a:r>
-            <a:endParaRPr/>
-          </a:p>
-        </p:txBody>
-      </p:sp>
-      <p:sp>
-        <p:nvSpPr>
-          <p:cNvPr id="72" name="Google Shape;72;p16"/>
-          <p:cNvSpPr txBox="1"/>
-          <p:nvPr>
-            <p:ph idx="1" type="body"/>
-          </p:nvPr>
-        </p:nvSpPr>
-        <p:spPr>
-          <a:xfrm>
-            <a:off x="311700" y="1152475"/>
-            <a:ext cx="8520600" cy="3416400"/>
-          </a:xfrm>
-          <a:prstGeom prst="rect">
-            <a:avLst/>
-          </a:prstGeom>
-        </p:spPr>
-        <p:txBody>
-          <a:bodyPr anchorCtr="0" anchor="t" bIns="91425" lIns="91425" spcFirstLastPara="1" rIns="91425" wrap="square" tIns="91425">
-            <a:noAutofit/>
-          </a:bodyPr>
-          <a:lstStyle/>
-          <a:p>
-            <a:pPr indent="-342900" lvl="0" marL="457200" rtl="0" algn="l">
+            <a:pPr marL="457200" lvl="0" indent="-342900" algn="l" rtl="0">
               <a:spcBef>
                 <a:spcPts val="0"/>
               </a:spcBef>
@@ -6444,7 +6582,7 @@
             <a:endParaRPr/>
           </a:p>
           <a:p>
-            <a:pPr indent="-342900" lvl="0" marL="457200" rtl="0" algn="l">
+            <a:pPr marL="457200" lvl="0" indent="-342900" algn="l" rtl="0">
               <a:spcBef>
                 <a:spcPts val="0"/>
               </a:spcBef>
@@ -6461,7 +6599,7 @@
             <a:endParaRPr/>
           </a:p>
           <a:p>
-            <a:pPr indent="-342900" lvl="0" marL="457200" rtl="0" algn="l">
+            <a:pPr marL="457200" lvl="0" indent="-342900" algn="l" rtl="0">
               <a:spcBef>
                 <a:spcPts val="0"/>
               </a:spcBef>
@@ -6478,7 +6616,7 @@
             <a:endParaRPr/>
           </a:p>
           <a:p>
-            <a:pPr indent="-342900" lvl="0" marL="457200" rtl="0" algn="l">
+            <a:pPr marL="457200" lvl="0" indent="-342900" algn="l" rtl="0">
               <a:spcBef>
                 <a:spcPts val="0"/>
               </a:spcBef>
@@ -6505,11 +6643,11 @@
 </file>
 
 <file path=ppt/slides/slide5.xml><?xml version="1.0" encoding="utf-8"?>
-<p:sld xmlns:a="http://schemas.openxmlformats.org/drawingml/2006/main" xmlns:r="http://schemas.openxmlformats.org/officeDocument/2006/relationships" xmlns:mc="http://schemas.openxmlformats.org/markup-compatibility/2006" xmlns:mv="urn:schemas-microsoft-com:mac:vml" xmlns:p="http://schemas.openxmlformats.org/presentationml/2006/main" xmlns:c="http://schemas.openxmlformats.org/drawingml/2006/chart" xmlns:dgm="http://schemas.openxmlformats.org/drawingml/2006/diagram" xmlns:o="urn:schemas-microsoft-com:office:office" xmlns:v="urn:schemas-microsoft-com:vml" xmlns:pvml="urn:schemas-microsoft-com:office:powerpoint" xmlns:com="http://schemas.openxmlformats.org/drawingml/2006/compatibility" xmlns:p14="http://schemas.microsoft.com/office/powerpoint/2010/main" xmlns:p15="http://schemas.microsoft.com/office/powerpoint/2012/main" xmlns:ahyp="http://schemas.microsoft.com/office/drawing/2018/hyperlinkcolor">
+<p:sld xmlns:a="http://schemas.openxmlformats.org/drawingml/2006/main" xmlns:r="http://schemas.openxmlformats.org/officeDocument/2006/relationships" xmlns:p="http://schemas.openxmlformats.org/presentationml/2006/main">
   <p:cSld>
     <p:spTree>
       <p:nvGrpSpPr>
-        <p:cNvPr id="76" name="Shape 76"/>
+        <p:cNvPr id="1" name="Shape 76"/>
         <p:cNvGrpSpPr/>
         <p:nvPr/>
       </p:nvGrpSpPr>
@@ -6524,7 +6662,9 @@
       <p:sp>
         <p:nvSpPr>
           <p:cNvPr id="77" name="Google Shape;77;p17"/>
-          <p:cNvSpPr txBox="1"/>
+          <p:cNvSpPr txBox="1">
+            <a:spLocks noGrp="1"/>
+          </p:cNvSpPr>
           <p:nvPr>
             <p:ph type="title"/>
           </p:nvPr>
@@ -6539,12 +6679,12 @@
           </a:prstGeom>
         </p:spPr>
         <p:txBody>
-          <a:bodyPr anchorCtr="0" anchor="ctr" bIns="91425" lIns="91425" spcFirstLastPara="1" rIns="91425" wrap="square" tIns="91425">
+          <a:bodyPr spcFirstLastPara="1" wrap="square" lIns="91425" tIns="91425" rIns="91425" bIns="91425" anchor="ctr" anchorCtr="0">
             <a:noAutofit/>
           </a:bodyPr>
           <a:lstStyle/>
           <a:p>
-            <a:pPr indent="0" lvl="0" marL="0" rtl="0" algn="ctr">
+            <a:pPr marL="0" lvl="0" indent="0" algn="ctr" rtl="0">
               <a:spcBef>
                 <a:spcPts val="0"/>
               </a:spcBef>
@@ -6570,11 +6710,11 @@
 </file>
 
 <file path=ppt/slides/slide6.xml><?xml version="1.0" encoding="utf-8"?>
-<p:sld xmlns:a="http://schemas.openxmlformats.org/drawingml/2006/main" xmlns:r="http://schemas.openxmlformats.org/officeDocument/2006/relationships" xmlns:mc="http://schemas.openxmlformats.org/markup-compatibility/2006" xmlns:mv="urn:schemas-microsoft-com:mac:vml" xmlns:p="http://schemas.openxmlformats.org/presentationml/2006/main" xmlns:c="http://schemas.openxmlformats.org/drawingml/2006/chart" xmlns:dgm="http://schemas.openxmlformats.org/drawingml/2006/diagram" xmlns:o="urn:schemas-microsoft-com:office:office" xmlns:v="urn:schemas-microsoft-com:vml" xmlns:pvml="urn:schemas-microsoft-com:office:powerpoint" xmlns:com="http://schemas.openxmlformats.org/drawingml/2006/compatibility" xmlns:p14="http://schemas.microsoft.com/office/powerpoint/2010/main" xmlns:p15="http://schemas.microsoft.com/office/powerpoint/2012/main" xmlns:ahyp="http://schemas.microsoft.com/office/drawing/2018/hyperlinkcolor">
+<p:sld xmlns:a="http://schemas.openxmlformats.org/drawingml/2006/main" xmlns:r="http://schemas.openxmlformats.org/officeDocument/2006/relationships" xmlns:p="http://schemas.openxmlformats.org/presentationml/2006/main">
   <p:cSld>
     <p:spTree>
       <p:nvGrpSpPr>
-        <p:cNvPr id="81" name="Shape 81"/>
+        <p:cNvPr id="1" name="Shape 81"/>
         <p:cNvGrpSpPr/>
         <p:nvPr/>
       </p:nvGrpSpPr>
@@ -6589,7 +6729,9 @@
       <p:sp>
         <p:nvSpPr>
           <p:cNvPr id="82" name="Google Shape;82;p18"/>
-          <p:cNvSpPr txBox="1"/>
+          <p:cNvSpPr txBox="1">
+            <a:spLocks noGrp="1"/>
+          </p:cNvSpPr>
           <p:nvPr>
             <p:ph type="title"/>
           </p:nvPr>
@@ -6604,12 +6746,12 @@
           </a:prstGeom>
         </p:spPr>
         <p:txBody>
-          <a:bodyPr anchorCtr="0" anchor="t" bIns="91425" lIns="91425" spcFirstLastPara="1" rIns="91425" wrap="square" tIns="91425">
+          <a:bodyPr spcFirstLastPara="1" wrap="square" lIns="91425" tIns="91425" rIns="91425" bIns="91425" anchor="t" anchorCtr="0">
             <a:noAutofit/>
           </a:bodyPr>
           <a:lstStyle/>
           <a:p>
-            <a:pPr indent="0" lvl="0" marL="0" rtl="0" algn="l">
+            <a:pPr marL="0" lvl="0" indent="0" algn="l" rtl="0">
               <a:spcBef>
                 <a:spcPts val="0"/>
               </a:spcBef>
@@ -6635,11 +6777,11 @@
 </file>
 
 <file path=ppt/slides/slide7.xml><?xml version="1.0" encoding="utf-8"?>
-<p:sld xmlns:a="http://schemas.openxmlformats.org/drawingml/2006/main" xmlns:r="http://schemas.openxmlformats.org/officeDocument/2006/relationships" xmlns:mc="http://schemas.openxmlformats.org/markup-compatibility/2006" xmlns:mv="urn:schemas-microsoft-com:mac:vml" xmlns:p="http://schemas.openxmlformats.org/presentationml/2006/main" xmlns:c="http://schemas.openxmlformats.org/drawingml/2006/chart" xmlns:dgm="http://schemas.openxmlformats.org/drawingml/2006/diagram" xmlns:o="urn:schemas-microsoft-com:office:office" xmlns:v="urn:schemas-microsoft-com:vml" xmlns:pvml="urn:schemas-microsoft-com:office:powerpoint" xmlns:com="http://schemas.openxmlformats.org/drawingml/2006/compatibility" xmlns:p14="http://schemas.microsoft.com/office/powerpoint/2010/main" xmlns:p15="http://schemas.microsoft.com/office/powerpoint/2012/main" xmlns:ahyp="http://schemas.microsoft.com/office/drawing/2018/hyperlinkcolor">
+<p:sld xmlns:a="http://schemas.openxmlformats.org/drawingml/2006/main" xmlns:r="http://schemas.openxmlformats.org/officeDocument/2006/relationships" xmlns:p="http://schemas.openxmlformats.org/presentationml/2006/main">
   <p:cSld>
     <p:spTree>
       <p:nvGrpSpPr>
-        <p:cNvPr id="86" name="Shape 86"/>
+        <p:cNvPr id="1" name="Shape 86"/>
         <p:cNvGrpSpPr/>
         <p:nvPr/>
       </p:nvGrpSpPr>
@@ -6654,7 +6796,9 @@
       <p:sp>
         <p:nvSpPr>
           <p:cNvPr id="87" name="Google Shape;87;p19"/>
-          <p:cNvSpPr txBox="1"/>
+          <p:cNvSpPr txBox="1">
+            <a:spLocks noGrp="1"/>
+          </p:cNvSpPr>
           <p:nvPr>
             <p:ph type="title"/>
           </p:nvPr>
@@ -6669,12 +6813,12 @@
           </a:prstGeom>
         </p:spPr>
         <p:txBody>
-          <a:bodyPr anchorCtr="0" anchor="t" bIns="91425" lIns="91425" spcFirstLastPara="1" rIns="91425" wrap="square" tIns="91425">
+          <a:bodyPr spcFirstLastPara="1" wrap="square" lIns="91425" tIns="91425" rIns="91425" bIns="91425" anchor="t" anchorCtr="0">
             <a:noAutofit/>
           </a:bodyPr>
           <a:lstStyle/>
           <a:p>
-            <a:pPr indent="0" lvl="0" marL="0" rtl="0" algn="l">
+            <a:pPr marL="0" lvl="0" indent="0" algn="l" rtl="0">
               <a:spcBef>
                 <a:spcPts val="0"/>
               </a:spcBef>
@@ -6694,9 +6838,11 @@
       <p:sp>
         <p:nvSpPr>
           <p:cNvPr id="88" name="Google Shape;88;p19"/>
-          <p:cNvSpPr txBox="1"/>
+          <p:cNvSpPr txBox="1">
+            <a:spLocks noGrp="1"/>
+          </p:cNvSpPr>
           <p:nvPr>
-            <p:ph idx="1" type="body"/>
+            <p:ph type="body" idx="1"/>
           </p:nvPr>
         </p:nvSpPr>
         <p:spPr>
@@ -6709,12 +6855,12 @@
           </a:prstGeom>
         </p:spPr>
         <p:txBody>
-          <a:bodyPr anchorCtr="0" anchor="t" bIns="91425" lIns="91425" spcFirstLastPara="1" rIns="91425" wrap="square" tIns="91425">
+          <a:bodyPr spcFirstLastPara="1" wrap="square" lIns="91425" tIns="91425" rIns="91425" bIns="91425" anchor="t" anchorCtr="0">
             <a:noAutofit/>
           </a:bodyPr>
           <a:lstStyle/>
           <a:p>
-            <a:pPr indent="-342900" lvl="0" marL="457200" rtl="0" algn="l">
+            <a:pPr marL="457200" lvl="0" indent="-342900" algn="l" rtl="0">
               <a:spcBef>
                 <a:spcPts val="0"/>
               </a:spcBef>
@@ -6731,7 +6877,7 @@
             <a:endParaRPr/>
           </a:p>
           <a:p>
-            <a:pPr indent="-342900" lvl="0" marL="457200" rtl="0" algn="l">
+            <a:pPr marL="457200" lvl="0" indent="-342900" algn="l" rtl="0">
               <a:spcBef>
                 <a:spcPts val="0"/>
               </a:spcBef>
@@ -6758,7 +6904,288 @@
 </file>
 
 <file path=ppt/theme/theme1.xml><?xml version="1.0" encoding="utf-8"?>
-<a:theme xmlns:a="http://schemas.openxmlformats.org/drawingml/2006/main" xmlns:r="http://schemas.openxmlformats.org/officeDocument/2006/relationships">
+<a:theme xmlns:a="http://schemas.openxmlformats.org/drawingml/2006/main" name="Simple Light">
+  <a:themeElements>
+    <a:clrScheme name="Simple Light">
+      <a:dk1>
+        <a:srgbClr val="000000"/>
+      </a:dk1>
+      <a:lt1>
+        <a:srgbClr val="FFFFFF"/>
+      </a:lt1>
+      <a:dk2>
+        <a:srgbClr val="595959"/>
+      </a:dk2>
+      <a:lt2>
+        <a:srgbClr val="EEEEEE"/>
+      </a:lt2>
+      <a:accent1>
+        <a:srgbClr val="FFAB40"/>
+      </a:accent1>
+      <a:accent2>
+        <a:srgbClr val="212121"/>
+      </a:accent2>
+      <a:accent3>
+        <a:srgbClr val="78909C"/>
+      </a:accent3>
+      <a:accent4>
+        <a:srgbClr val="FFAB40"/>
+      </a:accent4>
+      <a:accent5>
+        <a:srgbClr val="0097A7"/>
+      </a:accent5>
+      <a:accent6>
+        <a:srgbClr val="EEFF41"/>
+      </a:accent6>
+      <a:hlink>
+        <a:srgbClr val="0097A7"/>
+      </a:hlink>
+      <a:folHlink>
+        <a:srgbClr val="0097A7"/>
+      </a:folHlink>
+    </a:clrScheme>
+    <a:fontScheme name="Office">
+      <a:majorFont>
+        <a:latin typeface="Arial"/>
+        <a:ea typeface=""/>
+        <a:cs typeface=""/>
+        <a:font script="Jpan" typeface="ＭＳ Ｐゴシック"/>
+        <a:font script="Hang" typeface="맑은 고딕"/>
+        <a:font script="Hans" typeface="宋体"/>
+        <a:font script="Hant" typeface="新細明體"/>
+        <a:font script="Arab" typeface="Times New Roman"/>
+        <a:font script="Hebr" typeface="Times New Roman"/>
+        <a:font script="Thai" typeface="Angsana New"/>
+        <a:font script="Ethi" typeface="Nyala"/>
+        <a:font script="Beng" typeface="Vrinda"/>
+        <a:font script="Gujr" typeface="Shruti"/>
+        <a:font script="Khmr" typeface="MoolBoran"/>
+        <a:font script="Knda" typeface="Tunga"/>
+        <a:font script="Guru" typeface="Raavi"/>
+        <a:font script="Cans" typeface="Euphemia"/>
+        <a:font script="Cher" typeface="Plantagenet Cherokee"/>
+        <a:font script="Yiii" typeface="Microsoft Yi Baiti"/>
+        <a:font script="Tibt" typeface="Microsoft Himalaya"/>
+        <a:font script="Thaa" typeface="MV Boli"/>
+        <a:font script="Deva" typeface="Mangal"/>
+        <a:font script="Telu" typeface="Gautami"/>
+        <a:font script="Taml" typeface="Latha"/>
+        <a:font script="Syrc" typeface="Estrangelo Edessa"/>
+        <a:font script="Orya" typeface="Kalinga"/>
+        <a:font script="Mlym" typeface="Kartika"/>
+        <a:font script="Laoo" typeface="DokChampa"/>
+        <a:font script="Sinh" typeface="Iskoola Pota"/>
+        <a:font script="Mong" typeface="Mongolian Baiti"/>
+        <a:font script="Viet" typeface="Times New Roman"/>
+        <a:font script="Uigh" typeface="Microsoft Uighur"/>
+        <a:font script="Geor" typeface="Sylfaen"/>
+      </a:majorFont>
+      <a:minorFont>
+        <a:latin typeface="Arial"/>
+        <a:ea typeface=""/>
+        <a:cs typeface=""/>
+        <a:font script="Jpan" typeface="ＭＳ Ｐゴシック"/>
+        <a:font script="Hang" typeface="맑은 고딕"/>
+        <a:font script="Hans" typeface="宋体"/>
+        <a:font script="Hant" typeface="新細明體"/>
+        <a:font script="Arab" typeface="Arial"/>
+        <a:font script="Hebr" typeface="Arial"/>
+        <a:font script="Thai" typeface="Cordia New"/>
+        <a:font script="Ethi" typeface="Nyala"/>
+        <a:font script="Beng" typeface="Vrinda"/>
+        <a:font script="Gujr" typeface="Shruti"/>
+        <a:font script="Khmr" typeface="DaunPenh"/>
+        <a:font script="Knda" typeface="Tunga"/>
+        <a:font script="Guru" typeface="Raavi"/>
+        <a:font script="Cans" typeface="Euphemia"/>
+        <a:font script="Cher" typeface="Plantagenet Cherokee"/>
+        <a:font script="Yiii" typeface="Microsoft Yi Baiti"/>
+        <a:font script="Tibt" typeface="Microsoft Himalaya"/>
+        <a:font script="Thaa" typeface="MV Boli"/>
+        <a:font script="Deva" typeface="Mangal"/>
+        <a:font script="Telu" typeface="Gautami"/>
+        <a:font script="Taml" typeface="Latha"/>
+        <a:font script="Syrc" typeface="Estrangelo Edessa"/>
+        <a:font script="Orya" typeface="Kalinga"/>
+        <a:font script="Mlym" typeface="Kartika"/>
+        <a:font script="Laoo" typeface="DokChampa"/>
+        <a:font script="Sinh" typeface="Iskoola Pota"/>
+        <a:font script="Mong" typeface="Mongolian Baiti"/>
+        <a:font script="Viet" typeface="Arial"/>
+        <a:font script="Uigh" typeface="Microsoft Uighur"/>
+        <a:font script="Geor" typeface="Sylfaen"/>
+      </a:minorFont>
+    </a:fontScheme>
+    <a:fmtScheme name="Office">
+      <a:fillStyleLst>
+        <a:solidFill>
+          <a:schemeClr val="phClr"/>
+        </a:solidFill>
+        <a:gradFill rotWithShape="1">
+          <a:gsLst>
+            <a:gs pos="0">
+              <a:schemeClr val="phClr">
+                <a:tint val="50000"/>
+                <a:satMod val="300000"/>
+              </a:schemeClr>
+            </a:gs>
+            <a:gs pos="35000">
+              <a:schemeClr val="phClr">
+                <a:tint val="37000"/>
+                <a:satMod val="300000"/>
+              </a:schemeClr>
+            </a:gs>
+            <a:gs pos="100000">
+              <a:schemeClr val="phClr">
+                <a:tint val="15000"/>
+                <a:satMod val="350000"/>
+              </a:schemeClr>
+            </a:gs>
+          </a:gsLst>
+          <a:lin ang="16200000" scaled="1"/>
+        </a:gradFill>
+        <a:gradFill rotWithShape="1">
+          <a:gsLst>
+            <a:gs pos="0">
+              <a:schemeClr val="phClr">
+                <a:tint val="100000"/>
+                <a:shade val="100000"/>
+                <a:satMod val="130000"/>
+              </a:schemeClr>
+            </a:gs>
+            <a:gs pos="100000">
+              <a:schemeClr val="phClr">
+                <a:tint val="50000"/>
+                <a:shade val="100000"/>
+                <a:satMod val="350000"/>
+              </a:schemeClr>
+            </a:gs>
+          </a:gsLst>
+          <a:lin ang="16200000" scaled="0"/>
+        </a:gradFill>
+      </a:fillStyleLst>
+      <a:lnStyleLst>
+        <a:ln w="9525" cap="flat" cmpd="sng" algn="ctr">
+          <a:solidFill>
+            <a:schemeClr val="phClr">
+              <a:shade val="95000"/>
+              <a:satMod val="105000"/>
+            </a:schemeClr>
+          </a:solidFill>
+          <a:prstDash val="solid"/>
+        </a:ln>
+        <a:ln w="25400" cap="flat" cmpd="sng" algn="ctr">
+          <a:solidFill>
+            <a:schemeClr val="phClr"/>
+          </a:solidFill>
+          <a:prstDash val="solid"/>
+        </a:ln>
+        <a:ln w="38100" cap="flat" cmpd="sng" algn="ctr">
+          <a:solidFill>
+            <a:schemeClr val="phClr"/>
+          </a:solidFill>
+          <a:prstDash val="solid"/>
+        </a:ln>
+      </a:lnStyleLst>
+      <a:effectStyleLst>
+        <a:effectStyle>
+          <a:effectLst>
+            <a:outerShdw blurRad="40000" dist="20000" dir="5400000" rotWithShape="0">
+              <a:srgbClr val="000000">
+                <a:alpha val="38000"/>
+              </a:srgbClr>
+            </a:outerShdw>
+          </a:effectLst>
+        </a:effectStyle>
+        <a:effectStyle>
+          <a:effectLst>
+            <a:outerShdw blurRad="40000" dist="23000" dir="5400000" rotWithShape="0">
+              <a:srgbClr val="000000">
+                <a:alpha val="35000"/>
+              </a:srgbClr>
+            </a:outerShdw>
+          </a:effectLst>
+        </a:effectStyle>
+        <a:effectStyle>
+          <a:effectLst>
+            <a:outerShdw blurRad="40000" dist="23000" dir="5400000" rotWithShape="0">
+              <a:srgbClr val="000000">
+                <a:alpha val="35000"/>
+              </a:srgbClr>
+            </a:outerShdw>
+          </a:effectLst>
+          <a:scene3d>
+            <a:camera prst="orthographicFront">
+              <a:rot lat="0" lon="0" rev="0"/>
+            </a:camera>
+            <a:lightRig rig="threePt" dir="t">
+              <a:rot lat="0" lon="0" rev="1200000"/>
+            </a:lightRig>
+          </a:scene3d>
+          <a:sp3d>
+            <a:bevelT w="63500" h="25400"/>
+          </a:sp3d>
+        </a:effectStyle>
+      </a:effectStyleLst>
+      <a:bgFillStyleLst>
+        <a:solidFill>
+          <a:schemeClr val="phClr"/>
+        </a:solidFill>
+        <a:gradFill rotWithShape="1">
+          <a:gsLst>
+            <a:gs pos="0">
+              <a:schemeClr val="phClr">
+                <a:tint val="40000"/>
+                <a:satMod val="350000"/>
+              </a:schemeClr>
+            </a:gs>
+            <a:gs pos="40000">
+              <a:schemeClr val="phClr">
+                <a:tint val="45000"/>
+                <a:shade val="99000"/>
+                <a:satMod val="350000"/>
+              </a:schemeClr>
+            </a:gs>
+            <a:gs pos="100000">
+              <a:schemeClr val="phClr">
+                <a:shade val="20000"/>
+                <a:satMod val="255000"/>
+              </a:schemeClr>
+            </a:gs>
+          </a:gsLst>
+          <a:path path="circle">
+            <a:fillToRect l="50000" t="-80000" r="50000" b="180000"/>
+          </a:path>
+        </a:gradFill>
+        <a:gradFill rotWithShape="1">
+          <a:gsLst>
+            <a:gs pos="0">
+              <a:schemeClr val="phClr">
+                <a:tint val="80000"/>
+                <a:satMod val="300000"/>
+              </a:schemeClr>
+            </a:gs>
+            <a:gs pos="100000">
+              <a:schemeClr val="phClr">
+                <a:shade val="30000"/>
+                <a:satMod val="200000"/>
+              </a:schemeClr>
+            </a:gs>
+          </a:gsLst>
+          <a:path path="circle">
+            <a:fillToRect l="50000" t="50000" r="50000" b="50000"/>
+          </a:path>
+        </a:gradFill>
+      </a:bgFillStyleLst>
+    </a:fmtScheme>
+  </a:themeElements>
+  <a:objectDefaults/>
+  <a:extraClrSchemeLst/>
+</a:theme>
+</file>
+
+<file path=ppt/theme/theme2.xml><?xml version="1.0" encoding="utf-8"?>
+<a:theme xmlns:a="http://schemas.openxmlformats.org/drawingml/2006/main">
   <a:themeElements>
     <a:clrScheme name="Default">
       <a:dk1>
@@ -7033,284 +7460,7 @@
       </a:bgFillStyleLst>
     </a:fmtScheme>
   </a:themeElements>
-</a:theme>
-</file>
-
-<file path=ppt/theme/theme2.xml><?xml version="1.0" encoding="utf-8"?>
-<a:theme xmlns:a="http://schemas.openxmlformats.org/drawingml/2006/main" xmlns:r="http://schemas.openxmlformats.org/officeDocument/2006/relationships" name="Simple Light">
-  <a:themeElements>
-    <a:clrScheme name="Simple Light">
-      <a:dk1>
-        <a:srgbClr val="000000"/>
-      </a:dk1>
-      <a:lt1>
-        <a:srgbClr val="FFFFFF"/>
-      </a:lt1>
-      <a:dk2>
-        <a:srgbClr val="595959"/>
-      </a:dk2>
-      <a:lt2>
-        <a:srgbClr val="EEEEEE"/>
-      </a:lt2>
-      <a:accent1>
-        <a:srgbClr val="FFAB40"/>
-      </a:accent1>
-      <a:accent2>
-        <a:srgbClr val="212121"/>
-      </a:accent2>
-      <a:accent3>
-        <a:srgbClr val="78909C"/>
-      </a:accent3>
-      <a:accent4>
-        <a:srgbClr val="FFAB40"/>
-      </a:accent4>
-      <a:accent5>
-        <a:srgbClr val="0097A7"/>
-      </a:accent5>
-      <a:accent6>
-        <a:srgbClr val="EEFF41"/>
-      </a:accent6>
-      <a:hlink>
-        <a:srgbClr val="0097A7"/>
-      </a:hlink>
-      <a:folHlink>
-        <a:srgbClr val="0097A7"/>
-      </a:folHlink>
-    </a:clrScheme>
-    <a:fontScheme name="Office">
-      <a:majorFont>
-        <a:latin typeface="Arial"/>
-        <a:ea typeface=""/>
-        <a:cs typeface=""/>
-        <a:font script="Jpan" typeface="ＭＳ Ｐゴシック"/>
-        <a:font script="Hang" typeface="맑은 고딕"/>
-        <a:font script="Hans" typeface="宋体"/>
-        <a:font script="Hant" typeface="新細明體"/>
-        <a:font script="Arab" typeface="Times New Roman"/>
-        <a:font script="Hebr" typeface="Times New Roman"/>
-        <a:font script="Thai" typeface="Angsana New"/>
-        <a:font script="Ethi" typeface="Nyala"/>
-        <a:font script="Beng" typeface="Vrinda"/>
-        <a:font script="Gujr" typeface="Shruti"/>
-        <a:font script="Khmr" typeface="MoolBoran"/>
-        <a:font script="Knda" typeface="Tunga"/>
-        <a:font script="Guru" typeface="Raavi"/>
-        <a:font script="Cans" typeface="Euphemia"/>
-        <a:font script="Cher" typeface="Plantagenet Cherokee"/>
-        <a:font script="Yiii" typeface="Microsoft Yi Baiti"/>
-        <a:font script="Tibt" typeface="Microsoft Himalaya"/>
-        <a:font script="Thaa" typeface="MV Boli"/>
-        <a:font script="Deva" typeface="Mangal"/>
-        <a:font script="Telu" typeface="Gautami"/>
-        <a:font script="Taml" typeface="Latha"/>
-        <a:font script="Syrc" typeface="Estrangelo Edessa"/>
-        <a:font script="Orya" typeface="Kalinga"/>
-        <a:font script="Mlym" typeface="Kartika"/>
-        <a:font script="Laoo" typeface="DokChampa"/>
-        <a:font script="Sinh" typeface="Iskoola Pota"/>
-        <a:font script="Mong" typeface="Mongolian Baiti"/>
-        <a:font script="Viet" typeface="Times New Roman"/>
-        <a:font script="Uigh" typeface="Microsoft Uighur"/>
-        <a:font script="Geor" typeface="Sylfaen"/>
-      </a:majorFont>
-      <a:minorFont>
-        <a:latin typeface="Arial"/>
-        <a:ea typeface=""/>
-        <a:cs typeface=""/>
-        <a:font script="Jpan" typeface="ＭＳ Ｐゴシック"/>
-        <a:font script="Hang" typeface="맑은 고딕"/>
-        <a:font script="Hans" typeface="宋体"/>
-        <a:font script="Hant" typeface="新細明體"/>
-        <a:font script="Arab" typeface="Arial"/>
-        <a:font script="Hebr" typeface="Arial"/>
-        <a:font script="Thai" typeface="Cordia New"/>
-        <a:font script="Ethi" typeface="Nyala"/>
-        <a:font script="Beng" typeface="Vrinda"/>
-        <a:font script="Gujr" typeface="Shruti"/>
-        <a:font script="Khmr" typeface="DaunPenh"/>
-        <a:font script="Knda" typeface="Tunga"/>
-        <a:font script="Guru" typeface="Raavi"/>
-        <a:font script="Cans" typeface="Euphemia"/>
-        <a:font script="Cher" typeface="Plantagenet Cherokee"/>
-        <a:font script="Yiii" typeface="Microsoft Yi Baiti"/>
-        <a:font script="Tibt" typeface="Microsoft Himalaya"/>
-        <a:font script="Thaa" typeface="MV Boli"/>
-        <a:font script="Deva" typeface="Mangal"/>
-        <a:font script="Telu" typeface="Gautami"/>
-        <a:font script="Taml" typeface="Latha"/>
-        <a:font script="Syrc" typeface="Estrangelo Edessa"/>
-        <a:font script="Orya" typeface="Kalinga"/>
-        <a:font script="Mlym" typeface="Kartika"/>
-        <a:font script="Laoo" typeface="DokChampa"/>
-        <a:font script="Sinh" typeface="Iskoola Pota"/>
-        <a:font script="Mong" typeface="Mongolian Baiti"/>
-        <a:font script="Viet" typeface="Arial"/>
-        <a:font script="Uigh" typeface="Microsoft Uighur"/>
-        <a:font script="Geor" typeface="Sylfaen"/>
-      </a:minorFont>
-    </a:fontScheme>
-    <a:fmtScheme name="Office">
-      <a:fillStyleLst>
-        <a:solidFill>
-          <a:schemeClr val="phClr"/>
-        </a:solidFill>
-        <a:gradFill rotWithShape="1">
-          <a:gsLst>
-            <a:gs pos="0">
-              <a:schemeClr val="phClr">
-                <a:tint val="50000"/>
-                <a:satMod val="300000"/>
-              </a:schemeClr>
-            </a:gs>
-            <a:gs pos="35000">
-              <a:schemeClr val="phClr">
-                <a:tint val="37000"/>
-                <a:satMod val="300000"/>
-              </a:schemeClr>
-            </a:gs>
-            <a:gs pos="100000">
-              <a:schemeClr val="phClr">
-                <a:tint val="15000"/>
-                <a:satMod val="350000"/>
-              </a:schemeClr>
-            </a:gs>
-          </a:gsLst>
-          <a:lin ang="16200000" scaled="1"/>
-        </a:gradFill>
-        <a:gradFill rotWithShape="1">
-          <a:gsLst>
-            <a:gs pos="0">
-              <a:schemeClr val="phClr">
-                <a:tint val="100000"/>
-                <a:shade val="100000"/>
-                <a:satMod val="130000"/>
-              </a:schemeClr>
-            </a:gs>
-            <a:gs pos="100000">
-              <a:schemeClr val="phClr">
-                <a:tint val="50000"/>
-                <a:shade val="100000"/>
-                <a:satMod val="350000"/>
-              </a:schemeClr>
-            </a:gs>
-          </a:gsLst>
-          <a:lin ang="16200000" scaled="0"/>
-        </a:gradFill>
-      </a:fillStyleLst>
-      <a:lnStyleLst>
-        <a:ln w="9525" cap="flat" cmpd="sng" algn="ctr">
-          <a:solidFill>
-            <a:schemeClr val="phClr">
-              <a:shade val="95000"/>
-              <a:satMod val="105000"/>
-            </a:schemeClr>
-          </a:solidFill>
-          <a:prstDash val="solid"/>
-        </a:ln>
-        <a:ln w="25400" cap="flat" cmpd="sng" algn="ctr">
-          <a:solidFill>
-            <a:schemeClr val="phClr"/>
-          </a:solidFill>
-          <a:prstDash val="solid"/>
-        </a:ln>
-        <a:ln w="38100" cap="flat" cmpd="sng" algn="ctr">
-          <a:solidFill>
-            <a:schemeClr val="phClr"/>
-          </a:solidFill>
-          <a:prstDash val="solid"/>
-        </a:ln>
-      </a:lnStyleLst>
-      <a:effectStyleLst>
-        <a:effectStyle>
-          <a:effectLst>
-            <a:outerShdw blurRad="40000" dist="20000" dir="5400000" rotWithShape="0">
-              <a:srgbClr val="000000">
-                <a:alpha val="38000"/>
-              </a:srgbClr>
-            </a:outerShdw>
-          </a:effectLst>
-        </a:effectStyle>
-        <a:effectStyle>
-          <a:effectLst>
-            <a:outerShdw blurRad="40000" dist="23000" dir="5400000" rotWithShape="0">
-              <a:srgbClr val="000000">
-                <a:alpha val="35000"/>
-              </a:srgbClr>
-            </a:outerShdw>
-          </a:effectLst>
-        </a:effectStyle>
-        <a:effectStyle>
-          <a:effectLst>
-            <a:outerShdw blurRad="40000" dist="23000" dir="5400000" rotWithShape="0">
-              <a:srgbClr val="000000">
-                <a:alpha val="35000"/>
-              </a:srgbClr>
-            </a:outerShdw>
-          </a:effectLst>
-          <a:scene3d>
-            <a:camera prst="orthographicFront">
-              <a:rot lat="0" lon="0" rev="0"/>
-            </a:camera>
-            <a:lightRig rig="threePt" dir="t">
-              <a:rot lat="0" lon="0" rev="1200000"/>
-            </a:lightRig>
-          </a:scene3d>
-          <a:sp3d>
-            <a:bevelT w="63500" h="25400"/>
-          </a:sp3d>
-        </a:effectStyle>
-      </a:effectStyleLst>
-      <a:bgFillStyleLst>
-        <a:solidFill>
-          <a:schemeClr val="phClr"/>
-        </a:solidFill>
-        <a:gradFill rotWithShape="1">
-          <a:gsLst>
-            <a:gs pos="0">
-              <a:schemeClr val="phClr">
-                <a:tint val="40000"/>
-                <a:satMod val="350000"/>
-              </a:schemeClr>
-            </a:gs>
-            <a:gs pos="40000">
-              <a:schemeClr val="phClr">
-                <a:tint val="45000"/>
-                <a:shade val="99000"/>
-                <a:satMod val="350000"/>
-              </a:schemeClr>
-            </a:gs>
-            <a:gs pos="100000">
-              <a:schemeClr val="phClr">
-                <a:shade val="20000"/>
-                <a:satMod val="255000"/>
-              </a:schemeClr>
-            </a:gs>
-          </a:gsLst>
-          <a:path path="circle">
-            <a:fillToRect l="50000" t="-80000" r="50000" b="180000"/>
-          </a:path>
-        </a:gradFill>
-        <a:gradFill rotWithShape="1">
-          <a:gsLst>
-            <a:gs pos="0">
-              <a:schemeClr val="phClr">
-                <a:tint val="80000"/>
-                <a:satMod val="300000"/>
-              </a:schemeClr>
-            </a:gs>
-            <a:gs pos="100000">
-              <a:schemeClr val="phClr">
-                <a:shade val="30000"/>
-                <a:satMod val="200000"/>
-              </a:schemeClr>
-            </a:gs>
-          </a:gsLst>
-          <a:path path="circle">
-            <a:fillToRect l="50000" t="50000" r="50000" b="50000"/>
-          </a:path>
-        </a:gradFill>
-      </a:bgFillStyleLst>
-    </a:fmtScheme>
-  </a:themeElements>
+  <a:objectDefaults/>
+  <a:extraClrSchemeLst/>
 </a:theme>
 </file>
</xml_diff>

<commit_message>
Updated About Us section with picture and description
</commit_message>
<xml_diff>
--- a/assets/reference/Project Presentation Template.pptx
+++ b/assets/reference/Project Presentation Template.pptx
@@ -1,25 +1,25 @@
 
 <file path=ppt/presentation.xml><?xml version="1.0" encoding="utf-8"?>
-<p:presentation xmlns:a="http://schemas.openxmlformats.org/drawingml/2006/main" xmlns:r="http://schemas.openxmlformats.org/officeDocument/2006/relationships" xmlns:mc="http://schemas.openxmlformats.org/markup-compatibility/2006" xmlns:mv="urn:schemas-microsoft-com:mac:vml" xmlns:p="http://schemas.openxmlformats.org/presentationml/2006/main" xmlns:c="http://schemas.openxmlformats.org/drawingml/2006/chart" xmlns:dgm="http://schemas.openxmlformats.org/drawingml/2006/diagram" xmlns:o="urn:schemas-microsoft-com:office:office" xmlns:v="urn:schemas-microsoft-com:vml" xmlns:pvml="urn:schemas-microsoft-com:office:powerpoint" xmlns:com="http://schemas.openxmlformats.org/drawingml/2006/compatibility" xmlns:p14="http://schemas.microsoft.com/office/powerpoint/2010/main" xmlns:p15="http://schemas.microsoft.com/office/powerpoint/2012/main" xmlns:ahyp="http://schemas.microsoft.com/office/drawing/2018/hyperlinkcolor" autoCompressPictures="0" strictFirstAndLastChars="0" saveSubsetFonts="1">
+<p:presentation xmlns:a="http://schemas.openxmlformats.org/drawingml/2006/main" xmlns:r="http://schemas.openxmlformats.org/officeDocument/2006/relationships" xmlns:p="http://schemas.openxmlformats.org/presentationml/2006/main" strictFirstAndLastChars="0" saveSubsetFonts="1" autoCompressPictures="0">
   <p:sldMasterIdLst>
-    <p:sldMasterId id="2147483659" r:id="rId3"/>
+    <p:sldMasterId id="2147483659" r:id="rId1"/>
   </p:sldMasterIdLst>
   <p:notesMasterIdLst>
-    <p:notesMasterId r:id="rId4"/>
+    <p:notesMasterId r:id="rId9"/>
   </p:notesMasterIdLst>
   <p:sldIdLst>
-    <p:sldId id="256" r:id="rId5"/>
-    <p:sldId id="257" r:id="rId6"/>
-    <p:sldId id="258" r:id="rId7"/>
-    <p:sldId id="259" r:id="rId8"/>
-    <p:sldId id="260" r:id="rId9"/>
-    <p:sldId id="261" r:id="rId10"/>
-    <p:sldId id="262" r:id="rId11"/>
+    <p:sldId id="256" r:id="rId2"/>
+    <p:sldId id="257" r:id="rId3"/>
+    <p:sldId id="258" r:id="rId4"/>
+    <p:sldId id="259" r:id="rId5"/>
+    <p:sldId id="260" r:id="rId6"/>
+    <p:sldId id="261" r:id="rId7"/>
+    <p:sldId id="262" r:id="rId8"/>
   </p:sldIdLst>
-  <p:sldSz cy="5143500" cx="9144000"/>
+  <p:sldSz cx="9144000" cy="5143500" type="screen16x9"/>
   <p:notesSz cx="6858000" cy="9144000"/>
   <p:defaultTextStyle>
-    <a:defPPr lvl="0" marR="0" rtl="0" algn="l">
+    <a:defPPr marR="0" lvl="0" algn="l" rtl="0">
       <a:lnSpc>
         <a:spcPct val="100000"/>
       </a:lnSpc>
@@ -30,7 +30,7 @@
         <a:spcPts val="0"/>
       </a:spcAft>
     </a:defPPr>
-    <a:lvl1pPr lvl="0" marR="0" rtl="0" algn="l">
+    <a:lvl1pPr marR="0" lvl="0" algn="l" rtl="0">
       <a:lnSpc>
         <a:spcPct val="100000"/>
       </a:lnSpc>
@@ -44,7 +44,7 @@
         <a:srgbClr val="000000"/>
       </a:buClr>
       <a:buFont typeface="Arial"/>
-      <a:defRPr b="0" i="0" sz="1400" u="none" cap="none" strike="noStrike">
+      <a:defRPr sz="1400" b="0" i="0" u="none" strike="noStrike" cap="none">
         <a:solidFill>
           <a:srgbClr val="000000"/>
         </a:solidFill>
@@ -54,7 +54,7 @@
         <a:sym typeface="Arial"/>
       </a:defRPr>
     </a:lvl1pPr>
-    <a:lvl2pPr lvl="1" marR="0" rtl="0" algn="l">
+    <a:lvl2pPr marR="0" lvl="1" algn="l" rtl="0">
       <a:lnSpc>
         <a:spcPct val="100000"/>
       </a:lnSpc>
@@ -68,7 +68,7 @@
         <a:srgbClr val="000000"/>
       </a:buClr>
       <a:buFont typeface="Arial"/>
-      <a:defRPr b="0" i="0" sz="1400" u="none" cap="none" strike="noStrike">
+      <a:defRPr sz="1400" b="0" i="0" u="none" strike="noStrike" cap="none">
         <a:solidFill>
           <a:srgbClr val="000000"/>
         </a:solidFill>
@@ -78,7 +78,7 @@
         <a:sym typeface="Arial"/>
       </a:defRPr>
     </a:lvl2pPr>
-    <a:lvl3pPr lvl="2" marR="0" rtl="0" algn="l">
+    <a:lvl3pPr marR="0" lvl="2" algn="l" rtl="0">
       <a:lnSpc>
         <a:spcPct val="100000"/>
       </a:lnSpc>
@@ -92,7 +92,7 @@
         <a:srgbClr val="000000"/>
       </a:buClr>
       <a:buFont typeface="Arial"/>
-      <a:defRPr b="0" i="0" sz="1400" u="none" cap="none" strike="noStrike">
+      <a:defRPr sz="1400" b="0" i="0" u="none" strike="noStrike" cap="none">
         <a:solidFill>
           <a:srgbClr val="000000"/>
         </a:solidFill>
@@ -102,7 +102,7 @@
         <a:sym typeface="Arial"/>
       </a:defRPr>
     </a:lvl3pPr>
-    <a:lvl4pPr lvl="3" marR="0" rtl="0" algn="l">
+    <a:lvl4pPr marR="0" lvl="3" algn="l" rtl="0">
       <a:lnSpc>
         <a:spcPct val="100000"/>
       </a:lnSpc>
@@ -116,7 +116,7 @@
         <a:srgbClr val="000000"/>
       </a:buClr>
       <a:buFont typeface="Arial"/>
-      <a:defRPr b="0" i="0" sz="1400" u="none" cap="none" strike="noStrike">
+      <a:defRPr sz="1400" b="0" i="0" u="none" strike="noStrike" cap="none">
         <a:solidFill>
           <a:srgbClr val="000000"/>
         </a:solidFill>
@@ -126,7 +126,7 @@
         <a:sym typeface="Arial"/>
       </a:defRPr>
     </a:lvl4pPr>
-    <a:lvl5pPr lvl="4" marR="0" rtl="0" algn="l">
+    <a:lvl5pPr marR="0" lvl="4" algn="l" rtl="0">
       <a:lnSpc>
         <a:spcPct val="100000"/>
       </a:lnSpc>
@@ -140,7 +140,7 @@
         <a:srgbClr val="000000"/>
       </a:buClr>
       <a:buFont typeface="Arial"/>
-      <a:defRPr b="0" i="0" sz="1400" u="none" cap="none" strike="noStrike">
+      <a:defRPr sz="1400" b="0" i="0" u="none" strike="noStrike" cap="none">
         <a:solidFill>
           <a:srgbClr val="000000"/>
         </a:solidFill>
@@ -150,7 +150,7 @@
         <a:sym typeface="Arial"/>
       </a:defRPr>
     </a:lvl5pPr>
-    <a:lvl6pPr lvl="5" marR="0" rtl="0" algn="l">
+    <a:lvl6pPr marR="0" lvl="5" algn="l" rtl="0">
       <a:lnSpc>
         <a:spcPct val="100000"/>
       </a:lnSpc>
@@ -164,7 +164,7 @@
         <a:srgbClr val="000000"/>
       </a:buClr>
       <a:buFont typeface="Arial"/>
-      <a:defRPr b="0" i="0" sz="1400" u="none" cap="none" strike="noStrike">
+      <a:defRPr sz="1400" b="0" i="0" u="none" strike="noStrike" cap="none">
         <a:solidFill>
           <a:srgbClr val="000000"/>
         </a:solidFill>
@@ -174,7 +174,7 @@
         <a:sym typeface="Arial"/>
       </a:defRPr>
     </a:lvl6pPr>
-    <a:lvl7pPr lvl="6" marR="0" rtl="0" algn="l">
+    <a:lvl7pPr marR="0" lvl="6" algn="l" rtl="0">
       <a:lnSpc>
         <a:spcPct val="100000"/>
       </a:lnSpc>
@@ -188,7 +188,7 @@
         <a:srgbClr val="000000"/>
       </a:buClr>
       <a:buFont typeface="Arial"/>
-      <a:defRPr b="0" i="0" sz="1400" u="none" cap="none" strike="noStrike">
+      <a:defRPr sz="1400" b="0" i="0" u="none" strike="noStrike" cap="none">
         <a:solidFill>
           <a:srgbClr val="000000"/>
         </a:solidFill>
@@ -198,7 +198,7 @@
         <a:sym typeface="Arial"/>
       </a:defRPr>
     </a:lvl7pPr>
-    <a:lvl8pPr lvl="7" marR="0" rtl="0" algn="l">
+    <a:lvl8pPr marR="0" lvl="7" algn="l" rtl="0">
       <a:lnSpc>
         <a:spcPct val="100000"/>
       </a:lnSpc>
@@ -212,7 +212,7 @@
         <a:srgbClr val="000000"/>
       </a:buClr>
       <a:buFont typeface="Arial"/>
-      <a:defRPr b="0" i="0" sz="1400" u="none" cap="none" strike="noStrike">
+      <a:defRPr sz="1400" b="0" i="0" u="none" strike="noStrike" cap="none">
         <a:solidFill>
           <a:srgbClr val="000000"/>
         </a:solidFill>
@@ -222,7 +222,7 @@
         <a:sym typeface="Arial"/>
       </a:defRPr>
     </a:lvl8pPr>
-    <a:lvl9pPr lvl="8" marR="0" rtl="0" algn="l">
+    <a:lvl9pPr marR="0" lvl="8" algn="l" rtl="0">
       <a:lnSpc>
         <a:spcPct val="100000"/>
       </a:lnSpc>
@@ -236,7 +236,7 @@
         <a:srgbClr val="000000"/>
       </a:buClr>
       <a:buFont typeface="Arial"/>
-      <a:defRPr b="0" i="0" sz="1400" u="none" cap="none" strike="noStrike">
+      <a:defRPr sz="1400" b="0" i="0" u="none" strike="noStrike" cap="none">
         <a:solidFill>
           <a:srgbClr val="000000"/>
         </a:solidFill>
@@ -251,11 +251,16 @@
 </file>
 
 <file path=ppt/notesMasters/notesMaster1.xml><?xml version="1.0" encoding="utf-8"?>
-<p:notesMaster xmlns:a="http://schemas.openxmlformats.org/drawingml/2006/main" xmlns:r="http://schemas.openxmlformats.org/officeDocument/2006/relationships" xmlns:mc="http://schemas.openxmlformats.org/markup-compatibility/2006" xmlns:mv="urn:schemas-microsoft-com:mac:vml" xmlns:p="http://schemas.openxmlformats.org/presentationml/2006/main" xmlns:c="http://schemas.openxmlformats.org/drawingml/2006/chart" xmlns:dgm="http://schemas.openxmlformats.org/drawingml/2006/diagram" xmlns:o="urn:schemas-microsoft-com:office:office" xmlns:v="urn:schemas-microsoft-com:vml" xmlns:pvml="urn:schemas-microsoft-com:office:powerpoint" xmlns:com="http://schemas.openxmlformats.org/drawingml/2006/compatibility" xmlns:p14="http://schemas.microsoft.com/office/powerpoint/2010/main" xmlns:p15="http://schemas.microsoft.com/office/powerpoint/2012/main" xmlns:ahyp="http://schemas.microsoft.com/office/drawing/2018/hyperlinkcolor">
+<p:notesMaster xmlns:a="http://schemas.openxmlformats.org/drawingml/2006/main" xmlns:r="http://schemas.openxmlformats.org/officeDocument/2006/relationships" xmlns:p="http://schemas.openxmlformats.org/presentationml/2006/main">
   <p:cSld>
+    <p:bg>
+      <p:bgRef idx="1001">
+        <a:schemeClr val="bg1"/>
+      </p:bgRef>
+    </p:bg>
     <p:spTree>
       <p:nvGrpSpPr>
-        <p:cNvPr id="2" name="Shape 2"/>
+        <p:cNvPr id="1" name="Shape 2"/>
         <p:cNvGrpSpPr/>
         <p:nvPr/>
       </p:nvGrpSpPr>
@@ -270,9 +275,11 @@
       <p:sp>
         <p:nvSpPr>
           <p:cNvPr id="3" name="Google Shape;3;n"/>
-          <p:cNvSpPr/>
+          <p:cNvSpPr>
+            <a:spLocks noGrp="1" noRot="1" noChangeAspect="1"/>
+          </p:cNvSpPr>
           <p:nvPr>
-            <p:ph idx="2" type="sldImg"/>
+            <p:ph type="sldImg" idx="2"/>
           </p:nvPr>
         </p:nvSpPr>
         <p:spPr>
@@ -281,9 +288,13 @@
             <a:ext cx="6096075" cy="3429000"/>
           </a:xfrm>
           <a:custGeom>
-            <a:rect b="b" l="l" r="r" t="t"/>
+            <a:avLst/>
+            <a:gdLst/>
+            <a:ahLst/>
+            <a:cxnLst/>
+            <a:rect l="l" t="t" r="r" b="b"/>
             <a:pathLst>
-              <a:path extrusionOk="0" h="120000" w="120000">
+              <a:path w="120000" h="120000" extrusionOk="0">
                 <a:moveTo>
                   <a:pt x="0" y="0"/>
                 </a:moveTo>
@@ -301,23 +312,25 @@
             </a:pathLst>
           </a:custGeom>
           <a:noFill/>
-          <a:ln cap="flat" cmpd="sng" w="9525">
+          <a:ln w="9525" cap="flat" cmpd="sng">
             <a:solidFill>
               <a:srgbClr val="000000"/>
             </a:solidFill>
             <a:prstDash val="solid"/>
             <a:round/>
-            <a:headEnd len="sm" w="sm" type="none"/>
-            <a:tailEnd len="sm" w="sm" type="none"/>
+            <a:headEnd type="none" w="sm" len="sm"/>
+            <a:tailEnd type="none" w="sm" len="sm"/>
           </a:ln>
         </p:spPr>
       </p:sp>
       <p:sp>
         <p:nvSpPr>
           <p:cNvPr id="4" name="Google Shape;4;n"/>
-          <p:cNvSpPr txBox="1"/>
+          <p:cNvSpPr txBox="1">
+            <a:spLocks noGrp="1"/>
+          </p:cNvSpPr>
           <p:nvPr>
-            <p:ph idx="1" type="body"/>
+            <p:ph type="body" idx="1"/>
           </p:nvPr>
         </p:nvSpPr>
         <p:spPr>
@@ -334,11 +347,11 @@
           </a:ln>
         </p:spPr>
         <p:txBody>
-          <a:bodyPr anchorCtr="0" anchor="t" bIns="91425" lIns="91425" spcFirstLastPara="1" rIns="91425" wrap="square" tIns="91425">
+          <a:bodyPr spcFirstLastPara="1" wrap="square" lIns="91425" tIns="91425" rIns="91425" bIns="91425" anchor="t" anchorCtr="0">
             <a:noAutofit/>
           </a:bodyPr>
           <a:lstStyle>
-            <a:lvl1pPr indent="-298450" lvl="0" marL="457200">
+            <a:lvl1pPr marL="457200" lvl="0" indent="-298450">
               <a:spcBef>
                 <a:spcPts val="0"/>
               </a:spcBef>
@@ -349,7 +362,7 @@
               <a:buChar char="●"/>
               <a:defRPr sz="1100"/>
             </a:lvl1pPr>
-            <a:lvl2pPr indent="-298450" lvl="1" marL="914400">
+            <a:lvl2pPr marL="914400" lvl="1" indent="-298450">
               <a:spcBef>
                 <a:spcPts val="0"/>
               </a:spcBef>
@@ -360,7 +373,7 @@
               <a:buChar char="○"/>
               <a:defRPr sz="1100"/>
             </a:lvl2pPr>
-            <a:lvl3pPr indent="-298450" lvl="2" marL="1371600">
+            <a:lvl3pPr marL="1371600" lvl="2" indent="-298450">
               <a:spcBef>
                 <a:spcPts val="0"/>
               </a:spcBef>
@@ -371,7 +384,7 @@
               <a:buChar char="■"/>
               <a:defRPr sz="1100"/>
             </a:lvl3pPr>
-            <a:lvl4pPr indent="-298450" lvl="3" marL="1828800">
+            <a:lvl4pPr marL="1828800" lvl="3" indent="-298450">
               <a:spcBef>
                 <a:spcPts val="0"/>
               </a:spcBef>
@@ -382,7 +395,7 @@
               <a:buChar char="●"/>
               <a:defRPr sz="1100"/>
             </a:lvl4pPr>
-            <a:lvl5pPr indent="-298450" lvl="4" marL="2286000">
+            <a:lvl5pPr marL="2286000" lvl="4" indent="-298450">
               <a:spcBef>
                 <a:spcPts val="0"/>
               </a:spcBef>
@@ -393,7 +406,7 @@
               <a:buChar char="○"/>
               <a:defRPr sz="1100"/>
             </a:lvl5pPr>
-            <a:lvl6pPr indent="-298450" lvl="5" marL="2743200">
+            <a:lvl6pPr marL="2743200" lvl="5" indent="-298450">
               <a:spcBef>
                 <a:spcPts val="0"/>
               </a:spcBef>
@@ -404,7 +417,7 @@
               <a:buChar char="■"/>
               <a:defRPr sz="1100"/>
             </a:lvl6pPr>
-            <a:lvl7pPr indent="-298450" lvl="6" marL="3200400">
+            <a:lvl7pPr marL="3200400" lvl="6" indent="-298450">
               <a:spcBef>
                 <a:spcPts val="0"/>
               </a:spcBef>
@@ -415,7 +428,7 @@
               <a:buChar char="●"/>
               <a:defRPr sz="1100"/>
             </a:lvl7pPr>
-            <a:lvl8pPr indent="-298450" lvl="7" marL="3657600">
+            <a:lvl8pPr marL="3657600" lvl="7" indent="-298450">
               <a:spcBef>
                 <a:spcPts val="0"/>
               </a:spcBef>
@@ -426,7 +439,7 @@
               <a:buChar char="○"/>
               <a:defRPr sz="1100"/>
             </a:lvl8pPr>
-            <a:lvl9pPr indent="-298450" lvl="8" marL="4114800">
+            <a:lvl9pPr marL="4114800" lvl="8" indent="-298450">
               <a:spcBef>
                 <a:spcPts val="0"/>
               </a:spcBef>
@@ -438,14 +451,16 @@
               <a:defRPr sz="1100"/>
             </a:lvl9pPr>
           </a:lstStyle>
-          <a:p/>
+          <a:p>
+            <a:endParaRPr/>
+          </a:p>
         </p:txBody>
       </p:sp>
     </p:spTree>
   </p:cSld>
-  <p:clrMap accent1="accent1" accent2="accent2" accent3="accent3" accent4="accent4" accent5="accent5" accent6="accent6" bg1="lt1" bg2="dk2" tx1="dk1" tx2="lt2" folHlink="folHlink" hlink="hlink"/>
+  <p:clrMap bg1="lt1" tx1="dk1" bg2="dk2" tx2="lt2" accent1="accent1" accent2="accent2" accent3="accent3" accent4="accent4" accent5="accent5" accent6="accent6" hlink="hlink" folHlink="folHlink"/>
   <p:notesStyle>
-    <a:defPPr lvl="0" marR="0" rtl="0" algn="l">
+    <a:defPPr marR="0" lvl="0" algn="l" rtl="0">
       <a:lnSpc>
         <a:spcPct val="100000"/>
       </a:lnSpc>
@@ -456,7 +471,7 @@
         <a:spcPts val="0"/>
       </a:spcAft>
     </a:defPPr>
-    <a:lvl1pPr lvl="0" marR="0" rtl="0" algn="l">
+    <a:lvl1pPr marR="0" lvl="0" algn="l" rtl="0">
       <a:lnSpc>
         <a:spcPct val="100000"/>
       </a:lnSpc>
@@ -470,7 +485,7 @@
         <a:srgbClr val="000000"/>
       </a:buClr>
       <a:buFont typeface="Arial"/>
-      <a:defRPr b="0" i="0" sz="1400" u="none" cap="none" strike="noStrike">
+      <a:defRPr sz="1400" b="0" i="0" u="none" strike="noStrike" cap="none">
         <a:solidFill>
           <a:srgbClr val="000000"/>
         </a:solidFill>
@@ -480,7 +495,7 @@
         <a:sym typeface="Arial"/>
       </a:defRPr>
     </a:lvl1pPr>
-    <a:lvl2pPr lvl="1" marR="0" rtl="0" algn="l">
+    <a:lvl2pPr marR="0" lvl="1" algn="l" rtl="0">
       <a:lnSpc>
         <a:spcPct val="100000"/>
       </a:lnSpc>
@@ -494,7 +509,7 @@
         <a:srgbClr val="000000"/>
       </a:buClr>
       <a:buFont typeface="Arial"/>
-      <a:defRPr b="0" i="0" sz="1400" u="none" cap="none" strike="noStrike">
+      <a:defRPr sz="1400" b="0" i="0" u="none" strike="noStrike" cap="none">
         <a:solidFill>
           <a:srgbClr val="000000"/>
         </a:solidFill>
@@ -504,7 +519,7 @@
         <a:sym typeface="Arial"/>
       </a:defRPr>
     </a:lvl2pPr>
-    <a:lvl3pPr lvl="2" marR="0" rtl="0" algn="l">
+    <a:lvl3pPr marR="0" lvl="2" algn="l" rtl="0">
       <a:lnSpc>
         <a:spcPct val="100000"/>
       </a:lnSpc>
@@ -518,7 +533,7 @@
         <a:srgbClr val="000000"/>
       </a:buClr>
       <a:buFont typeface="Arial"/>
-      <a:defRPr b="0" i="0" sz="1400" u="none" cap="none" strike="noStrike">
+      <a:defRPr sz="1400" b="0" i="0" u="none" strike="noStrike" cap="none">
         <a:solidFill>
           <a:srgbClr val="000000"/>
         </a:solidFill>
@@ -528,7 +543,7 @@
         <a:sym typeface="Arial"/>
       </a:defRPr>
     </a:lvl3pPr>
-    <a:lvl4pPr lvl="3" marR="0" rtl="0" algn="l">
+    <a:lvl4pPr marR="0" lvl="3" algn="l" rtl="0">
       <a:lnSpc>
         <a:spcPct val="100000"/>
       </a:lnSpc>
@@ -542,7 +557,7 @@
         <a:srgbClr val="000000"/>
       </a:buClr>
       <a:buFont typeface="Arial"/>
-      <a:defRPr b="0" i="0" sz="1400" u="none" cap="none" strike="noStrike">
+      <a:defRPr sz="1400" b="0" i="0" u="none" strike="noStrike" cap="none">
         <a:solidFill>
           <a:srgbClr val="000000"/>
         </a:solidFill>
@@ -552,7 +567,7 @@
         <a:sym typeface="Arial"/>
       </a:defRPr>
     </a:lvl4pPr>
-    <a:lvl5pPr lvl="4" marR="0" rtl="0" algn="l">
+    <a:lvl5pPr marR="0" lvl="4" algn="l" rtl="0">
       <a:lnSpc>
         <a:spcPct val="100000"/>
       </a:lnSpc>
@@ -566,7 +581,7 @@
         <a:srgbClr val="000000"/>
       </a:buClr>
       <a:buFont typeface="Arial"/>
-      <a:defRPr b="0" i="0" sz="1400" u="none" cap="none" strike="noStrike">
+      <a:defRPr sz="1400" b="0" i="0" u="none" strike="noStrike" cap="none">
         <a:solidFill>
           <a:srgbClr val="000000"/>
         </a:solidFill>
@@ -576,7 +591,7 @@
         <a:sym typeface="Arial"/>
       </a:defRPr>
     </a:lvl5pPr>
-    <a:lvl6pPr lvl="5" marR="0" rtl="0" algn="l">
+    <a:lvl6pPr marR="0" lvl="5" algn="l" rtl="0">
       <a:lnSpc>
         <a:spcPct val="100000"/>
       </a:lnSpc>
@@ -590,7 +605,7 @@
         <a:srgbClr val="000000"/>
       </a:buClr>
       <a:buFont typeface="Arial"/>
-      <a:defRPr b="0" i="0" sz="1400" u="none" cap="none" strike="noStrike">
+      <a:defRPr sz="1400" b="0" i="0" u="none" strike="noStrike" cap="none">
         <a:solidFill>
           <a:srgbClr val="000000"/>
         </a:solidFill>
@@ -600,7 +615,7 @@
         <a:sym typeface="Arial"/>
       </a:defRPr>
     </a:lvl6pPr>
-    <a:lvl7pPr lvl="6" marR="0" rtl="0" algn="l">
+    <a:lvl7pPr marR="0" lvl="6" algn="l" rtl="0">
       <a:lnSpc>
         <a:spcPct val="100000"/>
       </a:lnSpc>
@@ -614,7 +629,7 @@
         <a:srgbClr val="000000"/>
       </a:buClr>
       <a:buFont typeface="Arial"/>
-      <a:defRPr b="0" i="0" sz="1400" u="none" cap="none" strike="noStrike">
+      <a:defRPr sz="1400" b="0" i="0" u="none" strike="noStrike" cap="none">
         <a:solidFill>
           <a:srgbClr val="000000"/>
         </a:solidFill>
@@ -624,7 +639,7 @@
         <a:sym typeface="Arial"/>
       </a:defRPr>
     </a:lvl7pPr>
-    <a:lvl8pPr lvl="7" marR="0" rtl="0" algn="l">
+    <a:lvl8pPr marR="0" lvl="7" algn="l" rtl="0">
       <a:lnSpc>
         <a:spcPct val="100000"/>
       </a:lnSpc>
@@ -638,7 +653,7 @@
         <a:srgbClr val="000000"/>
       </a:buClr>
       <a:buFont typeface="Arial"/>
-      <a:defRPr b="0" i="0" sz="1400" u="none" cap="none" strike="noStrike">
+      <a:defRPr sz="1400" b="0" i="0" u="none" strike="noStrike" cap="none">
         <a:solidFill>
           <a:srgbClr val="000000"/>
         </a:solidFill>
@@ -648,7 +663,7 @@
         <a:sym typeface="Arial"/>
       </a:defRPr>
     </a:lvl8pPr>
-    <a:lvl9pPr lvl="8" marR="0" rtl="0" algn="l">
+    <a:lvl9pPr marR="0" lvl="8" algn="l" rtl="0">
       <a:lnSpc>
         <a:spcPct val="100000"/>
       </a:lnSpc>
@@ -662,7 +677,7 @@
         <a:srgbClr val="000000"/>
       </a:buClr>
       <a:buFont typeface="Arial"/>
-      <a:defRPr b="0" i="0" sz="1400" u="none" cap="none" strike="noStrike">
+      <a:defRPr sz="1400" b="0" i="0" u="none" strike="noStrike" cap="none">
         <a:solidFill>
           <a:srgbClr val="000000"/>
         </a:solidFill>
@@ -677,11 +692,11 @@
 </file>
 
 <file path=ppt/notesSlides/notesSlide1.xml><?xml version="1.0" encoding="utf-8"?>
-<p:notes xmlns:a="http://schemas.openxmlformats.org/drawingml/2006/main" xmlns:r="http://schemas.openxmlformats.org/officeDocument/2006/relationships" xmlns:mc="http://schemas.openxmlformats.org/markup-compatibility/2006" xmlns:mv="urn:schemas-microsoft-com:mac:vml" xmlns:p="http://schemas.openxmlformats.org/presentationml/2006/main" xmlns:c="http://schemas.openxmlformats.org/drawingml/2006/chart" xmlns:dgm="http://schemas.openxmlformats.org/drawingml/2006/diagram" xmlns:o="urn:schemas-microsoft-com:office:office" xmlns:v="urn:schemas-microsoft-com:vml" xmlns:pvml="urn:schemas-microsoft-com:office:powerpoint" xmlns:com="http://schemas.openxmlformats.org/drawingml/2006/compatibility" xmlns:p14="http://schemas.microsoft.com/office/powerpoint/2010/main" xmlns:p15="http://schemas.microsoft.com/office/powerpoint/2012/main" xmlns:ahyp="http://schemas.microsoft.com/office/drawing/2018/hyperlinkcolor" showMasterPhAnim="0" showMasterSp="0">
+<p:notes xmlns:a="http://schemas.openxmlformats.org/drawingml/2006/main" xmlns:r="http://schemas.openxmlformats.org/officeDocument/2006/relationships" xmlns:p="http://schemas.openxmlformats.org/presentationml/2006/main" showMasterSp="0" showMasterPhAnim="0">
   <p:cSld>
     <p:spTree>
       <p:nvGrpSpPr>
-        <p:cNvPr id="50" name="Shape 50"/>
+        <p:cNvPr id="1" name="Shape 50"/>
         <p:cNvGrpSpPr/>
         <p:nvPr/>
       </p:nvGrpSpPr>
@@ -696,20 +711,26 @@
       <p:sp>
         <p:nvSpPr>
           <p:cNvPr id="51" name="Google Shape;51;p:notes"/>
-          <p:cNvSpPr/>
+          <p:cNvSpPr>
+            <a:spLocks noGrp="1" noRot="1" noChangeAspect="1"/>
+          </p:cNvSpPr>
           <p:nvPr>
-            <p:ph idx="2" type="sldImg"/>
+            <p:ph type="sldImg" idx="2"/>
           </p:nvPr>
         </p:nvSpPr>
         <p:spPr>
           <a:xfrm>
-            <a:off x="381300" y="685800"/>
-            <a:ext cx="6096075" cy="3429000"/>
+            <a:off x="381000" y="685800"/>
+            <a:ext cx="6096000" cy="3429000"/>
           </a:xfrm>
           <a:custGeom>
-            <a:rect b="b" l="l" r="r" t="t"/>
+            <a:avLst/>
+            <a:gdLst/>
+            <a:ahLst/>
+            <a:cxnLst/>
+            <a:rect l="l" t="t" r="r" b="b"/>
             <a:pathLst>
-              <a:path extrusionOk="0" h="120000" w="120000">
+              <a:path w="120000" h="120000" extrusionOk="0">
                 <a:moveTo>
                   <a:pt x="0" y="0"/>
                 </a:moveTo>
@@ -731,9 +752,11 @@
       <p:sp>
         <p:nvSpPr>
           <p:cNvPr id="52" name="Google Shape;52;p:notes"/>
-          <p:cNvSpPr txBox="1"/>
+          <p:cNvSpPr txBox="1">
+            <a:spLocks noGrp="1"/>
+          </p:cNvSpPr>
           <p:nvPr>
-            <p:ph idx="1" type="body"/>
+            <p:ph type="body" idx="1"/>
           </p:nvPr>
         </p:nvSpPr>
         <p:spPr>
@@ -746,12 +769,12 @@
           </a:prstGeom>
         </p:spPr>
         <p:txBody>
-          <a:bodyPr anchorCtr="0" anchor="t" bIns="91425" lIns="91425" spcFirstLastPara="1" rIns="91425" wrap="square" tIns="91425">
+          <a:bodyPr spcFirstLastPara="1" wrap="square" lIns="91425" tIns="91425" rIns="91425" bIns="91425" anchor="t" anchorCtr="0">
             <a:noAutofit/>
           </a:bodyPr>
           <a:lstStyle/>
           <a:p>
-            <a:pPr indent="0" lvl="0" marL="0" rtl="0" algn="l">
+            <a:pPr marL="0" lvl="0" indent="0" algn="l" rtl="0">
               <a:spcBef>
                 <a:spcPts val="0"/>
               </a:spcBef>
@@ -760,9 +783,6 @@
               </a:spcAft>
               <a:buNone/>
             </a:pPr>
-            <a:r>
-              <a:t/>
-            </a:r>
             <a:endParaRPr/>
           </a:p>
         </p:txBody>
@@ -776,11 +796,11 @@
 </file>
 
 <file path=ppt/notesSlides/notesSlide2.xml><?xml version="1.0" encoding="utf-8"?>
-<p:notes xmlns:a="http://schemas.openxmlformats.org/drawingml/2006/main" xmlns:r="http://schemas.openxmlformats.org/officeDocument/2006/relationships" xmlns:mc="http://schemas.openxmlformats.org/markup-compatibility/2006" xmlns:mv="urn:schemas-microsoft-com:mac:vml" xmlns:p="http://schemas.openxmlformats.org/presentationml/2006/main" xmlns:c="http://schemas.openxmlformats.org/drawingml/2006/chart" xmlns:dgm="http://schemas.openxmlformats.org/drawingml/2006/diagram" xmlns:o="urn:schemas-microsoft-com:office:office" xmlns:v="urn:schemas-microsoft-com:vml" xmlns:pvml="urn:schemas-microsoft-com:office:powerpoint" xmlns:com="http://schemas.openxmlformats.org/drawingml/2006/compatibility" xmlns:p14="http://schemas.microsoft.com/office/powerpoint/2010/main" xmlns:p15="http://schemas.microsoft.com/office/powerpoint/2012/main" xmlns:ahyp="http://schemas.microsoft.com/office/drawing/2018/hyperlinkcolor" showMasterPhAnim="0" showMasterSp="0">
+<p:notes xmlns:a="http://schemas.openxmlformats.org/drawingml/2006/main" xmlns:r="http://schemas.openxmlformats.org/officeDocument/2006/relationships" xmlns:p="http://schemas.openxmlformats.org/presentationml/2006/main" showMasterSp="0" showMasterPhAnim="0">
   <p:cSld>
     <p:spTree>
       <p:nvGrpSpPr>
-        <p:cNvPr id="56" name="Shape 56"/>
+        <p:cNvPr id="1" name="Shape 56"/>
         <p:cNvGrpSpPr/>
         <p:nvPr/>
       </p:nvGrpSpPr>
@@ -795,20 +815,26 @@
       <p:sp>
         <p:nvSpPr>
           <p:cNvPr id="57" name="Google Shape;57;g320332ed93_1_0:notes"/>
-          <p:cNvSpPr/>
+          <p:cNvSpPr>
+            <a:spLocks noGrp="1" noRot="1" noChangeAspect="1"/>
+          </p:cNvSpPr>
           <p:nvPr>
-            <p:ph idx="2" type="sldImg"/>
+            <p:ph type="sldImg" idx="2"/>
           </p:nvPr>
         </p:nvSpPr>
         <p:spPr>
           <a:xfrm>
-            <a:off x="381300" y="685800"/>
+            <a:off x="381000" y="685800"/>
             <a:ext cx="6096000" cy="3429000"/>
           </a:xfrm>
           <a:custGeom>
-            <a:rect b="b" l="l" r="r" t="t"/>
+            <a:avLst/>
+            <a:gdLst/>
+            <a:ahLst/>
+            <a:cxnLst/>
+            <a:rect l="l" t="t" r="r" b="b"/>
             <a:pathLst>
-              <a:path extrusionOk="0" h="120000" w="120000">
+              <a:path w="120000" h="120000" extrusionOk="0">
                 <a:moveTo>
                   <a:pt x="0" y="0"/>
                 </a:moveTo>
@@ -830,9 +856,11 @@
       <p:sp>
         <p:nvSpPr>
           <p:cNvPr id="58" name="Google Shape;58;g320332ed93_1_0:notes"/>
-          <p:cNvSpPr txBox="1"/>
+          <p:cNvSpPr txBox="1">
+            <a:spLocks noGrp="1"/>
+          </p:cNvSpPr>
           <p:nvPr>
-            <p:ph idx="1" type="body"/>
+            <p:ph type="body" idx="1"/>
           </p:nvPr>
         </p:nvSpPr>
         <p:spPr>
@@ -845,12 +873,12 @@
           </a:prstGeom>
         </p:spPr>
         <p:txBody>
-          <a:bodyPr anchorCtr="0" anchor="t" bIns="91425" lIns="91425" spcFirstLastPara="1" rIns="91425" wrap="square" tIns="91425">
+          <a:bodyPr spcFirstLastPara="1" wrap="square" lIns="91425" tIns="91425" rIns="91425" bIns="91425" anchor="t" anchorCtr="0">
             <a:noAutofit/>
           </a:bodyPr>
           <a:lstStyle/>
           <a:p>
-            <a:pPr indent="0" lvl="0" marL="0" rtl="0" algn="l">
+            <a:pPr marL="0" lvl="0" indent="0" algn="l" rtl="0">
               <a:spcBef>
                 <a:spcPts val="0"/>
               </a:spcBef>
@@ -859,9 +887,6 @@
               </a:spcAft>
               <a:buNone/>
             </a:pPr>
-            <a:r>
-              <a:t/>
-            </a:r>
             <a:endParaRPr/>
           </a:p>
         </p:txBody>
@@ -875,11 +900,11 @@
 </file>
 
 <file path=ppt/notesSlides/notesSlide3.xml><?xml version="1.0" encoding="utf-8"?>
-<p:notes xmlns:a="http://schemas.openxmlformats.org/drawingml/2006/main" xmlns:r="http://schemas.openxmlformats.org/officeDocument/2006/relationships" xmlns:mc="http://schemas.openxmlformats.org/markup-compatibility/2006" xmlns:mv="urn:schemas-microsoft-com:mac:vml" xmlns:p="http://schemas.openxmlformats.org/presentationml/2006/main" xmlns:c="http://schemas.openxmlformats.org/drawingml/2006/chart" xmlns:dgm="http://schemas.openxmlformats.org/drawingml/2006/diagram" xmlns:o="urn:schemas-microsoft-com:office:office" xmlns:v="urn:schemas-microsoft-com:vml" xmlns:pvml="urn:schemas-microsoft-com:office:powerpoint" xmlns:com="http://schemas.openxmlformats.org/drawingml/2006/compatibility" xmlns:p14="http://schemas.microsoft.com/office/powerpoint/2010/main" xmlns:p15="http://schemas.microsoft.com/office/powerpoint/2012/main" xmlns:ahyp="http://schemas.microsoft.com/office/drawing/2018/hyperlinkcolor" showMasterPhAnim="0" showMasterSp="0">
+<p:notes xmlns:a="http://schemas.openxmlformats.org/drawingml/2006/main" xmlns:r="http://schemas.openxmlformats.org/officeDocument/2006/relationships" xmlns:p="http://schemas.openxmlformats.org/presentationml/2006/main" showMasterSp="0" showMasterPhAnim="0">
   <p:cSld>
     <p:spTree>
       <p:nvGrpSpPr>
-        <p:cNvPr id="61" name="Shape 61"/>
+        <p:cNvPr id="1" name="Shape 61"/>
         <p:cNvGrpSpPr/>
         <p:nvPr/>
       </p:nvGrpSpPr>
@@ -894,20 +919,26 @@
       <p:sp>
         <p:nvSpPr>
           <p:cNvPr id="62" name="Google Shape;62;g29f43f0a72_0_0:notes"/>
-          <p:cNvSpPr/>
+          <p:cNvSpPr>
+            <a:spLocks noGrp="1" noRot="1" noChangeAspect="1"/>
+          </p:cNvSpPr>
           <p:nvPr>
-            <p:ph idx="2" type="sldImg"/>
+            <p:ph type="sldImg" idx="2"/>
           </p:nvPr>
         </p:nvSpPr>
         <p:spPr>
           <a:xfrm>
-            <a:off x="381300" y="685800"/>
+            <a:off x="381000" y="685800"/>
             <a:ext cx="6096000" cy="3429000"/>
           </a:xfrm>
           <a:custGeom>
-            <a:rect b="b" l="l" r="r" t="t"/>
+            <a:avLst/>
+            <a:gdLst/>
+            <a:ahLst/>
+            <a:cxnLst/>
+            <a:rect l="l" t="t" r="r" b="b"/>
             <a:pathLst>
-              <a:path extrusionOk="0" h="120000" w="120000">
+              <a:path w="120000" h="120000" extrusionOk="0">
                 <a:moveTo>
                   <a:pt x="0" y="0"/>
                 </a:moveTo>
@@ -929,9 +960,11 @@
       <p:sp>
         <p:nvSpPr>
           <p:cNvPr id="63" name="Google Shape;63;g29f43f0a72_0_0:notes"/>
-          <p:cNvSpPr txBox="1"/>
+          <p:cNvSpPr txBox="1">
+            <a:spLocks noGrp="1"/>
+          </p:cNvSpPr>
           <p:nvPr>
-            <p:ph idx="1" type="body"/>
+            <p:ph type="body" idx="1"/>
           </p:nvPr>
         </p:nvSpPr>
         <p:spPr>
@@ -944,12 +977,12 @@
           </a:prstGeom>
         </p:spPr>
         <p:txBody>
-          <a:bodyPr anchorCtr="0" anchor="t" bIns="91425" lIns="91425" spcFirstLastPara="1" rIns="91425" wrap="square" tIns="91425">
+          <a:bodyPr spcFirstLastPara="1" wrap="square" lIns="91425" tIns="91425" rIns="91425" bIns="91425" anchor="t" anchorCtr="0">
             <a:noAutofit/>
           </a:bodyPr>
           <a:lstStyle/>
           <a:p>
-            <a:pPr indent="0" lvl="0" marL="0" rtl="0" algn="l">
+            <a:pPr marL="0" lvl="0" indent="0" algn="l" rtl="0">
               <a:spcBef>
                 <a:spcPts val="0"/>
               </a:spcBef>
@@ -958,9 +991,6 @@
               </a:spcAft>
               <a:buNone/>
             </a:pPr>
-            <a:r>
-              <a:t/>
-            </a:r>
             <a:endParaRPr/>
           </a:p>
         </p:txBody>
@@ -974,11 +1004,11 @@
 </file>
 
 <file path=ppt/notesSlides/notesSlide4.xml><?xml version="1.0" encoding="utf-8"?>
-<p:notes xmlns:a="http://schemas.openxmlformats.org/drawingml/2006/main" xmlns:r="http://schemas.openxmlformats.org/officeDocument/2006/relationships" xmlns:mc="http://schemas.openxmlformats.org/markup-compatibility/2006" xmlns:mv="urn:schemas-microsoft-com:mac:vml" xmlns:p="http://schemas.openxmlformats.org/presentationml/2006/main" xmlns:c="http://schemas.openxmlformats.org/drawingml/2006/chart" xmlns:dgm="http://schemas.openxmlformats.org/drawingml/2006/diagram" xmlns:o="urn:schemas-microsoft-com:office:office" xmlns:v="urn:schemas-microsoft-com:vml" xmlns:pvml="urn:schemas-microsoft-com:office:powerpoint" xmlns:com="http://schemas.openxmlformats.org/drawingml/2006/compatibility" xmlns:p14="http://schemas.microsoft.com/office/powerpoint/2010/main" xmlns:p15="http://schemas.microsoft.com/office/powerpoint/2012/main" xmlns:ahyp="http://schemas.microsoft.com/office/drawing/2018/hyperlinkcolor" showMasterPhAnim="0" showMasterSp="0">
+<p:notes xmlns:a="http://schemas.openxmlformats.org/drawingml/2006/main" xmlns:r="http://schemas.openxmlformats.org/officeDocument/2006/relationships" xmlns:p="http://schemas.openxmlformats.org/presentationml/2006/main" showMasterSp="0" showMasterPhAnim="0">
   <p:cSld>
     <p:spTree>
       <p:nvGrpSpPr>
-        <p:cNvPr id="67" name="Shape 67"/>
+        <p:cNvPr id="1" name="Shape 67"/>
         <p:cNvGrpSpPr/>
         <p:nvPr/>
       </p:nvGrpSpPr>
@@ -993,9 +1023,11 @@
       <p:sp>
         <p:nvSpPr>
           <p:cNvPr id="68" name="Google Shape;68;g29f43f0a72_0_5:notes"/>
-          <p:cNvSpPr/>
+          <p:cNvSpPr>
+            <a:spLocks noGrp="1" noRot="1" noChangeAspect="1"/>
+          </p:cNvSpPr>
           <p:nvPr>
-            <p:ph idx="2" type="sldImg"/>
+            <p:ph type="sldImg" idx="2"/>
           </p:nvPr>
         </p:nvSpPr>
         <p:spPr>
@@ -1004,9 +1036,13 @@
             <a:ext cx="6096000" cy="3429000"/>
           </a:xfrm>
           <a:custGeom>
-            <a:rect b="b" l="l" r="r" t="t"/>
+            <a:avLst/>
+            <a:gdLst/>
+            <a:ahLst/>
+            <a:cxnLst/>
+            <a:rect l="l" t="t" r="r" b="b"/>
             <a:pathLst>
-              <a:path extrusionOk="0" h="120000" w="120000">
+              <a:path w="120000" h="120000" extrusionOk="0">
                 <a:moveTo>
                   <a:pt x="0" y="0"/>
                 </a:moveTo>
@@ -1028,9 +1064,11 @@
       <p:sp>
         <p:nvSpPr>
           <p:cNvPr id="69" name="Google Shape;69;g29f43f0a72_0_5:notes"/>
-          <p:cNvSpPr txBox="1"/>
+          <p:cNvSpPr txBox="1">
+            <a:spLocks noGrp="1"/>
+          </p:cNvSpPr>
           <p:nvPr>
-            <p:ph idx="1" type="body"/>
+            <p:ph type="body" idx="1"/>
           </p:nvPr>
         </p:nvSpPr>
         <p:spPr>
@@ -1043,12 +1081,12 @@
           </a:prstGeom>
         </p:spPr>
         <p:txBody>
-          <a:bodyPr anchorCtr="0" anchor="t" bIns="91425" lIns="91425" spcFirstLastPara="1" rIns="91425" wrap="square" tIns="91425">
+          <a:bodyPr spcFirstLastPara="1" wrap="square" lIns="91425" tIns="91425" rIns="91425" bIns="91425" anchor="t" anchorCtr="0">
             <a:noAutofit/>
           </a:bodyPr>
           <a:lstStyle/>
           <a:p>
-            <a:pPr indent="0" lvl="0" marL="0" rtl="0" algn="l">
+            <a:pPr marL="0" lvl="0" indent="0" algn="l" rtl="0">
               <a:spcBef>
                 <a:spcPts val="0"/>
               </a:spcBef>
@@ -1057,9 +1095,6 @@
               </a:spcAft>
               <a:buNone/>
             </a:pPr>
-            <a:r>
-              <a:t/>
-            </a:r>
             <a:endParaRPr/>
           </a:p>
         </p:txBody>
@@ -1073,11 +1108,11 @@
 </file>
 
 <file path=ppt/notesSlides/notesSlide5.xml><?xml version="1.0" encoding="utf-8"?>
-<p:notes xmlns:a="http://schemas.openxmlformats.org/drawingml/2006/main" xmlns:r="http://schemas.openxmlformats.org/officeDocument/2006/relationships" xmlns:mc="http://schemas.openxmlformats.org/markup-compatibility/2006" xmlns:mv="urn:schemas-microsoft-com:mac:vml" xmlns:p="http://schemas.openxmlformats.org/presentationml/2006/main" xmlns:c="http://schemas.openxmlformats.org/drawingml/2006/chart" xmlns:dgm="http://schemas.openxmlformats.org/drawingml/2006/diagram" xmlns:o="urn:schemas-microsoft-com:office:office" xmlns:v="urn:schemas-microsoft-com:vml" xmlns:pvml="urn:schemas-microsoft-com:office:powerpoint" xmlns:com="http://schemas.openxmlformats.org/drawingml/2006/compatibility" xmlns:p14="http://schemas.microsoft.com/office/powerpoint/2010/main" xmlns:p15="http://schemas.microsoft.com/office/powerpoint/2012/main" xmlns:ahyp="http://schemas.microsoft.com/office/drawing/2018/hyperlinkcolor" showMasterPhAnim="0" showMasterSp="0">
+<p:notes xmlns:a="http://schemas.openxmlformats.org/drawingml/2006/main" xmlns:r="http://schemas.openxmlformats.org/officeDocument/2006/relationships" xmlns:p="http://schemas.openxmlformats.org/presentationml/2006/main" showMasterSp="0" showMasterPhAnim="0">
   <p:cSld>
     <p:spTree>
       <p:nvGrpSpPr>
-        <p:cNvPr id="73" name="Shape 73"/>
+        <p:cNvPr id="1" name="Shape 73"/>
         <p:cNvGrpSpPr/>
         <p:nvPr/>
       </p:nvGrpSpPr>
@@ -1092,9 +1127,11 @@
       <p:sp>
         <p:nvSpPr>
           <p:cNvPr id="74" name="Google Shape;74;g29f43f0a72_0_15:notes"/>
-          <p:cNvSpPr/>
+          <p:cNvSpPr>
+            <a:spLocks noGrp="1" noRot="1" noChangeAspect="1"/>
+          </p:cNvSpPr>
           <p:nvPr>
-            <p:ph idx="2" type="sldImg"/>
+            <p:ph type="sldImg" idx="2"/>
           </p:nvPr>
         </p:nvSpPr>
         <p:spPr>
@@ -1103,9 +1140,13 @@
             <a:ext cx="6096000" cy="3429000"/>
           </a:xfrm>
           <a:custGeom>
-            <a:rect b="b" l="l" r="r" t="t"/>
+            <a:avLst/>
+            <a:gdLst/>
+            <a:ahLst/>
+            <a:cxnLst/>
+            <a:rect l="l" t="t" r="r" b="b"/>
             <a:pathLst>
-              <a:path extrusionOk="0" h="120000" w="120000">
+              <a:path w="120000" h="120000" extrusionOk="0">
                 <a:moveTo>
                   <a:pt x="0" y="0"/>
                 </a:moveTo>
@@ -1127,9 +1168,11 @@
       <p:sp>
         <p:nvSpPr>
           <p:cNvPr id="75" name="Google Shape;75;g29f43f0a72_0_15:notes"/>
-          <p:cNvSpPr txBox="1"/>
+          <p:cNvSpPr txBox="1">
+            <a:spLocks noGrp="1"/>
+          </p:cNvSpPr>
           <p:nvPr>
-            <p:ph idx="1" type="body"/>
+            <p:ph type="body" idx="1"/>
           </p:nvPr>
         </p:nvSpPr>
         <p:spPr>
@@ -1142,12 +1185,12 @@
           </a:prstGeom>
         </p:spPr>
         <p:txBody>
-          <a:bodyPr anchorCtr="0" anchor="t" bIns="91425" lIns="91425" spcFirstLastPara="1" rIns="91425" wrap="square" tIns="91425">
+          <a:bodyPr spcFirstLastPara="1" wrap="square" lIns="91425" tIns="91425" rIns="91425" bIns="91425" anchor="t" anchorCtr="0">
             <a:noAutofit/>
           </a:bodyPr>
           <a:lstStyle/>
           <a:p>
-            <a:pPr indent="0" lvl="0" marL="0" rtl="0" algn="l">
+            <a:pPr marL="0" lvl="0" indent="0" algn="l" rtl="0">
               <a:spcBef>
                 <a:spcPts val="0"/>
               </a:spcBef>
@@ -1156,9 +1199,6 @@
               </a:spcAft>
               <a:buNone/>
             </a:pPr>
-            <a:r>
-              <a:t/>
-            </a:r>
             <a:endParaRPr/>
           </a:p>
         </p:txBody>
@@ -1172,11 +1212,11 @@
 </file>
 
 <file path=ppt/notesSlides/notesSlide6.xml><?xml version="1.0" encoding="utf-8"?>
-<p:notes xmlns:a="http://schemas.openxmlformats.org/drawingml/2006/main" xmlns:r="http://schemas.openxmlformats.org/officeDocument/2006/relationships" xmlns:mc="http://schemas.openxmlformats.org/markup-compatibility/2006" xmlns:mv="urn:schemas-microsoft-com:mac:vml" xmlns:p="http://schemas.openxmlformats.org/presentationml/2006/main" xmlns:c="http://schemas.openxmlformats.org/drawingml/2006/chart" xmlns:dgm="http://schemas.openxmlformats.org/drawingml/2006/diagram" xmlns:o="urn:schemas-microsoft-com:office:office" xmlns:v="urn:schemas-microsoft-com:vml" xmlns:pvml="urn:schemas-microsoft-com:office:powerpoint" xmlns:com="http://schemas.openxmlformats.org/drawingml/2006/compatibility" xmlns:p14="http://schemas.microsoft.com/office/powerpoint/2010/main" xmlns:p15="http://schemas.microsoft.com/office/powerpoint/2012/main" xmlns:ahyp="http://schemas.microsoft.com/office/drawing/2018/hyperlinkcolor" showMasterPhAnim="0" showMasterSp="0">
+<p:notes xmlns:a="http://schemas.openxmlformats.org/drawingml/2006/main" xmlns:r="http://schemas.openxmlformats.org/officeDocument/2006/relationships" xmlns:p="http://schemas.openxmlformats.org/presentationml/2006/main" showMasterSp="0" showMasterPhAnim="0">
   <p:cSld>
     <p:spTree>
       <p:nvGrpSpPr>
-        <p:cNvPr id="78" name="Shape 78"/>
+        <p:cNvPr id="1" name="Shape 78"/>
         <p:cNvGrpSpPr/>
         <p:nvPr/>
       </p:nvGrpSpPr>
@@ -1191,9 +1231,11 @@
       <p:sp>
         <p:nvSpPr>
           <p:cNvPr id="79" name="Google Shape;79;g29f43f0a72_0_10:notes"/>
-          <p:cNvSpPr/>
+          <p:cNvSpPr>
+            <a:spLocks noGrp="1" noRot="1" noChangeAspect="1"/>
+          </p:cNvSpPr>
           <p:nvPr>
-            <p:ph idx="2" type="sldImg"/>
+            <p:ph type="sldImg" idx="2"/>
           </p:nvPr>
         </p:nvSpPr>
         <p:spPr>
@@ -1202,9 +1244,13 @@
             <a:ext cx="6096000" cy="3429000"/>
           </a:xfrm>
           <a:custGeom>
-            <a:rect b="b" l="l" r="r" t="t"/>
+            <a:avLst/>
+            <a:gdLst/>
+            <a:ahLst/>
+            <a:cxnLst/>
+            <a:rect l="l" t="t" r="r" b="b"/>
             <a:pathLst>
-              <a:path extrusionOk="0" h="120000" w="120000">
+              <a:path w="120000" h="120000" extrusionOk="0">
                 <a:moveTo>
                   <a:pt x="0" y="0"/>
                 </a:moveTo>
@@ -1226,9 +1272,11 @@
       <p:sp>
         <p:nvSpPr>
           <p:cNvPr id="80" name="Google Shape;80;g29f43f0a72_0_10:notes"/>
-          <p:cNvSpPr txBox="1"/>
+          <p:cNvSpPr txBox="1">
+            <a:spLocks noGrp="1"/>
+          </p:cNvSpPr>
           <p:nvPr>
-            <p:ph idx="1" type="body"/>
+            <p:ph type="body" idx="1"/>
           </p:nvPr>
         </p:nvSpPr>
         <p:spPr>
@@ -1241,12 +1289,12 @@
           </a:prstGeom>
         </p:spPr>
         <p:txBody>
-          <a:bodyPr anchorCtr="0" anchor="t" bIns="91425" lIns="91425" spcFirstLastPara="1" rIns="91425" wrap="square" tIns="91425">
+          <a:bodyPr spcFirstLastPara="1" wrap="square" lIns="91425" tIns="91425" rIns="91425" bIns="91425" anchor="t" anchorCtr="0">
             <a:noAutofit/>
           </a:bodyPr>
           <a:lstStyle/>
           <a:p>
-            <a:pPr indent="0" lvl="0" marL="0" rtl="0" algn="l">
+            <a:pPr marL="0" lvl="0" indent="0" algn="l" rtl="0">
               <a:spcBef>
                 <a:spcPts val="0"/>
               </a:spcBef>
@@ -1255,9 +1303,6 @@
               </a:spcAft>
               <a:buNone/>
             </a:pPr>
-            <a:r>
-              <a:t/>
-            </a:r>
             <a:endParaRPr/>
           </a:p>
         </p:txBody>
@@ -1271,11 +1316,11 @@
 </file>
 
 <file path=ppt/notesSlides/notesSlide7.xml><?xml version="1.0" encoding="utf-8"?>
-<p:notes xmlns:a="http://schemas.openxmlformats.org/drawingml/2006/main" xmlns:r="http://schemas.openxmlformats.org/officeDocument/2006/relationships" xmlns:mc="http://schemas.openxmlformats.org/markup-compatibility/2006" xmlns:mv="urn:schemas-microsoft-com:mac:vml" xmlns:p="http://schemas.openxmlformats.org/presentationml/2006/main" xmlns:c="http://schemas.openxmlformats.org/drawingml/2006/chart" xmlns:dgm="http://schemas.openxmlformats.org/drawingml/2006/diagram" xmlns:o="urn:schemas-microsoft-com:office:office" xmlns:v="urn:schemas-microsoft-com:vml" xmlns:pvml="urn:schemas-microsoft-com:office:powerpoint" xmlns:com="http://schemas.openxmlformats.org/drawingml/2006/compatibility" xmlns:p14="http://schemas.microsoft.com/office/powerpoint/2010/main" xmlns:p15="http://schemas.microsoft.com/office/powerpoint/2012/main" xmlns:ahyp="http://schemas.microsoft.com/office/drawing/2018/hyperlinkcolor" showMasterPhAnim="0" showMasterSp="0">
+<p:notes xmlns:a="http://schemas.openxmlformats.org/drawingml/2006/main" xmlns:r="http://schemas.openxmlformats.org/officeDocument/2006/relationships" xmlns:p="http://schemas.openxmlformats.org/presentationml/2006/main" showMasterSp="0" showMasterPhAnim="0">
   <p:cSld>
     <p:spTree>
       <p:nvGrpSpPr>
-        <p:cNvPr id="83" name="Shape 83"/>
+        <p:cNvPr id="1" name="Shape 83"/>
         <p:cNvGrpSpPr/>
         <p:nvPr/>
       </p:nvGrpSpPr>
@@ -1290,9 +1335,11 @@
       <p:sp>
         <p:nvSpPr>
           <p:cNvPr id="84" name="Google Shape;84;g29f43f0a72_0_24:notes"/>
-          <p:cNvSpPr/>
+          <p:cNvSpPr>
+            <a:spLocks noGrp="1" noRot="1" noChangeAspect="1"/>
+          </p:cNvSpPr>
           <p:nvPr>
-            <p:ph idx="2" type="sldImg"/>
+            <p:ph type="sldImg" idx="2"/>
           </p:nvPr>
         </p:nvSpPr>
         <p:spPr>
@@ -1301,9 +1348,13 @@
             <a:ext cx="6096000" cy="3429000"/>
           </a:xfrm>
           <a:custGeom>
-            <a:rect b="b" l="l" r="r" t="t"/>
+            <a:avLst/>
+            <a:gdLst/>
+            <a:ahLst/>
+            <a:cxnLst/>
+            <a:rect l="l" t="t" r="r" b="b"/>
             <a:pathLst>
-              <a:path extrusionOk="0" h="120000" w="120000">
+              <a:path w="120000" h="120000" extrusionOk="0">
                 <a:moveTo>
                   <a:pt x="0" y="0"/>
                 </a:moveTo>
@@ -1325,9 +1376,11 @@
       <p:sp>
         <p:nvSpPr>
           <p:cNvPr id="85" name="Google Shape;85;g29f43f0a72_0_24:notes"/>
-          <p:cNvSpPr txBox="1"/>
+          <p:cNvSpPr txBox="1">
+            <a:spLocks noGrp="1"/>
+          </p:cNvSpPr>
           <p:nvPr>
-            <p:ph idx="1" type="body"/>
+            <p:ph type="body" idx="1"/>
           </p:nvPr>
         </p:nvSpPr>
         <p:spPr>
@@ -1340,12 +1393,12 @@
           </a:prstGeom>
         </p:spPr>
         <p:txBody>
-          <a:bodyPr anchorCtr="0" anchor="t" bIns="91425" lIns="91425" spcFirstLastPara="1" rIns="91425" wrap="square" tIns="91425">
+          <a:bodyPr spcFirstLastPara="1" wrap="square" lIns="91425" tIns="91425" rIns="91425" bIns="91425" anchor="t" anchorCtr="0">
             <a:noAutofit/>
           </a:bodyPr>
           <a:lstStyle/>
           <a:p>
-            <a:pPr indent="0" lvl="0" marL="0" rtl="0" algn="l">
+            <a:pPr marL="0" lvl="0" indent="0" algn="l" rtl="0">
               <a:spcBef>
                 <a:spcPts val="0"/>
               </a:spcBef>
@@ -1354,9 +1407,6 @@
               </a:spcAft>
               <a:buNone/>
             </a:pPr>
-            <a:r>
-              <a:t/>
-            </a:r>
             <a:endParaRPr/>
           </a:p>
         </p:txBody>
@@ -1370,11 +1420,11 @@
 </file>
 
 <file path=ppt/slideLayouts/slideLayout1.xml><?xml version="1.0" encoding="utf-8"?>
-<p:sldLayout xmlns:a="http://schemas.openxmlformats.org/drawingml/2006/main" xmlns:r="http://schemas.openxmlformats.org/officeDocument/2006/relationships" xmlns:mc="http://schemas.openxmlformats.org/markup-compatibility/2006" xmlns:mv="urn:schemas-microsoft-com:mac:vml" xmlns:p="http://schemas.openxmlformats.org/presentationml/2006/main" xmlns:c="http://schemas.openxmlformats.org/drawingml/2006/chart" xmlns:dgm="http://schemas.openxmlformats.org/drawingml/2006/diagram" xmlns:o="urn:schemas-microsoft-com:office:office" xmlns:v="urn:schemas-microsoft-com:vml" xmlns:pvml="urn:schemas-microsoft-com:office:powerpoint" xmlns:com="http://schemas.openxmlformats.org/drawingml/2006/compatibility" xmlns:p14="http://schemas.microsoft.com/office/powerpoint/2010/main" xmlns:p15="http://schemas.microsoft.com/office/powerpoint/2012/main" xmlns:ahyp="http://schemas.microsoft.com/office/drawing/2018/hyperlinkcolor" matchingName="Title slide" type="title">
+<p:sldLayout xmlns:a="http://schemas.openxmlformats.org/drawingml/2006/main" xmlns:r="http://schemas.openxmlformats.org/officeDocument/2006/relationships" xmlns:p="http://schemas.openxmlformats.org/presentationml/2006/main" matchingName="Title slide" type="title">
   <p:cSld name="TITLE">
     <p:spTree>
       <p:nvGrpSpPr>
-        <p:cNvPr id="9" name="Shape 9"/>
+        <p:cNvPr id="1" name="Shape 9"/>
         <p:cNvGrpSpPr/>
         <p:nvPr/>
       </p:nvGrpSpPr>
@@ -1389,7 +1439,9 @@
       <p:sp>
         <p:nvSpPr>
           <p:cNvPr id="10" name="Google Shape;10;p2"/>
-          <p:cNvSpPr txBox="1"/>
+          <p:cNvSpPr txBox="1">
+            <a:spLocks noGrp="1"/>
+          </p:cNvSpPr>
           <p:nvPr>
             <p:ph type="ctrTitle"/>
           </p:nvPr>
@@ -1404,7 +1456,7 @@
           </a:prstGeom>
         </p:spPr>
         <p:txBody>
-          <a:bodyPr anchorCtr="0" anchor="b" bIns="91425" lIns="91425" spcFirstLastPara="1" rIns="91425" wrap="square" tIns="91425">
+          <a:bodyPr spcFirstLastPara="1" wrap="square" lIns="91425" tIns="91425" rIns="91425" bIns="91425" anchor="b" anchorCtr="0">
             <a:noAutofit/>
           </a:bodyPr>
           <a:lstStyle>
@@ -1508,15 +1560,19 @@
               <a:defRPr sz="5200"/>
             </a:lvl9pPr>
           </a:lstStyle>
-          <a:p/>
+          <a:p>
+            <a:endParaRPr/>
+          </a:p>
         </p:txBody>
       </p:sp>
       <p:sp>
         <p:nvSpPr>
           <p:cNvPr id="11" name="Google Shape;11;p2"/>
-          <p:cNvSpPr txBox="1"/>
+          <p:cNvSpPr txBox="1">
+            <a:spLocks noGrp="1"/>
+          </p:cNvSpPr>
           <p:nvPr>
-            <p:ph idx="1" type="subTitle"/>
+            <p:ph type="subTitle" idx="1"/>
           </p:nvPr>
         </p:nvSpPr>
         <p:spPr>
@@ -1529,7 +1585,7 @@
           </a:prstGeom>
         </p:spPr>
         <p:txBody>
-          <a:bodyPr anchorCtr="0" anchor="t" bIns="91425" lIns="91425" spcFirstLastPara="1" rIns="91425" wrap="square" tIns="91425">
+          <a:bodyPr spcFirstLastPara="1" wrap="square" lIns="91425" tIns="91425" rIns="91425" bIns="91425" anchor="t" anchorCtr="0">
             <a:noAutofit/>
           </a:bodyPr>
           <a:lstStyle>
@@ -1660,15 +1716,19 @@
               <a:defRPr sz="2800"/>
             </a:lvl9pPr>
           </a:lstStyle>
-          <a:p/>
+          <a:p>
+            <a:endParaRPr/>
+          </a:p>
         </p:txBody>
       </p:sp>
       <p:sp>
         <p:nvSpPr>
           <p:cNvPr id="12" name="Google Shape;12;p2"/>
-          <p:cNvSpPr txBox="1"/>
+          <p:cNvSpPr txBox="1">
+            <a:spLocks noGrp="1"/>
+          </p:cNvSpPr>
           <p:nvPr>
-            <p:ph idx="12" type="sldNum"/>
+            <p:ph type="sldNum" idx="12"/>
           </p:nvPr>
         </p:nvSpPr>
         <p:spPr>
@@ -1681,7 +1741,7 @@
           </a:prstGeom>
         </p:spPr>
         <p:txBody>
-          <a:bodyPr anchorCtr="0" anchor="ctr" bIns="91425" lIns="91425" spcFirstLastPara="1" rIns="91425" wrap="square" tIns="91425">
+          <a:bodyPr spcFirstLastPara="1" wrap="square" lIns="91425" tIns="91425" rIns="91425" bIns="91425" anchor="ctr" anchorCtr="0">
             <a:noAutofit/>
           </a:bodyPr>
           <a:lstStyle>
@@ -1723,7 +1783,7 @@
             </a:lvl9pPr>
           </a:lstStyle>
           <a:p>
-            <a:pPr indent="0" lvl="0" marL="0" rtl="0" algn="r">
+            <a:pPr marL="0" lvl="0" indent="0" algn="r" rtl="0">
               <a:spcBef>
                 <a:spcPts val="0"/>
               </a:spcBef>
@@ -1749,11 +1809,11 @@
 </file>
 
 <file path=ppt/slideLayouts/slideLayout10.xml><?xml version="1.0" encoding="utf-8"?>
-<p:sldLayout xmlns:a="http://schemas.openxmlformats.org/drawingml/2006/main" xmlns:r="http://schemas.openxmlformats.org/officeDocument/2006/relationships" xmlns:mc="http://schemas.openxmlformats.org/markup-compatibility/2006" xmlns:mv="urn:schemas-microsoft-com:mac:vml" xmlns:p="http://schemas.openxmlformats.org/presentationml/2006/main" xmlns:c="http://schemas.openxmlformats.org/drawingml/2006/chart" xmlns:dgm="http://schemas.openxmlformats.org/drawingml/2006/diagram" xmlns:o="urn:schemas-microsoft-com:office:office" xmlns:v="urn:schemas-microsoft-com:vml" xmlns:pvml="urn:schemas-microsoft-com:office:powerpoint" xmlns:com="http://schemas.openxmlformats.org/drawingml/2006/compatibility" xmlns:p14="http://schemas.microsoft.com/office/powerpoint/2010/main" xmlns:p15="http://schemas.microsoft.com/office/powerpoint/2012/main" xmlns:ahyp="http://schemas.microsoft.com/office/drawing/2018/hyperlinkcolor" matchingName="Big number">
+<p:sldLayout xmlns:a="http://schemas.openxmlformats.org/drawingml/2006/main" xmlns:r="http://schemas.openxmlformats.org/officeDocument/2006/relationships" xmlns:p="http://schemas.openxmlformats.org/presentationml/2006/main" matchingName="Big number">
   <p:cSld name="BIG_NUMBER">
     <p:spTree>
       <p:nvGrpSpPr>
-        <p:cNvPr id="44" name="Shape 44"/>
+        <p:cNvPr id="1" name="Shape 44"/>
         <p:cNvGrpSpPr/>
         <p:nvPr/>
       </p:nvGrpSpPr>
@@ -1768,9 +1828,11 @@
       <p:sp>
         <p:nvSpPr>
           <p:cNvPr id="45" name="Google Shape;45;p11"/>
-          <p:cNvSpPr txBox="1"/>
+          <p:cNvSpPr txBox="1">
+            <a:spLocks noGrp="1"/>
+          </p:cNvSpPr>
           <p:nvPr>
-            <p:ph hasCustomPrompt="1" type="title"/>
+            <p:ph type="title" hasCustomPrompt="1"/>
           </p:nvPr>
         </p:nvSpPr>
         <p:spPr>
@@ -1783,7 +1845,7 @@
           </a:prstGeom>
         </p:spPr>
         <p:txBody>
-          <a:bodyPr anchorCtr="0" anchor="b" bIns="91425" lIns="91425" spcFirstLastPara="1" rIns="91425" wrap="square" tIns="91425">
+          <a:bodyPr spcFirstLastPara="1" wrap="square" lIns="91425" tIns="91425" rIns="91425" bIns="91425" anchor="b" anchorCtr="0">
             <a:noAutofit/>
           </a:bodyPr>
           <a:lstStyle>
@@ -1897,9 +1959,11 @@
       <p:sp>
         <p:nvSpPr>
           <p:cNvPr id="46" name="Google Shape;46;p11"/>
-          <p:cNvSpPr txBox="1"/>
+          <p:cNvSpPr txBox="1">
+            <a:spLocks noGrp="1"/>
+          </p:cNvSpPr>
           <p:nvPr>
-            <p:ph idx="1" type="body"/>
+            <p:ph type="body" idx="1"/>
           </p:nvPr>
         </p:nvSpPr>
         <p:spPr>
@@ -1912,11 +1976,11 @@
           </a:prstGeom>
         </p:spPr>
         <p:txBody>
-          <a:bodyPr anchorCtr="0" anchor="t" bIns="91425" lIns="91425" spcFirstLastPara="1" rIns="91425" wrap="square" tIns="91425">
+          <a:bodyPr spcFirstLastPara="1" wrap="square" lIns="91425" tIns="91425" rIns="91425" bIns="91425" anchor="t" anchorCtr="0">
             <a:noAutofit/>
           </a:bodyPr>
           <a:lstStyle>
-            <a:lvl1pPr indent="-342900" lvl="0" marL="457200" algn="ctr">
+            <a:lvl1pPr marL="457200" lvl="0" indent="-342900" algn="ctr">
               <a:spcBef>
                 <a:spcPts val="0"/>
               </a:spcBef>
@@ -1927,7 +1991,7 @@
               <a:buChar char="●"/>
               <a:defRPr/>
             </a:lvl1pPr>
-            <a:lvl2pPr indent="-317500" lvl="1" marL="914400" algn="ctr">
+            <a:lvl2pPr marL="914400" lvl="1" indent="-317500" algn="ctr">
               <a:spcBef>
                 <a:spcPts val="1600"/>
               </a:spcBef>
@@ -1938,7 +2002,7 @@
               <a:buChar char="○"/>
               <a:defRPr/>
             </a:lvl2pPr>
-            <a:lvl3pPr indent="-317500" lvl="2" marL="1371600" algn="ctr">
+            <a:lvl3pPr marL="1371600" lvl="2" indent="-317500" algn="ctr">
               <a:spcBef>
                 <a:spcPts val="1600"/>
               </a:spcBef>
@@ -1949,7 +2013,7 @@
               <a:buChar char="■"/>
               <a:defRPr/>
             </a:lvl3pPr>
-            <a:lvl4pPr indent="-317500" lvl="3" marL="1828800" algn="ctr">
+            <a:lvl4pPr marL="1828800" lvl="3" indent="-317500" algn="ctr">
               <a:spcBef>
                 <a:spcPts val="1600"/>
               </a:spcBef>
@@ -1960,7 +2024,7 @@
               <a:buChar char="●"/>
               <a:defRPr/>
             </a:lvl4pPr>
-            <a:lvl5pPr indent="-317500" lvl="4" marL="2286000" algn="ctr">
+            <a:lvl5pPr marL="2286000" lvl="4" indent="-317500" algn="ctr">
               <a:spcBef>
                 <a:spcPts val="1600"/>
               </a:spcBef>
@@ -1971,7 +2035,7 @@
               <a:buChar char="○"/>
               <a:defRPr/>
             </a:lvl5pPr>
-            <a:lvl6pPr indent="-317500" lvl="5" marL="2743200" algn="ctr">
+            <a:lvl6pPr marL="2743200" lvl="5" indent="-317500" algn="ctr">
               <a:spcBef>
                 <a:spcPts val="1600"/>
               </a:spcBef>
@@ -1982,7 +2046,7 @@
               <a:buChar char="■"/>
               <a:defRPr/>
             </a:lvl6pPr>
-            <a:lvl7pPr indent="-317500" lvl="6" marL="3200400" algn="ctr">
+            <a:lvl7pPr marL="3200400" lvl="6" indent="-317500" algn="ctr">
               <a:spcBef>
                 <a:spcPts val="1600"/>
               </a:spcBef>
@@ -1993,7 +2057,7 @@
               <a:buChar char="●"/>
               <a:defRPr/>
             </a:lvl7pPr>
-            <a:lvl8pPr indent="-317500" lvl="7" marL="3657600" algn="ctr">
+            <a:lvl8pPr marL="3657600" lvl="7" indent="-317500" algn="ctr">
               <a:spcBef>
                 <a:spcPts val="1600"/>
               </a:spcBef>
@@ -2004,7 +2068,7 @@
               <a:buChar char="○"/>
               <a:defRPr/>
             </a:lvl8pPr>
-            <a:lvl9pPr indent="-317500" lvl="8" marL="4114800" algn="ctr">
+            <a:lvl9pPr marL="4114800" lvl="8" indent="-317500" algn="ctr">
               <a:spcBef>
                 <a:spcPts val="1600"/>
               </a:spcBef>
@@ -2016,15 +2080,19 @@
               <a:defRPr/>
             </a:lvl9pPr>
           </a:lstStyle>
-          <a:p/>
+          <a:p>
+            <a:endParaRPr/>
+          </a:p>
         </p:txBody>
       </p:sp>
       <p:sp>
         <p:nvSpPr>
           <p:cNvPr id="47" name="Google Shape;47;p11"/>
-          <p:cNvSpPr txBox="1"/>
+          <p:cNvSpPr txBox="1">
+            <a:spLocks noGrp="1"/>
+          </p:cNvSpPr>
           <p:nvPr>
-            <p:ph idx="12" type="sldNum"/>
+            <p:ph type="sldNum" idx="12"/>
           </p:nvPr>
         </p:nvSpPr>
         <p:spPr>
@@ -2037,7 +2105,7 @@
           </a:prstGeom>
         </p:spPr>
         <p:txBody>
-          <a:bodyPr anchorCtr="0" anchor="ctr" bIns="91425" lIns="91425" spcFirstLastPara="1" rIns="91425" wrap="square" tIns="91425">
+          <a:bodyPr spcFirstLastPara="1" wrap="square" lIns="91425" tIns="91425" rIns="91425" bIns="91425" anchor="ctr" anchorCtr="0">
             <a:noAutofit/>
           </a:bodyPr>
           <a:lstStyle>
@@ -2079,7 +2147,7 @@
             </a:lvl9pPr>
           </a:lstStyle>
           <a:p>
-            <a:pPr indent="0" lvl="0" marL="0" rtl="0" algn="r">
+            <a:pPr marL="0" lvl="0" indent="0" algn="r" rtl="0">
               <a:spcBef>
                 <a:spcPts val="0"/>
               </a:spcBef>
@@ -2105,11 +2173,11 @@
 </file>
 
 <file path=ppt/slideLayouts/slideLayout11.xml><?xml version="1.0" encoding="utf-8"?>
-<p:sldLayout xmlns:a="http://schemas.openxmlformats.org/drawingml/2006/main" xmlns:r="http://schemas.openxmlformats.org/officeDocument/2006/relationships" xmlns:mc="http://schemas.openxmlformats.org/markup-compatibility/2006" xmlns:mv="urn:schemas-microsoft-com:mac:vml" xmlns:p="http://schemas.openxmlformats.org/presentationml/2006/main" xmlns:c="http://schemas.openxmlformats.org/drawingml/2006/chart" xmlns:dgm="http://schemas.openxmlformats.org/drawingml/2006/diagram" xmlns:o="urn:schemas-microsoft-com:office:office" xmlns:v="urn:schemas-microsoft-com:vml" xmlns:pvml="urn:schemas-microsoft-com:office:powerpoint" xmlns:com="http://schemas.openxmlformats.org/drawingml/2006/compatibility" xmlns:p14="http://schemas.microsoft.com/office/powerpoint/2010/main" xmlns:p15="http://schemas.microsoft.com/office/powerpoint/2012/main" xmlns:ahyp="http://schemas.microsoft.com/office/drawing/2018/hyperlinkcolor" matchingName="Blank" type="blank">
+<p:sldLayout xmlns:a="http://schemas.openxmlformats.org/drawingml/2006/main" xmlns:r="http://schemas.openxmlformats.org/officeDocument/2006/relationships" xmlns:p="http://schemas.openxmlformats.org/presentationml/2006/main" matchingName="Blank" type="blank">
   <p:cSld name="BLANK">
     <p:spTree>
       <p:nvGrpSpPr>
-        <p:cNvPr id="48" name="Shape 48"/>
+        <p:cNvPr id="1" name="Shape 48"/>
         <p:cNvGrpSpPr/>
         <p:nvPr/>
       </p:nvGrpSpPr>
@@ -2124,9 +2192,11 @@
       <p:sp>
         <p:nvSpPr>
           <p:cNvPr id="49" name="Google Shape;49;p12"/>
-          <p:cNvSpPr txBox="1"/>
+          <p:cNvSpPr txBox="1">
+            <a:spLocks noGrp="1"/>
+          </p:cNvSpPr>
           <p:nvPr>
-            <p:ph idx="12" type="sldNum"/>
+            <p:ph type="sldNum" idx="12"/>
           </p:nvPr>
         </p:nvSpPr>
         <p:spPr>
@@ -2139,7 +2209,7 @@
           </a:prstGeom>
         </p:spPr>
         <p:txBody>
-          <a:bodyPr anchorCtr="0" anchor="ctr" bIns="91425" lIns="91425" spcFirstLastPara="1" rIns="91425" wrap="square" tIns="91425">
+          <a:bodyPr spcFirstLastPara="1" wrap="square" lIns="91425" tIns="91425" rIns="91425" bIns="91425" anchor="ctr" anchorCtr="0">
             <a:noAutofit/>
           </a:bodyPr>
           <a:lstStyle>
@@ -2181,7 +2251,7 @@
             </a:lvl9pPr>
           </a:lstStyle>
           <a:p>
-            <a:pPr indent="0" lvl="0" marL="0" rtl="0" algn="r">
+            <a:pPr marL="0" lvl="0" indent="0" algn="r" rtl="0">
               <a:spcBef>
                 <a:spcPts val="0"/>
               </a:spcBef>
@@ -2207,11 +2277,11 @@
 </file>
 
 <file path=ppt/slideLayouts/slideLayout2.xml><?xml version="1.0" encoding="utf-8"?>
-<p:sldLayout xmlns:a="http://schemas.openxmlformats.org/drawingml/2006/main" xmlns:r="http://schemas.openxmlformats.org/officeDocument/2006/relationships" xmlns:mc="http://schemas.openxmlformats.org/markup-compatibility/2006" xmlns:mv="urn:schemas-microsoft-com:mac:vml" xmlns:p="http://schemas.openxmlformats.org/presentationml/2006/main" xmlns:c="http://schemas.openxmlformats.org/drawingml/2006/chart" xmlns:dgm="http://schemas.openxmlformats.org/drawingml/2006/diagram" xmlns:o="urn:schemas-microsoft-com:office:office" xmlns:v="urn:schemas-microsoft-com:vml" xmlns:pvml="urn:schemas-microsoft-com:office:powerpoint" xmlns:com="http://schemas.openxmlformats.org/drawingml/2006/compatibility" xmlns:p14="http://schemas.microsoft.com/office/powerpoint/2010/main" xmlns:p15="http://schemas.microsoft.com/office/powerpoint/2012/main" xmlns:ahyp="http://schemas.microsoft.com/office/drawing/2018/hyperlinkcolor" matchingName="Section header" type="secHead">
+<p:sldLayout xmlns:a="http://schemas.openxmlformats.org/drawingml/2006/main" xmlns:r="http://schemas.openxmlformats.org/officeDocument/2006/relationships" xmlns:p="http://schemas.openxmlformats.org/presentationml/2006/main" matchingName="Section header" type="secHead">
   <p:cSld name="SECTION_HEADER">
     <p:spTree>
       <p:nvGrpSpPr>
-        <p:cNvPr id="13" name="Shape 13"/>
+        <p:cNvPr id="1" name="Shape 13"/>
         <p:cNvGrpSpPr/>
         <p:nvPr/>
       </p:nvGrpSpPr>
@@ -2226,7 +2296,9 @@
       <p:sp>
         <p:nvSpPr>
           <p:cNvPr id="14" name="Google Shape;14;p3"/>
-          <p:cNvSpPr txBox="1"/>
+          <p:cNvSpPr txBox="1">
+            <a:spLocks noGrp="1"/>
+          </p:cNvSpPr>
           <p:nvPr>
             <p:ph type="title"/>
           </p:nvPr>
@@ -2241,7 +2313,7 @@
           </a:prstGeom>
         </p:spPr>
         <p:txBody>
-          <a:bodyPr anchorCtr="0" anchor="ctr" bIns="91425" lIns="91425" spcFirstLastPara="1" rIns="91425" wrap="square" tIns="91425">
+          <a:bodyPr spcFirstLastPara="1" wrap="square" lIns="91425" tIns="91425" rIns="91425" bIns="91425" anchor="ctr" anchorCtr="0">
             <a:noAutofit/>
           </a:bodyPr>
           <a:lstStyle>
@@ -2345,15 +2417,19 @@
               <a:defRPr sz="3600"/>
             </a:lvl9pPr>
           </a:lstStyle>
-          <a:p/>
+          <a:p>
+            <a:endParaRPr/>
+          </a:p>
         </p:txBody>
       </p:sp>
       <p:sp>
         <p:nvSpPr>
           <p:cNvPr id="15" name="Google Shape;15;p3"/>
-          <p:cNvSpPr txBox="1"/>
+          <p:cNvSpPr txBox="1">
+            <a:spLocks noGrp="1"/>
+          </p:cNvSpPr>
           <p:nvPr>
-            <p:ph idx="12" type="sldNum"/>
+            <p:ph type="sldNum" idx="12"/>
           </p:nvPr>
         </p:nvSpPr>
         <p:spPr>
@@ -2366,7 +2442,7 @@
           </a:prstGeom>
         </p:spPr>
         <p:txBody>
-          <a:bodyPr anchorCtr="0" anchor="ctr" bIns="91425" lIns="91425" spcFirstLastPara="1" rIns="91425" wrap="square" tIns="91425">
+          <a:bodyPr spcFirstLastPara="1" wrap="square" lIns="91425" tIns="91425" rIns="91425" bIns="91425" anchor="ctr" anchorCtr="0">
             <a:noAutofit/>
           </a:bodyPr>
           <a:lstStyle>
@@ -2408,7 +2484,7 @@
             </a:lvl9pPr>
           </a:lstStyle>
           <a:p>
-            <a:pPr indent="0" lvl="0" marL="0" rtl="0" algn="r">
+            <a:pPr marL="0" lvl="0" indent="0" algn="r" rtl="0">
               <a:spcBef>
                 <a:spcPts val="0"/>
               </a:spcBef>
@@ -2434,11 +2510,11 @@
 </file>
 
 <file path=ppt/slideLayouts/slideLayout3.xml><?xml version="1.0" encoding="utf-8"?>
-<p:sldLayout xmlns:a="http://schemas.openxmlformats.org/drawingml/2006/main" xmlns:r="http://schemas.openxmlformats.org/officeDocument/2006/relationships" xmlns:mc="http://schemas.openxmlformats.org/markup-compatibility/2006" xmlns:mv="urn:schemas-microsoft-com:mac:vml" xmlns:p="http://schemas.openxmlformats.org/presentationml/2006/main" xmlns:c="http://schemas.openxmlformats.org/drawingml/2006/chart" xmlns:dgm="http://schemas.openxmlformats.org/drawingml/2006/diagram" xmlns:o="urn:schemas-microsoft-com:office:office" xmlns:v="urn:schemas-microsoft-com:vml" xmlns:pvml="urn:schemas-microsoft-com:office:powerpoint" xmlns:com="http://schemas.openxmlformats.org/drawingml/2006/compatibility" xmlns:p14="http://schemas.microsoft.com/office/powerpoint/2010/main" xmlns:p15="http://schemas.microsoft.com/office/powerpoint/2012/main" xmlns:ahyp="http://schemas.microsoft.com/office/drawing/2018/hyperlinkcolor" matchingName="Title and body" type="tx">
+<p:sldLayout xmlns:a="http://schemas.openxmlformats.org/drawingml/2006/main" xmlns:r="http://schemas.openxmlformats.org/officeDocument/2006/relationships" xmlns:p="http://schemas.openxmlformats.org/presentationml/2006/main" matchingName="Title and body" type="tx">
   <p:cSld name="TITLE_AND_BODY">
     <p:spTree>
       <p:nvGrpSpPr>
-        <p:cNvPr id="16" name="Shape 16"/>
+        <p:cNvPr id="1" name="Shape 16"/>
         <p:cNvGrpSpPr/>
         <p:nvPr/>
       </p:nvGrpSpPr>
@@ -2453,7 +2529,9 @@
       <p:sp>
         <p:nvSpPr>
           <p:cNvPr id="17" name="Google Shape;17;p4"/>
-          <p:cNvSpPr txBox="1"/>
+          <p:cNvSpPr txBox="1">
+            <a:spLocks noGrp="1"/>
+          </p:cNvSpPr>
           <p:nvPr>
             <p:ph type="title"/>
           </p:nvPr>
@@ -2468,7 +2546,7 @@
           </a:prstGeom>
         </p:spPr>
         <p:txBody>
-          <a:bodyPr anchorCtr="0" anchor="t" bIns="91425" lIns="91425" spcFirstLastPara="1" rIns="91425" wrap="square" tIns="91425">
+          <a:bodyPr spcFirstLastPara="1" wrap="square" lIns="91425" tIns="91425" rIns="91425" bIns="91425" anchor="t" anchorCtr="0">
             <a:noAutofit/>
           </a:bodyPr>
           <a:lstStyle>
@@ -2572,15 +2650,19 @@
               <a:defRPr/>
             </a:lvl9pPr>
           </a:lstStyle>
-          <a:p/>
+          <a:p>
+            <a:endParaRPr/>
+          </a:p>
         </p:txBody>
       </p:sp>
       <p:sp>
         <p:nvSpPr>
           <p:cNvPr id="18" name="Google Shape;18;p4"/>
-          <p:cNvSpPr txBox="1"/>
+          <p:cNvSpPr txBox="1">
+            <a:spLocks noGrp="1"/>
+          </p:cNvSpPr>
           <p:nvPr>
-            <p:ph idx="1" type="body"/>
+            <p:ph type="body" idx="1"/>
           </p:nvPr>
         </p:nvSpPr>
         <p:spPr>
@@ -2593,11 +2675,11 @@
           </a:prstGeom>
         </p:spPr>
         <p:txBody>
-          <a:bodyPr anchorCtr="0" anchor="t" bIns="91425" lIns="91425" spcFirstLastPara="1" rIns="91425" wrap="square" tIns="91425">
+          <a:bodyPr spcFirstLastPara="1" wrap="square" lIns="91425" tIns="91425" rIns="91425" bIns="91425" anchor="t" anchorCtr="0">
             <a:noAutofit/>
           </a:bodyPr>
           <a:lstStyle>
-            <a:lvl1pPr indent="-342900" lvl="0" marL="457200">
+            <a:lvl1pPr marL="457200" lvl="0" indent="-342900">
               <a:spcBef>
                 <a:spcPts val="0"/>
               </a:spcBef>
@@ -2608,7 +2690,7 @@
               <a:buChar char="●"/>
               <a:defRPr/>
             </a:lvl1pPr>
-            <a:lvl2pPr indent="-317500" lvl="1" marL="914400">
+            <a:lvl2pPr marL="914400" lvl="1" indent="-317500">
               <a:spcBef>
                 <a:spcPts val="1600"/>
               </a:spcBef>
@@ -2619,7 +2701,7 @@
               <a:buChar char="○"/>
               <a:defRPr/>
             </a:lvl2pPr>
-            <a:lvl3pPr indent="-317500" lvl="2" marL="1371600">
+            <a:lvl3pPr marL="1371600" lvl="2" indent="-317500">
               <a:spcBef>
                 <a:spcPts val="1600"/>
               </a:spcBef>
@@ -2630,7 +2712,7 @@
               <a:buChar char="■"/>
               <a:defRPr/>
             </a:lvl3pPr>
-            <a:lvl4pPr indent="-317500" lvl="3" marL="1828800">
+            <a:lvl4pPr marL="1828800" lvl="3" indent="-317500">
               <a:spcBef>
                 <a:spcPts val="1600"/>
               </a:spcBef>
@@ -2641,7 +2723,7 @@
               <a:buChar char="●"/>
               <a:defRPr/>
             </a:lvl4pPr>
-            <a:lvl5pPr indent="-317500" lvl="4" marL="2286000">
+            <a:lvl5pPr marL="2286000" lvl="4" indent="-317500">
               <a:spcBef>
                 <a:spcPts val="1600"/>
               </a:spcBef>
@@ -2652,7 +2734,7 @@
               <a:buChar char="○"/>
               <a:defRPr/>
             </a:lvl5pPr>
-            <a:lvl6pPr indent="-317500" lvl="5" marL="2743200">
+            <a:lvl6pPr marL="2743200" lvl="5" indent="-317500">
               <a:spcBef>
                 <a:spcPts val="1600"/>
               </a:spcBef>
@@ -2663,7 +2745,7 @@
               <a:buChar char="■"/>
               <a:defRPr/>
             </a:lvl6pPr>
-            <a:lvl7pPr indent="-317500" lvl="6" marL="3200400">
+            <a:lvl7pPr marL="3200400" lvl="6" indent="-317500">
               <a:spcBef>
                 <a:spcPts val="1600"/>
               </a:spcBef>
@@ -2674,7 +2756,7 @@
               <a:buChar char="●"/>
               <a:defRPr/>
             </a:lvl7pPr>
-            <a:lvl8pPr indent="-317500" lvl="7" marL="3657600">
+            <a:lvl8pPr marL="3657600" lvl="7" indent="-317500">
               <a:spcBef>
                 <a:spcPts val="1600"/>
               </a:spcBef>
@@ -2685,7 +2767,7 @@
               <a:buChar char="○"/>
               <a:defRPr/>
             </a:lvl8pPr>
-            <a:lvl9pPr indent="-317500" lvl="8" marL="4114800">
+            <a:lvl9pPr marL="4114800" lvl="8" indent="-317500">
               <a:spcBef>
                 <a:spcPts val="1600"/>
               </a:spcBef>
@@ -2697,15 +2779,19 @@
               <a:defRPr/>
             </a:lvl9pPr>
           </a:lstStyle>
-          <a:p/>
+          <a:p>
+            <a:endParaRPr/>
+          </a:p>
         </p:txBody>
       </p:sp>
       <p:sp>
         <p:nvSpPr>
           <p:cNvPr id="19" name="Google Shape;19;p4"/>
-          <p:cNvSpPr txBox="1"/>
+          <p:cNvSpPr txBox="1">
+            <a:spLocks noGrp="1"/>
+          </p:cNvSpPr>
           <p:nvPr>
-            <p:ph idx="12" type="sldNum"/>
+            <p:ph type="sldNum" idx="12"/>
           </p:nvPr>
         </p:nvSpPr>
         <p:spPr>
@@ -2718,7 +2804,7 @@
           </a:prstGeom>
         </p:spPr>
         <p:txBody>
-          <a:bodyPr anchorCtr="0" anchor="ctr" bIns="91425" lIns="91425" spcFirstLastPara="1" rIns="91425" wrap="square" tIns="91425">
+          <a:bodyPr spcFirstLastPara="1" wrap="square" lIns="91425" tIns="91425" rIns="91425" bIns="91425" anchor="ctr" anchorCtr="0">
             <a:noAutofit/>
           </a:bodyPr>
           <a:lstStyle>
@@ -2760,7 +2846,7 @@
             </a:lvl9pPr>
           </a:lstStyle>
           <a:p>
-            <a:pPr indent="0" lvl="0" marL="0" rtl="0" algn="r">
+            <a:pPr marL="0" lvl="0" indent="0" algn="r" rtl="0">
               <a:spcBef>
                 <a:spcPts val="0"/>
               </a:spcBef>
@@ -2786,11 +2872,11 @@
 </file>
 
 <file path=ppt/slideLayouts/slideLayout4.xml><?xml version="1.0" encoding="utf-8"?>
-<p:sldLayout xmlns:a="http://schemas.openxmlformats.org/drawingml/2006/main" xmlns:r="http://schemas.openxmlformats.org/officeDocument/2006/relationships" xmlns:mc="http://schemas.openxmlformats.org/markup-compatibility/2006" xmlns:mv="urn:schemas-microsoft-com:mac:vml" xmlns:p="http://schemas.openxmlformats.org/presentationml/2006/main" xmlns:c="http://schemas.openxmlformats.org/drawingml/2006/chart" xmlns:dgm="http://schemas.openxmlformats.org/drawingml/2006/diagram" xmlns:o="urn:schemas-microsoft-com:office:office" xmlns:v="urn:schemas-microsoft-com:vml" xmlns:pvml="urn:schemas-microsoft-com:office:powerpoint" xmlns:com="http://schemas.openxmlformats.org/drawingml/2006/compatibility" xmlns:p14="http://schemas.microsoft.com/office/powerpoint/2010/main" xmlns:p15="http://schemas.microsoft.com/office/powerpoint/2012/main" xmlns:ahyp="http://schemas.microsoft.com/office/drawing/2018/hyperlinkcolor" matchingName="Title and two columns" type="twoColTx">
+<p:sldLayout xmlns:a="http://schemas.openxmlformats.org/drawingml/2006/main" xmlns:r="http://schemas.openxmlformats.org/officeDocument/2006/relationships" xmlns:p="http://schemas.openxmlformats.org/presentationml/2006/main" matchingName="Title and two columns" type="twoColTx">
   <p:cSld name="TITLE_AND_TWO_COLUMNS">
     <p:spTree>
       <p:nvGrpSpPr>
-        <p:cNvPr id="20" name="Shape 20"/>
+        <p:cNvPr id="1" name="Shape 20"/>
         <p:cNvGrpSpPr/>
         <p:nvPr/>
       </p:nvGrpSpPr>
@@ -2805,7 +2891,9 @@
       <p:sp>
         <p:nvSpPr>
           <p:cNvPr id="21" name="Google Shape;21;p5"/>
-          <p:cNvSpPr txBox="1"/>
+          <p:cNvSpPr txBox="1">
+            <a:spLocks noGrp="1"/>
+          </p:cNvSpPr>
           <p:nvPr>
             <p:ph type="title"/>
           </p:nvPr>
@@ -2820,7 +2908,7 @@
           </a:prstGeom>
         </p:spPr>
         <p:txBody>
-          <a:bodyPr anchorCtr="0" anchor="t" bIns="91425" lIns="91425" spcFirstLastPara="1" rIns="91425" wrap="square" tIns="91425">
+          <a:bodyPr spcFirstLastPara="1" wrap="square" lIns="91425" tIns="91425" rIns="91425" bIns="91425" anchor="t" anchorCtr="0">
             <a:noAutofit/>
           </a:bodyPr>
           <a:lstStyle>
@@ -2924,15 +3012,19 @@
               <a:defRPr/>
             </a:lvl9pPr>
           </a:lstStyle>
-          <a:p/>
+          <a:p>
+            <a:endParaRPr/>
+          </a:p>
         </p:txBody>
       </p:sp>
       <p:sp>
         <p:nvSpPr>
           <p:cNvPr id="22" name="Google Shape;22;p5"/>
-          <p:cNvSpPr txBox="1"/>
+          <p:cNvSpPr txBox="1">
+            <a:spLocks noGrp="1"/>
+          </p:cNvSpPr>
           <p:nvPr>
-            <p:ph idx="1" type="body"/>
+            <p:ph type="body" idx="1"/>
           </p:nvPr>
         </p:nvSpPr>
         <p:spPr>
@@ -2945,11 +3037,11 @@
           </a:prstGeom>
         </p:spPr>
         <p:txBody>
-          <a:bodyPr anchorCtr="0" anchor="t" bIns="91425" lIns="91425" spcFirstLastPara="1" rIns="91425" wrap="square" tIns="91425">
+          <a:bodyPr spcFirstLastPara="1" wrap="square" lIns="91425" tIns="91425" rIns="91425" bIns="91425" anchor="t" anchorCtr="0">
             <a:noAutofit/>
           </a:bodyPr>
           <a:lstStyle>
-            <a:lvl1pPr indent="-317500" lvl="0" marL="457200">
+            <a:lvl1pPr marL="457200" lvl="0" indent="-317500">
               <a:spcBef>
                 <a:spcPts val="0"/>
               </a:spcBef>
@@ -2960,7 +3052,7 @@
               <a:buChar char="●"/>
               <a:defRPr sz="1400"/>
             </a:lvl1pPr>
-            <a:lvl2pPr indent="-304800" lvl="1" marL="914400">
+            <a:lvl2pPr marL="914400" lvl="1" indent="-304800">
               <a:spcBef>
                 <a:spcPts val="1600"/>
               </a:spcBef>
@@ -2971,7 +3063,7 @@
               <a:buChar char="○"/>
               <a:defRPr sz="1200"/>
             </a:lvl2pPr>
-            <a:lvl3pPr indent="-304800" lvl="2" marL="1371600">
+            <a:lvl3pPr marL="1371600" lvl="2" indent="-304800">
               <a:spcBef>
                 <a:spcPts val="1600"/>
               </a:spcBef>
@@ -2982,7 +3074,7 @@
               <a:buChar char="■"/>
               <a:defRPr sz="1200"/>
             </a:lvl3pPr>
-            <a:lvl4pPr indent="-304800" lvl="3" marL="1828800">
+            <a:lvl4pPr marL="1828800" lvl="3" indent="-304800">
               <a:spcBef>
                 <a:spcPts val="1600"/>
               </a:spcBef>
@@ -2993,7 +3085,7 @@
               <a:buChar char="●"/>
               <a:defRPr sz="1200"/>
             </a:lvl4pPr>
-            <a:lvl5pPr indent="-304800" lvl="4" marL="2286000">
+            <a:lvl5pPr marL="2286000" lvl="4" indent="-304800">
               <a:spcBef>
                 <a:spcPts val="1600"/>
               </a:spcBef>
@@ -3004,7 +3096,7 @@
               <a:buChar char="○"/>
               <a:defRPr sz="1200"/>
             </a:lvl5pPr>
-            <a:lvl6pPr indent="-304800" lvl="5" marL="2743200">
+            <a:lvl6pPr marL="2743200" lvl="5" indent="-304800">
               <a:spcBef>
                 <a:spcPts val="1600"/>
               </a:spcBef>
@@ -3015,7 +3107,7 @@
               <a:buChar char="■"/>
               <a:defRPr sz="1200"/>
             </a:lvl6pPr>
-            <a:lvl7pPr indent="-304800" lvl="6" marL="3200400">
+            <a:lvl7pPr marL="3200400" lvl="6" indent="-304800">
               <a:spcBef>
                 <a:spcPts val="1600"/>
               </a:spcBef>
@@ -3026,7 +3118,7 @@
               <a:buChar char="●"/>
               <a:defRPr sz="1200"/>
             </a:lvl7pPr>
-            <a:lvl8pPr indent="-304800" lvl="7" marL="3657600">
+            <a:lvl8pPr marL="3657600" lvl="7" indent="-304800">
               <a:spcBef>
                 <a:spcPts val="1600"/>
               </a:spcBef>
@@ -3037,7 +3129,7 @@
               <a:buChar char="○"/>
               <a:defRPr sz="1200"/>
             </a:lvl8pPr>
-            <a:lvl9pPr indent="-304800" lvl="8" marL="4114800">
+            <a:lvl9pPr marL="4114800" lvl="8" indent="-304800">
               <a:spcBef>
                 <a:spcPts val="1600"/>
               </a:spcBef>
@@ -3049,15 +3141,19 @@
               <a:defRPr sz="1200"/>
             </a:lvl9pPr>
           </a:lstStyle>
-          <a:p/>
+          <a:p>
+            <a:endParaRPr/>
+          </a:p>
         </p:txBody>
       </p:sp>
       <p:sp>
         <p:nvSpPr>
           <p:cNvPr id="23" name="Google Shape;23;p5"/>
-          <p:cNvSpPr txBox="1"/>
+          <p:cNvSpPr txBox="1">
+            <a:spLocks noGrp="1"/>
+          </p:cNvSpPr>
           <p:nvPr>
-            <p:ph idx="2" type="body"/>
+            <p:ph type="body" idx="2"/>
           </p:nvPr>
         </p:nvSpPr>
         <p:spPr>
@@ -3070,11 +3166,11 @@
           </a:prstGeom>
         </p:spPr>
         <p:txBody>
-          <a:bodyPr anchorCtr="0" anchor="t" bIns="91425" lIns="91425" spcFirstLastPara="1" rIns="91425" wrap="square" tIns="91425">
+          <a:bodyPr spcFirstLastPara="1" wrap="square" lIns="91425" tIns="91425" rIns="91425" bIns="91425" anchor="t" anchorCtr="0">
             <a:noAutofit/>
           </a:bodyPr>
           <a:lstStyle>
-            <a:lvl1pPr indent="-317500" lvl="0" marL="457200">
+            <a:lvl1pPr marL="457200" lvl="0" indent="-317500">
               <a:spcBef>
                 <a:spcPts val="0"/>
               </a:spcBef>
@@ -3085,7 +3181,7 @@
               <a:buChar char="●"/>
               <a:defRPr sz="1400"/>
             </a:lvl1pPr>
-            <a:lvl2pPr indent="-304800" lvl="1" marL="914400">
+            <a:lvl2pPr marL="914400" lvl="1" indent="-304800">
               <a:spcBef>
                 <a:spcPts val="1600"/>
               </a:spcBef>
@@ -3096,7 +3192,7 @@
               <a:buChar char="○"/>
               <a:defRPr sz="1200"/>
             </a:lvl2pPr>
-            <a:lvl3pPr indent="-304800" lvl="2" marL="1371600">
+            <a:lvl3pPr marL="1371600" lvl="2" indent="-304800">
               <a:spcBef>
                 <a:spcPts val="1600"/>
               </a:spcBef>
@@ -3107,7 +3203,7 @@
               <a:buChar char="■"/>
               <a:defRPr sz="1200"/>
             </a:lvl3pPr>
-            <a:lvl4pPr indent="-304800" lvl="3" marL="1828800">
+            <a:lvl4pPr marL="1828800" lvl="3" indent="-304800">
               <a:spcBef>
                 <a:spcPts val="1600"/>
               </a:spcBef>
@@ -3118,7 +3214,7 @@
               <a:buChar char="●"/>
               <a:defRPr sz="1200"/>
             </a:lvl4pPr>
-            <a:lvl5pPr indent="-304800" lvl="4" marL="2286000">
+            <a:lvl5pPr marL="2286000" lvl="4" indent="-304800">
               <a:spcBef>
                 <a:spcPts val="1600"/>
               </a:spcBef>
@@ -3129,7 +3225,7 @@
               <a:buChar char="○"/>
               <a:defRPr sz="1200"/>
             </a:lvl5pPr>
-            <a:lvl6pPr indent="-304800" lvl="5" marL="2743200">
+            <a:lvl6pPr marL="2743200" lvl="5" indent="-304800">
               <a:spcBef>
                 <a:spcPts val="1600"/>
               </a:spcBef>
@@ -3140,7 +3236,7 @@
               <a:buChar char="■"/>
               <a:defRPr sz="1200"/>
             </a:lvl6pPr>
-            <a:lvl7pPr indent="-304800" lvl="6" marL="3200400">
+            <a:lvl7pPr marL="3200400" lvl="6" indent="-304800">
               <a:spcBef>
                 <a:spcPts val="1600"/>
               </a:spcBef>
@@ -3151,7 +3247,7 @@
               <a:buChar char="●"/>
               <a:defRPr sz="1200"/>
             </a:lvl7pPr>
-            <a:lvl8pPr indent="-304800" lvl="7" marL="3657600">
+            <a:lvl8pPr marL="3657600" lvl="7" indent="-304800">
               <a:spcBef>
                 <a:spcPts val="1600"/>
               </a:spcBef>
@@ -3162,7 +3258,7 @@
               <a:buChar char="○"/>
               <a:defRPr sz="1200"/>
             </a:lvl8pPr>
-            <a:lvl9pPr indent="-304800" lvl="8" marL="4114800">
+            <a:lvl9pPr marL="4114800" lvl="8" indent="-304800">
               <a:spcBef>
                 <a:spcPts val="1600"/>
               </a:spcBef>
@@ -3174,15 +3270,19 @@
               <a:defRPr sz="1200"/>
             </a:lvl9pPr>
           </a:lstStyle>
-          <a:p/>
+          <a:p>
+            <a:endParaRPr/>
+          </a:p>
         </p:txBody>
       </p:sp>
       <p:sp>
         <p:nvSpPr>
           <p:cNvPr id="24" name="Google Shape;24;p5"/>
-          <p:cNvSpPr txBox="1"/>
+          <p:cNvSpPr txBox="1">
+            <a:spLocks noGrp="1"/>
+          </p:cNvSpPr>
           <p:nvPr>
-            <p:ph idx="12" type="sldNum"/>
+            <p:ph type="sldNum" idx="12"/>
           </p:nvPr>
         </p:nvSpPr>
         <p:spPr>
@@ -3195,7 +3295,7 @@
           </a:prstGeom>
         </p:spPr>
         <p:txBody>
-          <a:bodyPr anchorCtr="0" anchor="ctr" bIns="91425" lIns="91425" spcFirstLastPara="1" rIns="91425" wrap="square" tIns="91425">
+          <a:bodyPr spcFirstLastPara="1" wrap="square" lIns="91425" tIns="91425" rIns="91425" bIns="91425" anchor="ctr" anchorCtr="0">
             <a:noAutofit/>
           </a:bodyPr>
           <a:lstStyle>
@@ -3237,7 +3337,7 @@
             </a:lvl9pPr>
           </a:lstStyle>
           <a:p>
-            <a:pPr indent="0" lvl="0" marL="0" rtl="0" algn="r">
+            <a:pPr marL="0" lvl="0" indent="0" algn="r" rtl="0">
               <a:spcBef>
                 <a:spcPts val="0"/>
               </a:spcBef>
@@ -3263,11 +3363,11 @@
 </file>
 
 <file path=ppt/slideLayouts/slideLayout5.xml><?xml version="1.0" encoding="utf-8"?>
-<p:sldLayout xmlns:a="http://schemas.openxmlformats.org/drawingml/2006/main" xmlns:r="http://schemas.openxmlformats.org/officeDocument/2006/relationships" xmlns:mc="http://schemas.openxmlformats.org/markup-compatibility/2006" xmlns:mv="urn:schemas-microsoft-com:mac:vml" xmlns:p="http://schemas.openxmlformats.org/presentationml/2006/main" xmlns:c="http://schemas.openxmlformats.org/drawingml/2006/chart" xmlns:dgm="http://schemas.openxmlformats.org/drawingml/2006/diagram" xmlns:o="urn:schemas-microsoft-com:office:office" xmlns:v="urn:schemas-microsoft-com:vml" xmlns:pvml="urn:schemas-microsoft-com:office:powerpoint" xmlns:com="http://schemas.openxmlformats.org/drawingml/2006/compatibility" xmlns:p14="http://schemas.microsoft.com/office/powerpoint/2010/main" xmlns:p15="http://schemas.microsoft.com/office/powerpoint/2012/main" xmlns:ahyp="http://schemas.microsoft.com/office/drawing/2018/hyperlinkcolor" matchingName="Title only" type="titleOnly">
+<p:sldLayout xmlns:a="http://schemas.openxmlformats.org/drawingml/2006/main" xmlns:r="http://schemas.openxmlformats.org/officeDocument/2006/relationships" xmlns:p="http://schemas.openxmlformats.org/presentationml/2006/main" matchingName="Title only" type="titleOnly">
   <p:cSld name="TITLE_ONLY">
     <p:spTree>
       <p:nvGrpSpPr>
-        <p:cNvPr id="25" name="Shape 25"/>
+        <p:cNvPr id="1" name="Shape 25"/>
         <p:cNvGrpSpPr/>
         <p:nvPr/>
       </p:nvGrpSpPr>
@@ -3282,7 +3382,9 @@
       <p:sp>
         <p:nvSpPr>
           <p:cNvPr id="26" name="Google Shape;26;p6"/>
-          <p:cNvSpPr txBox="1"/>
+          <p:cNvSpPr txBox="1">
+            <a:spLocks noGrp="1"/>
+          </p:cNvSpPr>
           <p:nvPr>
             <p:ph type="title"/>
           </p:nvPr>
@@ -3297,7 +3399,7 @@
           </a:prstGeom>
         </p:spPr>
         <p:txBody>
-          <a:bodyPr anchorCtr="0" anchor="t" bIns="91425" lIns="91425" spcFirstLastPara="1" rIns="91425" wrap="square" tIns="91425">
+          <a:bodyPr spcFirstLastPara="1" wrap="square" lIns="91425" tIns="91425" rIns="91425" bIns="91425" anchor="t" anchorCtr="0">
             <a:noAutofit/>
           </a:bodyPr>
           <a:lstStyle>
@@ -3401,15 +3503,19 @@
               <a:defRPr/>
             </a:lvl9pPr>
           </a:lstStyle>
-          <a:p/>
+          <a:p>
+            <a:endParaRPr/>
+          </a:p>
         </p:txBody>
       </p:sp>
       <p:sp>
         <p:nvSpPr>
           <p:cNvPr id="27" name="Google Shape;27;p6"/>
-          <p:cNvSpPr txBox="1"/>
+          <p:cNvSpPr txBox="1">
+            <a:spLocks noGrp="1"/>
+          </p:cNvSpPr>
           <p:nvPr>
-            <p:ph idx="12" type="sldNum"/>
+            <p:ph type="sldNum" idx="12"/>
           </p:nvPr>
         </p:nvSpPr>
         <p:spPr>
@@ -3422,7 +3528,7 @@
           </a:prstGeom>
         </p:spPr>
         <p:txBody>
-          <a:bodyPr anchorCtr="0" anchor="ctr" bIns="91425" lIns="91425" spcFirstLastPara="1" rIns="91425" wrap="square" tIns="91425">
+          <a:bodyPr spcFirstLastPara="1" wrap="square" lIns="91425" tIns="91425" rIns="91425" bIns="91425" anchor="ctr" anchorCtr="0">
             <a:noAutofit/>
           </a:bodyPr>
           <a:lstStyle>
@@ -3464,7 +3570,7 @@
             </a:lvl9pPr>
           </a:lstStyle>
           <a:p>
-            <a:pPr indent="0" lvl="0" marL="0" rtl="0" algn="r">
+            <a:pPr marL="0" lvl="0" indent="0" algn="r" rtl="0">
               <a:spcBef>
                 <a:spcPts val="0"/>
               </a:spcBef>
@@ -3490,11 +3596,11 @@
 </file>
 
 <file path=ppt/slideLayouts/slideLayout6.xml><?xml version="1.0" encoding="utf-8"?>
-<p:sldLayout xmlns:a="http://schemas.openxmlformats.org/drawingml/2006/main" xmlns:r="http://schemas.openxmlformats.org/officeDocument/2006/relationships" xmlns:mc="http://schemas.openxmlformats.org/markup-compatibility/2006" xmlns:mv="urn:schemas-microsoft-com:mac:vml" xmlns:p="http://schemas.openxmlformats.org/presentationml/2006/main" xmlns:c="http://schemas.openxmlformats.org/drawingml/2006/chart" xmlns:dgm="http://schemas.openxmlformats.org/drawingml/2006/diagram" xmlns:o="urn:schemas-microsoft-com:office:office" xmlns:v="urn:schemas-microsoft-com:vml" xmlns:pvml="urn:schemas-microsoft-com:office:powerpoint" xmlns:com="http://schemas.openxmlformats.org/drawingml/2006/compatibility" xmlns:p14="http://schemas.microsoft.com/office/powerpoint/2010/main" xmlns:p15="http://schemas.microsoft.com/office/powerpoint/2012/main" xmlns:ahyp="http://schemas.microsoft.com/office/drawing/2018/hyperlinkcolor" matchingName="One column text">
+<p:sldLayout xmlns:a="http://schemas.openxmlformats.org/drawingml/2006/main" xmlns:r="http://schemas.openxmlformats.org/officeDocument/2006/relationships" xmlns:p="http://schemas.openxmlformats.org/presentationml/2006/main" matchingName="One column text">
   <p:cSld name="ONE_COLUMN_TEXT">
     <p:spTree>
       <p:nvGrpSpPr>
-        <p:cNvPr id="28" name="Shape 28"/>
+        <p:cNvPr id="1" name="Shape 28"/>
         <p:cNvGrpSpPr/>
         <p:nvPr/>
       </p:nvGrpSpPr>
@@ -3509,7 +3615,9 @@
       <p:sp>
         <p:nvSpPr>
           <p:cNvPr id="29" name="Google Shape;29;p7"/>
-          <p:cNvSpPr txBox="1"/>
+          <p:cNvSpPr txBox="1">
+            <a:spLocks noGrp="1"/>
+          </p:cNvSpPr>
           <p:nvPr>
             <p:ph type="title"/>
           </p:nvPr>
@@ -3524,7 +3632,7 @@
           </a:prstGeom>
         </p:spPr>
         <p:txBody>
-          <a:bodyPr anchorCtr="0" anchor="b" bIns="91425" lIns="91425" spcFirstLastPara="1" rIns="91425" wrap="square" tIns="91425">
+          <a:bodyPr spcFirstLastPara="1" wrap="square" lIns="91425" tIns="91425" rIns="91425" bIns="91425" anchor="b" anchorCtr="0">
             <a:noAutofit/>
           </a:bodyPr>
           <a:lstStyle>
@@ -3628,15 +3736,19 @@
               <a:defRPr sz="2400"/>
             </a:lvl9pPr>
           </a:lstStyle>
-          <a:p/>
+          <a:p>
+            <a:endParaRPr/>
+          </a:p>
         </p:txBody>
       </p:sp>
       <p:sp>
         <p:nvSpPr>
           <p:cNvPr id="30" name="Google Shape;30;p7"/>
-          <p:cNvSpPr txBox="1"/>
+          <p:cNvSpPr txBox="1">
+            <a:spLocks noGrp="1"/>
+          </p:cNvSpPr>
           <p:nvPr>
-            <p:ph idx="1" type="body"/>
+            <p:ph type="body" idx="1"/>
           </p:nvPr>
         </p:nvSpPr>
         <p:spPr>
@@ -3649,11 +3761,11 @@
           </a:prstGeom>
         </p:spPr>
         <p:txBody>
-          <a:bodyPr anchorCtr="0" anchor="t" bIns="91425" lIns="91425" spcFirstLastPara="1" rIns="91425" wrap="square" tIns="91425">
+          <a:bodyPr spcFirstLastPara="1" wrap="square" lIns="91425" tIns="91425" rIns="91425" bIns="91425" anchor="t" anchorCtr="0">
             <a:noAutofit/>
           </a:bodyPr>
           <a:lstStyle>
-            <a:lvl1pPr indent="-304800" lvl="0" marL="457200">
+            <a:lvl1pPr marL="457200" lvl="0" indent="-304800">
               <a:spcBef>
                 <a:spcPts val="0"/>
               </a:spcBef>
@@ -3664,7 +3776,7 @@
               <a:buChar char="●"/>
               <a:defRPr sz="1200"/>
             </a:lvl1pPr>
-            <a:lvl2pPr indent="-304800" lvl="1" marL="914400">
+            <a:lvl2pPr marL="914400" lvl="1" indent="-304800">
               <a:spcBef>
                 <a:spcPts val="1600"/>
               </a:spcBef>
@@ -3675,7 +3787,7 @@
               <a:buChar char="○"/>
               <a:defRPr sz="1200"/>
             </a:lvl2pPr>
-            <a:lvl3pPr indent="-304800" lvl="2" marL="1371600">
+            <a:lvl3pPr marL="1371600" lvl="2" indent="-304800">
               <a:spcBef>
                 <a:spcPts val="1600"/>
               </a:spcBef>
@@ -3686,7 +3798,7 @@
               <a:buChar char="■"/>
               <a:defRPr sz="1200"/>
             </a:lvl3pPr>
-            <a:lvl4pPr indent="-304800" lvl="3" marL="1828800">
+            <a:lvl4pPr marL="1828800" lvl="3" indent="-304800">
               <a:spcBef>
                 <a:spcPts val="1600"/>
               </a:spcBef>
@@ -3697,7 +3809,7 @@
               <a:buChar char="●"/>
               <a:defRPr sz="1200"/>
             </a:lvl4pPr>
-            <a:lvl5pPr indent="-304800" lvl="4" marL="2286000">
+            <a:lvl5pPr marL="2286000" lvl="4" indent="-304800">
               <a:spcBef>
                 <a:spcPts val="1600"/>
               </a:spcBef>
@@ -3708,7 +3820,7 @@
               <a:buChar char="○"/>
               <a:defRPr sz="1200"/>
             </a:lvl5pPr>
-            <a:lvl6pPr indent="-304800" lvl="5" marL="2743200">
+            <a:lvl6pPr marL="2743200" lvl="5" indent="-304800">
               <a:spcBef>
                 <a:spcPts val="1600"/>
               </a:spcBef>
@@ -3719,7 +3831,7 @@
               <a:buChar char="■"/>
               <a:defRPr sz="1200"/>
             </a:lvl6pPr>
-            <a:lvl7pPr indent="-304800" lvl="6" marL="3200400">
+            <a:lvl7pPr marL="3200400" lvl="6" indent="-304800">
               <a:spcBef>
                 <a:spcPts val="1600"/>
               </a:spcBef>
@@ -3730,7 +3842,7 @@
               <a:buChar char="●"/>
               <a:defRPr sz="1200"/>
             </a:lvl7pPr>
-            <a:lvl8pPr indent="-304800" lvl="7" marL="3657600">
+            <a:lvl8pPr marL="3657600" lvl="7" indent="-304800">
               <a:spcBef>
                 <a:spcPts val="1600"/>
               </a:spcBef>
@@ -3741,7 +3853,7 @@
               <a:buChar char="○"/>
               <a:defRPr sz="1200"/>
             </a:lvl8pPr>
-            <a:lvl9pPr indent="-304800" lvl="8" marL="4114800">
+            <a:lvl9pPr marL="4114800" lvl="8" indent="-304800">
               <a:spcBef>
                 <a:spcPts val="1600"/>
               </a:spcBef>
@@ -3753,15 +3865,19 @@
               <a:defRPr sz="1200"/>
             </a:lvl9pPr>
           </a:lstStyle>
-          <a:p/>
+          <a:p>
+            <a:endParaRPr/>
+          </a:p>
         </p:txBody>
       </p:sp>
       <p:sp>
         <p:nvSpPr>
           <p:cNvPr id="31" name="Google Shape;31;p7"/>
-          <p:cNvSpPr txBox="1"/>
+          <p:cNvSpPr txBox="1">
+            <a:spLocks noGrp="1"/>
+          </p:cNvSpPr>
           <p:nvPr>
-            <p:ph idx="12" type="sldNum"/>
+            <p:ph type="sldNum" idx="12"/>
           </p:nvPr>
         </p:nvSpPr>
         <p:spPr>
@@ -3774,7 +3890,7 @@
           </a:prstGeom>
         </p:spPr>
         <p:txBody>
-          <a:bodyPr anchorCtr="0" anchor="ctr" bIns="91425" lIns="91425" spcFirstLastPara="1" rIns="91425" wrap="square" tIns="91425">
+          <a:bodyPr spcFirstLastPara="1" wrap="square" lIns="91425" tIns="91425" rIns="91425" bIns="91425" anchor="ctr" anchorCtr="0">
             <a:noAutofit/>
           </a:bodyPr>
           <a:lstStyle>
@@ -3816,7 +3932,7 @@
             </a:lvl9pPr>
           </a:lstStyle>
           <a:p>
-            <a:pPr indent="0" lvl="0" marL="0" rtl="0" algn="r">
+            <a:pPr marL="0" lvl="0" indent="0" algn="r" rtl="0">
               <a:spcBef>
                 <a:spcPts val="0"/>
               </a:spcBef>
@@ -3842,11 +3958,11 @@
 </file>
 
 <file path=ppt/slideLayouts/slideLayout7.xml><?xml version="1.0" encoding="utf-8"?>
-<p:sldLayout xmlns:a="http://schemas.openxmlformats.org/drawingml/2006/main" xmlns:r="http://schemas.openxmlformats.org/officeDocument/2006/relationships" xmlns:mc="http://schemas.openxmlformats.org/markup-compatibility/2006" xmlns:mv="urn:schemas-microsoft-com:mac:vml" xmlns:p="http://schemas.openxmlformats.org/presentationml/2006/main" xmlns:c="http://schemas.openxmlformats.org/drawingml/2006/chart" xmlns:dgm="http://schemas.openxmlformats.org/drawingml/2006/diagram" xmlns:o="urn:schemas-microsoft-com:office:office" xmlns:v="urn:schemas-microsoft-com:vml" xmlns:pvml="urn:schemas-microsoft-com:office:powerpoint" xmlns:com="http://schemas.openxmlformats.org/drawingml/2006/compatibility" xmlns:p14="http://schemas.microsoft.com/office/powerpoint/2010/main" xmlns:p15="http://schemas.microsoft.com/office/powerpoint/2012/main" xmlns:ahyp="http://schemas.microsoft.com/office/drawing/2018/hyperlinkcolor" matchingName="Main point">
+<p:sldLayout xmlns:a="http://schemas.openxmlformats.org/drawingml/2006/main" xmlns:r="http://schemas.openxmlformats.org/officeDocument/2006/relationships" xmlns:p="http://schemas.openxmlformats.org/presentationml/2006/main" matchingName="Main point">
   <p:cSld name="MAIN_POINT">
     <p:spTree>
       <p:nvGrpSpPr>
-        <p:cNvPr id="32" name="Shape 32"/>
+        <p:cNvPr id="1" name="Shape 32"/>
         <p:cNvGrpSpPr/>
         <p:nvPr/>
       </p:nvGrpSpPr>
@@ -3861,7 +3977,9 @@
       <p:sp>
         <p:nvSpPr>
           <p:cNvPr id="33" name="Google Shape;33;p8"/>
-          <p:cNvSpPr txBox="1"/>
+          <p:cNvSpPr txBox="1">
+            <a:spLocks noGrp="1"/>
+          </p:cNvSpPr>
           <p:nvPr>
             <p:ph type="title"/>
           </p:nvPr>
@@ -3876,7 +3994,7 @@
           </a:prstGeom>
         </p:spPr>
         <p:txBody>
-          <a:bodyPr anchorCtr="0" anchor="ctr" bIns="91425" lIns="91425" spcFirstLastPara="1" rIns="91425" wrap="square" tIns="91425">
+          <a:bodyPr spcFirstLastPara="1" wrap="square" lIns="91425" tIns="91425" rIns="91425" bIns="91425" anchor="ctr" anchorCtr="0">
             <a:noAutofit/>
           </a:bodyPr>
           <a:lstStyle>
@@ -3980,15 +4098,19 @@
               <a:defRPr sz="4800"/>
             </a:lvl9pPr>
           </a:lstStyle>
-          <a:p/>
+          <a:p>
+            <a:endParaRPr/>
+          </a:p>
         </p:txBody>
       </p:sp>
       <p:sp>
         <p:nvSpPr>
           <p:cNvPr id="34" name="Google Shape;34;p8"/>
-          <p:cNvSpPr txBox="1"/>
+          <p:cNvSpPr txBox="1">
+            <a:spLocks noGrp="1"/>
+          </p:cNvSpPr>
           <p:nvPr>
-            <p:ph idx="12" type="sldNum"/>
+            <p:ph type="sldNum" idx="12"/>
           </p:nvPr>
         </p:nvSpPr>
         <p:spPr>
@@ -4001,7 +4123,7 @@
           </a:prstGeom>
         </p:spPr>
         <p:txBody>
-          <a:bodyPr anchorCtr="0" anchor="ctr" bIns="91425" lIns="91425" spcFirstLastPara="1" rIns="91425" wrap="square" tIns="91425">
+          <a:bodyPr spcFirstLastPara="1" wrap="square" lIns="91425" tIns="91425" rIns="91425" bIns="91425" anchor="ctr" anchorCtr="0">
             <a:noAutofit/>
           </a:bodyPr>
           <a:lstStyle>
@@ -4043,7 +4165,7 @@
             </a:lvl9pPr>
           </a:lstStyle>
           <a:p>
-            <a:pPr indent="0" lvl="0" marL="0" rtl="0" algn="r">
+            <a:pPr marL="0" lvl="0" indent="0" algn="r" rtl="0">
               <a:spcBef>
                 <a:spcPts val="0"/>
               </a:spcBef>
@@ -4069,11 +4191,11 @@
 </file>
 
 <file path=ppt/slideLayouts/slideLayout8.xml><?xml version="1.0" encoding="utf-8"?>
-<p:sldLayout xmlns:a="http://schemas.openxmlformats.org/drawingml/2006/main" xmlns:r="http://schemas.openxmlformats.org/officeDocument/2006/relationships" xmlns:mc="http://schemas.openxmlformats.org/markup-compatibility/2006" xmlns:mv="urn:schemas-microsoft-com:mac:vml" xmlns:p="http://schemas.openxmlformats.org/presentationml/2006/main" xmlns:c="http://schemas.openxmlformats.org/drawingml/2006/chart" xmlns:dgm="http://schemas.openxmlformats.org/drawingml/2006/diagram" xmlns:o="urn:schemas-microsoft-com:office:office" xmlns:v="urn:schemas-microsoft-com:vml" xmlns:pvml="urn:schemas-microsoft-com:office:powerpoint" xmlns:com="http://schemas.openxmlformats.org/drawingml/2006/compatibility" xmlns:p14="http://schemas.microsoft.com/office/powerpoint/2010/main" xmlns:p15="http://schemas.microsoft.com/office/powerpoint/2012/main" xmlns:ahyp="http://schemas.microsoft.com/office/drawing/2018/hyperlinkcolor" matchingName="Section title and description">
+<p:sldLayout xmlns:a="http://schemas.openxmlformats.org/drawingml/2006/main" xmlns:r="http://schemas.openxmlformats.org/officeDocument/2006/relationships" xmlns:p="http://schemas.openxmlformats.org/presentationml/2006/main" matchingName="Section title and description">
   <p:cSld name="SECTION_TITLE_AND_DESCRIPTION">
     <p:spTree>
       <p:nvGrpSpPr>
-        <p:cNvPr id="35" name="Shape 35"/>
+        <p:cNvPr id="1" name="Shape 35"/>
         <p:cNvGrpSpPr/>
         <p:nvPr/>
       </p:nvGrpSpPr>
@@ -4107,12 +4229,12 @@
           </a:ln>
         </p:spPr>
         <p:txBody>
-          <a:bodyPr anchorCtr="0" anchor="ctr" bIns="91425" lIns="91425" spcFirstLastPara="1" rIns="91425" wrap="square" tIns="91425">
+          <a:bodyPr spcFirstLastPara="1" wrap="square" lIns="91425" tIns="91425" rIns="91425" bIns="91425" anchor="ctr" anchorCtr="0">
             <a:noAutofit/>
           </a:bodyPr>
           <a:lstStyle/>
           <a:p>
-            <a:pPr indent="0" lvl="0" marL="0" rtl="0" algn="l">
+            <a:pPr marL="0" lvl="0" indent="0" algn="l" rtl="0">
               <a:spcBef>
                 <a:spcPts val="0"/>
               </a:spcBef>
@@ -4121,9 +4243,6 @@
               </a:spcAft>
               <a:buNone/>
             </a:pPr>
-            <a:r>
-              <a:t/>
-            </a:r>
             <a:endParaRPr/>
           </a:p>
         </p:txBody>
@@ -4131,7 +4250,9 @@
       <p:sp>
         <p:nvSpPr>
           <p:cNvPr id="37" name="Google Shape;37;p9"/>
-          <p:cNvSpPr txBox="1"/>
+          <p:cNvSpPr txBox="1">
+            <a:spLocks noGrp="1"/>
+          </p:cNvSpPr>
           <p:nvPr>
             <p:ph type="title"/>
           </p:nvPr>
@@ -4146,7 +4267,7 @@
           </a:prstGeom>
         </p:spPr>
         <p:txBody>
-          <a:bodyPr anchorCtr="0" anchor="b" bIns="91425" lIns="91425" spcFirstLastPara="1" rIns="91425" wrap="square" tIns="91425">
+          <a:bodyPr spcFirstLastPara="1" wrap="square" lIns="91425" tIns="91425" rIns="91425" bIns="91425" anchor="b" anchorCtr="0">
             <a:noAutofit/>
           </a:bodyPr>
           <a:lstStyle>
@@ -4250,15 +4371,19 @@
               <a:defRPr sz="4200"/>
             </a:lvl9pPr>
           </a:lstStyle>
-          <a:p/>
+          <a:p>
+            <a:endParaRPr/>
+          </a:p>
         </p:txBody>
       </p:sp>
       <p:sp>
         <p:nvSpPr>
           <p:cNvPr id="38" name="Google Shape;38;p9"/>
-          <p:cNvSpPr txBox="1"/>
+          <p:cNvSpPr txBox="1">
+            <a:spLocks noGrp="1"/>
+          </p:cNvSpPr>
           <p:nvPr>
-            <p:ph idx="1" type="subTitle"/>
+            <p:ph type="subTitle" idx="1"/>
           </p:nvPr>
         </p:nvSpPr>
         <p:spPr>
@@ -4271,7 +4396,7 @@
           </a:prstGeom>
         </p:spPr>
         <p:txBody>
-          <a:bodyPr anchorCtr="0" anchor="t" bIns="91425" lIns="91425" spcFirstLastPara="1" rIns="91425" wrap="square" tIns="91425">
+          <a:bodyPr spcFirstLastPara="1" wrap="square" lIns="91425" tIns="91425" rIns="91425" bIns="91425" anchor="t" anchorCtr="0">
             <a:noAutofit/>
           </a:bodyPr>
           <a:lstStyle>
@@ -4402,15 +4527,19 @@
               <a:defRPr sz="2100"/>
             </a:lvl9pPr>
           </a:lstStyle>
-          <a:p/>
+          <a:p>
+            <a:endParaRPr/>
+          </a:p>
         </p:txBody>
       </p:sp>
       <p:sp>
         <p:nvSpPr>
           <p:cNvPr id="39" name="Google Shape;39;p9"/>
-          <p:cNvSpPr txBox="1"/>
+          <p:cNvSpPr txBox="1">
+            <a:spLocks noGrp="1"/>
+          </p:cNvSpPr>
           <p:nvPr>
-            <p:ph idx="2" type="body"/>
+            <p:ph type="body" idx="2"/>
           </p:nvPr>
         </p:nvSpPr>
         <p:spPr>
@@ -4423,11 +4552,11 @@
           </a:prstGeom>
         </p:spPr>
         <p:txBody>
-          <a:bodyPr anchorCtr="0" anchor="ctr" bIns="91425" lIns="91425" spcFirstLastPara="1" rIns="91425" wrap="square" tIns="91425">
+          <a:bodyPr spcFirstLastPara="1" wrap="square" lIns="91425" tIns="91425" rIns="91425" bIns="91425" anchor="ctr" anchorCtr="0">
             <a:noAutofit/>
           </a:bodyPr>
           <a:lstStyle>
-            <a:lvl1pPr indent="-342900" lvl="0" marL="457200">
+            <a:lvl1pPr marL="457200" lvl="0" indent="-342900">
               <a:spcBef>
                 <a:spcPts val="0"/>
               </a:spcBef>
@@ -4438,7 +4567,7 @@
               <a:buChar char="●"/>
               <a:defRPr/>
             </a:lvl1pPr>
-            <a:lvl2pPr indent="-317500" lvl="1" marL="914400">
+            <a:lvl2pPr marL="914400" lvl="1" indent="-317500">
               <a:spcBef>
                 <a:spcPts val="1600"/>
               </a:spcBef>
@@ -4449,7 +4578,7 @@
               <a:buChar char="○"/>
               <a:defRPr/>
             </a:lvl2pPr>
-            <a:lvl3pPr indent="-317500" lvl="2" marL="1371600">
+            <a:lvl3pPr marL="1371600" lvl="2" indent="-317500">
               <a:spcBef>
                 <a:spcPts val="1600"/>
               </a:spcBef>
@@ -4460,7 +4589,7 @@
               <a:buChar char="■"/>
               <a:defRPr/>
             </a:lvl3pPr>
-            <a:lvl4pPr indent="-317500" lvl="3" marL="1828800">
+            <a:lvl4pPr marL="1828800" lvl="3" indent="-317500">
               <a:spcBef>
                 <a:spcPts val="1600"/>
               </a:spcBef>
@@ -4471,7 +4600,7 @@
               <a:buChar char="●"/>
               <a:defRPr/>
             </a:lvl4pPr>
-            <a:lvl5pPr indent="-317500" lvl="4" marL="2286000">
+            <a:lvl5pPr marL="2286000" lvl="4" indent="-317500">
               <a:spcBef>
                 <a:spcPts val="1600"/>
               </a:spcBef>
@@ -4482,7 +4611,7 @@
               <a:buChar char="○"/>
               <a:defRPr/>
             </a:lvl5pPr>
-            <a:lvl6pPr indent="-317500" lvl="5" marL="2743200">
+            <a:lvl6pPr marL="2743200" lvl="5" indent="-317500">
               <a:spcBef>
                 <a:spcPts val="1600"/>
               </a:spcBef>
@@ -4493,7 +4622,7 @@
               <a:buChar char="■"/>
               <a:defRPr/>
             </a:lvl6pPr>
-            <a:lvl7pPr indent="-317500" lvl="6" marL="3200400">
+            <a:lvl7pPr marL="3200400" lvl="6" indent="-317500">
               <a:spcBef>
                 <a:spcPts val="1600"/>
               </a:spcBef>
@@ -4504,7 +4633,7 @@
               <a:buChar char="●"/>
               <a:defRPr/>
             </a:lvl7pPr>
-            <a:lvl8pPr indent="-317500" lvl="7" marL="3657600">
+            <a:lvl8pPr marL="3657600" lvl="7" indent="-317500">
               <a:spcBef>
                 <a:spcPts val="1600"/>
               </a:spcBef>
@@ -4515,7 +4644,7 @@
               <a:buChar char="○"/>
               <a:defRPr/>
             </a:lvl8pPr>
-            <a:lvl9pPr indent="-317500" lvl="8" marL="4114800">
+            <a:lvl9pPr marL="4114800" lvl="8" indent="-317500">
               <a:spcBef>
                 <a:spcPts val="1600"/>
               </a:spcBef>
@@ -4527,15 +4656,19 @@
               <a:defRPr/>
             </a:lvl9pPr>
           </a:lstStyle>
-          <a:p/>
+          <a:p>
+            <a:endParaRPr/>
+          </a:p>
         </p:txBody>
       </p:sp>
       <p:sp>
         <p:nvSpPr>
           <p:cNvPr id="40" name="Google Shape;40;p9"/>
-          <p:cNvSpPr txBox="1"/>
+          <p:cNvSpPr txBox="1">
+            <a:spLocks noGrp="1"/>
+          </p:cNvSpPr>
           <p:nvPr>
-            <p:ph idx="12" type="sldNum"/>
+            <p:ph type="sldNum" idx="12"/>
           </p:nvPr>
         </p:nvSpPr>
         <p:spPr>
@@ -4548,7 +4681,7 @@
           </a:prstGeom>
         </p:spPr>
         <p:txBody>
-          <a:bodyPr anchorCtr="0" anchor="ctr" bIns="91425" lIns="91425" spcFirstLastPara="1" rIns="91425" wrap="square" tIns="91425">
+          <a:bodyPr spcFirstLastPara="1" wrap="square" lIns="91425" tIns="91425" rIns="91425" bIns="91425" anchor="ctr" anchorCtr="0">
             <a:noAutofit/>
           </a:bodyPr>
           <a:lstStyle>
@@ -4590,7 +4723,7 @@
             </a:lvl9pPr>
           </a:lstStyle>
           <a:p>
-            <a:pPr indent="0" lvl="0" marL="0" rtl="0" algn="r">
+            <a:pPr marL="0" lvl="0" indent="0" algn="r" rtl="0">
               <a:spcBef>
                 <a:spcPts val="0"/>
               </a:spcBef>
@@ -4616,11 +4749,11 @@
 </file>
 
 <file path=ppt/slideLayouts/slideLayout9.xml><?xml version="1.0" encoding="utf-8"?>
-<p:sldLayout xmlns:a="http://schemas.openxmlformats.org/drawingml/2006/main" xmlns:r="http://schemas.openxmlformats.org/officeDocument/2006/relationships" xmlns:mc="http://schemas.openxmlformats.org/markup-compatibility/2006" xmlns:mv="urn:schemas-microsoft-com:mac:vml" xmlns:p="http://schemas.openxmlformats.org/presentationml/2006/main" xmlns:c="http://schemas.openxmlformats.org/drawingml/2006/chart" xmlns:dgm="http://schemas.openxmlformats.org/drawingml/2006/diagram" xmlns:o="urn:schemas-microsoft-com:office:office" xmlns:v="urn:schemas-microsoft-com:vml" xmlns:pvml="urn:schemas-microsoft-com:office:powerpoint" xmlns:com="http://schemas.openxmlformats.org/drawingml/2006/compatibility" xmlns:p14="http://schemas.microsoft.com/office/powerpoint/2010/main" xmlns:p15="http://schemas.microsoft.com/office/powerpoint/2012/main" xmlns:ahyp="http://schemas.microsoft.com/office/drawing/2018/hyperlinkcolor" matchingName="Caption">
+<p:sldLayout xmlns:a="http://schemas.openxmlformats.org/drawingml/2006/main" xmlns:r="http://schemas.openxmlformats.org/officeDocument/2006/relationships" xmlns:p="http://schemas.openxmlformats.org/presentationml/2006/main" matchingName="Caption">
   <p:cSld name="CAPTION_ONLY">
     <p:spTree>
       <p:nvGrpSpPr>
-        <p:cNvPr id="41" name="Shape 41"/>
+        <p:cNvPr id="1" name="Shape 41"/>
         <p:cNvGrpSpPr/>
         <p:nvPr/>
       </p:nvGrpSpPr>
@@ -4635,9 +4768,11 @@
       <p:sp>
         <p:nvSpPr>
           <p:cNvPr id="42" name="Google Shape;42;p10"/>
-          <p:cNvSpPr txBox="1"/>
+          <p:cNvSpPr txBox="1">
+            <a:spLocks noGrp="1"/>
+          </p:cNvSpPr>
           <p:nvPr>
-            <p:ph idx="1" type="body"/>
+            <p:ph type="body" idx="1"/>
           </p:nvPr>
         </p:nvSpPr>
         <p:spPr>
@@ -4650,11 +4785,11 @@
           </a:prstGeom>
         </p:spPr>
         <p:txBody>
-          <a:bodyPr anchorCtr="0" anchor="ctr" bIns="91425" lIns="91425" spcFirstLastPara="1" rIns="91425" wrap="square" tIns="91425">
+          <a:bodyPr spcFirstLastPara="1" wrap="square" lIns="91425" tIns="91425" rIns="91425" bIns="91425" anchor="ctr" anchorCtr="0">
             <a:noAutofit/>
           </a:bodyPr>
           <a:lstStyle>
-            <a:lvl1pPr indent="-228600" lvl="0" marL="457200">
+            <a:lvl1pPr marL="457200" lvl="0" indent="-228600">
               <a:lnSpc>
                 <a:spcPct val="100000"/>
               </a:lnSpc>
@@ -4669,15 +4804,19 @@
               <a:defRPr/>
             </a:lvl1pPr>
           </a:lstStyle>
-          <a:p/>
+          <a:p>
+            <a:endParaRPr/>
+          </a:p>
         </p:txBody>
       </p:sp>
       <p:sp>
         <p:nvSpPr>
           <p:cNvPr id="43" name="Google Shape;43;p10"/>
-          <p:cNvSpPr txBox="1"/>
+          <p:cNvSpPr txBox="1">
+            <a:spLocks noGrp="1"/>
+          </p:cNvSpPr>
           <p:nvPr>
-            <p:ph idx="12" type="sldNum"/>
+            <p:ph type="sldNum" idx="12"/>
           </p:nvPr>
         </p:nvSpPr>
         <p:spPr>
@@ -4690,7 +4829,7 @@
           </a:prstGeom>
         </p:spPr>
         <p:txBody>
-          <a:bodyPr anchorCtr="0" anchor="ctr" bIns="91425" lIns="91425" spcFirstLastPara="1" rIns="91425" wrap="square" tIns="91425">
+          <a:bodyPr spcFirstLastPara="1" wrap="square" lIns="91425" tIns="91425" rIns="91425" bIns="91425" anchor="ctr" anchorCtr="0">
             <a:noAutofit/>
           </a:bodyPr>
           <a:lstStyle>
@@ -4732,7 +4871,7 @@
             </a:lvl9pPr>
           </a:lstStyle>
           <a:p>
-            <a:pPr indent="0" lvl="0" marL="0" rtl="0" algn="r">
+            <a:pPr marL="0" lvl="0" indent="0" algn="r" rtl="0">
               <a:spcBef>
                 <a:spcPts val="0"/>
               </a:spcBef>
@@ -4758,18 +4897,19 @@
 </file>
 
 <file path=ppt/slideMasters/slideMaster1.xml><?xml version="1.0" encoding="utf-8"?>
-<p:sldMaster xmlns:a="http://schemas.openxmlformats.org/drawingml/2006/main" xmlns:r="http://schemas.openxmlformats.org/officeDocument/2006/relationships" xmlns:mc="http://schemas.openxmlformats.org/markup-compatibility/2006" xmlns:mv="urn:schemas-microsoft-com:mac:vml" xmlns:p="http://schemas.openxmlformats.org/presentationml/2006/main" xmlns:c="http://schemas.openxmlformats.org/drawingml/2006/chart" xmlns:dgm="http://schemas.openxmlformats.org/drawingml/2006/diagram" xmlns:o="urn:schemas-microsoft-com:office:office" xmlns:v="urn:schemas-microsoft-com:vml" xmlns:pvml="urn:schemas-microsoft-com:office:powerpoint" xmlns:com="http://schemas.openxmlformats.org/drawingml/2006/compatibility" xmlns:p14="http://schemas.microsoft.com/office/powerpoint/2010/main" xmlns:p15="http://schemas.microsoft.com/office/powerpoint/2012/main" xmlns:ahyp="http://schemas.microsoft.com/office/drawing/2018/hyperlinkcolor">
+<p:sldMaster xmlns:a="http://schemas.openxmlformats.org/drawingml/2006/main" xmlns:r="http://schemas.openxmlformats.org/officeDocument/2006/relationships" xmlns:p="http://schemas.openxmlformats.org/presentationml/2006/main">
   <p:cSld name="simple-light-2">
     <p:bg>
       <p:bgPr>
         <a:solidFill>
           <a:schemeClr val="lt1"/>
         </a:solidFill>
+        <a:effectLst/>
       </p:bgPr>
     </p:bg>
     <p:spTree>
       <p:nvGrpSpPr>
-        <p:cNvPr id="5" name="Shape 5"/>
+        <p:cNvPr id="1" name="Shape 5"/>
         <p:cNvGrpSpPr/>
         <p:nvPr/>
       </p:nvGrpSpPr>
@@ -4784,7 +4924,9 @@
       <p:sp>
         <p:nvSpPr>
           <p:cNvPr id="6" name="Google Shape;6;p1"/>
-          <p:cNvSpPr txBox="1"/>
+          <p:cNvSpPr txBox="1">
+            <a:spLocks noGrp="1"/>
+          </p:cNvSpPr>
           <p:nvPr>
             <p:ph type="title"/>
           </p:nvPr>
@@ -4803,7 +4945,7 @@
           </a:ln>
         </p:spPr>
         <p:txBody>
-          <a:bodyPr anchorCtr="0" anchor="t" bIns="91425" lIns="91425" spcFirstLastPara="1" rIns="91425" wrap="square" tIns="91425">
+          <a:bodyPr spcFirstLastPara="1" wrap="square" lIns="91425" tIns="91425" rIns="91425" bIns="91425" anchor="t" anchorCtr="0">
             <a:noAutofit/>
           </a:bodyPr>
           <a:lstStyle>
@@ -4970,15 +5112,19 @@
               </a:defRPr>
             </a:lvl9pPr>
           </a:lstStyle>
-          <a:p/>
+          <a:p>
+            <a:endParaRPr/>
+          </a:p>
         </p:txBody>
       </p:sp>
       <p:sp>
         <p:nvSpPr>
           <p:cNvPr id="7" name="Google Shape;7;p1"/>
-          <p:cNvSpPr txBox="1"/>
+          <p:cNvSpPr txBox="1">
+            <a:spLocks noGrp="1"/>
+          </p:cNvSpPr>
           <p:nvPr>
-            <p:ph idx="1" type="body"/>
+            <p:ph type="body" idx="1"/>
           </p:nvPr>
         </p:nvSpPr>
         <p:spPr>
@@ -4995,11 +5141,11 @@
           </a:ln>
         </p:spPr>
         <p:txBody>
-          <a:bodyPr anchorCtr="0" anchor="t" bIns="91425" lIns="91425" spcFirstLastPara="1" rIns="91425" wrap="square" tIns="91425">
+          <a:bodyPr spcFirstLastPara="1" wrap="square" lIns="91425" tIns="91425" rIns="91425" bIns="91425" anchor="t" anchorCtr="0">
             <a:noAutofit/>
           </a:bodyPr>
           <a:lstStyle>
-            <a:lvl1pPr indent="-342900" lvl="0" marL="457200">
+            <a:lvl1pPr marL="457200" lvl="0" indent="-342900">
               <a:lnSpc>
                 <a:spcPct val="115000"/>
               </a:lnSpc>
@@ -5020,7 +5166,7 @@
                 </a:solidFill>
               </a:defRPr>
             </a:lvl1pPr>
-            <a:lvl2pPr indent="-317500" lvl="1" marL="914400">
+            <a:lvl2pPr marL="914400" lvl="1" indent="-317500">
               <a:lnSpc>
                 <a:spcPct val="115000"/>
               </a:lnSpc>
@@ -5041,7 +5187,7 @@
                 </a:solidFill>
               </a:defRPr>
             </a:lvl2pPr>
-            <a:lvl3pPr indent="-317500" lvl="2" marL="1371600">
+            <a:lvl3pPr marL="1371600" lvl="2" indent="-317500">
               <a:lnSpc>
                 <a:spcPct val="115000"/>
               </a:lnSpc>
@@ -5062,7 +5208,7 @@
                 </a:solidFill>
               </a:defRPr>
             </a:lvl3pPr>
-            <a:lvl4pPr indent="-317500" lvl="3" marL="1828800">
+            <a:lvl4pPr marL="1828800" lvl="3" indent="-317500">
               <a:lnSpc>
                 <a:spcPct val="115000"/>
               </a:lnSpc>
@@ -5083,7 +5229,7 @@
                 </a:solidFill>
               </a:defRPr>
             </a:lvl4pPr>
-            <a:lvl5pPr indent="-317500" lvl="4" marL="2286000">
+            <a:lvl5pPr marL="2286000" lvl="4" indent="-317500">
               <a:lnSpc>
                 <a:spcPct val="115000"/>
               </a:lnSpc>
@@ -5104,7 +5250,7 @@
                 </a:solidFill>
               </a:defRPr>
             </a:lvl5pPr>
-            <a:lvl6pPr indent="-317500" lvl="5" marL="2743200">
+            <a:lvl6pPr marL="2743200" lvl="5" indent="-317500">
               <a:lnSpc>
                 <a:spcPct val="115000"/>
               </a:lnSpc>
@@ -5125,7 +5271,7 @@
                 </a:solidFill>
               </a:defRPr>
             </a:lvl6pPr>
-            <a:lvl7pPr indent="-317500" lvl="6" marL="3200400">
+            <a:lvl7pPr marL="3200400" lvl="6" indent="-317500">
               <a:lnSpc>
                 <a:spcPct val="115000"/>
               </a:lnSpc>
@@ -5146,7 +5292,7 @@
                 </a:solidFill>
               </a:defRPr>
             </a:lvl7pPr>
-            <a:lvl8pPr indent="-317500" lvl="7" marL="3657600">
+            <a:lvl8pPr marL="3657600" lvl="7" indent="-317500">
               <a:lnSpc>
                 <a:spcPct val="115000"/>
               </a:lnSpc>
@@ -5167,7 +5313,7 @@
                 </a:solidFill>
               </a:defRPr>
             </a:lvl8pPr>
-            <a:lvl9pPr indent="-317500" lvl="8" marL="4114800">
+            <a:lvl9pPr marL="4114800" lvl="8" indent="-317500">
               <a:lnSpc>
                 <a:spcPct val="115000"/>
               </a:lnSpc>
@@ -5189,15 +5335,19 @@
               </a:defRPr>
             </a:lvl9pPr>
           </a:lstStyle>
-          <a:p/>
+          <a:p>
+            <a:endParaRPr/>
+          </a:p>
         </p:txBody>
       </p:sp>
       <p:sp>
         <p:nvSpPr>
           <p:cNvPr id="8" name="Google Shape;8;p1"/>
-          <p:cNvSpPr txBox="1"/>
+          <p:cNvSpPr txBox="1">
+            <a:spLocks noGrp="1"/>
+          </p:cNvSpPr>
           <p:nvPr>
-            <p:ph idx="12" type="sldNum"/>
+            <p:ph type="sldNum" idx="12"/>
           </p:nvPr>
         </p:nvSpPr>
         <p:spPr>
@@ -5214,7 +5364,7 @@
           </a:ln>
         </p:spPr>
         <p:txBody>
-          <a:bodyPr anchorCtr="0" anchor="ctr" bIns="91425" lIns="91425" spcFirstLastPara="1" rIns="91425" wrap="square" tIns="91425">
+          <a:bodyPr spcFirstLastPara="1" wrap="square" lIns="91425" tIns="91425" rIns="91425" bIns="91425" anchor="ctr" anchorCtr="0">
             <a:noAutofit/>
           </a:bodyPr>
           <a:lstStyle>
@@ -5292,7 +5442,7 @@
             </a:lvl9pPr>
           </a:lstStyle>
           <a:p>
-            <a:pPr indent="0" lvl="0" marL="0" rtl="0" algn="r">
+            <a:pPr marL="0" lvl="0" indent="0" algn="r" rtl="0">
               <a:spcBef>
                 <a:spcPts val="0"/>
               </a:spcBef>
@@ -5311,7 +5461,7 @@
       </p:sp>
     </p:spTree>
   </p:cSld>
-  <p:clrMap accent1="accent1" accent2="accent2" accent3="accent3" accent4="accent4" accent5="accent5" accent6="accent6" bg1="lt1" bg2="dk2" tx1="dk1" tx2="lt2" folHlink="folHlink" hlink="hlink"/>
+  <p:clrMap bg1="lt1" tx1="dk1" bg2="dk2" tx2="lt2" accent1="accent1" accent2="accent2" accent3="accent3" accent4="accent4" accent5="accent5" accent6="accent6" hlink="hlink" folHlink="folHlink"/>
   <p:sldLayoutIdLst>
     <p:sldLayoutId id="2147483648" r:id="rId1"/>
     <p:sldLayoutId id="2147483649" r:id="rId2"/>
@@ -5325,10 +5475,10 @@
     <p:sldLayoutId id="2147483657" r:id="rId10"/>
     <p:sldLayoutId id="2147483658" r:id="rId11"/>
   </p:sldLayoutIdLst>
-  <p:hf dt="0" ftr="0" hdr="0" sldNum="0"/>
+  <p:hf sldNum="0" hdr="0" ftr="0" dt="0"/>
   <p:txStyles>
     <p:titleStyle>
-      <a:defPPr lvl="0" marR="0" rtl="0" algn="l">
+      <a:defPPr marR="0" lvl="0" algn="l" rtl="0">
         <a:lnSpc>
           <a:spcPct val="100000"/>
         </a:lnSpc>
@@ -5339,7 +5489,7 @@
           <a:spcPts val="0"/>
         </a:spcAft>
       </a:defPPr>
-      <a:lvl1pPr lvl="0" marR="0" rtl="0" algn="l">
+      <a:lvl1pPr marR="0" lvl="0" algn="l" rtl="0">
         <a:lnSpc>
           <a:spcPct val="100000"/>
         </a:lnSpc>
@@ -5353,7 +5503,7 @@
           <a:srgbClr val="000000"/>
         </a:buClr>
         <a:buFont typeface="Arial"/>
-        <a:defRPr b="0" i="0" sz="1400" u="none" cap="none" strike="noStrike">
+        <a:defRPr sz="1400" b="0" i="0" u="none" strike="noStrike" cap="none">
           <a:solidFill>
             <a:srgbClr val="000000"/>
           </a:solidFill>
@@ -5363,7 +5513,7 @@
           <a:sym typeface="Arial"/>
         </a:defRPr>
       </a:lvl1pPr>
-      <a:lvl2pPr lvl="1" marR="0" rtl="0" algn="l">
+      <a:lvl2pPr marR="0" lvl="1" algn="l" rtl="0">
         <a:lnSpc>
           <a:spcPct val="100000"/>
         </a:lnSpc>
@@ -5377,7 +5527,7 @@
           <a:srgbClr val="000000"/>
         </a:buClr>
         <a:buFont typeface="Arial"/>
-        <a:defRPr b="0" i="0" sz="1400" u="none" cap="none" strike="noStrike">
+        <a:defRPr sz="1400" b="0" i="0" u="none" strike="noStrike" cap="none">
           <a:solidFill>
             <a:srgbClr val="000000"/>
           </a:solidFill>
@@ -5387,7 +5537,7 @@
           <a:sym typeface="Arial"/>
         </a:defRPr>
       </a:lvl2pPr>
-      <a:lvl3pPr lvl="2" marR="0" rtl="0" algn="l">
+      <a:lvl3pPr marR="0" lvl="2" algn="l" rtl="0">
         <a:lnSpc>
           <a:spcPct val="100000"/>
         </a:lnSpc>
@@ -5401,7 +5551,7 @@
           <a:srgbClr val="000000"/>
         </a:buClr>
         <a:buFont typeface="Arial"/>
-        <a:defRPr b="0" i="0" sz="1400" u="none" cap="none" strike="noStrike">
+        <a:defRPr sz="1400" b="0" i="0" u="none" strike="noStrike" cap="none">
           <a:solidFill>
             <a:srgbClr val="000000"/>
           </a:solidFill>
@@ -5411,7 +5561,7 @@
           <a:sym typeface="Arial"/>
         </a:defRPr>
       </a:lvl3pPr>
-      <a:lvl4pPr lvl="3" marR="0" rtl="0" algn="l">
+      <a:lvl4pPr marR="0" lvl="3" algn="l" rtl="0">
         <a:lnSpc>
           <a:spcPct val="100000"/>
         </a:lnSpc>
@@ -5425,7 +5575,7 @@
           <a:srgbClr val="000000"/>
         </a:buClr>
         <a:buFont typeface="Arial"/>
-        <a:defRPr b="0" i="0" sz="1400" u="none" cap="none" strike="noStrike">
+        <a:defRPr sz="1400" b="0" i="0" u="none" strike="noStrike" cap="none">
           <a:solidFill>
             <a:srgbClr val="000000"/>
           </a:solidFill>
@@ -5435,7 +5585,7 @@
           <a:sym typeface="Arial"/>
         </a:defRPr>
       </a:lvl4pPr>
-      <a:lvl5pPr lvl="4" marR="0" rtl="0" algn="l">
+      <a:lvl5pPr marR="0" lvl="4" algn="l" rtl="0">
         <a:lnSpc>
           <a:spcPct val="100000"/>
         </a:lnSpc>
@@ -5449,7 +5599,7 @@
           <a:srgbClr val="000000"/>
         </a:buClr>
         <a:buFont typeface="Arial"/>
-        <a:defRPr b="0" i="0" sz="1400" u="none" cap="none" strike="noStrike">
+        <a:defRPr sz="1400" b="0" i="0" u="none" strike="noStrike" cap="none">
           <a:solidFill>
             <a:srgbClr val="000000"/>
           </a:solidFill>
@@ -5459,7 +5609,7 @@
           <a:sym typeface="Arial"/>
         </a:defRPr>
       </a:lvl5pPr>
-      <a:lvl6pPr lvl="5" marR="0" rtl="0" algn="l">
+      <a:lvl6pPr marR="0" lvl="5" algn="l" rtl="0">
         <a:lnSpc>
           <a:spcPct val="100000"/>
         </a:lnSpc>
@@ -5473,7 +5623,7 @@
           <a:srgbClr val="000000"/>
         </a:buClr>
         <a:buFont typeface="Arial"/>
-        <a:defRPr b="0" i="0" sz="1400" u="none" cap="none" strike="noStrike">
+        <a:defRPr sz="1400" b="0" i="0" u="none" strike="noStrike" cap="none">
           <a:solidFill>
             <a:srgbClr val="000000"/>
           </a:solidFill>
@@ -5483,7 +5633,7 @@
           <a:sym typeface="Arial"/>
         </a:defRPr>
       </a:lvl6pPr>
-      <a:lvl7pPr lvl="6" marR="0" rtl="0" algn="l">
+      <a:lvl7pPr marR="0" lvl="6" algn="l" rtl="0">
         <a:lnSpc>
           <a:spcPct val="100000"/>
         </a:lnSpc>
@@ -5497,7 +5647,7 @@
           <a:srgbClr val="000000"/>
         </a:buClr>
         <a:buFont typeface="Arial"/>
-        <a:defRPr b="0" i="0" sz="1400" u="none" cap="none" strike="noStrike">
+        <a:defRPr sz="1400" b="0" i="0" u="none" strike="noStrike" cap="none">
           <a:solidFill>
             <a:srgbClr val="000000"/>
           </a:solidFill>
@@ -5507,7 +5657,7 @@
           <a:sym typeface="Arial"/>
         </a:defRPr>
       </a:lvl7pPr>
-      <a:lvl8pPr lvl="7" marR="0" rtl="0" algn="l">
+      <a:lvl8pPr marR="0" lvl="7" algn="l" rtl="0">
         <a:lnSpc>
           <a:spcPct val="100000"/>
         </a:lnSpc>
@@ -5521,7 +5671,7 @@
           <a:srgbClr val="000000"/>
         </a:buClr>
         <a:buFont typeface="Arial"/>
-        <a:defRPr b="0" i="0" sz="1400" u="none" cap="none" strike="noStrike">
+        <a:defRPr sz="1400" b="0" i="0" u="none" strike="noStrike" cap="none">
           <a:solidFill>
             <a:srgbClr val="000000"/>
           </a:solidFill>
@@ -5531,7 +5681,7 @@
           <a:sym typeface="Arial"/>
         </a:defRPr>
       </a:lvl8pPr>
-      <a:lvl9pPr lvl="8" marR="0" rtl="0" algn="l">
+      <a:lvl9pPr marR="0" lvl="8" algn="l" rtl="0">
         <a:lnSpc>
           <a:spcPct val="100000"/>
         </a:lnSpc>
@@ -5545,7 +5695,7 @@
           <a:srgbClr val="000000"/>
         </a:buClr>
         <a:buFont typeface="Arial"/>
-        <a:defRPr b="0" i="0" sz="1400" u="none" cap="none" strike="noStrike">
+        <a:defRPr sz="1400" b="0" i="0" u="none" strike="noStrike" cap="none">
           <a:solidFill>
             <a:srgbClr val="000000"/>
           </a:solidFill>
@@ -5557,7 +5707,7 @@
       </a:lvl9pPr>
     </p:titleStyle>
     <p:bodyStyle>
-      <a:defPPr lvl="0" marR="0" rtl="0" algn="l">
+      <a:defPPr marR="0" lvl="0" algn="l" rtl="0">
         <a:lnSpc>
           <a:spcPct val="100000"/>
         </a:lnSpc>
@@ -5568,7 +5718,7 @@
           <a:spcPts val="0"/>
         </a:spcAft>
       </a:defPPr>
-      <a:lvl1pPr lvl="0" marR="0" rtl="0" algn="l">
+      <a:lvl1pPr marR="0" lvl="0" algn="l" rtl="0">
         <a:lnSpc>
           <a:spcPct val="100000"/>
         </a:lnSpc>
@@ -5582,7 +5732,7 @@
           <a:srgbClr val="000000"/>
         </a:buClr>
         <a:buFont typeface="Arial"/>
-        <a:defRPr b="0" i="0" sz="1400" u="none" cap="none" strike="noStrike">
+        <a:defRPr sz="1400" b="0" i="0" u="none" strike="noStrike" cap="none">
           <a:solidFill>
             <a:srgbClr val="000000"/>
           </a:solidFill>
@@ -5592,7 +5742,7 @@
           <a:sym typeface="Arial"/>
         </a:defRPr>
       </a:lvl1pPr>
-      <a:lvl2pPr lvl="1" marR="0" rtl="0" algn="l">
+      <a:lvl2pPr marR="0" lvl="1" algn="l" rtl="0">
         <a:lnSpc>
           <a:spcPct val="100000"/>
         </a:lnSpc>
@@ -5606,7 +5756,7 @@
           <a:srgbClr val="000000"/>
         </a:buClr>
         <a:buFont typeface="Arial"/>
-        <a:defRPr b="0" i="0" sz="1400" u="none" cap="none" strike="noStrike">
+        <a:defRPr sz="1400" b="0" i="0" u="none" strike="noStrike" cap="none">
           <a:solidFill>
             <a:srgbClr val="000000"/>
           </a:solidFill>
@@ -5616,7 +5766,7 @@
           <a:sym typeface="Arial"/>
         </a:defRPr>
       </a:lvl2pPr>
-      <a:lvl3pPr lvl="2" marR="0" rtl="0" algn="l">
+      <a:lvl3pPr marR="0" lvl="2" algn="l" rtl="0">
         <a:lnSpc>
           <a:spcPct val="100000"/>
         </a:lnSpc>
@@ -5630,7 +5780,7 @@
           <a:srgbClr val="000000"/>
         </a:buClr>
         <a:buFont typeface="Arial"/>
-        <a:defRPr b="0" i="0" sz="1400" u="none" cap="none" strike="noStrike">
+        <a:defRPr sz="1400" b="0" i="0" u="none" strike="noStrike" cap="none">
           <a:solidFill>
             <a:srgbClr val="000000"/>
           </a:solidFill>
@@ -5640,7 +5790,7 @@
           <a:sym typeface="Arial"/>
         </a:defRPr>
       </a:lvl3pPr>
-      <a:lvl4pPr lvl="3" marR="0" rtl="0" algn="l">
+      <a:lvl4pPr marR="0" lvl="3" algn="l" rtl="0">
         <a:lnSpc>
           <a:spcPct val="100000"/>
         </a:lnSpc>
@@ -5654,7 +5804,7 @@
           <a:srgbClr val="000000"/>
         </a:buClr>
         <a:buFont typeface="Arial"/>
-        <a:defRPr b="0" i="0" sz="1400" u="none" cap="none" strike="noStrike">
+        <a:defRPr sz="1400" b="0" i="0" u="none" strike="noStrike" cap="none">
           <a:solidFill>
             <a:srgbClr val="000000"/>
           </a:solidFill>
@@ -5664,7 +5814,7 @@
           <a:sym typeface="Arial"/>
         </a:defRPr>
       </a:lvl4pPr>
-      <a:lvl5pPr lvl="4" marR="0" rtl="0" algn="l">
+      <a:lvl5pPr marR="0" lvl="4" algn="l" rtl="0">
         <a:lnSpc>
           <a:spcPct val="100000"/>
         </a:lnSpc>
@@ -5678,7 +5828,7 @@
           <a:srgbClr val="000000"/>
         </a:buClr>
         <a:buFont typeface="Arial"/>
-        <a:defRPr b="0" i="0" sz="1400" u="none" cap="none" strike="noStrike">
+        <a:defRPr sz="1400" b="0" i="0" u="none" strike="noStrike" cap="none">
           <a:solidFill>
             <a:srgbClr val="000000"/>
           </a:solidFill>
@@ -5688,7 +5838,7 @@
           <a:sym typeface="Arial"/>
         </a:defRPr>
       </a:lvl5pPr>
-      <a:lvl6pPr lvl="5" marR="0" rtl="0" algn="l">
+      <a:lvl6pPr marR="0" lvl="5" algn="l" rtl="0">
         <a:lnSpc>
           <a:spcPct val="100000"/>
         </a:lnSpc>
@@ -5702,7 +5852,7 @@
           <a:srgbClr val="000000"/>
         </a:buClr>
         <a:buFont typeface="Arial"/>
-        <a:defRPr b="0" i="0" sz="1400" u="none" cap="none" strike="noStrike">
+        <a:defRPr sz="1400" b="0" i="0" u="none" strike="noStrike" cap="none">
           <a:solidFill>
             <a:srgbClr val="000000"/>
           </a:solidFill>
@@ -5712,7 +5862,7 @@
           <a:sym typeface="Arial"/>
         </a:defRPr>
       </a:lvl6pPr>
-      <a:lvl7pPr lvl="6" marR="0" rtl="0" algn="l">
+      <a:lvl7pPr marR="0" lvl="6" algn="l" rtl="0">
         <a:lnSpc>
           <a:spcPct val="100000"/>
         </a:lnSpc>
@@ -5726,7 +5876,7 @@
           <a:srgbClr val="000000"/>
         </a:buClr>
         <a:buFont typeface="Arial"/>
-        <a:defRPr b="0" i="0" sz="1400" u="none" cap="none" strike="noStrike">
+        <a:defRPr sz="1400" b="0" i="0" u="none" strike="noStrike" cap="none">
           <a:solidFill>
             <a:srgbClr val="000000"/>
           </a:solidFill>
@@ -5736,7 +5886,7 @@
           <a:sym typeface="Arial"/>
         </a:defRPr>
       </a:lvl7pPr>
-      <a:lvl8pPr lvl="7" marR="0" rtl="0" algn="l">
+      <a:lvl8pPr marR="0" lvl="7" algn="l" rtl="0">
         <a:lnSpc>
           <a:spcPct val="100000"/>
         </a:lnSpc>
@@ -5750,7 +5900,7 @@
           <a:srgbClr val="000000"/>
         </a:buClr>
         <a:buFont typeface="Arial"/>
-        <a:defRPr b="0" i="0" sz="1400" u="none" cap="none" strike="noStrike">
+        <a:defRPr sz="1400" b="0" i="0" u="none" strike="noStrike" cap="none">
           <a:solidFill>
             <a:srgbClr val="000000"/>
           </a:solidFill>
@@ -5760,7 +5910,7 @@
           <a:sym typeface="Arial"/>
         </a:defRPr>
       </a:lvl8pPr>
-      <a:lvl9pPr lvl="8" marR="0" rtl="0" algn="l">
+      <a:lvl9pPr marR="0" lvl="8" algn="l" rtl="0">
         <a:lnSpc>
           <a:spcPct val="100000"/>
         </a:lnSpc>
@@ -5774,7 +5924,7 @@
           <a:srgbClr val="000000"/>
         </a:buClr>
         <a:buFont typeface="Arial"/>
-        <a:defRPr b="0" i="0" sz="1400" u="none" cap="none" strike="noStrike">
+        <a:defRPr sz="1400" b="0" i="0" u="none" strike="noStrike" cap="none">
           <a:solidFill>
             <a:srgbClr val="000000"/>
           </a:solidFill>
@@ -5786,7 +5936,7 @@
       </a:lvl9pPr>
     </p:bodyStyle>
     <p:otherStyle>
-      <a:defPPr lvl="0" marR="0" rtl="0" algn="l">
+      <a:defPPr marR="0" lvl="0" algn="l" rtl="0">
         <a:lnSpc>
           <a:spcPct val="100000"/>
         </a:lnSpc>
@@ -5797,7 +5947,7 @@
           <a:spcPts val="0"/>
         </a:spcAft>
       </a:defPPr>
-      <a:lvl1pPr lvl="0" marR="0" rtl="0" algn="l">
+      <a:lvl1pPr marR="0" lvl="0" algn="l" rtl="0">
         <a:lnSpc>
           <a:spcPct val="100000"/>
         </a:lnSpc>
@@ -5811,7 +5961,7 @@
           <a:srgbClr val="000000"/>
         </a:buClr>
         <a:buFont typeface="Arial"/>
-        <a:defRPr b="0" i="0" sz="1400" u="none" cap="none" strike="noStrike">
+        <a:defRPr sz="1400" b="0" i="0" u="none" strike="noStrike" cap="none">
           <a:solidFill>
             <a:srgbClr val="000000"/>
           </a:solidFill>
@@ -5821,7 +5971,7 @@
           <a:sym typeface="Arial"/>
         </a:defRPr>
       </a:lvl1pPr>
-      <a:lvl2pPr lvl="1" marR="0" rtl="0" algn="l">
+      <a:lvl2pPr marR="0" lvl="1" algn="l" rtl="0">
         <a:lnSpc>
           <a:spcPct val="100000"/>
         </a:lnSpc>
@@ -5835,7 +5985,7 @@
           <a:srgbClr val="000000"/>
         </a:buClr>
         <a:buFont typeface="Arial"/>
-        <a:defRPr b="0" i="0" sz="1400" u="none" cap="none" strike="noStrike">
+        <a:defRPr sz="1400" b="0" i="0" u="none" strike="noStrike" cap="none">
           <a:solidFill>
             <a:srgbClr val="000000"/>
           </a:solidFill>
@@ -5845,7 +5995,7 @@
           <a:sym typeface="Arial"/>
         </a:defRPr>
       </a:lvl2pPr>
-      <a:lvl3pPr lvl="2" marR="0" rtl="0" algn="l">
+      <a:lvl3pPr marR="0" lvl="2" algn="l" rtl="0">
         <a:lnSpc>
           <a:spcPct val="100000"/>
         </a:lnSpc>
@@ -5859,7 +6009,7 @@
           <a:srgbClr val="000000"/>
         </a:buClr>
         <a:buFont typeface="Arial"/>
-        <a:defRPr b="0" i="0" sz="1400" u="none" cap="none" strike="noStrike">
+        <a:defRPr sz="1400" b="0" i="0" u="none" strike="noStrike" cap="none">
           <a:solidFill>
             <a:srgbClr val="000000"/>
           </a:solidFill>
@@ -5869,7 +6019,7 @@
           <a:sym typeface="Arial"/>
         </a:defRPr>
       </a:lvl3pPr>
-      <a:lvl4pPr lvl="3" marR="0" rtl="0" algn="l">
+      <a:lvl4pPr marR="0" lvl="3" algn="l" rtl="0">
         <a:lnSpc>
           <a:spcPct val="100000"/>
         </a:lnSpc>
@@ -5883,7 +6033,7 @@
           <a:srgbClr val="000000"/>
         </a:buClr>
         <a:buFont typeface="Arial"/>
-        <a:defRPr b="0" i="0" sz="1400" u="none" cap="none" strike="noStrike">
+        <a:defRPr sz="1400" b="0" i="0" u="none" strike="noStrike" cap="none">
           <a:solidFill>
             <a:srgbClr val="000000"/>
           </a:solidFill>
@@ -5893,7 +6043,7 @@
           <a:sym typeface="Arial"/>
         </a:defRPr>
       </a:lvl4pPr>
-      <a:lvl5pPr lvl="4" marR="0" rtl="0" algn="l">
+      <a:lvl5pPr marR="0" lvl="4" algn="l" rtl="0">
         <a:lnSpc>
           <a:spcPct val="100000"/>
         </a:lnSpc>
@@ -5907,7 +6057,7 @@
           <a:srgbClr val="000000"/>
         </a:buClr>
         <a:buFont typeface="Arial"/>
-        <a:defRPr b="0" i="0" sz="1400" u="none" cap="none" strike="noStrike">
+        <a:defRPr sz="1400" b="0" i="0" u="none" strike="noStrike" cap="none">
           <a:solidFill>
             <a:srgbClr val="000000"/>
           </a:solidFill>
@@ -5917,7 +6067,7 @@
           <a:sym typeface="Arial"/>
         </a:defRPr>
       </a:lvl5pPr>
-      <a:lvl6pPr lvl="5" marR="0" rtl="0" algn="l">
+      <a:lvl6pPr marR="0" lvl="5" algn="l" rtl="0">
         <a:lnSpc>
           <a:spcPct val="100000"/>
         </a:lnSpc>
@@ -5931,7 +6081,7 @@
           <a:srgbClr val="000000"/>
         </a:buClr>
         <a:buFont typeface="Arial"/>
-        <a:defRPr b="0" i="0" sz="1400" u="none" cap="none" strike="noStrike">
+        <a:defRPr sz="1400" b="0" i="0" u="none" strike="noStrike" cap="none">
           <a:solidFill>
             <a:srgbClr val="000000"/>
           </a:solidFill>
@@ -5941,7 +6091,7 @@
           <a:sym typeface="Arial"/>
         </a:defRPr>
       </a:lvl6pPr>
-      <a:lvl7pPr lvl="6" marR="0" rtl="0" algn="l">
+      <a:lvl7pPr marR="0" lvl="6" algn="l" rtl="0">
         <a:lnSpc>
           <a:spcPct val="100000"/>
         </a:lnSpc>
@@ -5955,7 +6105,7 @@
           <a:srgbClr val="000000"/>
         </a:buClr>
         <a:buFont typeface="Arial"/>
-        <a:defRPr b="0" i="0" sz="1400" u="none" cap="none" strike="noStrike">
+        <a:defRPr sz="1400" b="0" i="0" u="none" strike="noStrike" cap="none">
           <a:solidFill>
             <a:srgbClr val="000000"/>
           </a:solidFill>
@@ -5965,7 +6115,7 @@
           <a:sym typeface="Arial"/>
         </a:defRPr>
       </a:lvl7pPr>
-      <a:lvl8pPr lvl="7" marR="0" rtl="0" algn="l">
+      <a:lvl8pPr marR="0" lvl="7" algn="l" rtl="0">
         <a:lnSpc>
           <a:spcPct val="100000"/>
         </a:lnSpc>
@@ -5979,7 +6129,7 @@
           <a:srgbClr val="000000"/>
         </a:buClr>
         <a:buFont typeface="Arial"/>
-        <a:defRPr b="0" i="0" sz="1400" u="none" cap="none" strike="noStrike">
+        <a:defRPr sz="1400" b="0" i="0" u="none" strike="noStrike" cap="none">
           <a:solidFill>
             <a:srgbClr val="000000"/>
           </a:solidFill>
@@ -5989,7 +6139,7 @@
           <a:sym typeface="Arial"/>
         </a:defRPr>
       </a:lvl8pPr>
-      <a:lvl9pPr lvl="8" marR="0" rtl="0" algn="l">
+      <a:lvl9pPr marR="0" lvl="8" algn="l" rtl="0">
         <a:lnSpc>
           <a:spcPct val="100000"/>
         </a:lnSpc>
@@ -6003,7 +6153,7 @@
           <a:srgbClr val="000000"/>
         </a:buClr>
         <a:buFont typeface="Arial"/>
-        <a:defRPr b="0" i="0" sz="1400" u="none" cap="none" strike="noStrike">
+        <a:defRPr sz="1400" b="0" i="0" u="none" strike="noStrike" cap="none">
           <a:solidFill>
             <a:srgbClr val="000000"/>
           </a:solidFill>
@@ -6019,11 +6169,11 @@
 </file>
 
 <file path=ppt/slides/slide1.xml><?xml version="1.0" encoding="utf-8"?>
-<p:sld xmlns:a="http://schemas.openxmlformats.org/drawingml/2006/main" xmlns:r="http://schemas.openxmlformats.org/officeDocument/2006/relationships" xmlns:mc="http://schemas.openxmlformats.org/markup-compatibility/2006" xmlns:mv="urn:schemas-microsoft-com:mac:vml" xmlns:p="http://schemas.openxmlformats.org/presentationml/2006/main" xmlns:c="http://schemas.openxmlformats.org/drawingml/2006/chart" xmlns:dgm="http://schemas.openxmlformats.org/drawingml/2006/diagram" xmlns:o="urn:schemas-microsoft-com:office:office" xmlns:v="urn:schemas-microsoft-com:vml" xmlns:pvml="urn:schemas-microsoft-com:office:powerpoint" xmlns:com="http://schemas.openxmlformats.org/drawingml/2006/compatibility" xmlns:p14="http://schemas.microsoft.com/office/powerpoint/2010/main" xmlns:p15="http://schemas.microsoft.com/office/powerpoint/2012/main" xmlns:ahyp="http://schemas.microsoft.com/office/drawing/2018/hyperlinkcolor">
+<p:sld xmlns:a="http://schemas.openxmlformats.org/drawingml/2006/main" xmlns:r="http://schemas.openxmlformats.org/officeDocument/2006/relationships" xmlns:p="http://schemas.openxmlformats.org/presentationml/2006/main">
   <p:cSld>
     <p:spTree>
       <p:nvGrpSpPr>
-        <p:cNvPr id="53" name="Shape 53"/>
+        <p:cNvPr id="1" name="Shape 53"/>
         <p:cNvGrpSpPr/>
         <p:nvPr/>
       </p:nvGrpSpPr>
@@ -6038,7 +6188,9 @@
       <p:sp>
         <p:nvSpPr>
           <p:cNvPr id="54" name="Google Shape;54;p13"/>
-          <p:cNvSpPr txBox="1"/>
+          <p:cNvSpPr txBox="1">
+            <a:spLocks noGrp="1"/>
+          </p:cNvSpPr>
           <p:nvPr>
             <p:ph type="ctrTitle"/>
           </p:nvPr>
@@ -6053,12 +6205,12 @@
           </a:prstGeom>
         </p:spPr>
         <p:txBody>
-          <a:bodyPr anchorCtr="0" anchor="b" bIns="91425" lIns="91425" spcFirstLastPara="1" rIns="91425" wrap="square" tIns="91425">
+          <a:bodyPr spcFirstLastPara="1" wrap="square" lIns="91425" tIns="91425" rIns="91425" bIns="91425" anchor="b" anchorCtr="0">
             <a:noAutofit/>
           </a:bodyPr>
           <a:lstStyle/>
           <a:p>
-            <a:pPr indent="0" lvl="0" marL="0" rtl="0" algn="ctr">
+            <a:pPr marL="0" lvl="0" indent="0" algn="ctr" rtl="0">
               <a:spcBef>
                 <a:spcPts val="0"/>
               </a:spcBef>
@@ -6068,69 +6220,9 @@
               <a:buNone/>
             </a:pPr>
             <a:r>
-              <a:rPr lang="en"/>
-              <a:t>Project Title</a:t>
+              <a:rPr lang="en-US" dirty="0"/>
+              <a:t>P1T2-Array-of-Sunshine</a:t>
             </a:r>
-            <a:endParaRPr/>
-          </a:p>
-        </p:txBody>
-      </p:sp>
-      <p:sp>
-        <p:nvSpPr>
-          <p:cNvPr id="55" name="Google Shape;55;p13"/>
-          <p:cNvSpPr txBox="1"/>
-          <p:nvPr>
-            <p:ph idx="1" type="subTitle"/>
-          </p:nvPr>
-        </p:nvSpPr>
-        <p:spPr>
-          <a:xfrm>
-            <a:off x="311700" y="2834125"/>
-            <a:ext cx="8520600" cy="792600"/>
-          </a:xfrm>
-          <a:prstGeom prst="rect">
-            <a:avLst/>
-          </a:prstGeom>
-        </p:spPr>
-        <p:txBody>
-          <a:bodyPr anchorCtr="0" anchor="t" bIns="91425" lIns="91425" spcFirstLastPara="1" rIns="91425" wrap="square" tIns="91425">
-            <a:noAutofit/>
-          </a:bodyPr>
-          <a:lstStyle/>
-          <a:p>
-            <a:pPr indent="0" lvl="0" marL="0" rtl="0" algn="ctr">
-              <a:spcBef>
-                <a:spcPts val="0"/>
-              </a:spcBef>
-              <a:spcAft>
-                <a:spcPts val="0"/>
-              </a:spcAft>
-              <a:buNone/>
-            </a:pPr>
-            <a:r>
-              <a:rPr lang="en">
-                <a:solidFill>
-                  <a:srgbClr val="FFFFFF"/>
-                </a:solidFill>
-                <a:highlight>
-                  <a:srgbClr val="FF0000"/>
-                </a:highlight>
-              </a:rPr>
-              <a:t>MAKE A COPY!</a:t>
-            </a:r>
-            <a:r>
-              <a:rPr lang="en">
-                <a:highlight>
-                  <a:srgbClr val="FFFF00"/>
-                </a:highlight>
-              </a:rPr>
-              <a:t> DO NOT REQUEST EDIT ACCESS</a:t>
-            </a:r>
-            <a:endParaRPr>
-              <a:highlight>
-                <a:srgbClr val="FFFF00"/>
-              </a:highlight>
-            </a:endParaRPr>
           </a:p>
         </p:txBody>
       </p:sp>
@@ -6143,11 +6235,11 @@
 </file>
 
 <file path=ppt/slides/slide2.xml><?xml version="1.0" encoding="utf-8"?>
-<p:sld xmlns:a="http://schemas.openxmlformats.org/drawingml/2006/main" xmlns:r="http://schemas.openxmlformats.org/officeDocument/2006/relationships" xmlns:mc="http://schemas.openxmlformats.org/markup-compatibility/2006" xmlns:mv="urn:schemas-microsoft-com:mac:vml" xmlns:p="http://schemas.openxmlformats.org/presentationml/2006/main" xmlns:c="http://schemas.openxmlformats.org/drawingml/2006/chart" xmlns:dgm="http://schemas.openxmlformats.org/drawingml/2006/diagram" xmlns:o="urn:schemas-microsoft-com:office:office" xmlns:v="urn:schemas-microsoft-com:vml" xmlns:pvml="urn:schemas-microsoft-com:office:powerpoint" xmlns:com="http://schemas.openxmlformats.org/drawingml/2006/compatibility" xmlns:p14="http://schemas.microsoft.com/office/powerpoint/2010/main" xmlns:p15="http://schemas.microsoft.com/office/powerpoint/2012/main" xmlns:ahyp="http://schemas.microsoft.com/office/drawing/2018/hyperlinkcolor">
+<p:sld xmlns:a="http://schemas.openxmlformats.org/drawingml/2006/main" xmlns:r="http://schemas.openxmlformats.org/officeDocument/2006/relationships" xmlns:p="http://schemas.openxmlformats.org/presentationml/2006/main">
   <p:cSld>
     <p:spTree>
       <p:nvGrpSpPr>
-        <p:cNvPr id="59" name="Shape 59"/>
+        <p:cNvPr id="1" name="Shape 59"/>
         <p:cNvGrpSpPr/>
         <p:nvPr/>
       </p:nvGrpSpPr>
@@ -6162,27 +6254,29 @@
       <p:sp>
         <p:nvSpPr>
           <p:cNvPr id="60" name="Google Shape;60;p14"/>
-          <p:cNvSpPr txBox="1"/>
+          <p:cNvSpPr txBox="1">
+            <a:spLocks noGrp="1"/>
+          </p:cNvSpPr>
           <p:nvPr>
             <p:ph type="title"/>
           </p:nvPr>
         </p:nvSpPr>
         <p:spPr>
           <a:xfrm>
-            <a:off x="311700" y="2150850"/>
-            <a:ext cx="8520600" cy="841800"/>
+            <a:off x="311700" y="245327"/>
+            <a:ext cx="8520600" cy="4549697"/>
           </a:xfrm>
           <a:prstGeom prst="rect">
             <a:avLst/>
           </a:prstGeom>
         </p:spPr>
         <p:txBody>
-          <a:bodyPr anchorCtr="0" anchor="ctr" bIns="91425" lIns="91425" spcFirstLastPara="1" rIns="91425" wrap="square" tIns="91425">
+          <a:bodyPr spcFirstLastPara="1" wrap="square" lIns="91425" tIns="91425" rIns="91425" bIns="91425" anchor="ctr" anchorCtr="0">
             <a:noAutofit/>
           </a:bodyPr>
           <a:lstStyle/>
           <a:p>
-            <a:pPr indent="0" lvl="0" marL="0" rtl="0" algn="ctr">
+            <a:pPr marL="0" lvl="0" indent="0" algn="l" rtl="0">
               <a:spcBef>
                 <a:spcPts val="0"/>
               </a:spcBef>
@@ -6192,10 +6286,14 @@
               <a:buNone/>
             </a:pPr>
             <a:r>
-              <a:rPr lang="en"/>
-              <a:t>Elevator pitch</a:t>
+              <a:rPr lang="en-US" sz="1800" dirty="0"/>
+              <a:t>"Level up your logic skills with our Connect 4-inspired game, built from the ground up using HTML, CSS, and JavaScript! Designed as a coding bootcamp project, this interactive web game delivers a fun and engaging experience while showcasing dynamic UI updates, responsive design, and core JavaScript functionality. Play against a friend, test your strategic thinking, and see how simple web technologies come together to create an immersive gameplay experience!"</a:t>
             </a:r>
-            <a:endParaRPr/>
+            <a:r>
+              <a:rPr lang="en" sz="1800" dirty="0"/>
+              <a:t> pitch</a:t>
+            </a:r>
+            <a:endParaRPr sz="1800" dirty="0"/>
           </a:p>
         </p:txBody>
       </p:sp>
@@ -6208,11 +6306,11 @@
 </file>
 
 <file path=ppt/slides/slide3.xml><?xml version="1.0" encoding="utf-8"?>
-<p:sld xmlns:a="http://schemas.openxmlformats.org/drawingml/2006/main" xmlns:r="http://schemas.openxmlformats.org/officeDocument/2006/relationships" xmlns:mc="http://schemas.openxmlformats.org/markup-compatibility/2006" xmlns:mv="urn:schemas-microsoft-com:mac:vml" xmlns:p="http://schemas.openxmlformats.org/presentationml/2006/main" xmlns:c="http://schemas.openxmlformats.org/drawingml/2006/chart" xmlns:dgm="http://schemas.openxmlformats.org/drawingml/2006/diagram" xmlns:o="urn:schemas-microsoft-com:office:office" xmlns:v="urn:schemas-microsoft-com:vml" xmlns:pvml="urn:schemas-microsoft-com:office:powerpoint" xmlns:com="http://schemas.openxmlformats.org/drawingml/2006/compatibility" xmlns:p14="http://schemas.microsoft.com/office/powerpoint/2010/main" xmlns:p15="http://schemas.microsoft.com/office/powerpoint/2012/main" xmlns:ahyp="http://schemas.microsoft.com/office/drawing/2018/hyperlinkcolor">
+<p:sld xmlns:a="http://schemas.openxmlformats.org/drawingml/2006/main" xmlns:r="http://schemas.openxmlformats.org/officeDocument/2006/relationships" xmlns:p="http://schemas.openxmlformats.org/presentationml/2006/main">
   <p:cSld>
     <p:spTree>
       <p:nvGrpSpPr>
-        <p:cNvPr id="64" name="Shape 64"/>
+        <p:cNvPr id="1" name="Shape 64"/>
         <p:cNvGrpSpPr/>
         <p:nvPr/>
       </p:nvGrpSpPr>
@@ -6227,7 +6325,185 @@
       <p:sp>
         <p:nvSpPr>
           <p:cNvPr id="65" name="Google Shape;65;p15"/>
-          <p:cNvSpPr txBox="1"/>
+          <p:cNvSpPr txBox="1">
+            <a:spLocks noGrp="1"/>
+          </p:cNvSpPr>
+          <p:nvPr>
+            <p:ph type="title"/>
+          </p:nvPr>
+        </p:nvSpPr>
+        <p:spPr>
+          <a:xfrm>
+            <a:off x="311700" y="1925"/>
+            <a:ext cx="8520600" cy="572700"/>
+          </a:xfrm>
+          <a:prstGeom prst="rect">
+            <a:avLst/>
+          </a:prstGeom>
+        </p:spPr>
+        <p:txBody>
+          <a:bodyPr spcFirstLastPara="1" wrap="square" lIns="91425" tIns="91425" rIns="91425" bIns="91425" anchor="t" anchorCtr="0">
+            <a:noAutofit/>
+          </a:bodyPr>
+          <a:lstStyle/>
+          <a:p>
+            <a:pPr marL="0" lvl="0" indent="0" algn="l" rtl="0">
+              <a:spcBef>
+                <a:spcPts val="0"/>
+              </a:spcBef>
+              <a:spcAft>
+                <a:spcPts val="0"/>
+              </a:spcAft>
+              <a:buNone/>
+            </a:pPr>
+            <a:r>
+              <a:rPr lang="en" b="1" dirty="0">
+                <a:solidFill>
+                  <a:schemeClr val="dk2"/>
+                </a:solidFill>
+              </a:rPr>
+              <a:t>Concept</a:t>
+            </a:r>
+            <a:endParaRPr b="1" dirty="0">
+              <a:solidFill>
+                <a:schemeClr val="dk2"/>
+              </a:solidFill>
+            </a:endParaRPr>
+          </a:p>
+        </p:txBody>
+      </p:sp>
+      <p:sp>
+        <p:nvSpPr>
+          <p:cNvPr id="66" name="Google Shape;66;p15"/>
+          <p:cNvSpPr txBox="1">
+            <a:spLocks noGrp="1"/>
+          </p:cNvSpPr>
+          <p:nvPr>
+            <p:ph type="body" idx="1"/>
+          </p:nvPr>
+        </p:nvSpPr>
+        <p:spPr>
+          <a:xfrm>
+            <a:off x="311700" y="574625"/>
+            <a:ext cx="8520600" cy="3416400"/>
+          </a:xfrm>
+          <a:prstGeom prst="rect">
+            <a:avLst/>
+          </a:prstGeom>
+        </p:spPr>
+        <p:txBody>
+          <a:bodyPr spcFirstLastPara="1" wrap="square" lIns="91425" tIns="91425" rIns="91425" bIns="91425" anchor="t" anchorCtr="0">
+            <a:noAutofit/>
+          </a:bodyPr>
+          <a:lstStyle/>
+          <a:p>
+            <a:pPr marL="114300" lvl="0" indent="0" algn="l" rtl="0">
+              <a:spcBef>
+                <a:spcPts val="0"/>
+              </a:spcBef>
+              <a:spcAft>
+                <a:spcPts val="0"/>
+              </a:spcAft>
+              <a:buSzPts val="1800"/>
+              <a:buNone/>
+            </a:pPr>
+            <a:r>
+              <a:rPr lang="en" sz="1600" b="1" dirty="0"/>
+              <a:t>Description</a:t>
+            </a:r>
+            <a:endParaRPr lang="en-US" sz="1600" b="1" dirty="0"/>
+          </a:p>
+          <a:p>
+            <a:pPr marL="114300" indent="0">
+              <a:buNone/>
+            </a:pPr>
+            <a:r>
+              <a:rPr lang="en-US" sz="1200" dirty="0"/>
+              <a:t>Array of Sunshine is a web-based twist on the classic game, built with HTML, CSS, and JavaScript for an interactive and personalized experience. Players can choose custom token colors and create a username that persists via local storage. Smooth animations bring the game to life as tokens drop into place, while an intuitive message UI guides players with turn-based prompts and victory messages. With its dynamic visuals and engaging mechanics, Array of Sunshine offers a fresh, fun way to enjoy this timeless strategy game.</a:t>
+            </a:r>
+          </a:p>
+          <a:p>
+            <a:pPr marL="114300" indent="0">
+              <a:buNone/>
+            </a:pPr>
+            <a:endParaRPr lang="en-US" sz="1200" dirty="0"/>
+          </a:p>
+          <a:p>
+            <a:pPr marL="114300" indent="0">
+              <a:buNone/>
+            </a:pPr>
+            <a:r>
+              <a:rPr lang="en-US" sz="1600" b="1" dirty="0"/>
+              <a:t>Motivation for development?</a:t>
+            </a:r>
+          </a:p>
+          <a:p>
+            <a:pPr marL="114300" indent="0">
+              <a:buNone/>
+            </a:pPr>
+            <a:r>
+              <a:rPr lang="en-US" sz="1200" dirty="0"/>
+              <a:t>Stuff</a:t>
+            </a:r>
+          </a:p>
+          <a:p>
+            <a:pPr marL="114300" indent="0">
+              <a:buNone/>
+            </a:pPr>
+            <a:endParaRPr lang="en-US" sz="1200" dirty="0"/>
+          </a:p>
+          <a:p>
+            <a:pPr marL="114300" indent="0">
+              <a:buNone/>
+            </a:pPr>
+            <a:r>
+              <a:rPr lang="en" sz="1600" b="1" dirty="0"/>
+              <a:t>User story</a:t>
+            </a:r>
+            <a:endParaRPr lang="en-US" sz="1200" dirty="0"/>
+          </a:p>
+          <a:p>
+            <a:pPr marL="114300" indent="0">
+              <a:buNone/>
+            </a:pPr>
+            <a:r>
+              <a:rPr lang="en-US" sz="1200" dirty="0"/>
+              <a:t>As a player, I want to customize my game experience by selecting my own token color and creating a unique username that saves for future sessions, so I can feel more connected to the game. I want smooth, animated gameplay where tokens drop seamlessly into place, making each move visually satisfying. Throughout the game, I expect clear and engaging messages that prompt my actions, indicate turns, and celebrate wins, so I always know what’s happening. Ultimately, I want an interactive, customizable and visually appealing way to enjoy the classic Connect 4 experience right in my browser.</a:t>
+            </a:r>
+          </a:p>
+        </p:txBody>
+      </p:sp>
+    </p:spTree>
+  </p:cSld>
+  <p:clrMapOvr>
+    <a:masterClrMapping/>
+  </p:clrMapOvr>
+</p:sld>
+</file>
+
+<file path=ppt/slides/slide4.xml><?xml version="1.0" encoding="utf-8"?>
+<p:sld xmlns:a="http://schemas.openxmlformats.org/drawingml/2006/main" xmlns:r="http://schemas.openxmlformats.org/officeDocument/2006/relationships" xmlns:p="http://schemas.openxmlformats.org/presentationml/2006/main">
+  <p:cSld>
+    <p:spTree>
+      <p:nvGrpSpPr>
+        <p:cNvPr id="1" name="Shape 70"/>
+        <p:cNvGrpSpPr/>
+        <p:nvPr/>
+      </p:nvGrpSpPr>
+      <p:grpSpPr>
+        <a:xfrm>
+          <a:off x="0" y="0"/>
+          <a:ext cx="0" cy="0"/>
+          <a:chOff x="0" y="0"/>
+          <a:chExt cx="0" cy="0"/>
+        </a:xfrm>
+      </p:grpSpPr>
+      <p:sp>
+        <p:nvSpPr>
+          <p:cNvPr id="71" name="Google Shape;71;p16"/>
+          <p:cNvSpPr txBox="1">
+            <a:spLocks noGrp="1"/>
+          </p:cNvSpPr>
           <p:nvPr>
             <p:ph type="title"/>
           </p:nvPr>
@@ -6242,12 +6518,12 @@
           </a:prstGeom>
         </p:spPr>
         <p:txBody>
-          <a:bodyPr anchorCtr="0" anchor="t" bIns="91425" lIns="91425" spcFirstLastPara="1" rIns="91425" wrap="square" tIns="91425">
+          <a:bodyPr spcFirstLastPara="1" wrap="square" lIns="91425" tIns="91425" rIns="91425" bIns="91425" anchor="t" anchorCtr="0">
             <a:noAutofit/>
           </a:bodyPr>
           <a:lstStyle/>
           <a:p>
-            <a:pPr indent="0" lvl="0" marL="0" rtl="0" algn="l">
+            <a:pPr marL="0" lvl="0" indent="0" algn="l" rtl="0">
               <a:spcBef>
                 <a:spcPts val="0"/>
               </a:spcBef>
@@ -6258,7 +6534,7 @@
             </a:pPr>
             <a:r>
               <a:rPr lang="en"/>
-              <a:t>Concept</a:t>
+              <a:t>Process</a:t>
             </a:r>
             <a:endParaRPr/>
           </a:p>
@@ -6266,10 +6542,12 @@
       </p:sp>
       <p:sp>
         <p:nvSpPr>
-          <p:cNvPr id="66" name="Google Shape;66;p15"/>
-          <p:cNvSpPr txBox="1"/>
+          <p:cNvPr id="72" name="Google Shape;72;p16"/>
+          <p:cNvSpPr txBox="1">
+            <a:spLocks noGrp="1"/>
+          </p:cNvSpPr>
           <p:nvPr>
-            <p:ph idx="1" type="body"/>
+            <p:ph type="body" idx="1"/>
           </p:nvPr>
         </p:nvSpPr>
         <p:spPr>
@@ -6282,152 +6560,12 @@
           </a:prstGeom>
         </p:spPr>
         <p:txBody>
-          <a:bodyPr anchorCtr="0" anchor="t" bIns="91425" lIns="91425" spcFirstLastPara="1" rIns="91425" wrap="square" tIns="91425">
+          <a:bodyPr spcFirstLastPara="1" wrap="square" lIns="91425" tIns="91425" rIns="91425" bIns="91425" anchor="t" anchorCtr="0">
             <a:noAutofit/>
           </a:bodyPr>
           <a:lstStyle/>
           <a:p>
-            <a:pPr indent="-342900" lvl="0" marL="457200" rtl="0" algn="l">
-              <a:spcBef>
-                <a:spcPts val="0"/>
-              </a:spcBef>
-              <a:spcAft>
-                <a:spcPts val="0"/>
-              </a:spcAft>
-              <a:buSzPts val="1800"/>
-              <a:buChar char="●"/>
-            </a:pPr>
-            <a:r>
-              <a:rPr lang="en"/>
-              <a:t>Description</a:t>
-            </a:r>
-            <a:endParaRPr/>
-          </a:p>
-          <a:p>
-            <a:pPr indent="-342900" lvl="0" marL="457200" rtl="0" algn="l">
-              <a:spcBef>
-                <a:spcPts val="0"/>
-              </a:spcBef>
-              <a:spcAft>
-                <a:spcPts val="0"/>
-              </a:spcAft>
-              <a:buSzPts val="1800"/>
-              <a:buChar char="●"/>
-            </a:pPr>
-            <a:r>
-              <a:rPr lang="en"/>
-              <a:t>Motivation for development?</a:t>
-            </a:r>
-            <a:endParaRPr/>
-          </a:p>
-          <a:p>
-            <a:pPr indent="-342900" lvl="0" marL="457200" rtl="0" algn="l">
-              <a:spcBef>
-                <a:spcPts val="0"/>
-              </a:spcBef>
-              <a:spcAft>
-                <a:spcPts val="0"/>
-              </a:spcAft>
-              <a:buSzPts val="1800"/>
-              <a:buChar char="●"/>
-            </a:pPr>
-            <a:r>
-              <a:rPr lang="en"/>
-              <a:t>User story</a:t>
-            </a:r>
-            <a:endParaRPr/>
-          </a:p>
-        </p:txBody>
-      </p:sp>
-    </p:spTree>
-  </p:cSld>
-  <p:clrMapOvr>
-    <a:masterClrMapping/>
-  </p:clrMapOvr>
-</p:sld>
-</file>
-
-<file path=ppt/slides/slide4.xml><?xml version="1.0" encoding="utf-8"?>
-<p:sld xmlns:a="http://schemas.openxmlformats.org/drawingml/2006/main" xmlns:r="http://schemas.openxmlformats.org/officeDocument/2006/relationships" xmlns:mc="http://schemas.openxmlformats.org/markup-compatibility/2006" xmlns:mv="urn:schemas-microsoft-com:mac:vml" xmlns:p="http://schemas.openxmlformats.org/presentationml/2006/main" xmlns:c="http://schemas.openxmlformats.org/drawingml/2006/chart" xmlns:dgm="http://schemas.openxmlformats.org/drawingml/2006/diagram" xmlns:o="urn:schemas-microsoft-com:office:office" xmlns:v="urn:schemas-microsoft-com:vml" xmlns:pvml="urn:schemas-microsoft-com:office:powerpoint" xmlns:com="http://schemas.openxmlformats.org/drawingml/2006/compatibility" xmlns:p14="http://schemas.microsoft.com/office/powerpoint/2010/main" xmlns:p15="http://schemas.microsoft.com/office/powerpoint/2012/main" xmlns:ahyp="http://schemas.microsoft.com/office/drawing/2018/hyperlinkcolor">
-  <p:cSld>
-    <p:spTree>
-      <p:nvGrpSpPr>
-        <p:cNvPr id="70" name="Shape 70"/>
-        <p:cNvGrpSpPr/>
-        <p:nvPr/>
-      </p:nvGrpSpPr>
-      <p:grpSpPr>
-        <a:xfrm>
-          <a:off x="0" y="0"/>
-          <a:ext cx="0" cy="0"/>
-          <a:chOff x="0" y="0"/>
-          <a:chExt cx="0" cy="0"/>
-        </a:xfrm>
-      </p:grpSpPr>
-      <p:sp>
-        <p:nvSpPr>
-          <p:cNvPr id="71" name="Google Shape;71;p16"/>
-          <p:cNvSpPr txBox="1"/>
-          <p:nvPr>
-            <p:ph type="title"/>
-          </p:nvPr>
-        </p:nvSpPr>
-        <p:spPr>
-          <a:xfrm>
-            <a:off x="311700" y="445025"/>
-            <a:ext cx="8520600" cy="572700"/>
-          </a:xfrm>
-          <a:prstGeom prst="rect">
-            <a:avLst/>
-          </a:prstGeom>
-        </p:spPr>
-        <p:txBody>
-          <a:bodyPr anchorCtr="0" anchor="t" bIns="91425" lIns="91425" spcFirstLastPara="1" rIns="91425" wrap="square" tIns="91425">
-            <a:noAutofit/>
-          </a:bodyPr>
-          <a:lstStyle/>
-          <a:p>
-            <a:pPr indent="0" lvl="0" marL="0" rtl="0" algn="l">
-              <a:spcBef>
-                <a:spcPts val="0"/>
-              </a:spcBef>
-              <a:spcAft>
-                <a:spcPts val="0"/>
-              </a:spcAft>
-              <a:buNone/>
-            </a:pPr>
-            <a:r>
-              <a:rPr lang="en"/>
-              <a:t>Process</a:t>
-            </a:r>
-            <a:endParaRPr/>
-          </a:p>
-        </p:txBody>
-      </p:sp>
-      <p:sp>
-        <p:nvSpPr>
-          <p:cNvPr id="72" name="Google Shape;72;p16"/>
-          <p:cNvSpPr txBox="1"/>
-          <p:nvPr>
-            <p:ph idx="1" type="body"/>
-          </p:nvPr>
-        </p:nvSpPr>
-        <p:spPr>
-          <a:xfrm>
-            <a:off x="311700" y="1152475"/>
-            <a:ext cx="8520600" cy="3416400"/>
-          </a:xfrm>
-          <a:prstGeom prst="rect">
-            <a:avLst/>
-          </a:prstGeom>
-        </p:spPr>
-        <p:txBody>
-          <a:bodyPr anchorCtr="0" anchor="t" bIns="91425" lIns="91425" spcFirstLastPara="1" rIns="91425" wrap="square" tIns="91425">
-            <a:noAutofit/>
-          </a:bodyPr>
-          <a:lstStyle/>
-          <a:p>
-            <a:pPr indent="-342900" lvl="0" marL="457200" rtl="0" algn="l">
+            <a:pPr marL="457200" lvl="0" indent="-342900" algn="l" rtl="0">
               <a:spcBef>
                 <a:spcPts val="0"/>
               </a:spcBef>
@@ -6444,7 +6582,7 @@
             <a:endParaRPr/>
           </a:p>
           <a:p>
-            <a:pPr indent="-342900" lvl="0" marL="457200" rtl="0" algn="l">
+            <a:pPr marL="457200" lvl="0" indent="-342900" algn="l" rtl="0">
               <a:spcBef>
                 <a:spcPts val="0"/>
               </a:spcBef>
@@ -6461,7 +6599,7 @@
             <a:endParaRPr/>
           </a:p>
           <a:p>
-            <a:pPr indent="-342900" lvl="0" marL="457200" rtl="0" algn="l">
+            <a:pPr marL="457200" lvl="0" indent="-342900" algn="l" rtl="0">
               <a:spcBef>
                 <a:spcPts val="0"/>
               </a:spcBef>
@@ -6478,7 +6616,7 @@
             <a:endParaRPr/>
           </a:p>
           <a:p>
-            <a:pPr indent="-342900" lvl="0" marL="457200" rtl="0" algn="l">
+            <a:pPr marL="457200" lvl="0" indent="-342900" algn="l" rtl="0">
               <a:spcBef>
                 <a:spcPts val="0"/>
               </a:spcBef>
@@ -6505,11 +6643,11 @@
 </file>
 
 <file path=ppt/slides/slide5.xml><?xml version="1.0" encoding="utf-8"?>
-<p:sld xmlns:a="http://schemas.openxmlformats.org/drawingml/2006/main" xmlns:r="http://schemas.openxmlformats.org/officeDocument/2006/relationships" xmlns:mc="http://schemas.openxmlformats.org/markup-compatibility/2006" xmlns:mv="urn:schemas-microsoft-com:mac:vml" xmlns:p="http://schemas.openxmlformats.org/presentationml/2006/main" xmlns:c="http://schemas.openxmlformats.org/drawingml/2006/chart" xmlns:dgm="http://schemas.openxmlformats.org/drawingml/2006/diagram" xmlns:o="urn:schemas-microsoft-com:office:office" xmlns:v="urn:schemas-microsoft-com:vml" xmlns:pvml="urn:schemas-microsoft-com:office:powerpoint" xmlns:com="http://schemas.openxmlformats.org/drawingml/2006/compatibility" xmlns:p14="http://schemas.microsoft.com/office/powerpoint/2010/main" xmlns:p15="http://schemas.microsoft.com/office/powerpoint/2012/main" xmlns:ahyp="http://schemas.microsoft.com/office/drawing/2018/hyperlinkcolor">
+<p:sld xmlns:a="http://schemas.openxmlformats.org/drawingml/2006/main" xmlns:r="http://schemas.openxmlformats.org/officeDocument/2006/relationships" xmlns:p="http://schemas.openxmlformats.org/presentationml/2006/main">
   <p:cSld>
     <p:spTree>
       <p:nvGrpSpPr>
-        <p:cNvPr id="76" name="Shape 76"/>
+        <p:cNvPr id="1" name="Shape 76"/>
         <p:cNvGrpSpPr/>
         <p:nvPr/>
       </p:nvGrpSpPr>
@@ -6524,7 +6662,9 @@
       <p:sp>
         <p:nvSpPr>
           <p:cNvPr id="77" name="Google Shape;77;p17"/>
-          <p:cNvSpPr txBox="1"/>
+          <p:cNvSpPr txBox="1">
+            <a:spLocks noGrp="1"/>
+          </p:cNvSpPr>
           <p:nvPr>
             <p:ph type="title"/>
           </p:nvPr>
@@ -6539,12 +6679,12 @@
           </a:prstGeom>
         </p:spPr>
         <p:txBody>
-          <a:bodyPr anchorCtr="0" anchor="ctr" bIns="91425" lIns="91425" spcFirstLastPara="1" rIns="91425" wrap="square" tIns="91425">
+          <a:bodyPr spcFirstLastPara="1" wrap="square" lIns="91425" tIns="91425" rIns="91425" bIns="91425" anchor="ctr" anchorCtr="0">
             <a:noAutofit/>
           </a:bodyPr>
           <a:lstStyle/>
           <a:p>
-            <a:pPr indent="0" lvl="0" marL="0" rtl="0" algn="ctr">
+            <a:pPr marL="0" lvl="0" indent="0" algn="ctr" rtl="0">
               <a:spcBef>
                 <a:spcPts val="0"/>
               </a:spcBef>
@@ -6570,11 +6710,11 @@
 </file>
 
 <file path=ppt/slides/slide6.xml><?xml version="1.0" encoding="utf-8"?>
-<p:sld xmlns:a="http://schemas.openxmlformats.org/drawingml/2006/main" xmlns:r="http://schemas.openxmlformats.org/officeDocument/2006/relationships" xmlns:mc="http://schemas.openxmlformats.org/markup-compatibility/2006" xmlns:mv="urn:schemas-microsoft-com:mac:vml" xmlns:p="http://schemas.openxmlformats.org/presentationml/2006/main" xmlns:c="http://schemas.openxmlformats.org/drawingml/2006/chart" xmlns:dgm="http://schemas.openxmlformats.org/drawingml/2006/diagram" xmlns:o="urn:schemas-microsoft-com:office:office" xmlns:v="urn:schemas-microsoft-com:vml" xmlns:pvml="urn:schemas-microsoft-com:office:powerpoint" xmlns:com="http://schemas.openxmlformats.org/drawingml/2006/compatibility" xmlns:p14="http://schemas.microsoft.com/office/powerpoint/2010/main" xmlns:p15="http://schemas.microsoft.com/office/powerpoint/2012/main" xmlns:ahyp="http://schemas.microsoft.com/office/drawing/2018/hyperlinkcolor">
+<p:sld xmlns:a="http://schemas.openxmlformats.org/drawingml/2006/main" xmlns:r="http://schemas.openxmlformats.org/officeDocument/2006/relationships" xmlns:p="http://schemas.openxmlformats.org/presentationml/2006/main">
   <p:cSld>
     <p:spTree>
       <p:nvGrpSpPr>
-        <p:cNvPr id="81" name="Shape 81"/>
+        <p:cNvPr id="1" name="Shape 81"/>
         <p:cNvGrpSpPr/>
         <p:nvPr/>
       </p:nvGrpSpPr>
@@ -6589,7 +6729,9 @@
       <p:sp>
         <p:nvSpPr>
           <p:cNvPr id="82" name="Google Shape;82;p18"/>
-          <p:cNvSpPr txBox="1"/>
+          <p:cNvSpPr txBox="1">
+            <a:spLocks noGrp="1"/>
+          </p:cNvSpPr>
           <p:nvPr>
             <p:ph type="title"/>
           </p:nvPr>
@@ -6604,12 +6746,12 @@
           </a:prstGeom>
         </p:spPr>
         <p:txBody>
-          <a:bodyPr anchorCtr="0" anchor="t" bIns="91425" lIns="91425" spcFirstLastPara="1" rIns="91425" wrap="square" tIns="91425">
+          <a:bodyPr spcFirstLastPara="1" wrap="square" lIns="91425" tIns="91425" rIns="91425" bIns="91425" anchor="t" anchorCtr="0">
             <a:noAutofit/>
           </a:bodyPr>
           <a:lstStyle/>
           <a:p>
-            <a:pPr indent="0" lvl="0" marL="0" rtl="0" algn="l">
+            <a:pPr marL="0" lvl="0" indent="0" algn="l" rtl="0">
               <a:spcBef>
                 <a:spcPts val="0"/>
               </a:spcBef>
@@ -6635,11 +6777,11 @@
 </file>
 
 <file path=ppt/slides/slide7.xml><?xml version="1.0" encoding="utf-8"?>
-<p:sld xmlns:a="http://schemas.openxmlformats.org/drawingml/2006/main" xmlns:r="http://schemas.openxmlformats.org/officeDocument/2006/relationships" xmlns:mc="http://schemas.openxmlformats.org/markup-compatibility/2006" xmlns:mv="urn:schemas-microsoft-com:mac:vml" xmlns:p="http://schemas.openxmlformats.org/presentationml/2006/main" xmlns:c="http://schemas.openxmlformats.org/drawingml/2006/chart" xmlns:dgm="http://schemas.openxmlformats.org/drawingml/2006/diagram" xmlns:o="urn:schemas-microsoft-com:office:office" xmlns:v="urn:schemas-microsoft-com:vml" xmlns:pvml="urn:schemas-microsoft-com:office:powerpoint" xmlns:com="http://schemas.openxmlformats.org/drawingml/2006/compatibility" xmlns:p14="http://schemas.microsoft.com/office/powerpoint/2010/main" xmlns:p15="http://schemas.microsoft.com/office/powerpoint/2012/main" xmlns:ahyp="http://schemas.microsoft.com/office/drawing/2018/hyperlinkcolor">
+<p:sld xmlns:a="http://schemas.openxmlformats.org/drawingml/2006/main" xmlns:r="http://schemas.openxmlformats.org/officeDocument/2006/relationships" xmlns:p="http://schemas.openxmlformats.org/presentationml/2006/main">
   <p:cSld>
     <p:spTree>
       <p:nvGrpSpPr>
-        <p:cNvPr id="86" name="Shape 86"/>
+        <p:cNvPr id="1" name="Shape 86"/>
         <p:cNvGrpSpPr/>
         <p:nvPr/>
       </p:nvGrpSpPr>
@@ -6654,7 +6796,9 @@
       <p:sp>
         <p:nvSpPr>
           <p:cNvPr id="87" name="Google Shape;87;p19"/>
-          <p:cNvSpPr txBox="1"/>
+          <p:cNvSpPr txBox="1">
+            <a:spLocks noGrp="1"/>
+          </p:cNvSpPr>
           <p:nvPr>
             <p:ph type="title"/>
           </p:nvPr>
@@ -6669,12 +6813,12 @@
           </a:prstGeom>
         </p:spPr>
         <p:txBody>
-          <a:bodyPr anchorCtr="0" anchor="t" bIns="91425" lIns="91425" spcFirstLastPara="1" rIns="91425" wrap="square" tIns="91425">
+          <a:bodyPr spcFirstLastPara="1" wrap="square" lIns="91425" tIns="91425" rIns="91425" bIns="91425" anchor="t" anchorCtr="0">
             <a:noAutofit/>
           </a:bodyPr>
           <a:lstStyle/>
           <a:p>
-            <a:pPr indent="0" lvl="0" marL="0" rtl="0" algn="l">
+            <a:pPr marL="0" lvl="0" indent="0" algn="l" rtl="0">
               <a:spcBef>
                 <a:spcPts val="0"/>
               </a:spcBef>
@@ -6694,9 +6838,11 @@
       <p:sp>
         <p:nvSpPr>
           <p:cNvPr id="88" name="Google Shape;88;p19"/>
-          <p:cNvSpPr txBox="1"/>
+          <p:cNvSpPr txBox="1">
+            <a:spLocks noGrp="1"/>
+          </p:cNvSpPr>
           <p:nvPr>
-            <p:ph idx="1" type="body"/>
+            <p:ph type="body" idx="1"/>
           </p:nvPr>
         </p:nvSpPr>
         <p:spPr>
@@ -6709,12 +6855,12 @@
           </a:prstGeom>
         </p:spPr>
         <p:txBody>
-          <a:bodyPr anchorCtr="0" anchor="t" bIns="91425" lIns="91425" spcFirstLastPara="1" rIns="91425" wrap="square" tIns="91425">
+          <a:bodyPr spcFirstLastPara="1" wrap="square" lIns="91425" tIns="91425" rIns="91425" bIns="91425" anchor="t" anchorCtr="0">
             <a:noAutofit/>
           </a:bodyPr>
           <a:lstStyle/>
           <a:p>
-            <a:pPr indent="-342900" lvl="0" marL="457200" rtl="0" algn="l">
+            <a:pPr marL="457200" lvl="0" indent="-342900" algn="l" rtl="0">
               <a:spcBef>
                 <a:spcPts val="0"/>
               </a:spcBef>
@@ -6731,7 +6877,7 @@
             <a:endParaRPr/>
           </a:p>
           <a:p>
-            <a:pPr indent="-342900" lvl="0" marL="457200" rtl="0" algn="l">
+            <a:pPr marL="457200" lvl="0" indent="-342900" algn="l" rtl="0">
               <a:spcBef>
                 <a:spcPts val="0"/>
               </a:spcBef>
@@ -6758,7 +6904,288 @@
 </file>
 
 <file path=ppt/theme/theme1.xml><?xml version="1.0" encoding="utf-8"?>
-<a:theme xmlns:a="http://schemas.openxmlformats.org/drawingml/2006/main" xmlns:r="http://schemas.openxmlformats.org/officeDocument/2006/relationships">
+<a:theme xmlns:a="http://schemas.openxmlformats.org/drawingml/2006/main" name="Simple Light">
+  <a:themeElements>
+    <a:clrScheme name="Simple Light">
+      <a:dk1>
+        <a:srgbClr val="000000"/>
+      </a:dk1>
+      <a:lt1>
+        <a:srgbClr val="FFFFFF"/>
+      </a:lt1>
+      <a:dk2>
+        <a:srgbClr val="595959"/>
+      </a:dk2>
+      <a:lt2>
+        <a:srgbClr val="EEEEEE"/>
+      </a:lt2>
+      <a:accent1>
+        <a:srgbClr val="FFAB40"/>
+      </a:accent1>
+      <a:accent2>
+        <a:srgbClr val="212121"/>
+      </a:accent2>
+      <a:accent3>
+        <a:srgbClr val="78909C"/>
+      </a:accent3>
+      <a:accent4>
+        <a:srgbClr val="FFAB40"/>
+      </a:accent4>
+      <a:accent5>
+        <a:srgbClr val="0097A7"/>
+      </a:accent5>
+      <a:accent6>
+        <a:srgbClr val="EEFF41"/>
+      </a:accent6>
+      <a:hlink>
+        <a:srgbClr val="0097A7"/>
+      </a:hlink>
+      <a:folHlink>
+        <a:srgbClr val="0097A7"/>
+      </a:folHlink>
+    </a:clrScheme>
+    <a:fontScheme name="Office">
+      <a:majorFont>
+        <a:latin typeface="Arial"/>
+        <a:ea typeface=""/>
+        <a:cs typeface=""/>
+        <a:font script="Jpan" typeface="ＭＳ Ｐゴシック"/>
+        <a:font script="Hang" typeface="맑은 고딕"/>
+        <a:font script="Hans" typeface="宋体"/>
+        <a:font script="Hant" typeface="新細明體"/>
+        <a:font script="Arab" typeface="Times New Roman"/>
+        <a:font script="Hebr" typeface="Times New Roman"/>
+        <a:font script="Thai" typeface="Angsana New"/>
+        <a:font script="Ethi" typeface="Nyala"/>
+        <a:font script="Beng" typeface="Vrinda"/>
+        <a:font script="Gujr" typeface="Shruti"/>
+        <a:font script="Khmr" typeface="MoolBoran"/>
+        <a:font script="Knda" typeface="Tunga"/>
+        <a:font script="Guru" typeface="Raavi"/>
+        <a:font script="Cans" typeface="Euphemia"/>
+        <a:font script="Cher" typeface="Plantagenet Cherokee"/>
+        <a:font script="Yiii" typeface="Microsoft Yi Baiti"/>
+        <a:font script="Tibt" typeface="Microsoft Himalaya"/>
+        <a:font script="Thaa" typeface="MV Boli"/>
+        <a:font script="Deva" typeface="Mangal"/>
+        <a:font script="Telu" typeface="Gautami"/>
+        <a:font script="Taml" typeface="Latha"/>
+        <a:font script="Syrc" typeface="Estrangelo Edessa"/>
+        <a:font script="Orya" typeface="Kalinga"/>
+        <a:font script="Mlym" typeface="Kartika"/>
+        <a:font script="Laoo" typeface="DokChampa"/>
+        <a:font script="Sinh" typeface="Iskoola Pota"/>
+        <a:font script="Mong" typeface="Mongolian Baiti"/>
+        <a:font script="Viet" typeface="Times New Roman"/>
+        <a:font script="Uigh" typeface="Microsoft Uighur"/>
+        <a:font script="Geor" typeface="Sylfaen"/>
+      </a:majorFont>
+      <a:minorFont>
+        <a:latin typeface="Arial"/>
+        <a:ea typeface=""/>
+        <a:cs typeface=""/>
+        <a:font script="Jpan" typeface="ＭＳ Ｐゴシック"/>
+        <a:font script="Hang" typeface="맑은 고딕"/>
+        <a:font script="Hans" typeface="宋体"/>
+        <a:font script="Hant" typeface="新細明體"/>
+        <a:font script="Arab" typeface="Arial"/>
+        <a:font script="Hebr" typeface="Arial"/>
+        <a:font script="Thai" typeface="Cordia New"/>
+        <a:font script="Ethi" typeface="Nyala"/>
+        <a:font script="Beng" typeface="Vrinda"/>
+        <a:font script="Gujr" typeface="Shruti"/>
+        <a:font script="Khmr" typeface="DaunPenh"/>
+        <a:font script="Knda" typeface="Tunga"/>
+        <a:font script="Guru" typeface="Raavi"/>
+        <a:font script="Cans" typeface="Euphemia"/>
+        <a:font script="Cher" typeface="Plantagenet Cherokee"/>
+        <a:font script="Yiii" typeface="Microsoft Yi Baiti"/>
+        <a:font script="Tibt" typeface="Microsoft Himalaya"/>
+        <a:font script="Thaa" typeface="MV Boli"/>
+        <a:font script="Deva" typeface="Mangal"/>
+        <a:font script="Telu" typeface="Gautami"/>
+        <a:font script="Taml" typeface="Latha"/>
+        <a:font script="Syrc" typeface="Estrangelo Edessa"/>
+        <a:font script="Orya" typeface="Kalinga"/>
+        <a:font script="Mlym" typeface="Kartika"/>
+        <a:font script="Laoo" typeface="DokChampa"/>
+        <a:font script="Sinh" typeface="Iskoola Pota"/>
+        <a:font script="Mong" typeface="Mongolian Baiti"/>
+        <a:font script="Viet" typeface="Arial"/>
+        <a:font script="Uigh" typeface="Microsoft Uighur"/>
+        <a:font script="Geor" typeface="Sylfaen"/>
+      </a:minorFont>
+    </a:fontScheme>
+    <a:fmtScheme name="Office">
+      <a:fillStyleLst>
+        <a:solidFill>
+          <a:schemeClr val="phClr"/>
+        </a:solidFill>
+        <a:gradFill rotWithShape="1">
+          <a:gsLst>
+            <a:gs pos="0">
+              <a:schemeClr val="phClr">
+                <a:tint val="50000"/>
+                <a:satMod val="300000"/>
+              </a:schemeClr>
+            </a:gs>
+            <a:gs pos="35000">
+              <a:schemeClr val="phClr">
+                <a:tint val="37000"/>
+                <a:satMod val="300000"/>
+              </a:schemeClr>
+            </a:gs>
+            <a:gs pos="100000">
+              <a:schemeClr val="phClr">
+                <a:tint val="15000"/>
+                <a:satMod val="350000"/>
+              </a:schemeClr>
+            </a:gs>
+          </a:gsLst>
+          <a:lin ang="16200000" scaled="1"/>
+        </a:gradFill>
+        <a:gradFill rotWithShape="1">
+          <a:gsLst>
+            <a:gs pos="0">
+              <a:schemeClr val="phClr">
+                <a:tint val="100000"/>
+                <a:shade val="100000"/>
+                <a:satMod val="130000"/>
+              </a:schemeClr>
+            </a:gs>
+            <a:gs pos="100000">
+              <a:schemeClr val="phClr">
+                <a:tint val="50000"/>
+                <a:shade val="100000"/>
+                <a:satMod val="350000"/>
+              </a:schemeClr>
+            </a:gs>
+          </a:gsLst>
+          <a:lin ang="16200000" scaled="0"/>
+        </a:gradFill>
+      </a:fillStyleLst>
+      <a:lnStyleLst>
+        <a:ln w="9525" cap="flat" cmpd="sng" algn="ctr">
+          <a:solidFill>
+            <a:schemeClr val="phClr">
+              <a:shade val="95000"/>
+              <a:satMod val="105000"/>
+            </a:schemeClr>
+          </a:solidFill>
+          <a:prstDash val="solid"/>
+        </a:ln>
+        <a:ln w="25400" cap="flat" cmpd="sng" algn="ctr">
+          <a:solidFill>
+            <a:schemeClr val="phClr"/>
+          </a:solidFill>
+          <a:prstDash val="solid"/>
+        </a:ln>
+        <a:ln w="38100" cap="flat" cmpd="sng" algn="ctr">
+          <a:solidFill>
+            <a:schemeClr val="phClr"/>
+          </a:solidFill>
+          <a:prstDash val="solid"/>
+        </a:ln>
+      </a:lnStyleLst>
+      <a:effectStyleLst>
+        <a:effectStyle>
+          <a:effectLst>
+            <a:outerShdw blurRad="40000" dist="20000" dir="5400000" rotWithShape="0">
+              <a:srgbClr val="000000">
+                <a:alpha val="38000"/>
+              </a:srgbClr>
+            </a:outerShdw>
+          </a:effectLst>
+        </a:effectStyle>
+        <a:effectStyle>
+          <a:effectLst>
+            <a:outerShdw blurRad="40000" dist="23000" dir="5400000" rotWithShape="0">
+              <a:srgbClr val="000000">
+                <a:alpha val="35000"/>
+              </a:srgbClr>
+            </a:outerShdw>
+          </a:effectLst>
+        </a:effectStyle>
+        <a:effectStyle>
+          <a:effectLst>
+            <a:outerShdw blurRad="40000" dist="23000" dir="5400000" rotWithShape="0">
+              <a:srgbClr val="000000">
+                <a:alpha val="35000"/>
+              </a:srgbClr>
+            </a:outerShdw>
+          </a:effectLst>
+          <a:scene3d>
+            <a:camera prst="orthographicFront">
+              <a:rot lat="0" lon="0" rev="0"/>
+            </a:camera>
+            <a:lightRig rig="threePt" dir="t">
+              <a:rot lat="0" lon="0" rev="1200000"/>
+            </a:lightRig>
+          </a:scene3d>
+          <a:sp3d>
+            <a:bevelT w="63500" h="25400"/>
+          </a:sp3d>
+        </a:effectStyle>
+      </a:effectStyleLst>
+      <a:bgFillStyleLst>
+        <a:solidFill>
+          <a:schemeClr val="phClr"/>
+        </a:solidFill>
+        <a:gradFill rotWithShape="1">
+          <a:gsLst>
+            <a:gs pos="0">
+              <a:schemeClr val="phClr">
+                <a:tint val="40000"/>
+                <a:satMod val="350000"/>
+              </a:schemeClr>
+            </a:gs>
+            <a:gs pos="40000">
+              <a:schemeClr val="phClr">
+                <a:tint val="45000"/>
+                <a:shade val="99000"/>
+                <a:satMod val="350000"/>
+              </a:schemeClr>
+            </a:gs>
+            <a:gs pos="100000">
+              <a:schemeClr val="phClr">
+                <a:shade val="20000"/>
+                <a:satMod val="255000"/>
+              </a:schemeClr>
+            </a:gs>
+          </a:gsLst>
+          <a:path path="circle">
+            <a:fillToRect l="50000" t="-80000" r="50000" b="180000"/>
+          </a:path>
+        </a:gradFill>
+        <a:gradFill rotWithShape="1">
+          <a:gsLst>
+            <a:gs pos="0">
+              <a:schemeClr val="phClr">
+                <a:tint val="80000"/>
+                <a:satMod val="300000"/>
+              </a:schemeClr>
+            </a:gs>
+            <a:gs pos="100000">
+              <a:schemeClr val="phClr">
+                <a:shade val="30000"/>
+                <a:satMod val="200000"/>
+              </a:schemeClr>
+            </a:gs>
+          </a:gsLst>
+          <a:path path="circle">
+            <a:fillToRect l="50000" t="50000" r="50000" b="50000"/>
+          </a:path>
+        </a:gradFill>
+      </a:bgFillStyleLst>
+    </a:fmtScheme>
+  </a:themeElements>
+  <a:objectDefaults/>
+  <a:extraClrSchemeLst/>
+</a:theme>
+</file>
+
+<file path=ppt/theme/theme2.xml><?xml version="1.0" encoding="utf-8"?>
+<a:theme xmlns:a="http://schemas.openxmlformats.org/drawingml/2006/main">
   <a:themeElements>
     <a:clrScheme name="Default">
       <a:dk1>
@@ -7033,284 +7460,7 @@
       </a:bgFillStyleLst>
     </a:fmtScheme>
   </a:themeElements>
-</a:theme>
-</file>
-
-<file path=ppt/theme/theme2.xml><?xml version="1.0" encoding="utf-8"?>
-<a:theme xmlns:a="http://schemas.openxmlformats.org/drawingml/2006/main" xmlns:r="http://schemas.openxmlformats.org/officeDocument/2006/relationships" name="Simple Light">
-  <a:themeElements>
-    <a:clrScheme name="Simple Light">
-      <a:dk1>
-        <a:srgbClr val="000000"/>
-      </a:dk1>
-      <a:lt1>
-        <a:srgbClr val="FFFFFF"/>
-      </a:lt1>
-      <a:dk2>
-        <a:srgbClr val="595959"/>
-      </a:dk2>
-      <a:lt2>
-        <a:srgbClr val="EEEEEE"/>
-      </a:lt2>
-      <a:accent1>
-        <a:srgbClr val="FFAB40"/>
-      </a:accent1>
-      <a:accent2>
-        <a:srgbClr val="212121"/>
-      </a:accent2>
-      <a:accent3>
-        <a:srgbClr val="78909C"/>
-      </a:accent3>
-      <a:accent4>
-        <a:srgbClr val="FFAB40"/>
-      </a:accent4>
-      <a:accent5>
-        <a:srgbClr val="0097A7"/>
-      </a:accent5>
-      <a:accent6>
-        <a:srgbClr val="EEFF41"/>
-      </a:accent6>
-      <a:hlink>
-        <a:srgbClr val="0097A7"/>
-      </a:hlink>
-      <a:folHlink>
-        <a:srgbClr val="0097A7"/>
-      </a:folHlink>
-    </a:clrScheme>
-    <a:fontScheme name="Office">
-      <a:majorFont>
-        <a:latin typeface="Arial"/>
-        <a:ea typeface=""/>
-        <a:cs typeface=""/>
-        <a:font script="Jpan" typeface="ＭＳ Ｐゴシック"/>
-        <a:font script="Hang" typeface="맑은 고딕"/>
-        <a:font script="Hans" typeface="宋体"/>
-        <a:font script="Hant" typeface="新細明體"/>
-        <a:font script="Arab" typeface="Times New Roman"/>
-        <a:font script="Hebr" typeface="Times New Roman"/>
-        <a:font script="Thai" typeface="Angsana New"/>
-        <a:font script="Ethi" typeface="Nyala"/>
-        <a:font script="Beng" typeface="Vrinda"/>
-        <a:font script="Gujr" typeface="Shruti"/>
-        <a:font script="Khmr" typeface="MoolBoran"/>
-        <a:font script="Knda" typeface="Tunga"/>
-        <a:font script="Guru" typeface="Raavi"/>
-        <a:font script="Cans" typeface="Euphemia"/>
-        <a:font script="Cher" typeface="Plantagenet Cherokee"/>
-        <a:font script="Yiii" typeface="Microsoft Yi Baiti"/>
-        <a:font script="Tibt" typeface="Microsoft Himalaya"/>
-        <a:font script="Thaa" typeface="MV Boli"/>
-        <a:font script="Deva" typeface="Mangal"/>
-        <a:font script="Telu" typeface="Gautami"/>
-        <a:font script="Taml" typeface="Latha"/>
-        <a:font script="Syrc" typeface="Estrangelo Edessa"/>
-        <a:font script="Orya" typeface="Kalinga"/>
-        <a:font script="Mlym" typeface="Kartika"/>
-        <a:font script="Laoo" typeface="DokChampa"/>
-        <a:font script="Sinh" typeface="Iskoola Pota"/>
-        <a:font script="Mong" typeface="Mongolian Baiti"/>
-        <a:font script="Viet" typeface="Times New Roman"/>
-        <a:font script="Uigh" typeface="Microsoft Uighur"/>
-        <a:font script="Geor" typeface="Sylfaen"/>
-      </a:majorFont>
-      <a:minorFont>
-        <a:latin typeface="Arial"/>
-        <a:ea typeface=""/>
-        <a:cs typeface=""/>
-        <a:font script="Jpan" typeface="ＭＳ Ｐゴシック"/>
-        <a:font script="Hang" typeface="맑은 고딕"/>
-        <a:font script="Hans" typeface="宋体"/>
-        <a:font script="Hant" typeface="新細明體"/>
-        <a:font script="Arab" typeface="Arial"/>
-        <a:font script="Hebr" typeface="Arial"/>
-        <a:font script="Thai" typeface="Cordia New"/>
-        <a:font script="Ethi" typeface="Nyala"/>
-        <a:font script="Beng" typeface="Vrinda"/>
-        <a:font script="Gujr" typeface="Shruti"/>
-        <a:font script="Khmr" typeface="DaunPenh"/>
-        <a:font script="Knda" typeface="Tunga"/>
-        <a:font script="Guru" typeface="Raavi"/>
-        <a:font script="Cans" typeface="Euphemia"/>
-        <a:font script="Cher" typeface="Plantagenet Cherokee"/>
-        <a:font script="Yiii" typeface="Microsoft Yi Baiti"/>
-        <a:font script="Tibt" typeface="Microsoft Himalaya"/>
-        <a:font script="Thaa" typeface="MV Boli"/>
-        <a:font script="Deva" typeface="Mangal"/>
-        <a:font script="Telu" typeface="Gautami"/>
-        <a:font script="Taml" typeface="Latha"/>
-        <a:font script="Syrc" typeface="Estrangelo Edessa"/>
-        <a:font script="Orya" typeface="Kalinga"/>
-        <a:font script="Mlym" typeface="Kartika"/>
-        <a:font script="Laoo" typeface="DokChampa"/>
-        <a:font script="Sinh" typeface="Iskoola Pota"/>
-        <a:font script="Mong" typeface="Mongolian Baiti"/>
-        <a:font script="Viet" typeface="Arial"/>
-        <a:font script="Uigh" typeface="Microsoft Uighur"/>
-        <a:font script="Geor" typeface="Sylfaen"/>
-      </a:minorFont>
-    </a:fontScheme>
-    <a:fmtScheme name="Office">
-      <a:fillStyleLst>
-        <a:solidFill>
-          <a:schemeClr val="phClr"/>
-        </a:solidFill>
-        <a:gradFill rotWithShape="1">
-          <a:gsLst>
-            <a:gs pos="0">
-              <a:schemeClr val="phClr">
-                <a:tint val="50000"/>
-                <a:satMod val="300000"/>
-              </a:schemeClr>
-            </a:gs>
-            <a:gs pos="35000">
-              <a:schemeClr val="phClr">
-                <a:tint val="37000"/>
-                <a:satMod val="300000"/>
-              </a:schemeClr>
-            </a:gs>
-            <a:gs pos="100000">
-              <a:schemeClr val="phClr">
-                <a:tint val="15000"/>
-                <a:satMod val="350000"/>
-              </a:schemeClr>
-            </a:gs>
-          </a:gsLst>
-          <a:lin ang="16200000" scaled="1"/>
-        </a:gradFill>
-        <a:gradFill rotWithShape="1">
-          <a:gsLst>
-            <a:gs pos="0">
-              <a:schemeClr val="phClr">
-                <a:tint val="100000"/>
-                <a:shade val="100000"/>
-                <a:satMod val="130000"/>
-              </a:schemeClr>
-            </a:gs>
-            <a:gs pos="100000">
-              <a:schemeClr val="phClr">
-                <a:tint val="50000"/>
-                <a:shade val="100000"/>
-                <a:satMod val="350000"/>
-              </a:schemeClr>
-            </a:gs>
-          </a:gsLst>
-          <a:lin ang="16200000" scaled="0"/>
-        </a:gradFill>
-      </a:fillStyleLst>
-      <a:lnStyleLst>
-        <a:ln w="9525" cap="flat" cmpd="sng" algn="ctr">
-          <a:solidFill>
-            <a:schemeClr val="phClr">
-              <a:shade val="95000"/>
-              <a:satMod val="105000"/>
-            </a:schemeClr>
-          </a:solidFill>
-          <a:prstDash val="solid"/>
-        </a:ln>
-        <a:ln w="25400" cap="flat" cmpd="sng" algn="ctr">
-          <a:solidFill>
-            <a:schemeClr val="phClr"/>
-          </a:solidFill>
-          <a:prstDash val="solid"/>
-        </a:ln>
-        <a:ln w="38100" cap="flat" cmpd="sng" algn="ctr">
-          <a:solidFill>
-            <a:schemeClr val="phClr"/>
-          </a:solidFill>
-          <a:prstDash val="solid"/>
-        </a:ln>
-      </a:lnStyleLst>
-      <a:effectStyleLst>
-        <a:effectStyle>
-          <a:effectLst>
-            <a:outerShdw blurRad="40000" dist="20000" dir="5400000" rotWithShape="0">
-              <a:srgbClr val="000000">
-                <a:alpha val="38000"/>
-              </a:srgbClr>
-            </a:outerShdw>
-          </a:effectLst>
-        </a:effectStyle>
-        <a:effectStyle>
-          <a:effectLst>
-            <a:outerShdw blurRad="40000" dist="23000" dir="5400000" rotWithShape="0">
-              <a:srgbClr val="000000">
-                <a:alpha val="35000"/>
-              </a:srgbClr>
-            </a:outerShdw>
-          </a:effectLst>
-        </a:effectStyle>
-        <a:effectStyle>
-          <a:effectLst>
-            <a:outerShdw blurRad="40000" dist="23000" dir="5400000" rotWithShape="0">
-              <a:srgbClr val="000000">
-                <a:alpha val="35000"/>
-              </a:srgbClr>
-            </a:outerShdw>
-          </a:effectLst>
-          <a:scene3d>
-            <a:camera prst="orthographicFront">
-              <a:rot lat="0" lon="0" rev="0"/>
-            </a:camera>
-            <a:lightRig rig="threePt" dir="t">
-              <a:rot lat="0" lon="0" rev="1200000"/>
-            </a:lightRig>
-          </a:scene3d>
-          <a:sp3d>
-            <a:bevelT w="63500" h="25400"/>
-          </a:sp3d>
-        </a:effectStyle>
-      </a:effectStyleLst>
-      <a:bgFillStyleLst>
-        <a:solidFill>
-          <a:schemeClr val="phClr"/>
-        </a:solidFill>
-        <a:gradFill rotWithShape="1">
-          <a:gsLst>
-            <a:gs pos="0">
-              <a:schemeClr val="phClr">
-                <a:tint val="40000"/>
-                <a:satMod val="350000"/>
-              </a:schemeClr>
-            </a:gs>
-            <a:gs pos="40000">
-              <a:schemeClr val="phClr">
-                <a:tint val="45000"/>
-                <a:shade val="99000"/>
-                <a:satMod val="350000"/>
-              </a:schemeClr>
-            </a:gs>
-            <a:gs pos="100000">
-              <a:schemeClr val="phClr">
-                <a:shade val="20000"/>
-                <a:satMod val="255000"/>
-              </a:schemeClr>
-            </a:gs>
-          </a:gsLst>
-          <a:path path="circle">
-            <a:fillToRect l="50000" t="-80000" r="50000" b="180000"/>
-          </a:path>
-        </a:gradFill>
-        <a:gradFill rotWithShape="1">
-          <a:gsLst>
-            <a:gs pos="0">
-              <a:schemeClr val="phClr">
-                <a:tint val="80000"/>
-                <a:satMod val="300000"/>
-              </a:schemeClr>
-            </a:gs>
-            <a:gs pos="100000">
-              <a:schemeClr val="phClr">
-                <a:shade val="30000"/>
-                <a:satMod val="200000"/>
-              </a:schemeClr>
-            </a:gs>
-          </a:gsLst>
-          <a:path path="circle">
-            <a:fillToRect l="50000" t="50000" r="50000" b="50000"/>
-          </a:path>
-        </a:gradFill>
-      </a:bgFillStyleLst>
-    </a:fmtScheme>
-  </a:themeElements>
+  <a:objectDefaults/>
+  <a:extraClrSchemeLst/>
 </a:theme>
 </file>
</xml_diff>